<commit_message>
add the progress presentation v1 : [Etat d'avancement V2]
</commit_message>
<xml_diff>
--- a/Progress' Presentations/Etat d'avancement - S1.pptx
+++ b/Progress' Presentations/Etat d'avancement - S1.pptx
@@ -5,16 +5,12 @@
     <p:sldMasterId id="2147483648" r:id="rId1"/>
   </p:sldMasterIdLst>
   <p:sldIdLst>
-    <p:sldId id="262" r:id="rId2"/>
-    <p:sldId id="264" r:id="rId3"/>
-    <p:sldId id="263" r:id="rId4"/>
-    <p:sldId id="266" r:id="rId5"/>
-    <p:sldId id="265" r:id="rId6"/>
-    <p:sldId id="261" r:id="rId7"/>
-    <p:sldId id="256" r:id="rId8"/>
-    <p:sldId id="259" r:id="rId9"/>
-    <p:sldId id="257" r:id="rId10"/>
-    <p:sldId id="260" r:id="rId11"/>
+    <p:sldId id="263" r:id="rId2"/>
+    <p:sldId id="261" r:id="rId3"/>
+    <p:sldId id="256" r:id="rId4"/>
+    <p:sldId id="259" r:id="rId5"/>
+    <p:sldId id="257" r:id="rId6"/>
+    <p:sldId id="260" r:id="rId7"/>
   </p:sldIdLst>
   <p:sldSz cx="12192000" cy="6858000"/>
   <p:notesSz cx="6858000" cy="9144000"/>
@@ -270,7 +266,7 @@
           <a:p>
             <a:fld id="{33C3348E-3C1A-4598-9A7B-0D66E8588920}" type="datetimeFigureOut">
               <a:rPr lang="fr-FR" smtClean="0"/>
-              <a:t>29/11/2021</a:t>
+              <a:t>30/11/2021</a:t>
             </a:fld>
             <a:endParaRPr lang="fr-FR"/>
           </a:p>
@@ -470,7 +466,7 @@
           <a:p>
             <a:fld id="{33C3348E-3C1A-4598-9A7B-0D66E8588920}" type="datetimeFigureOut">
               <a:rPr lang="fr-FR" smtClean="0"/>
-              <a:t>29/11/2021</a:t>
+              <a:t>30/11/2021</a:t>
             </a:fld>
             <a:endParaRPr lang="fr-FR"/>
           </a:p>
@@ -680,7 +676,7 @@
           <a:p>
             <a:fld id="{33C3348E-3C1A-4598-9A7B-0D66E8588920}" type="datetimeFigureOut">
               <a:rPr lang="fr-FR" smtClean="0"/>
-              <a:t>29/11/2021</a:t>
+              <a:t>30/11/2021</a:t>
             </a:fld>
             <a:endParaRPr lang="fr-FR"/>
           </a:p>
@@ -880,7 +876,7 @@
           <a:p>
             <a:fld id="{33C3348E-3C1A-4598-9A7B-0D66E8588920}" type="datetimeFigureOut">
               <a:rPr lang="fr-FR" smtClean="0"/>
-              <a:t>29/11/2021</a:t>
+              <a:t>30/11/2021</a:t>
             </a:fld>
             <a:endParaRPr lang="fr-FR"/>
           </a:p>
@@ -1156,7 +1152,7 @@
           <a:p>
             <a:fld id="{33C3348E-3C1A-4598-9A7B-0D66E8588920}" type="datetimeFigureOut">
               <a:rPr lang="fr-FR" smtClean="0"/>
-              <a:t>29/11/2021</a:t>
+              <a:t>30/11/2021</a:t>
             </a:fld>
             <a:endParaRPr lang="fr-FR"/>
           </a:p>
@@ -1424,7 +1420,7 @@
           <a:p>
             <a:fld id="{33C3348E-3C1A-4598-9A7B-0D66E8588920}" type="datetimeFigureOut">
               <a:rPr lang="fr-FR" smtClean="0"/>
-              <a:t>29/11/2021</a:t>
+              <a:t>30/11/2021</a:t>
             </a:fld>
             <a:endParaRPr lang="fr-FR"/>
           </a:p>
@@ -1839,7 +1835,7 @@
           <a:p>
             <a:fld id="{33C3348E-3C1A-4598-9A7B-0D66E8588920}" type="datetimeFigureOut">
               <a:rPr lang="fr-FR" smtClean="0"/>
-              <a:t>29/11/2021</a:t>
+              <a:t>30/11/2021</a:t>
             </a:fld>
             <a:endParaRPr lang="fr-FR"/>
           </a:p>
@@ -1981,7 +1977,7 @@
           <a:p>
             <a:fld id="{33C3348E-3C1A-4598-9A7B-0D66E8588920}" type="datetimeFigureOut">
               <a:rPr lang="fr-FR" smtClean="0"/>
-              <a:t>29/11/2021</a:t>
+              <a:t>30/11/2021</a:t>
             </a:fld>
             <a:endParaRPr lang="fr-FR"/>
           </a:p>
@@ -2094,7 +2090,7 @@
           <a:p>
             <a:fld id="{33C3348E-3C1A-4598-9A7B-0D66E8588920}" type="datetimeFigureOut">
               <a:rPr lang="fr-FR" smtClean="0"/>
-              <a:t>29/11/2021</a:t>
+              <a:t>30/11/2021</a:t>
             </a:fld>
             <a:endParaRPr lang="fr-FR"/>
           </a:p>
@@ -2407,7 +2403,7 @@
           <a:p>
             <a:fld id="{33C3348E-3C1A-4598-9A7B-0D66E8588920}" type="datetimeFigureOut">
               <a:rPr lang="fr-FR" smtClean="0"/>
-              <a:t>29/11/2021</a:t>
+              <a:t>30/11/2021</a:t>
             </a:fld>
             <a:endParaRPr lang="fr-FR"/>
           </a:p>
@@ -2696,7 +2692,7 @@
           <a:p>
             <a:fld id="{33C3348E-3C1A-4598-9A7B-0D66E8588920}" type="datetimeFigureOut">
               <a:rPr lang="fr-FR" smtClean="0"/>
-              <a:t>29/11/2021</a:t>
+              <a:t>30/11/2021</a:t>
             </a:fld>
             <a:endParaRPr lang="fr-FR"/>
           </a:p>
@@ -2939,7 +2935,7 @@
           <a:p>
             <a:fld id="{33C3348E-3C1A-4598-9A7B-0D66E8588920}" type="datetimeFigureOut">
               <a:rPr lang="fr-FR" smtClean="0"/>
-              <a:t>29/11/2021</a:t>
+              <a:t>30/11/2021</a:t>
             </a:fld>
             <a:endParaRPr lang="fr-FR"/>
           </a:p>
@@ -3358,554 +3354,6 @@
       </p:grpSpPr>
       <p:sp>
         <p:nvSpPr>
-          <p:cNvPr id="3" name="Rectangle 2">
-            <a:extLst>
-              <a:ext uri="{FF2B5EF4-FFF2-40B4-BE49-F238E27FC236}">
-                <a16:creationId xmlns:a16="http://schemas.microsoft.com/office/drawing/2014/main" id="{11737221-2AAA-4F9E-AF9B-0F9E01C49AA9}"/>
-              </a:ext>
-            </a:extLst>
-          </p:cNvPr>
-          <p:cNvSpPr/>
-          <p:nvPr/>
-        </p:nvSpPr>
-        <p:spPr>
-          <a:xfrm>
-            <a:off x="0" y="2442133"/>
-            <a:ext cx="12192000" cy="2459864"/>
-          </a:xfrm>
-          <a:prstGeom prst="rect">
-            <a:avLst/>
-          </a:prstGeom>
-          <a:solidFill>
-            <a:schemeClr val="accent6">
-              <a:lumMod val="20000"/>
-              <a:lumOff val="80000"/>
-            </a:schemeClr>
-          </a:solidFill>
-          <a:ln>
-            <a:noFill/>
-          </a:ln>
-        </p:spPr>
-        <p:style>
-          <a:lnRef idx="2">
-            <a:schemeClr val="accent1">
-              <a:shade val="50000"/>
-            </a:schemeClr>
-          </a:lnRef>
-          <a:fillRef idx="1">
-            <a:schemeClr val="accent1"/>
-          </a:fillRef>
-          <a:effectRef idx="0">
-            <a:schemeClr val="accent1"/>
-          </a:effectRef>
-          <a:fontRef idx="minor">
-            <a:schemeClr val="lt1"/>
-          </a:fontRef>
-        </p:style>
-        <p:txBody>
-          <a:bodyPr rtlCol="0" anchor="ctr"/>
-          <a:lstStyle/>
-          <a:p>
-            <a:pPr algn="ctr"/>
-            <a:endParaRPr lang="fr-FR"/>
-          </a:p>
-        </p:txBody>
-      </p:sp>
-      <p:pic>
-        <p:nvPicPr>
-          <p:cNvPr id="2" name="Image 1">
-            <a:extLst>
-              <a:ext uri="{FF2B5EF4-FFF2-40B4-BE49-F238E27FC236}">
-                <a16:creationId xmlns:a16="http://schemas.microsoft.com/office/drawing/2014/main" id="{A7F62FCF-E074-4FE9-A388-66EB7C9FEB28}"/>
-              </a:ext>
-            </a:extLst>
-          </p:cNvPr>
-          <p:cNvPicPr>
-            <a:picLocks noChangeAspect="1"/>
-          </p:cNvPicPr>
-          <p:nvPr/>
-        </p:nvPicPr>
-        <p:blipFill rotWithShape="1">
-          <a:blip r:embed="rId2"/>
-          <a:srcRect r="541"/>
-          <a:stretch/>
-        </p:blipFill>
-        <p:spPr>
-          <a:xfrm>
-            <a:off x="238007" y="1063225"/>
-            <a:ext cx="11438586" cy="4731550"/>
-          </a:xfrm>
-          <a:prstGeom prst="rect">
-            <a:avLst/>
-          </a:prstGeom>
-          <a:ln>
-            <a:solidFill>
-              <a:schemeClr val="bg1">
-                <a:lumMod val="85000"/>
-              </a:schemeClr>
-            </a:solidFill>
-          </a:ln>
-        </p:spPr>
-      </p:pic>
-    </p:spTree>
-    <p:extLst>
-      <p:ext uri="{BB962C8B-B14F-4D97-AF65-F5344CB8AC3E}">
-        <p14:creationId xmlns:p14="http://schemas.microsoft.com/office/powerpoint/2010/main" val="2177250427"/>
-      </p:ext>
-    </p:extLst>
-  </p:cSld>
-  <p:clrMapOvr>
-    <a:masterClrMapping/>
-  </p:clrMapOvr>
-</p:sld>
-</file>
-
-<file path=ppt/slides/slide10.xml><?xml version="1.0" encoding="utf-8"?>
-<p:sld xmlns:a="http://schemas.openxmlformats.org/drawingml/2006/main" xmlns:r="http://schemas.openxmlformats.org/officeDocument/2006/relationships" xmlns:p="http://schemas.openxmlformats.org/presentationml/2006/main">
-  <p:cSld>
-    <p:spTree>
-      <p:nvGrpSpPr>
-        <p:cNvPr id="1" name=""/>
-        <p:cNvGrpSpPr/>
-        <p:nvPr/>
-      </p:nvGrpSpPr>
-      <p:grpSpPr>
-        <a:xfrm>
-          <a:off x="0" y="0"/>
-          <a:ext cx="0" cy="0"/>
-          <a:chOff x="0" y="0"/>
-          <a:chExt cx="0" cy="0"/>
-        </a:xfrm>
-      </p:grpSpPr>
-      <p:sp>
-        <p:nvSpPr>
-          <p:cNvPr id="2" name="Title 1">
-            <a:extLst>
-              <a:ext uri="{FF2B5EF4-FFF2-40B4-BE49-F238E27FC236}">
-                <a16:creationId xmlns:a16="http://schemas.microsoft.com/office/drawing/2014/main" id="{3D20979F-C224-45DD-9A21-BF0CF8E7A524}"/>
-              </a:ext>
-            </a:extLst>
-          </p:cNvPr>
-          <p:cNvSpPr>
-            <a:spLocks noGrp="1"/>
-          </p:cNvSpPr>
-          <p:nvPr>
-            <p:ph type="title"/>
-          </p:nvPr>
-        </p:nvSpPr>
-        <p:spPr>
-          <a:xfrm>
-            <a:off x="155620" y="274667"/>
-            <a:ext cx="3180008" cy="1325563"/>
-          </a:xfrm>
-        </p:spPr>
-        <p:txBody>
-          <a:bodyPr/>
-          <a:lstStyle/>
-          <a:p>
-            <a:r>
-              <a:rPr lang="en-US" dirty="0">
-                <a:latin typeface="Times New Roman" panose="02020603050405020304" pitchFamily="18" charset="0"/>
-                <a:cs typeface="Times New Roman" panose="02020603050405020304" pitchFamily="18" charset="0"/>
-              </a:rPr>
-              <a:t>Current Step</a:t>
-            </a:r>
-            <a:endParaRPr lang="fr-FR" dirty="0">
-              <a:latin typeface="Times New Roman" panose="02020603050405020304" pitchFamily="18" charset="0"/>
-              <a:cs typeface="Times New Roman" panose="02020603050405020304" pitchFamily="18" charset="0"/>
-            </a:endParaRPr>
-          </a:p>
-        </p:txBody>
-      </p:sp>
-      <p:pic>
-        <p:nvPicPr>
-          <p:cNvPr id="1030" name="Picture 6" descr="Afficher l’image source">
-            <a:extLst>
-              <a:ext uri="{FF2B5EF4-FFF2-40B4-BE49-F238E27FC236}">
-                <a16:creationId xmlns:a16="http://schemas.microsoft.com/office/drawing/2014/main" id="{4D506C72-7495-492D-9C62-F747B9444F0B}"/>
-              </a:ext>
-            </a:extLst>
-          </p:cNvPr>
-          <p:cNvPicPr>
-            <a:picLocks noChangeAspect="1" noChangeArrowheads="1"/>
-          </p:cNvPicPr>
-          <p:nvPr/>
-        </p:nvPicPr>
-        <p:blipFill>
-          <a:blip r:embed="rId2">
-            <a:extLst>
-              <a:ext uri="{28A0092B-C50C-407E-A947-70E740481C1C}">
-                <a14:useLocalDpi xmlns:a14="http://schemas.microsoft.com/office/drawing/2010/main" val="0"/>
-              </a:ext>
-            </a:extLst>
-          </a:blip>
-          <a:srcRect/>
-          <a:stretch>
-            <a:fillRect/>
-          </a:stretch>
-        </p:blipFill>
-        <p:spPr bwMode="auto">
-          <a:xfrm>
-            <a:off x="6858434" y="1504186"/>
-            <a:ext cx="3857647" cy="3849627"/>
-          </a:xfrm>
-          <a:prstGeom prst="rect">
-            <a:avLst/>
-          </a:prstGeom>
-          <a:noFill/>
-          <a:extLst>
-            <a:ext uri="{909E8E84-426E-40DD-AFC4-6F175D3DCCD1}">
-              <a14:hiddenFill xmlns:a14="http://schemas.microsoft.com/office/drawing/2010/main">
-                <a:solidFill>
-                  <a:srgbClr val="FFFFFF"/>
-                </a:solidFill>
-              </a14:hiddenFill>
-            </a:ext>
-          </a:extLst>
-        </p:spPr>
-      </p:pic>
-      <p:pic>
-        <p:nvPicPr>
-          <p:cNvPr id="6" name="Graphic 5" descr="Smart Phone">
-            <a:extLst>
-              <a:ext uri="{FF2B5EF4-FFF2-40B4-BE49-F238E27FC236}">
-                <a16:creationId xmlns:a16="http://schemas.microsoft.com/office/drawing/2014/main" id="{A84BC0C8-5514-4306-A6B8-15B819A3EB3C}"/>
-              </a:ext>
-            </a:extLst>
-          </p:cNvPr>
-          <p:cNvPicPr>
-            <a:picLocks noChangeAspect="1"/>
-          </p:cNvPicPr>
-          <p:nvPr/>
-        </p:nvPicPr>
-        <p:blipFill>
-          <a:blip r:embed="rId3">
-            <a:extLst>
-              <a:ext uri="{28A0092B-C50C-407E-A947-70E740481C1C}">
-                <a14:useLocalDpi xmlns:a14="http://schemas.microsoft.com/office/drawing/2010/main" val="0"/>
-              </a:ext>
-              <a:ext uri="{96DAC541-7B7A-43D3-8B79-37D633B846F1}">
-                <asvg:svgBlip xmlns:asvg="http://schemas.microsoft.com/office/drawing/2016/SVG/main" r:embed="rId4"/>
-              </a:ext>
-            </a:extLst>
-          </a:blip>
-          <a:stretch>
-            <a:fillRect/>
-          </a:stretch>
-        </p:blipFill>
-        <p:spPr>
-          <a:xfrm>
-            <a:off x="1475919" y="2528652"/>
-            <a:ext cx="1226927" cy="1226927"/>
-          </a:xfrm>
-          <a:prstGeom prst="rect">
-            <a:avLst/>
-          </a:prstGeom>
-        </p:spPr>
-      </p:pic>
-      <p:sp>
-        <p:nvSpPr>
-          <p:cNvPr id="7" name="Rectangle 6">
-            <a:extLst>
-              <a:ext uri="{FF2B5EF4-FFF2-40B4-BE49-F238E27FC236}">
-                <a16:creationId xmlns:a16="http://schemas.microsoft.com/office/drawing/2014/main" id="{9DB97059-FE87-4E9D-B25F-B7B1A12A5528}"/>
-              </a:ext>
-            </a:extLst>
-          </p:cNvPr>
-          <p:cNvSpPr/>
-          <p:nvPr/>
-        </p:nvSpPr>
-        <p:spPr>
-          <a:xfrm>
-            <a:off x="932645" y="3965551"/>
-            <a:ext cx="2805448" cy="369332"/>
-          </a:xfrm>
-          <a:prstGeom prst="rect">
-            <a:avLst/>
-          </a:prstGeom>
-        </p:spPr>
-        <p:txBody>
-          <a:bodyPr wrap="none">
-            <a:spAutoFit/>
-          </a:bodyPr>
-          <a:lstStyle/>
-          <a:p>
-            <a:r>
-              <a:rPr lang="fr-FR" dirty="0" err="1">
-                <a:solidFill>
-                  <a:srgbClr val="24292F"/>
-                </a:solidFill>
-                <a:latin typeface="Times New Roman" panose="02020603050405020304" pitchFamily="18" charset="0"/>
-                <a:cs typeface="Times New Roman" panose="02020603050405020304" pitchFamily="18" charset="0"/>
-              </a:rPr>
-              <a:t>Traccar</a:t>
-            </a:r>
-            <a:r>
-              <a:rPr lang="fr-FR" dirty="0">
-                <a:solidFill>
-                  <a:srgbClr val="24292F"/>
-                </a:solidFill>
-                <a:latin typeface="Times New Roman" panose="02020603050405020304" pitchFamily="18" charset="0"/>
-                <a:cs typeface="Times New Roman" panose="02020603050405020304" pitchFamily="18" charset="0"/>
-              </a:rPr>
-              <a:t> Client (Application)</a:t>
-            </a:r>
-            <a:endParaRPr lang="fr-FR" dirty="0">
-              <a:latin typeface="Times New Roman" panose="02020603050405020304" pitchFamily="18" charset="0"/>
-              <a:cs typeface="Times New Roman" panose="02020603050405020304" pitchFamily="18" charset="0"/>
-            </a:endParaRPr>
-          </a:p>
-        </p:txBody>
-      </p:sp>
-      <p:sp>
-        <p:nvSpPr>
-          <p:cNvPr id="10" name="Rectangle 9">
-            <a:extLst>
-              <a:ext uri="{FF2B5EF4-FFF2-40B4-BE49-F238E27FC236}">
-                <a16:creationId xmlns:a16="http://schemas.microsoft.com/office/drawing/2014/main" id="{BF36CDF2-D11D-46DA-BB61-6D325F6CADDC}"/>
-              </a:ext>
-            </a:extLst>
-          </p:cNvPr>
-          <p:cNvSpPr/>
-          <p:nvPr/>
-        </p:nvSpPr>
-        <p:spPr>
-          <a:xfrm>
-            <a:off x="7563118" y="5637658"/>
-            <a:ext cx="2318135" cy="369332"/>
-          </a:xfrm>
-          <a:prstGeom prst="rect">
-            <a:avLst/>
-          </a:prstGeom>
-        </p:spPr>
-        <p:txBody>
-          <a:bodyPr wrap="none">
-            <a:spAutoFit/>
-          </a:bodyPr>
-          <a:lstStyle/>
-          <a:p>
-            <a:r>
-              <a:rPr lang="fr-FR" dirty="0" err="1">
-                <a:solidFill>
-                  <a:srgbClr val="24292F"/>
-                </a:solidFill>
-                <a:latin typeface="Times New Roman" panose="02020603050405020304" pitchFamily="18" charset="0"/>
-                <a:cs typeface="Times New Roman" panose="02020603050405020304" pitchFamily="18" charset="0"/>
-              </a:rPr>
-              <a:t>Traccar</a:t>
-            </a:r>
-            <a:r>
-              <a:rPr lang="fr-FR" dirty="0">
-                <a:solidFill>
-                  <a:srgbClr val="24292F"/>
-                </a:solidFill>
-                <a:latin typeface="Times New Roman" panose="02020603050405020304" pitchFamily="18" charset="0"/>
-                <a:cs typeface="Times New Roman" panose="02020603050405020304" pitchFamily="18" charset="0"/>
-              </a:rPr>
-              <a:t> Client (Server)</a:t>
-            </a:r>
-            <a:endParaRPr lang="fr-FR" dirty="0">
-              <a:latin typeface="Times New Roman" panose="02020603050405020304" pitchFamily="18" charset="0"/>
-              <a:cs typeface="Times New Roman" panose="02020603050405020304" pitchFamily="18" charset="0"/>
-            </a:endParaRPr>
-          </a:p>
-        </p:txBody>
-      </p:sp>
-      <p:cxnSp>
-        <p:nvCxnSpPr>
-          <p:cNvPr id="12" name="Straight Arrow Connector 11">
-            <a:extLst>
-              <a:ext uri="{FF2B5EF4-FFF2-40B4-BE49-F238E27FC236}">
-                <a16:creationId xmlns:a16="http://schemas.microsoft.com/office/drawing/2014/main" id="{CF7EF238-5E5E-4E90-B8F2-A651811A1352}"/>
-              </a:ext>
-            </a:extLst>
-          </p:cNvPr>
-          <p:cNvCxnSpPr/>
-          <p:nvPr/>
-        </p:nvCxnSpPr>
-        <p:spPr>
-          <a:xfrm>
-            <a:off x="3335628" y="3142115"/>
-            <a:ext cx="3181082" cy="0"/>
-          </a:xfrm>
-          <a:prstGeom prst="straightConnector1">
-            <a:avLst/>
-          </a:prstGeom>
-          <a:ln w="28575">
-            <a:solidFill>
-              <a:schemeClr val="tx1"/>
-            </a:solidFill>
-            <a:headEnd type="triangle"/>
-            <a:tailEnd type="triangle"/>
-          </a:ln>
-        </p:spPr>
-        <p:style>
-          <a:lnRef idx="1">
-            <a:schemeClr val="accent1"/>
-          </a:lnRef>
-          <a:fillRef idx="0">
-            <a:schemeClr val="accent1"/>
-          </a:fillRef>
-          <a:effectRef idx="0">
-            <a:schemeClr val="accent1"/>
-          </a:effectRef>
-          <a:fontRef idx="minor">
-            <a:schemeClr val="tx1"/>
-          </a:fontRef>
-        </p:style>
-      </p:cxnSp>
-      <p:sp>
-        <p:nvSpPr>
-          <p:cNvPr id="15" name="Rectangle 14">
-            <a:extLst>
-              <a:ext uri="{FF2B5EF4-FFF2-40B4-BE49-F238E27FC236}">
-                <a16:creationId xmlns:a16="http://schemas.microsoft.com/office/drawing/2014/main" id="{EF622F5A-7792-4884-997F-97822869CDF9}"/>
-              </a:ext>
-            </a:extLst>
-          </p:cNvPr>
-          <p:cNvSpPr/>
-          <p:nvPr/>
-        </p:nvSpPr>
-        <p:spPr>
-          <a:xfrm>
-            <a:off x="3269305" y="2667797"/>
-            <a:ext cx="3256020" cy="369332"/>
-          </a:xfrm>
-          <a:prstGeom prst="rect">
-            <a:avLst/>
-          </a:prstGeom>
-        </p:spPr>
-        <p:txBody>
-          <a:bodyPr wrap="none">
-            <a:spAutoFit/>
-          </a:bodyPr>
-          <a:lstStyle/>
-          <a:p>
-            <a:r>
-              <a:rPr lang="fr-FR" dirty="0" err="1">
-                <a:solidFill>
-                  <a:srgbClr val="24292F"/>
-                </a:solidFill>
-                <a:latin typeface="Times New Roman" panose="02020603050405020304" pitchFamily="18" charset="0"/>
-                <a:cs typeface="Times New Roman" panose="02020603050405020304" pitchFamily="18" charset="0"/>
-              </a:rPr>
-              <a:t>Bind</a:t>
-            </a:r>
-            <a:r>
-              <a:rPr lang="fr-FR" dirty="0">
-                <a:solidFill>
-                  <a:srgbClr val="24292F"/>
-                </a:solidFill>
-                <a:latin typeface="Times New Roman" panose="02020603050405020304" pitchFamily="18" charset="0"/>
-                <a:cs typeface="Times New Roman" panose="02020603050405020304" pitchFamily="18" charset="0"/>
-              </a:rPr>
-              <a:t> the application to the server</a:t>
-            </a:r>
-            <a:endParaRPr lang="fr-FR" dirty="0">
-              <a:latin typeface="Times New Roman" panose="02020603050405020304" pitchFamily="18" charset="0"/>
-              <a:cs typeface="Times New Roman" panose="02020603050405020304" pitchFamily="18" charset="0"/>
-            </a:endParaRPr>
-          </a:p>
-        </p:txBody>
-      </p:sp>
-    </p:spTree>
-    <p:extLst>
-      <p:ext uri="{BB962C8B-B14F-4D97-AF65-F5344CB8AC3E}">
-        <p14:creationId xmlns:p14="http://schemas.microsoft.com/office/powerpoint/2010/main" val="83230128"/>
-      </p:ext>
-    </p:extLst>
-  </p:cSld>
-  <p:clrMapOvr>
-    <a:masterClrMapping/>
-  </p:clrMapOvr>
-</p:sld>
-</file>
-
-<file path=ppt/slides/slide2.xml><?xml version="1.0" encoding="utf-8"?>
-<p:sld xmlns:a="http://schemas.openxmlformats.org/drawingml/2006/main" xmlns:r="http://schemas.openxmlformats.org/officeDocument/2006/relationships" xmlns:p="http://schemas.openxmlformats.org/presentationml/2006/main">
-  <p:cSld>
-    <p:spTree>
-      <p:nvGrpSpPr>
-        <p:cNvPr id="1" name=""/>
-        <p:cNvGrpSpPr/>
-        <p:nvPr/>
-      </p:nvGrpSpPr>
-      <p:grpSpPr>
-        <a:xfrm>
-          <a:off x="0" y="0"/>
-          <a:ext cx="0" cy="0"/>
-          <a:chOff x="0" y="0"/>
-          <a:chExt cx="0" cy="0"/>
-        </a:xfrm>
-      </p:grpSpPr>
-      <p:pic>
-        <p:nvPicPr>
-          <p:cNvPr id="3" name="Image 2">
-            <a:extLst>
-              <a:ext uri="{FF2B5EF4-FFF2-40B4-BE49-F238E27FC236}">
-                <a16:creationId xmlns:a16="http://schemas.microsoft.com/office/drawing/2014/main" id="{79D69101-CB47-4C86-8024-EA1EA221CAF2}"/>
-              </a:ext>
-            </a:extLst>
-          </p:cNvPr>
-          <p:cNvPicPr>
-            <a:picLocks noChangeAspect="1"/>
-          </p:cNvPicPr>
-          <p:nvPr/>
-        </p:nvPicPr>
-        <p:blipFill>
-          <a:blip r:embed="rId2">
-            <a:extLst>
-              <a:ext uri="{28A0092B-C50C-407E-A947-70E740481C1C}">
-                <a14:useLocalDpi xmlns:a14="http://schemas.microsoft.com/office/drawing/2010/main" val="0"/>
-              </a:ext>
-            </a:extLst>
-          </a:blip>
-          <a:stretch>
-            <a:fillRect/>
-          </a:stretch>
-        </p:blipFill>
-        <p:spPr>
-          <a:xfrm>
-            <a:off x="821397" y="2063666"/>
-            <a:ext cx="10549205" cy="3338513"/>
-          </a:xfrm>
-          <a:prstGeom prst="rect">
-            <a:avLst/>
-          </a:prstGeom>
-        </p:spPr>
-      </p:pic>
-    </p:spTree>
-    <p:extLst>
-      <p:ext uri="{BB962C8B-B14F-4D97-AF65-F5344CB8AC3E}">
-        <p14:creationId xmlns:p14="http://schemas.microsoft.com/office/powerpoint/2010/main" val="3184374428"/>
-      </p:ext>
-    </p:extLst>
-  </p:cSld>
-  <p:clrMapOvr>
-    <a:masterClrMapping/>
-  </p:clrMapOvr>
-</p:sld>
-</file>
-
-<file path=ppt/slides/slide3.xml><?xml version="1.0" encoding="utf-8"?>
-<p:sld xmlns:a="http://schemas.openxmlformats.org/drawingml/2006/main" xmlns:r="http://schemas.openxmlformats.org/officeDocument/2006/relationships" xmlns:p="http://schemas.openxmlformats.org/presentationml/2006/main">
-  <p:cSld>
-    <p:spTree>
-      <p:nvGrpSpPr>
-        <p:cNvPr id="1" name=""/>
-        <p:cNvGrpSpPr/>
-        <p:nvPr/>
-      </p:nvGrpSpPr>
-      <p:grpSpPr>
-        <a:xfrm>
-          <a:off x="0" y="0"/>
-          <a:ext cx="0" cy="0"/>
-          <a:chOff x="0" y="0"/>
-          <a:chExt cx="0" cy="0"/>
-        </a:xfrm>
-      </p:grpSpPr>
-      <p:sp>
-        <p:nvSpPr>
           <p:cNvPr id="104" name="Rectangle 103">
             <a:extLst>
               <a:ext uri="{FF2B5EF4-FFF2-40B4-BE49-F238E27FC236}">
@@ -6830,1753 +6278,7 @@
 </p:sld>
 </file>
 
-<file path=ppt/slides/slide4.xml><?xml version="1.0" encoding="utf-8"?>
-<p:sld xmlns:a="http://schemas.openxmlformats.org/drawingml/2006/main" xmlns:r="http://schemas.openxmlformats.org/officeDocument/2006/relationships" xmlns:p="http://schemas.openxmlformats.org/presentationml/2006/main">
-  <p:cSld>
-    <p:spTree>
-      <p:nvGrpSpPr>
-        <p:cNvPr id="1" name=""/>
-        <p:cNvGrpSpPr/>
-        <p:nvPr/>
-      </p:nvGrpSpPr>
-      <p:grpSpPr>
-        <a:xfrm>
-          <a:off x="0" y="0"/>
-          <a:ext cx="0" cy="0"/>
-          <a:chOff x="0" y="0"/>
-          <a:chExt cx="0" cy="0"/>
-        </a:xfrm>
-      </p:grpSpPr>
-      <p:pic>
-        <p:nvPicPr>
-          <p:cNvPr id="2" name="Image 1">
-            <a:extLst>
-              <a:ext uri="{FF2B5EF4-FFF2-40B4-BE49-F238E27FC236}">
-                <a16:creationId xmlns:a16="http://schemas.microsoft.com/office/drawing/2014/main" id="{23D83E72-574E-48B8-AA81-0ED8E94822E8}"/>
-              </a:ext>
-            </a:extLst>
-          </p:cNvPr>
-          <p:cNvPicPr>
-            <a:picLocks noChangeAspect="1"/>
-          </p:cNvPicPr>
-          <p:nvPr/>
-        </p:nvPicPr>
-        <p:blipFill>
-          <a:blip r:embed="rId2"/>
-          <a:stretch>
-            <a:fillRect/>
-          </a:stretch>
-        </p:blipFill>
-        <p:spPr>
-          <a:xfrm>
-            <a:off x="0" y="243666"/>
-            <a:ext cx="12192000" cy="6370668"/>
-          </a:xfrm>
-          <a:prstGeom prst="rect">
-            <a:avLst/>
-          </a:prstGeom>
-        </p:spPr>
-      </p:pic>
-    </p:spTree>
-    <p:extLst>
-      <p:ext uri="{BB962C8B-B14F-4D97-AF65-F5344CB8AC3E}">
-        <p14:creationId xmlns:p14="http://schemas.microsoft.com/office/powerpoint/2010/main" val="3331158984"/>
-      </p:ext>
-    </p:extLst>
-  </p:cSld>
-  <p:clrMapOvr>
-    <a:masterClrMapping/>
-  </p:clrMapOvr>
-</p:sld>
-</file>
-
-<file path=ppt/slides/slide5.xml><?xml version="1.0" encoding="utf-8"?>
-<p:sld xmlns:a="http://schemas.openxmlformats.org/drawingml/2006/main" xmlns:r="http://schemas.openxmlformats.org/officeDocument/2006/relationships" xmlns:p="http://schemas.openxmlformats.org/presentationml/2006/main">
-  <p:cSld>
-    <p:spTree>
-      <p:nvGrpSpPr>
-        <p:cNvPr id="1" name=""/>
-        <p:cNvGrpSpPr/>
-        <p:nvPr/>
-      </p:nvGrpSpPr>
-      <p:grpSpPr>
-        <a:xfrm>
-          <a:off x="0" y="0"/>
-          <a:ext cx="0" cy="0"/>
-          <a:chOff x="0" y="0"/>
-          <a:chExt cx="0" cy="0"/>
-        </a:xfrm>
-      </p:grpSpPr>
-      <p:sp>
-        <p:nvSpPr>
-          <p:cNvPr id="3" name="Rectangle 2">
-            <a:extLst>
-              <a:ext uri="{FF2B5EF4-FFF2-40B4-BE49-F238E27FC236}">
-                <a16:creationId xmlns:a16="http://schemas.microsoft.com/office/drawing/2014/main" id="{11737221-2AAA-4F9E-AF9B-0F9E01C49AA9}"/>
-              </a:ext>
-            </a:extLst>
-          </p:cNvPr>
-          <p:cNvSpPr/>
-          <p:nvPr/>
-        </p:nvSpPr>
-        <p:spPr>
-          <a:xfrm>
-            <a:off x="0" y="2442133"/>
-            <a:ext cx="12192000" cy="2459864"/>
-          </a:xfrm>
-          <a:prstGeom prst="rect">
-            <a:avLst/>
-          </a:prstGeom>
-          <a:solidFill>
-            <a:schemeClr val="accent6">
-              <a:lumMod val="20000"/>
-              <a:lumOff val="80000"/>
-            </a:schemeClr>
-          </a:solidFill>
-          <a:ln>
-            <a:noFill/>
-          </a:ln>
-        </p:spPr>
-        <p:style>
-          <a:lnRef idx="2">
-            <a:schemeClr val="accent1">
-              <a:shade val="50000"/>
-            </a:schemeClr>
-          </a:lnRef>
-          <a:fillRef idx="1">
-            <a:schemeClr val="accent1"/>
-          </a:fillRef>
-          <a:effectRef idx="0">
-            <a:schemeClr val="accent1"/>
-          </a:effectRef>
-          <a:fontRef idx="minor">
-            <a:schemeClr val="lt1"/>
-          </a:fontRef>
-        </p:style>
-        <p:txBody>
-          <a:bodyPr rtlCol="0" anchor="ctr"/>
-          <a:lstStyle/>
-          <a:p>
-            <a:pPr algn="ctr"/>
-            <a:endParaRPr lang="fr-FR" dirty="0"/>
-          </a:p>
-        </p:txBody>
-      </p:sp>
-      <p:sp>
-        <p:nvSpPr>
-          <p:cNvPr id="6" name="Rectangle 5">
-            <a:extLst>
-              <a:ext uri="{FF2B5EF4-FFF2-40B4-BE49-F238E27FC236}">
-                <a16:creationId xmlns:a16="http://schemas.microsoft.com/office/drawing/2014/main" id="{191B2BD3-15F7-43E0-BDFA-56BB04527287}"/>
-              </a:ext>
-            </a:extLst>
-          </p:cNvPr>
-          <p:cNvSpPr/>
-          <p:nvPr/>
-        </p:nvSpPr>
-        <p:spPr>
-          <a:xfrm>
-            <a:off x="320728" y="1259073"/>
-            <a:ext cx="11450472" cy="4776716"/>
-          </a:xfrm>
-          <a:prstGeom prst="rect">
-            <a:avLst/>
-          </a:prstGeom>
-          <a:ln>
-            <a:solidFill>
-              <a:schemeClr val="accent6">
-                <a:lumMod val="20000"/>
-                <a:lumOff val="80000"/>
-              </a:schemeClr>
-            </a:solidFill>
-          </a:ln>
-        </p:spPr>
-        <p:style>
-          <a:lnRef idx="2">
-            <a:schemeClr val="accent6"/>
-          </a:lnRef>
-          <a:fillRef idx="1">
-            <a:schemeClr val="lt1"/>
-          </a:fillRef>
-          <a:effectRef idx="0">
-            <a:schemeClr val="accent6"/>
-          </a:effectRef>
-          <a:fontRef idx="minor">
-            <a:schemeClr val="dk1"/>
-          </a:fontRef>
-        </p:style>
-        <p:txBody>
-          <a:bodyPr rtlCol="0" anchor="ctr"/>
-          <a:lstStyle/>
-          <a:p>
-            <a:pPr algn="ctr"/>
-            <a:endParaRPr lang="fr-FR" dirty="0"/>
-          </a:p>
-        </p:txBody>
-      </p:sp>
-      <p:sp>
-        <p:nvSpPr>
-          <p:cNvPr id="4" name="Rectangle 3">
-            <a:extLst>
-              <a:ext uri="{FF2B5EF4-FFF2-40B4-BE49-F238E27FC236}">
-                <a16:creationId xmlns:a16="http://schemas.microsoft.com/office/drawing/2014/main" id="{27D2C1D8-BBC5-4EF1-9643-C36F2265C7F5}"/>
-              </a:ext>
-            </a:extLst>
-          </p:cNvPr>
-          <p:cNvSpPr/>
-          <p:nvPr/>
-        </p:nvSpPr>
-        <p:spPr>
-          <a:xfrm>
-            <a:off x="0" y="234091"/>
-            <a:ext cx="245660" cy="584775"/>
-          </a:xfrm>
-          <a:prstGeom prst="rect">
-            <a:avLst/>
-          </a:prstGeom>
-          <a:solidFill>
-            <a:schemeClr val="accent6">
-              <a:lumMod val="20000"/>
-              <a:lumOff val="80000"/>
-            </a:schemeClr>
-          </a:solidFill>
-          <a:ln>
-            <a:noFill/>
-          </a:ln>
-        </p:spPr>
-        <p:style>
-          <a:lnRef idx="2">
-            <a:schemeClr val="accent1">
-              <a:shade val="50000"/>
-            </a:schemeClr>
-          </a:lnRef>
-          <a:fillRef idx="1">
-            <a:schemeClr val="accent1"/>
-          </a:fillRef>
-          <a:effectRef idx="0">
-            <a:schemeClr val="accent1"/>
-          </a:effectRef>
-          <a:fontRef idx="minor">
-            <a:schemeClr val="lt1"/>
-          </a:fontRef>
-        </p:style>
-        <p:txBody>
-          <a:bodyPr rtlCol="0" anchor="ctr"/>
-          <a:lstStyle/>
-          <a:p>
-            <a:pPr algn="ctr"/>
-            <a:endParaRPr lang="fr-FR" dirty="0"/>
-          </a:p>
-        </p:txBody>
-      </p:sp>
-      <p:sp>
-        <p:nvSpPr>
-          <p:cNvPr id="5" name="ZoneTexte 4">
-            <a:extLst>
-              <a:ext uri="{FF2B5EF4-FFF2-40B4-BE49-F238E27FC236}">
-                <a16:creationId xmlns:a16="http://schemas.microsoft.com/office/drawing/2014/main" id="{AF9B5890-B653-480E-B2B2-6EED5FBED2DD}"/>
-              </a:ext>
-            </a:extLst>
-          </p:cNvPr>
-          <p:cNvSpPr txBox="1"/>
-          <p:nvPr/>
-        </p:nvSpPr>
-        <p:spPr>
-          <a:xfrm>
-            <a:off x="245660" y="277113"/>
-            <a:ext cx="8765738" cy="584775"/>
-          </a:xfrm>
-          <a:prstGeom prst="rect">
-            <a:avLst/>
-          </a:prstGeom>
-          <a:noFill/>
-        </p:spPr>
-        <p:txBody>
-          <a:bodyPr wrap="square" rtlCol="0">
-            <a:spAutoFit/>
-          </a:bodyPr>
-          <a:lstStyle/>
-          <a:p>
-            <a:r>
-              <a:rPr lang="en-US" sz="3200" dirty="0">
-                <a:latin typeface="Times New Roman" panose="02020603050405020304" pitchFamily="18" charset="0"/>
-                <a:cs typeface="Times New Roman" panose="02020603050405020304" pitchFamily="18" charset="0"/>
-              </a:rPr>
-              <a:t>The main functional architecture of the project :</a:t>
-            </a:r>
-            <a:endParaRPr lang="fr-FR" sz="3200" dirty="0">
-              <a:latin typeface="Times New Roman" panose="02020603050405020304" pitchFamily="18" charset="0"/>
-              <a:cs typeface="Times New Roman" panose="02020603050405020304" pitchFamily="18" charset="0"/>
-            </a:endParaRPr>
-          </a:p>
-        </p:txBody>
-      </p:sp>
-      <p:sp>
-        <p:nvSpPr>
-          <p:cNvPr id="29" name="Rectangle : coins arrondis 28">
-            <a:extLst>
-              <a:ext uri="{FF2B5EF4-FFF2-40B4-BE49-F238E27FC236}">
-                <a16:creationId xmlns:a16="http://schemas.microsoft.com/office/drawing/2014/main" id="{1473A292-CF49-4CB4-AC44-7640A715BDB8}"/>
-              </a:ext>
-            </a:extLst>
-          </p:cNvPr>
-          <p:cNvSpPr/>
-          <p:nvPr/>
-        </p:nvSpPr>
-        <p:spPr>
-          <a:xfrm>
-            <a:off x="825591" y="2181340"/>
-            <a:ext cx="2303201" cy="3355857"/>
-          </a:xfrm>
-          <a:prstGeom prst="roundRect">
-            <a:avLst>
-              <a:gd name="adj" fmla="val 6873"/>
-            </a:avLst>
-          </a:prstGeom>
-          <a:noFill/>
-          <a:ln>
-            <a:solidFill>
-              <a:schemeClr val="bg1">
-                <a:lumMod val="50000"/>
-              </a:schemeClr>
-            </a:solidFill>
-          </a:ln>
-        </p:spPr>
-        <p:style>
-          <a:lnRef idx="2">
-            <a:schemeClr val="accent1">
-              <a:shade val="50000"/>
-            </a:schemeClr>
-          </a:lnRef>
-          <a:fillRef idx="1">
-            <a:schemeClr val="accent1"/>
-          </a:fillRef>
-          <a:effectRef idx="0">
-            <a:schemeClr val="accent1"/>
-          </a:effectRef>
-          <a:fontRef idx="minor">
-            <a:schemeClr val="lt1"/>
-          </a:fontRef>
-        </p:style>
-        <p:txBody>
-          <a:bodyPr rtlCol="0" anchor="ctr"/>
-          <a:lstStyle/>
-          <a:p>
-            <a:pPr algn="ctr"/>
-            <a:endParaRPr lang="fr-FR"/>
-          </a:p>
-        </p:txBody>
-      </p:sp>
-      <p:pic>
-        <p:nvPicPr>
-          <p:cNvPr id="7" name="Image 6">
-            <a:extLst>
-              <a:ext uri="{FF2B5EF4-FFF2-40B4-BE49-F238E27FC236}">
-                <a16:creationId xmlns:a16="http://schemas.microsoft.com/office/drawing/2014/main" id="{61831194-131D-47EB-BCCA-01FAA73332E7}"/>
-              </a:ext>
-            </a:extLst>
-          </p:cNvPr>
-          <p:cNvPicPr>
-            <a:picLocks noChangeAspect="1"/>
-          </p:cNvPicPr>
-          <p:nvPr/>
-        </p:nvPicPr>
-        <p:blipFill rotWithShape="1">
-          <a:blip r:embed="rId2"/>
-          <a:srcRect l="62015" t="42982" r="2015" b="34121"/>
-          <a:stretch/>
-        </p:blipFill>
-        <p:spPr>
-          <a:xfrm>
-            <a:off x="407830" y="1320802"/>
-            <a:ext cx="1554480" cy="556324"/>
-          </a:xfrm>
-          <a:prstGeom prst="rect">
-            <a:avLst/>
-          </a:prstGeom>
-        </p:spPr>
-      </p:pic>
-      <p:grpSp>
-        <p:nvGrpSpPr>
-          <p:cNvPr id="16" name="Groupe 15">
-            <a:extLst>
-              <a:ext uri="{FF2B5EF4-FFF2-40B4-BE49-F238E27FC236}">
-                <a16:creationId xmlns:a16="http://schemas.microsoft.com/office/drawing/2014/main" id="{4E6D332B-F5C1-4F2B-B3CD-16B2C5E4AE7B}"/>
-              </a:ext>
-            </a:extLst>
-          </p:cNvPr>
-          <p:cNvGrpSpPr/>
-          <p:nvPr/>
-        </p:nvGrpSpPr>
-        <p:grpSpPr>
-          <a:xfrm>
-            <a:off x="1043631" y="2800645"/>
-            <a:ext cx="365760" cy="2161486"/>
-            <a:chOff x="1177002" y="2567985"/>
-            <a:chExt cx="365760" cy="2161486"/>
-          </a:xfrm>
-        </p:grpSpPr>
-        <p:pic>
-          <p:nvPicPr>
-            <p:cNvPr id="10" name="Image 9">
-              <a:extLst>
-                <a:ext uri="{FF2B5EF4-FFF2-40B4-BE49-F238E27FC236}">
-                  <a16:creationId xmlns:a16="http://schemas.microsoft.com/office/drawing/2014/main" id="{2256F37F-44EA-4DBE-A14B-EF6E38860BBA}"/>
-                </a:ext>
-              </a:extLst>
-            </p:cNvPr>
-            <p:cNvPicPr>
-              <a:picLocks noChangeAspect="1"/>
-            </p:cNvPicPr>
-            <p:nvPr/>
-          </p:nvPicPr>
-          <p:blipFill rotWithShape="1">
-            <a:blip r:embed="rId3">
-              <a:extLst>
-                <a:ext uri="{28A0092B-C50C-407E-A947-70E740481C1C}">
-                  <a14:useLocalDpi xmlns:a14="http://schemas.microsoft.com/office/drawing/2010/main" val="0"/>
-                </a:ext>
-              </a:extLst>
-            </a:blip>
-            <a:srcRect l="31534" t="25727" r="30908" b="26760"/>
-            <a:stretch/>
-          </p:blipFill>
-          <p:spPr>
-            <a:xfrm>
-              <a:off x="1177002" y="2567985"/>
-              <a:ext cx="365760" cy="462687"/>
-            </a:xfrm>
-            <a:prstGeom prst="rect">
-              <a:avLst/>
-            </a:prstGeom>
-          </p:spPr>
-        </p:pic>
-        <p:pic>
-          <p:nvPicPr>
-            <p:cNvPr id="11" name="Image 10">
-              <a:extLst>
-                <a:ext uri="{FF2B5EF4-FFF2-40B4-BE49-F238E27FC236}">
-                  <a16:creationId xmlns:a16="http://schemas.microsoft.com/office/drawing/2014/main" id="{6A293B59-377A-4289-8662-F5BC60834970}"/>
-                </a:ext>
-              </a:extLst>
-            </p:cNvPr>
-            <p:cNvPicPr>
-              <a:picLocks noChangeAspect="1"/>
-            </p:cNvPicPr>
-            <p:nvPr/>
-          </p:nvPicPr>
-          <p:blipFill rotWithShape="1">
-            <a:blip r:embed="rId3">
-              <a:extLst>
-                <a:ext uri="{28A0092B-C50C-407E-A947-70E740481C1C}">
-                  <a14:useLocalDpi xmlns:a14="http://schemas.microsoft.com/office/drawing/2010/main" val="0"/>
-                </a:ext>
-              </a:extLst>
-            </a:blip>
-            <a:srcRect l="31534" t="25727" r="30908" b="26760"/>
-            <a:stretch/>
-          </p:blipFill>
-          <p:spPr>
-            <a:xfrm>
-              <a:off x="1177002" y="3136770"/>
-              <a:ext cx="365760" cy="462687"/>
-            </a:xfrm>
-            <a:prstGeom prst="rect">
-              <a:avLst/>
-            </a:prstGeom>
-          </p:spPr>
-        </p:pic>
-        <p:pic>
-          <p:nvPicPr>
-            <p:cNvPr id="12" name="Image 11">
-              <a:extLst>
-                <a:ext uri="{FF2B5EF4-FFF2-40B4-BE49-F238E27FC236}">
-                  <a16:creationId xmlns:a16="http://schemas.microsoft.com/office/drawing/2014/main" id="{076C46E4-16A4-4D6E-96B4-C6EE1EACFD2B}"/>
-                </a:ext>
-              </a:extLst>
-            </p:cNvPr>
-            <p:cNvPicPr>
-              <a:picLocks noChangeAspect="1"/>
-            </p:cNvPicPr>
-            <p:nvPr/>
-          </p:nvPicPr>
-          <p:blipFill rotWithShape="1">
-            <a:blip r:embed="rId3">
-              <a:extLst>
-                <a:ext uri="{28A0092B-C50C-407E-A947-70E740481C1C}">
-                  <a14:useLocalDpi xmlns:a14="http://schemas.microsoft.com/office/drawing/2010/main" val="0"/>
-                </a:ext>
-              </a:extLst>
-            </a:blip>
-            <a:srcRect l="31534" t="25727" r="30908" b="26760"/>
-            <a:stretch/>
-          </p:blipFill>
-          <p:spPr>
-            <a:xfrm>
-              <a:off x="1177002" y="3701777"/>
-              <a:ext cx="365760" cy="462687"/>
-            </a:xfrm>
-            <a:prstGeom prst="rect">
-              <a:avLst/>
-            </a:prstGeom>
-          </p:spPr>
-        </p:pic>
-        <p:pic>
-          <p:nvPicPr>
-            <p:cNvPr id="13" name="Image 12">
-              <a:extLst>
-                <a:ext uri="{FF2B5EF4-FFF2-40B4-BE49-F238E27FC236}">
-                  <a16:creationId xmlns:a16="http://schemas.microsoft.com/office/drawing/2014/main" id="{B161EF4A-8038-4796-9CBD-247930E9975D}"/>
-                </a:ext>
-              </a:extLst>
-            </p:cNvPr>
-            <p:cNvPicPr>
-              <a:picLocks noChangeAspect="1"/>
-            </p:cNvPicPr>
-            <p:nvPr/>
-          </p:nvPicPr>
-          <p:blipFill rotWithShape="1">
-            <a:blip r:embed="rId3">
-              <a:extLst>
-                <a:ext uri="{28A0092B-C50C-407E-A947-70E740481C1C}">
-                  <a14:useLocalDpi xmlns:a14="http://schemas.microsoft.com/office/drawing/2010/main" val="0"/>
-                </a:ext>
-              </a:extLst>
-            </a:blip>
-            <a:srcRect l="31534" t="25727" r="30908" b="26760"/>
-            <a:stretch/>
-          </p:blipFill>
-          <p:spPr>
-            <a:xfrm>
-              <a:off x="1177002" y="4266784"/>
-              <a:ext cx="365760" cy="462687"/>
-            </a:xfrm>
-            <a:prstGeom prst="rect">
-              <a:avLst/>
-            </a:prstGeom>
-          </p:spPr>
-        </p:pic>
-      </p:grpSp>
-      <p:pic>
-        <p:nvPicPr>
-          <p:cNvPr id="31" name="Image 30">
-            <a:extLst>
-              <a:ext uri="{FF2B5EF4-FFF2-40B4-BE49-F238E27FC236}">
-                <a16:creationId xmlns:a16="http://schemas.microsoft.com/office/drawing/2014/main" id="{DFEBC988-1737-44C3-BEFD-D7E003A711E0}"/>
-              </a:ext>
-            </a:extLst>
-          </p:cNvPr>
-          <p:cNvPicPr>
-            <a:picLocks noChangeAspect="1"/>
-          </p:cNvPicPr>
-          <p:nvPr/>
-        </p:nvPicPr>
-        <p:blipFill>
-          <a:blip r:embed="rId4">
-            <a:extLst>
-              <a:ext uri="{28A0092B-C50C-407E-A947-70E740481C1C}">
-                <a14:useLocalDpi xmlns:a14="http://schemas.microsoft.com/office/drawing/2010/main" val="0"/>
-              </a:ext>
-            </a:extLst>
-          </a:blip>
-          <a:stretch>
-            <a:fillRect/>
-          </a:stretch>
-        </p:blipFill>
-        <p:spPr>
-          <a:xfrm>
-            <a:off x="2083497" y="3371810"/>
-            <a:ext cx="914400" cy="914400"/>
-          </a:xfrm>
-          <a:prstGeom prst="rect">
-            <a:avLst/>
-          </a:prstGeom>
-        </p:spPr>
-      </p:pic>
-      <p:cxnSp>
-        <p:nvCxnSpPr>
-          <p:cNvPr id="33" name="Connecteur : en arc 32">
-            <a:extLst>
-              <a:ext uri="{FF2B5EF4-FFF2-40B4-BE49-F238E27FC236}">
-                <a16:creationId xmlns:a16="http://schemas.microsoft.com/office/drawing/2014/main" id="{43A15D1B-C914-4755-BB05-CB03319498B2}"/>
-              </a:ext>
-            </a:extLst>
-          </p:cNvPr>
-          <p:cNvCxnSpPr>
-            <a:cxnSpLocks/>
-            <a:stCxn id="54" idx="6"/>
-            <a:endCxn id="31" idx="1"/>
-          </p:cNvCxnSpPr>
-          <p:nvPr/>
-        </p:nvCxnSpPr>
-        <p:spPr>
-          <a:xfrm>
-            <a:off x="1409391" y="3071059"/>
-            <a:ext cx="674106" cy="757951"/>
-          </a:xfrm>
-          <a:prstGeom prst="curvedConnector3">
-            <a:avLst/>
-          </a:prstGeom>
-          <a:ln>
-            <a:solidFill>
-              <a:schemeClr val="bg2">
-                <a:lumMod val="90000"/>
-              </a:schemeClr>
-            </a:solidFill>
-            <a:tailEnd type="triangle"/>
-          </a:ln>
-        </p:spPr>
-        <p:style>
-          <a:lnRef idx="1">
-            <a:schemeClr val="dk1"/>
-          </a:lnRef>
-          <a:fillRef idx="0">
-            <a:schemeClr val="dk1"/>
-          </a:fillRef>
-          <a:effectRef idx="0">
-            <a:schemeClr val="dk1"/>
-          </a:effectRef>
-          <a:fontRef idx="minor">
-            <a:schemeClr val="tx1"/>
-          </a:fontRef>
-        </p:style>
-      </p:cxnSp>
-      <p:cxnSp>
-        <p:nvCxnSpPr>
-          <p:cNvPr id="35" name="Connecteur : en arc 34">
-            <a:extLst>
-              <a:ext uri="{FF2B5EF4-FFF2-40B4-BE49-F238E27FC236}">
-                <a16:creationId xmlns:a16="http://schemas.microsoft.com/office/drawing/2014/main" id="{20366530-C29F-4E83-9A94-F28EEADFCA67}"/>
-              </a:ext>
-            </a:extLst>
-          </p:cNvPr>
-          <p:cNvCxnSpPr>
-            <a:cxnSpLocks/>
-            <a:endCxn id="31" idx="1"/>
-          </p:cNvCxnSpPr>
-          <p:nvPr/>
-        </p:nvCxnSpPr>
-        <p:spPr>
-          <a:xfrm>
-            <a:off x="1403604" y="3594669"/>
-            <a:ext cx="679893" cy="234341"/>
-          </a:xfrm>
-          <a:prstGeom prst="curvedConnector3">
-            <a:avLst/>
-          </a:prstGeom>
-          <a:ln>
-            <a:solidFill>
-              <a:schemeClr val="bg2">
-                <a:lumMod val="90000"/>
-              </a:schemeClr>
-            </a:solidFill>
-            <a:tailEnd type="triangle"/>
-          </a:ln>
-        </p:spPr>
-        <p:style>
-          <a:lnRef idx="1">
-            <a:schemeClr val="dk1"/>
-          </a:lnRef>
-          <a:fillRef idx="0">
-            <a:schemeClr val="dk1"/>
-          </a:fillRef>
-          <a:effectRef idx="0">
-            <a:schemeClr val="dk1"/>
-          </a:effectRef>
-          <a:fontRef idx="minor">
-            <a:schemeClr val="tx1"/>
-          </a:fontRef>
-        </p:style>
-      </p:cxnSp>
-      <p:cxnSp>
-        <p:nvCxnSpPr>
-          <p:cNvPr id="37" name="Connecteur : en arc 36">
-            <a:extLst>
-              <a:ext uri="{FF2B5EF4-FFF2-40B4-BE49-F238E27FC236}">
-                <a16:creationId xmlns:a16="http://schemas.microsoft.com/office/drawing/2014/main" id="{2DC596E7-6075-40AC-93A9-610849DD35E7}"/>
-              </a:ext>
-            </a:extLst>
-          </p:cNvPr>
-          <p:cNvCxnSpPr>
-            <a:cxnSpLocks/>
-            <a:stCxn id="58" idx="6"/>
-            <a:endCxn id="31" idx="1"/>
-          </p:cNvCxnSpPr>
-          <p:nvPr/>
-        </p:nvCxnSpPr>
-        <p:spPr>
-          <a:xfrm flipV="1">
-            <a:off x="1403604" y="3829010"/>
-            <a:ext cx="679893" cy="374755"/>
-          </a:xfrm>
-          <a:prstGeom prst="curvedConnector3">
-            <a:avLst/>
-          </a:prstGeom>
-          <a:ln>
-            <a:solidFill>
-              <a:schemeClr val="bg2">
-                <a:lumMod val="90000"/>
-              </a:schemeClr>
-            </a:solidFill>
-            <a:tailEnd type="triangle"/>
-          </a:ln>
-        </p:spPr>
-        <p:style>
-          <a:lnRef idx="1">
-            <a:schemeClr val="dk1"/>
-          </a:lnRef>
-          <a:fillRef idx="0">
-            <a:schemeClr val="dk1"/>
-          </a:fillRef>
-          <a:effectRef idx="0">
-            <a:schemeClr val="dk1"/>
-          </a:effectRef>
-          <a:fontRef idx="minor">
-            <a:schemeClr val="tx1"/>
-          </a:fontRef>
-        </p:style>
-      </p:cxnSp>
-      <p:cxnSp>
-        <p:nvCxnSpPr>
-          <p:cNvPr id="42" name="Connecteur : en arc 41">
-            <a:extLst>
-              <a:ext uri="{FF2B5EF4-FFF2-40B4-BE49-F238E27FC236}">
-                <a16:creationId xmlns:a16="http://schemas.microsoft.com/office/drawing/2014/main" id="{D8319A2D-EDDC-4410-95C5-B73431514E31}"/>
-              </a:ext>
-            </a:extLst>
-          </p:cNvPr>
-          <p:cNvCxnSpPr>
-            <a:cxnSpLocks/>
-            <a:stCxn id="61" idx="6"/>
-            <a:endCxn id="31" idx="1"/>
-          </p:cNvCxnSpPr>
-          <p:nvPr/>
-        </p:nvCxnSpPr>
-        <p:spPr>
-          <a:xfrm flipV="1">
-            <a:off x="1400601" y="3829010"/>
-            <a:ext cx="682896" cy="939762"/>
-          </a:xfrm>
-          <a:prstGeom prst="curvedConnector3">
-            <a:avLst/>
-          </a:prstGeom>
-          <a:ln>
-            <a:solidFill>
-              <a:schemeClr val="bg2">
-                <a:lumMod val="90000"/>
-              </a:schemeClr>
-            </a:solidFill>
-            <a:tailEnd type="triangle"/>
-          </a:ln>
-        </p:spPr>
-        <p:style>
-          <a:lnRef idx="1">
-            <a:schemeClr val="dk1"/>
-          </a:lnRef>
-          <a:fillRef idx="0">
-            <a:schemeClr val="dk1"/>
-          </a:fillRef>
-          <a:effectRef idx="0">
-            <a:schemeClr val="dk1"/>
-          </a:effectRef>
-          <a:fontRef idx="minor">
-            <a:schemeClr val="tx1"/>
-          </a:fontRef>
-        </p:style>
-      </p:cxnSp>
-      <p:sp>
-        <p:nvSpPr>
-          <p:cNvPr id="43" name="Rectangle : coins arrondis 42">
-            <a:extLst>
-              <a:ext uri="{FF2B5EF4-FFF2-40B4-BE49-F238E27FC236}">
-                <a16:creationId xmlns:a16="http://schemas.microsoft.com/office/drawing/2014/main" id="{8E0B7745-8C46-4EF9-A40B-D524A7C1C6D2}"/>
-              </a:ext>
-            </a:extLst>
-          </p:cNvPr>
-          <p:cNvSpPr/>
-          <p:nvPr/>
-        </p:nvSpPr>
-        <p:spPr>
-          <a:xfrm>
-            <a:off x="5465888" y="2181341"/>
-            <a:ext cx="3885922" cy="1647670"/>
-          </a:xfrm>
-          <a:prstGeom prst="roundRect">
-            <a:avLst>
-              <a:gd name="adj" fmla="val 6873"/>
-            </a:avLst>
-          </a:prstGeom>
-          <a:noFill/>
-          <a:ln>
-            <a:solidFill>
-              <a:schemeClr val="bg1">
-                <a:lumMod val="50000"/>
-              </a:schemeClr>
-            </a:solidFill>
-          </a:ln>
-        </p:spPr>
-        <p:style>
-          <a:lnRef idx="2">
-            <a:schemeClr val="accent1">
-              <a:shade val="50000"/>
-            </a:schemeClr>
-          </a:lnRef>
-          <a:fillRef idx="1">
-            <a:schemeClr val="accent1"/>
-          </a:fillRef>
-          <a:effectRef idx="0">
-            <a:schemeClr val="accent1"/>
-          </a:effectRef>
-          <a:fontRef idx="minor">
-            <a:schemeClr val="lt1"/>
-          </a:fontRef>
-        </p:style>
-        <p:txBody>
-          <a:bodyPr rtlCol="0" anchor="ctr"/>
-          <a:lstStyle/>
-          <a:p>
-            <a:pPr algn="ctr"/>
-            <a:endParaRPr lang="fr-FR"/>
-          </a:p>
-        </p:txBody>
-      </p:sp>
-      <p:sp>
-        <p:nvSpPr>
-          <p:cNvPr id="48" name="Rectangle : coins arrondis 47">
-            <a:extLst>
-              <a:ext uri="{FF2B5EF4-FFF2-40B4-BE49-F238E27FC236}">
-                <a16:creationId xmlns:a16="http://schemas.microsoft.com/office/drawing/2014/main" id="{F31E269F-61EF-4BA7-8EE4-24E4EB55855C}"/>
-              </a:ext>
-            </a:extLst>
-          </p:cNvPr>
-          <p:cNvSpPr/>
-          <p:nvPr/>
-        </p:nvSpPr>
-        <p:spPr>
-          <a:xfrm>
-            <a:off x="4608060" y="4226195"/>
-            <a:ext cx="1904824" cy="1311004"/>
-          </a:xfrm>
-          <a:prstGeom prst="roundRect">
-            <a:avLst>
-              <a:gd name="adj" fmla="val 6873"/>
-            </a:avLst>
-          </a:prstGeom>
-          <a:noFill/>
-          <a:ln>
-            <a:solidFill>
-              <a:schemeClr val="bg1">
-                <a:lumMod val="50000"/>
-              </a:schemeClr>
-            </a:solidFill>
-          </a:ln>
-        </p:spPr>
-        <p:style>
-          <a:lnRef idx="2">
-            <a:schemeClr val="accent1">
-              <a:shade val="50000"/>
-            </a:schemeClr>
-          </a:lnRef>
-          <a:fillRef idx="1">
-            <a:schemeClr val="accent1"/>
-          </a:fillRef>
-          <a:effectRef idx="0">
-            <a:schemeClr val="accent1"/>
-          </a:effectRef>
-          <a:fontRef idx="minor">
-            <a:schemeClr val="lt1"/>
-          </a:fontRef>
-        </p:style>
-        <p:txBody>
-          <a:bodyPr rtlCol="0" anchor="ctr"/>
-          <a:lstStyle/>
-          <a:p>
-            <a:pPr algn="ctr"/>
-            <a:endParaRPr lang="fr-FR" dirty="0"/>
-          </a:p>
-        </p:txBody>
-      </p:sp>
-      <p:sp>
-        <p:nvSpPr>
-          <p:cNvPr id="50" name="Rectangle : coins arrondis 49">
-            <a:extLst>
-              <a:ext uri="{FF2B5EF4-FFF2-40B4-BE49-F238E27FC236}">
-                <a16:creationId xmlns:a16="http://schemas.microsoft.com/office/drawing/2014/main" id="{964182B8-96FB-4826-95CF-DF45926DFD8C}"/>
-              </a:ext>
-            </a:extLst>
-          </p:cNvPr>
-          <p:cNvSpPr/>
-          <p:nvPr/>
-        </p:nvSpPr>
-        <p:spPr>
-          <a:xfrm>
-            <a:off x="9824775" y="2181339"/>
-            <a:ext cx="1777073" cy="3355858"/>
-          </a:xfrm>
-          <a:prstGeom prst="roundRect">
-            <a:avLst>
-              <a:gd name="adj" fmla="val 6873"/>
-            </a:avLst>
-          </a:prstGeom>
-          <a:noFill/>
-          <a:ln>
-            <a:solidFill>
-              <a:schemeClr val="bg1">
-                <a:lumMod val="50000"/>
-              </a:schemeClr>
-            </a:solidFill>
-          </a:ln>
-        </p:spPr>
-        <p:style>
-          <a:lnRef idx="2">
-            <a:schemeClr val="accent1">
-              <a:shade val="50000"/>
-            </a:schemeClr>
-          </a:lnRef>
-          <a:fillRef idx="1">
-            <a:schemeClr val="accent1"/>
-          </a:fillRef>
-          <a:effectRef idx="0">
-            <a:schemeClr val="accent1"/>
-          </a:effectRef>
-          <a:fontRef idx="minor">
-            <a:schemeClr val="lt1"/>
-          </a:fontRef>
-        </p:style>
-        <p:txBody>
-          <a:bodyPr rtlCol="0" anchor="ctr"/>
-          <a:lstStyle/>
-          <a:p>
-            <a:pPr algn="ctr"/>
-            <a:endParaRPr lang="fr-FR"/>
-          </a:p>
-        </p:txBody>
-      </p:sp>
-      <p:sp>
-        <p:nvSpPr>
-          <p:cNvPr id="51" name="ZoneTexte 50">
-            <a:extLst>
-              <a:ext uri="{FF2B5EF4-FFF2-40B4-BE49-F238E27FC236}">
-                <a16:creationId xmlns:a16="http://schemas.microsoft.com/office/drawing/2014/main" id="{143910C4-69FF-42C8-8AD4-AA46DB59C909}"/>
-              </a:ext>
-            </a:extLst>
-          </p:cNvPr>
-          <p:cNvSpPr txBox="1"/>
-          <p:nvPr/>
-        </p:nvSpPr>
-        <p:spPr>
-          <a:xfrm>
-            <a:off x="825592" y="2184858"/>
-            <a:ext cx="2194180" cy="338554"/>
-          </a:xfrm>
-          <a:prstGeom prst="rect">
-            <a:avLst/>
-          </a:prstGeom>
-          <a:noFill/>
-        </p:spPr>
-        <p:txBody>
-          <a:bodyPr wrap="square" rtlCol="0">
-            <a:spAutoFit/>
-          </a:bodyPr>
-          <a:lstStyle/>
-          <a:p>
-            <a:r>
-              <a:rPr lang="en-US" sz="1600" i="1" dirty="0">
-                <a:solidFill>
-                  <a:schemeClr val="bg2">
-                    <a:lumMod val="50000"/>
-                  </a:schemeClr>
-                </a:solidFill>
-                <a:latin typeface="Times New Roman" panose="02020603050405020304" pitchFamily="18" charset="0"/>
-                <a:cs typeface="Times New Roman" panose="02020603050405020304" pitchFamily="18" charset="0"/>
-              </a:rPr>
-              <a:t>Data Source</a:t>
-            </a:r>
-            <a:endParaRPr lang="fr-FR" sz="1600" i="1" dirty="0">
-              <a:solidFill>
-                <a:schemeClr val="bg2">
-                  <a:lumMod val="50000"/>
-                </a:schemeClr>
-              </a:solidFill>
-              <a:latin typeface="Times New Roman" panose="02020603050405020304" pitchFamily="18" charset="0"/>
-              <a:cs typeface="Times New Roman" panose="02020603050405020304" pitchFamily="18" charset="0"/>
-            </a:endParaRPr>
-          </a:p>
-        </p:txBody>
-      </p:sp>
-      <p:sp>
-        <p:nvSpPr>
-          <p:cNvPr id="52" name="ZoneTexte 51">
-            <a:extLst>
-              <a:ext uri="{FF2B5EF4-FFF2-40B4-BE49-F238E27FC236}">
-                <a16:creationId xmlns:a16="http://schemas.microsoft.com/office/drawing/2014/main" id="{0C0BF580-12B2-47A6-B231-5F05E4EDB9D8}"/>
-              </a:ext>
-            </a:extLst>
-          </p:cNvPr>
-          <p:cNvSpPr txBox="1"/>
-          <p:nvPr/>
-        </p:nvSpPr>
-        <p:spPr>
-          <a:xfrm>
-            <a:off x="825591" y="5050901"/>
-            <a:ext cx="1412992" cy="430887"/>
-          </a:xfrm>
-          <a:prstGeom prst="rect">
-            <a:avLst/>
-          </a:prstGeom>
-          <a:noFill/>
-        </p:spPr>
-        <p:txBody>
-          <a:bodyPr wrap="square" rtlCol="0">
-            <a:spAutoFit/>
-          </a:bodyPr>
-          <a:lstStyle/>
-          <a:p>
-            <a:pPr algn="ctr"/>
-            <a:r>
-              <a:rPr lang="en-US" sz="1050" dirty="0" err="1">
-                <a:solidFill>
-                  <a:schemeClr val="tx1">
-                    <a:lumMod val="95000"/>
-                    <a:lumOff val="5000"/>
-                  </a:schemeClr>
-                </a:solidFill>
-                <a:latin typeface="Times New Roman" panose="02020603050405020304" pitchFamily="18" charset="0"/>
-                <a:cs typeface="Times New Roman" panose="02020603050405020304" pitchFamily="18" charset="0"/>
-              </a:rPr>
-              <a:t>Traccar</a:t>
-            </a:r>
-            <a:r>
-              <a:rPr lang="en-US" sz="1050" dirty="0">
-                <a:solidFill>
-                  <a:schemeClr val="tx1">
-                    <a:lumMod val="95000"/>
-                    <a:lumOff val="5000"/>
-                  </a:schemeClr>
-                </a:solidFill>
-                <a:latin typeface="Times New Roman" panose="02020603050405020304" pitchFamily="18" charset="0"/>
-                <a:cs typeface="Times New Roman" panose="02020603050405020304" pitchFamily="18" charset="0"/>
-              </a:rPr>
-              <a:t> application’s users</a:t>
-            </a:r>
-            <a:endParaRPr lang="fr-FR" sz="1050" dirty="0">
-              <a:solidFill>
-                <a:schemeClr val="tx1">
-                  <a:lumMod val="95000"/>
-                  <a:lumOff val="5000"/>
-                </a:schemeClr>
-              </a:solidFill>
-              <a:latin typeface="Times New Roman" panose="02020603050405020304" pitchFamily="18" charset="0"/>
-              <a:cs typeface="Times New Roman" panose="02020603050405020304" pitchFamily="18" charset="0"/>
-            </a:endParaRPr>
-          </a:p>
-        </p:txBody>
-      </p:sp>
-      <p:pic>
-        <p:nvPicPr>
-          <p:cNvPr id="54" name="Image 53">
-            <a:extLst>
-              <a:ext uri="{FF2B5EF4-FFF2-40B4-BE49-F238E27FC236}">
-                <a16:creationId xmlns:a16="http://schemas.microsoft.com/office/drawing/2014/main" id="{C851E8AC-E6BE-41FF-860C-3F01717248AA}"/>
-              </a:ext>
-            </a:extLst>
-          </p:cNvPr>
-          <p:cNvPicPr>
-            <a:picLocks noChangeAspect="1"/>
-          </p:cNvPicPr>
-          <p:nvPr/>
-        </p:nvPicPr>
-        <p:blipFill rotWithShape="1">
-          <a:blip r:embed="rId5">
-            <a:extLst>
-              <a:ext uri="{28A0092B-C50C-407E-A947-70E740481C1C}">
-                <a14:useLocalDpi xmlns:a14="http://schemas.microsoft.com/office/drawing/2010/main" val="0"/>
-              </a:ext>
-            </a:extLst>
-          </a:blip>
-          <a:srcRect l="3818" t="4316" r="71976" b="66049"/>
-          <a:stretch/>
-        </p:blipFill>
-        <p:spPr>
-          <a:xfrm>
-            <a:off x="1208931" y="2970951"/>
-            <a:ext cx="200460" cy="200216"/>
-          </a:xfrm>
-          <a:prstGeom prst="ellipse">
-            <a:avLst/>
-          </a:prstGeom>
-        </p:spPr>
-      </p:pic>
-      <p:pic>
-        <p:nvPicPr>
-          <p:cNvPr id="55" name="Image 54">
-            <a:extLst>
-              <a:ext uri="{FF2B5EF4-FFF2-40B4-BE49-F238E27FC236}">
-                <a16:creationId xmlns:a16="http://schemas.microsoft.com/office/drawing/2014/main" id="{6C7789EA-C77D-431E-A3AF-31D6CDFF1DF4}"/>
-              </a:ext>
-            </a:extLst>
-          </p:cNvPr>
-          <p:cNvPicPr>
-            <a:picLocks noChangeAspect="1"/>
-          </p:cNvPicPr>
-          <p:nvPr/>
-        </p:nvPicPr>
-        <p:blipFill rotWithShape="1">
-          <a:blip r:embed="rId5">
-            <a:extLst>
-              <a:ext uri="{28A0092B-C50C-407E-A947-70E740481C1C}">
-                <a14:useLocalDpi xmlns:a14="http://schemas.microsoft.com/office/drawing/2010/main" val="0"/>
-              </a:ext>
-            </a:extLst>
-          </a:blip>
-          <a:srcRect l="3818" t="4316" r="71976" b="66049"/>
-          <a:stretch/>
-        </p:blipFill>
-        <p:spPr>
-          <a:xfrm>
-            <a:off x="1208931" y="3540565"/>
-            <a:ext cx="200460" cy="200216"/>
-          </a:xfrm>
-          <a:prstGeom prst="ellipse">
-            <a:avLst/>
-          </a:prstGeom>
-        </p:spPr>
-      </p:pic>
-      <p:pic>
-        <p:nvPicPr>
-          <p:cNvPr id="58" name="Image 57">
-            <a:extLst>
-              <a:ext uri="{FF2B5EF4-FFF2-40B4-BE49-F238E27FC236}">
-                <a16:creationId xmlns:a16="http://schemas.microsoft.com/office/drawing/2014/main" id="{DDFFD6D6-D32B-462B-8DB8-102CA9C64988}"/>
-              </a:ext>
-            </a:extLst>
-          </p:cNvPr>
-          <p:cNvPicPr>
-            <a:picLocks noChangeAspect="1"/>
-          </p:cNvPicPr>
-          <p:nvPr/>
-        </p:nvPicPr>
-        <p:blipFill rotWithShape="1">
-          <a:blip r:embed="rId5">
-            <a:extLst>
-              <a:ext uri="{28A0092B-C50C-407E-A947-70E740481C1C}">
-                <a14:useLocalDpi xmlns:a14="http://schemas.microsoft.com/office/drawing/2010/main" val="0"/>
-              </a:ext>
-            </a:extLst>
-          </a:blip>
-          <a:srcRect l="3818" t="4316" r="71976" b="66049"/>
-          <a:stretch/>
-        </p:blipFill>
-        <p:spPr>
-          <a:xfrm>
-            <a:off x="1203144" y="4103657"/>
-            <a:ext cx="200460" cy="200216"/>
-          </a:xfrm>
-          <a:prstGeom prst="ellipse">
-            <a:avLst/>
-          </a:prstGeom>
-        </p:spPr>
-      </p:pic>
-      <p:pic>
-        <p:nvPicPr>
-          <p:cNvPr id="61" name="Image 60">
-            <a:extLst>
-              <a:ext uri="{FF2B5EF4-FFF2-40B4-BE49-F238E27FC236}">
-                <a16:creationId xmlns:a16="http://schemas.microsoft.com/office/drawing/2014/main" id="{4315D735-4C5A-48F5-908E-2C42CCE85CBA}"/>
-              </a:ext>
-            </a:extLst>
-          </p:cNvPr>
-          <p:cNvPicPr>
-            <a:picLocks noChangeAspect="1"/>
-          </p:cNvPicPr>
-          <p:nvPr/>
-        </p:nvPicPr>
-        <p:blipFill rotWithShape="1">
-          <a:blip r:embed="rId5">
-            <a:extLst>
-              <a:ext uri="{28A0092B-C50C-407E-A947-70E740481C1C}">
-                <a14:useLocalDpi xmlns:a14="http://schemas.microsoft.com/office/drawing/2010/main" val="0"/>
-              </a:ext>
-            </a:extLst>
-          </a:blip>
-          <a:srcRect l="3818" t="4316" r="71976" b="66049"/>
-          <a:stretch/>
-        </p:blipFill>
-        <p:spPr>
-          <a:xfrm>
-            <a:off x="1200141" y="4668664"/>
-            <a:ext cx="200460" cy="200216"/>
-          </a:xfrm>
-          <a:prstGeom prst="ellipse">
-            <a:avLst/>
-          </a:prstGeom>
-        </p:spPr>
-      </p:pic>
-      <p:sp>
-        <p:nvSpPr>
-          <p:cNvPr id="64" name="ZoneTexte 63">
-            <a:extLst>
-              <a:ext uri="{FF2B5EF4-FFF2-40B4-BE49-F238E27FC236}">
-                <a16:creationId xmlns:a16="http://schemas.microsoft.com/office/drawing/2014/main" id="{4872E307-8ACB-4AC7-90BA-28E61C22BA34}"/>
-              </a:ext>
-            </a:extLst>
-          </p:cNvPr>
-          <p:cNvSpPr txBox="1"/>
-          <p:nvPr/>
-        </p:nvSpPr>
-        <p:spPr>
-          <a:xfrm>
-            <a:off x="1796388" y="3223907"/>
-            <a:ext cx="1412992" cy="253916"/>
-          </a:xfrm>
-          <a:prstGeom prst="rect">
-            <a:avLst/>
-          </a:prstGeom>
-          <a:noFill/>
-        </p:spPr>
-        <p:txBody>
-          <a:bodyPr wrap="square" rtlCol="0">
-            <a:spAutoFit/>
-          </a:bodyPr>
-          <a:lstStyle/>
-          <a:p>
-            <a:pPr algn="ctr"/>
-            <a:r>
-              <a:rPr lang="en-US" sz="1050" dirty="0">
-                <a:solidFill>
-                  <a:schemeClr val="tx1">
-                    <a:lumMod val="95000"/>
-                    <a:lumOff val="5000"/>
-                  </a:schemeClr>
-                </a:solidFill>
-                <a:latin typeface="Times New Roman" panose="02020603050405020304" pitchFamily="18" charset="0"/>
-                <a:cs typeface="Times New Roman" panose="02020603050405020304" pitchFamily="18" charset="0"/>
-              </a:rPr>
-              <a:t>Data Server recipient</a:t>
-            </a:r>
-            <a:endParaRPr lang="fr-FR" sz="1050" dirty="0">
-              <a:solidFill>
-                <a:schemeClr val="tx1">
-                  <a:lumMod val="95000"/>
-                  <a:lumOff val="5000"/>
-                </a:schemeClr>
-              </a:solidFill>
-              <a:latin typeface="Times New Roman" panose="02020603050405020304" pitchFamily="18" charset="0"/>
-              <a:cs typeface="Times New Roman" panose="02020603050405020304" pitchFamily="18" charset="0"/>
-            </a:endParaRPr>
-          </a:p>
-        </p:txBody>
-      </p:sp>
-      <p:sp>
-        <p:nvSpPr>
-          <p:cNvPr id="65" name="ZoneTexte 64">
-            <a:extLst>
-              <a:ext uri="{FF2B5EF4-FFF2-40B4-BE49-F238E27FC236}">
-                <a16:creationId xmlns:a16="http://schemas.microsoft.com/office/drawing/2014/main" id="{275F7F86-E829-424B-BF66-3404F0D2BBE9}"/>
-              </a:ext>
-            </a:extLst>
-          </p:cNvPr>
-          <p:cNvSpPr txBox="1"/>
-          <p:nvPr/>
-        </p:nvSpPr>
-        <p:spPr>
-          <a:xfrm>
-            <a:off x="5490554" y="2184858"/>
-            <a:ext cx="2381772" cy="338554"/>
-          </a:xfrm>
-          <a:prstGeom prst="rect">
-            <a:avLst/>
-          </a:prstGeom>
-          <a:noFill/>
-        </p:spPr>
-        <p:txBody>
-          <a:bodyPr wrap="square" rtlCol="0">
-            <a:spAutoFit/>
-          </a:bodyPr>
-          <a:lstStyle/>
-          <a:p>
-            <a:r>
-              <a:rPr lang="en-US" sz="1600" i="1" dirty="0">
-                <a:solidFill>
-                  <a:schemeClr val="bg2">
-                    <a:lumMod val="50000"/>
-                  </a:schemeClr>
-                </a:solidFill>
-                <a:latin typeface="Times New Roman" panose="02020603050405020304" pitchFamily="18" charset="0"/>
-                <a:cs typeface="Times New Roman" panose="02020603050405020304" pitchFamily="18" charset="0"/>
-              </a:rPr>
-              <a:t>Data Processing</a:t>
-            </a:r>
-            <a:endParaRPr lang="fr-FR" sz="1600" i="1" dirty="0">
-              <a:solidFill>
-                <a:schemeClr val="bg2">
-                  <a:lumMod val="50000"/>
-                </a:schemeClr>
-              </a:solidFill>
-              <a:latin typeface="Times New Roman" panose="02020603050405020304" pitchFamily="18" charset="0"/>
-              <a:cs typeface="Times New Roman" panose="02020603050405020304" pitchFamily="18" charset="0"/>
-            </a:endParaRPr>
-          </a:p>
-        </p:txBody>
-      </p:sp>
-      <p:sp>
-        <p:nvSpPr>
-          <p:cNvPr id="66" name="ZoneTexte 65">
-            <a:extLst>
-              <a:ext uri="{FF2B5EF4-FFF2-40B4-BE49-F238E27FC236}">
-                <a16:creationId xmlns:a16="http://schemas.microsoft.com/office/drawing/2014/main" id="{A52C2AC8-696E-4376-A52E-B3BA5D173C53}"/>
-              </a:ext>
-            </a:extLst>
-          </p:cNvPr>
-          <p:cNvSpPr txBox="1"/>
-          <p:nvPr/>
-        </p:nvSpPr>
-        <p:spPr>
-          <a:xfrm>
-            <a:off x="4608059" y="4245565"/>
-            <a:ext cx="2381772" cy="338554"/>
-          </a:xfrm>
-          <a:prstGeom prst="rect">
-            <a:avLst/>
-          </a:prstGeom>
-          <a:noFill/>
-        </p:spPr>
-        <p:txBody>
-          <a:bodyPr wrap="square" rtlCol="0">
-            <a:spAutoFit/>
-          </a:bodyPr>
-          <a:lstStyle/>
-          <a:p>
-            <a:r>
-              <a:rPr lang="en-US" sz="1600" i="1" dirty="0">
-                <a:solidFill>
-                  <a:schemeClr val="bg2">
-                    <a:lumMod val="50000"/>
-                  </a:schemeClr>
-                </a:solidFill>
-                <a:latin typeface="Times New Roman" panose="02020603050405020304" pitchFamily="18" charset="0"/>
-                <a:cs typeface="Times New Roman" panose="02020603050405020304" pitchFamily="18" charset="0"/>
-              </a:rPr>
-              <a:t>Data Lake</a:t>
-            </a:r>
-            <a:endParaRPr lang="fr-FR" sz="1600" i="1" dirty="0">
-              <a:solidFill>
-                <a:schemeClr val="bg2">
-                  <a:lumMod val="50000"/>
-                </a:schemeClr>
-              </a:solidFill>
-              <a:latin typeface="Times New Roman" panose="02020603050405020304" pitchFamily="18" charset="0"/>
-              <a:cs typeface="Times New Roman" panose="02020603050405020304" pitchFamily="18" charset="0"/>
-            </a:endParaRPr>
-          </a:p>
-        </p:txBody>
-      </p:sp>
-      <p:sp>
-        <p:nvSpPr>
-          <p:cNvPr id="67" name="ZoneTexte 66">
-            <a:extLst>
-              <a:ext uri="{FF2B5EF4-FFF2-40B4-BE49-F238E27FC236}">
-                <a16:creationId xmlns:a16="http://schemas.microsoft.com/office/drawing/2014/main" id="{FE1B83B6-F40E-451F-9684-296B63C8D90B}"/>
-              </a:ext>
-            </a:extLst>
-          </p:cNvPr>
-          <p:cNvSpPr txBox="1"/>
-          <p:nvPr/>
-        </p:nvSpPr>
-        <p:spPr>
-          <a:xfrm>
-            <a:off x="9842408" y="2181339"/>
-            <a:ext cx="2381772" cy="338554"/>
-          </a:xfrm>
-          <a:prstGeom prst="rect">
-            <a:avLst/>
-          </a:prstGeom>
-          <a:noFill/>
-        </p:spPr>
-        <p:txBody>
-          <a:bodyPr wrap="square" rtlCol="0">
-            <a:spAutoFit/>
-          </a:bodyPr>
-          <a:lstStyle/>
-          <a:p>
-            <a:r>
-              <a:rPr lang="en-US" sz="1600" i="1" dirty="0">
-                <a:solidFill>
-                  <a:schemeClr val="bg2">
-                    <a:lumMod val="50000"/>
-                  </a:schemeClr>
-                </a:solidFill>
-                <a:latin typeface="Times New Roman" panose="02020603050405020304" pitchFamily="18" charset="0"/>
-                <a:cs typeface="Times New Roman" panose="02020603050405020304" pitchFamily="18" charset="0"/>
-              </a:rPr>
-              <a:t>Reporting</a:t>
-            </a:r>
-            <a:endParaRPr lang="fr-FR" sz="1600" i="1" dirty="0">
-              <a:solidFill>
-                <a:schemeClr val="bg2">
-                  <a:lumMod val="50000"/>
-                </a:schemeClr>
-              </a:solidFill>
-              <a:latin typeface="Times New Roman" panose="02020603050405020304" pitchFamily="18" charset="0"/>
-              <a:cs typeface="Times New Roman" panose="02020603050405020304" pitchFamily="18" charset="0"/>
-            </a:endParaRPr>
-          </a:p>
-        </p:txBody>
-      </p:sp>
-      <p:sp>
-        <p:nvSpPr>
-          <p:cNvPr id="68" name="Rectangle : coins arrondis 67">
-            <a:extLst>
-              <a:ext uri="{FF2B5EF4-FFF2-40B4-BE49-F238E27FC236}">
-                <a16:creationId xmlns:a16="http://schemas.microsoft.com/office/drawing/2014/main" id="{FA694833-8D20-4856-A336-1979C154F4D5}"/>
-              </a:ext>
-            </a:extLst>
-          </p:cNvPr>
-          <p:cNvSpPr/>
-          <p:nvPr/>
-        </p:nvSpPr>
-        <p:spPr>
-          <a:xfrm>
-            <a:off x="3379745" y="2485155"/>
-            <a:ext cx="1123331" cy="2664484"/>
-          </a:xfrm>
-          <a:prstGeom prst="roundRect">
-            <a:avLst>
-              <a:gd name="adj" fmla="val 12743"/>
-            </a:avLst>
-          </a:prstGeom>
-          <a:noFill/>
-          <a:ln>
-            <a:solidFill>
-              <a:schemeClr val="bg1">
-                <a:lumMod val="50000"/>
-              </a:schemeClr>
-            </a:solidFill>
-          </a:ln>
-        </p:spPr>
-        <p:style>
-          <a:lnRef idx="2">
-            <a:schemeClr val="accent1">
-              <a:shade val="50000"/>
-            </a:schemeClr>
-          </a:lnRef>
-          <a:fillRef idx="1">
-            <a:schemeClr val="accent1"/>
-          </a:fillRef>
-          <a:effectRef idx="0">
-            <a:schemeClr val="accent1"/>
-          </a:effectRef>
-          <a:fontRef idx="minor">
-            <a:schemeClr val="lt1"/>
-          </a:fontRef>
-        </p:style>
-        <p:txBody>
-          <a:bodyPr rtlCol="0" anchor="ctr"/>
-          <a:lstStyle/>
-          <a:p>
-            <a:pPr algn="ctr"/>
-            <a:endParaRPr lang="fr-FR"/>
-          </a:p>
-        </p:txBody>
-      </p:sp>
-      <p:sp>
-        <p:nvSpPr>
-          <p:cNvPr id="69" name="Flèche : droite 68">
-            <a:extLst>
-              <a:ext uri="{FF2B5EF4-FFF2-40B4-BE49-F238E27FC236}">
-                <a16:creationId xmlns:a16="http://schemas.microsoft.com/office/drawing/2014/main" id="{4CEEE819-61D6-4279-8F06-00C075DE9DFA}"/>
-              </a:ext>
-            </a:extLst>
-          </p:cNvPr>
-          <p:cNvSpPr/>
-          <p:nvPr/>
-        </p:nvSpPr>
-        <p:spPr>
-          <a:xfrm>
-            <a:off x="9414038" y="3171167"/>
-            <a:ext cx="377190" cy="251618"/>
-          </a:xfrm>
-          <a:prstGeom prst="rightArrow">
-            <a:avLst/>
-          </a:prstGeom>
-          <a:solidFill>
-            <a:schemeClr val="bg1">
-              <a:lumMod val="50000"/>
-            </a:schemeClr>
-          </a:solidFill>
-          <a:ln>
-            <a:noFill/>
-          </a:ln>
-        </p:spPr>
-        <p:style>
-          <a:lnRef idx="2">
-            <a:schemeClr val="accent1">
-              <a:shade val="50000"/>
-            </a:schemeClr>
-          </a:lnRef>
-          <a:fillRef idx="1">
-            <a:schemeClr val="accent1"/>
-          </a:fillRef>
-          <a:effectRef idx="0">
-            <a:schemeClr val="accent1"/>
-          </a:effectRef>
-          <a:fontRef idx="minor">
-            <a:schemeClr val="lt1"/>
-          </a:fontRef>
-        </p:style>
-        <p:txBody>
-          <a:bodyPr rtlCol="0" anchor="ctr"/>
-          <a:lstStyle/>
-          <a:p>
-            <a:pPr algn="ctr"/>
-            <a:endParaRPr lang="fr-FR"/>
-          </a:p>
-        </p:txBody>
-      </p:sp>
-      <p:sp>
-        <p:nvSpPr>
-          <p:cNvPr id="70" name="Flèche : droite 69">
-            <a:extLst>
-              <a:ext uri="{FF2B5EF4-FFF2-40B4-BE49-F238E27FC236}">
-                <a16:creationId xmlns:a16="http://schemas.microsoft.com/office/drawing/2014/main" id="{FF3ADAB4-D9D4-4DF6-BC97-719297CB2FED}"/>
-              </a:ext>
-            </a:extLst>
-          </p:cNvPr>
-          <p:cNvSpPr/>
-          <p:nvPr/>
-        </p:nvSpPr>
-        <p:spPr>
-          <a:xfrm>
-            <a:off x="9409969" y="4898021"/>
-            <a:ext cx="377190" cy="251618"/>
-          </a:xfrm>
-          <a:prstGeom prst="rightArrow">
-            <a:avLst/>
-          </a:prstGeom>
-          <a:solidFill>
-            <a:schemeClr val="bg1">
-              <a:lumMod val="50000"/>
-            </a:schemeClr>
-          </a:solidFill>
-          <a:ln>
-            <a:noFill/>
-          </a:ln>
-        </p:spPr>
-        <p:style>
-          <a:lnRef idx="2">
-            <a:schemeClr val="accent1">
-              <a:shade val="50000"/>
-            </a:schemeClr>
-          </a:lnRef>
-          <a:fillRef idx="1">
-            <a:schemeClr val="accent1"/>
-          </a:fillRef>
-          <a:effectRef idx="0">
-            <a:schemeClr val="accent1"/>
-          </a:effectRef>
-          <a:fontRef idx="minor">
-            <a:schemeClr val="lt1"/>
-          </a:fontRef>
-        </p:style>
-        <p:txBody>
-          <a:bodyPr rtlCol="0" anchor="ctr"/>
-          <a:lstStyle/>
-          <a:p>
-            <a:pPr algn="ctr"/>
-            <a:endParaRPr lang="fr-FR"/>
-          </a:p>
-        </p:txBody>
-      </p:sp>
-      <p:sp>
-        <p:nvSpPr>
-          <p:cNvPr id="71" name="ZoneTexte 70">
-            <a:extLst>
-              <a:ext uri="{FF2B5EF4-FFF2-40B4-BE49-F238E27FC236}">
-                <a16:creationId xmlns:a16="http://schemas.microsoft.com/office/drawing/2014/main" id="{7F9AF22F-E0EF-4323-91C2-17E4A65E275A}"/>
-              </a:ext>
-            </a:extLst>
-          </p:cNvPr>
-          <p:cNvSpPr txBox="1"/>
-          <p:nvPr/>
-        </p:nvSpPr>
-        <p:spPr>
-          <a:xfrm>
-            <a:off x="3382274" y="2459301"/>
-            <a:ext cx="1132056" cy="584775"/>
-          </a:xfrm>
-          <a:prstGeom prst="rect">
-            <a:avLst/>
-          </a:prstGeom>
-          <a:noFill/>
-        </p:spPr>
-        <p:txBody>
-          <a:bodyPr wrap="square" rtlCol="0">
-            <a:spAutoFit/>
-          </a:bodyPr>
-          <a:lstStyle/>
-          <a:p>
-            <a:pPr algn="ctr"/>
-            <a:r>
-              <a:rPr lang="en-US" sz="1600" i="1" dirty="0">
-                <a:solidFill>
-                  <a:schemeClr val="bg2">
-                    <a:lumMod val="50000"/>
-                  </a:schemeClr>
-                </a:solidFill>
-                <a:latin typeface="Times New Roman" panose="02020603050405020304" pitchFamily="18" charset="0"/>
-                <a:cs typeface="Times New Roman" panose="02020603050405020304" pitchFamily="18" charset="0"/>
-              </a:rPr>
-              <a:t>Data </a:t>
-            </a:r>
-          </a:p>
-          <a:p>
-            <a:pPr algn="ctr"/>
-            <a:r>
-              <a:rPr lang="en-US" sz="1600" i="1" dirty="0">
-                <a:solidFill>
-                  <a:schemeClr val="bg2">
-                    <a:lumMod val="50000"/>
-                  </a:schemeClr>
-                </a:solidFill>
-                <a:latin typeface="Times New Roman" panose="02020603050405020304" pitchFamily="18" charset="0"/>
-                <a:cs typeface="Times New Roman" panose="02020603050405020304" pitchFamily="18" charset="0"/>
-              </a:rPr>
-              <a:t>Acquisition</a:t>
-            </a:r>
-            <a:endParaRPr lang="fr-FR" sz="1600" i="1" dirty="0">
-              <a:solidFill>
-                <a:schemeClr val="bg2">
-                  <a:lumMod val="50000"/>
-                </a:schemeClr>
-              </a:solidFill>
-              <a:latin typeface="Times New Roman" panose="02020603050405020304" pitchFamily="18" charset="0"/>
-              <a:cs typeface="Times New Roman" panose="02020603050405020304" pitchFamily="18" charset="0"/>
-            </a:endParaRPr>
-          </a:p>
-        </p:txBody>
-      </p:sp>
-      <p:sp>
-        <p:nvSpPr>
-          <p:cNvPr id="72" name="Rectangle : coins arrondis 71">
-            <a:extLst>
-              <a:ext uri="{FF2B5EF4-FFF2-40B4-BE49-F238E27FC236}">
-                <a16:creationId xmlns:a16="http://schemas.microsoft.com/office/drawing/2014/main" id="{172BF548-D858-4EDE-BECD-150FB7090981}"/>
-              </a:ext>
-            </a:extLst>
-          </p:cNvPr>
-          <p:cNvSpPr/>
-          <p:nvPr/>
-        </p:nvSpPr>
-        <p:spPr>
-          <a:xfrm>
-            <a:off x="6750369" y="4242519"/>
-            <a:ext cx="2601441" cy="1311004"/>
-          </a:xfrm>
-          <a:prstGeom prst="roundRect">
-            <a:avLst>
-              <a:gd name="adj" fmla="val 6873"/>
-            </a:avLst>
-          </a:prstGeom>
-          <a:noFill/>
-          <a:ln>
-            <a:solidFill>
-              <a:schemeClr val="bg1">
-                <a:lumMod val="50000"/>
-              </a:schemeClr>
-            </a:solidFill>
-          </a:ln>
-        </p:spPr>
-        <p:style>
-          <a:lnRef idx="2">
-            <a:schemeClr val="accent1">
-              <a:shade val="50000"/>
-            </a:schemeClr>
-          </a:lnRef>
-          <a:fillRef idx="1">
-            <a:schemeClr val="accent1"/>
-          </a:fillRef>
-          <a:effectRef idx="0">
-            <a:schemeClr val="accent1"/>
-          </a:effectRef>
-          <a:fontRef idx="minor">
-            <a:schemeClr val="lt1"/>
-          </a:fontRef>
-        </p:style>
-        <p:txBody>
-          <a:bodyPr rtlCol="0" anchor="ctr"/>
-          <a:lstStyle/>
-          <a:p>
-            <a:pPr algn="ctr"/>
-            <a:endParaRPr lang="fr-FR" dirty="0"/>
-          </a:p>
-        </p:txBody>
-      </p:sp>
-      <p:sp>
-        <p:nvSpPr>
-          <p:cNvPr id="73" name="ZoneTexte 72">
-            <a:extLst>
-              <a:ext uri="{FF2B5EF4-FFF2-40B4-BE49-F238E27FC236}">
-                <a16:creationId xmlns:a16="http://schemas.microsoft.com/office/drawing/2014/main" id="{9D82B7B3-818B-4EBB-A282-53F549A08C9B}"/>
-              </a:ext>
-            </a:extLst>
-          </p:cNvPr>
-          <p:cNvSpPr txBox="1"/>
-          <p:nvPr/>
-        </p:nvSpPr>
-        <p:spPr>
-          <a:xfrm>
-            <a:off x="7202215" y="4245565"/>
-            <a:ext cx="2381772" cy="338554"/>
-          </a:xfrm>
-          <a:prstGeom prst="rect">
-            <a:avLst/>
-          </a:prstGeom>
-          <a:noFill/>
-        </p:spPr>
-        <p:txBody>
-          <a:bodyPr wrap="square" rtlCol="0">
-            <a:spAutoFit/>
-          </a:bodyPr>
-          <a:lstStyle/>
-          <a:p>
-            <a:r>
-              <a:rPr lang="en-US" sz="1600" i="1" dirty="0">
-                <a:solidFill>
-                  <a:schemeClr val="bg2">
-                    <a:lumMod val="50000"/>
-                  </a:schemeClr>
-                </a:solidFill>
-                <a:latin typeface="Times New Roman" panose="02020603050405020304" pitchFamily="18" charset="0"/>
-                <a:cs typeface="Times New Roman" panose="02020603050405020304" pitchFamily="18" charset="0"/>
-              </a:rPr>
-              <a:t>Data Serving</a:t>
-            </a:r>
-            <a:endParaRPr lang="fr-FR" sz="1600" i="1" dirty="0">
-              <a:solidFill>
-                <a:schemeClr val="bg2">
-                  <a:lumMod val="50000"/>
-                </a:schemeClr>
-              </a:solidFill>
-              <a:latin typeface="Times New Roman" panose="02020603050405020304" pitchFamily="18" charset="0"/>
-              <a:cs typeface="Times New Roman" panose="02020603050405020304" pitchFamily="18" charset="0"/>
-            </a:endParaRPr>
-          </a:p>
-        </p:txBody>
-      </p:sp>
-    </p:spTree>
-    <p:extLst>
-      <p:ext uri="{BB962C8B-B14F-4D97-AF65-F5344CB8AC3E}">
-        <p14:creationId xmlns:p14="http://schemas.microsoft.com/office/powerpoint/2010/main" val="101953868"/>
-      </p:ext>
-    </p:extLst>
-  </p:cSld>
-  <p:clrMapOvr>
-    <a:masterClrMapping/>
-  </p:clrMapOvr>
-</p:sld>
-</file>
-
-<file path=ppt/slides/slide6.xml><?xml version="1.0" encoding="utf-8"?>
+<file path=ppt/slides/slide2.xml><?xml version="1.0" encoding="utf-8"?>
 <p:sld xmlns:a="http://schemas.openxmlformats.org/drawingml/2006/main" xmlns:r="http://schemas.openxmlformats.org/officeDocument/2006/relationships" xmlns:p="http://schemas.openxmlformats.org/presentationml/2006/main">
   <p:cSld>
     <p:spTree>
@@ -14903,7 +12605,7 @@
 </p:sld>
 </file>
 
-<file path=ppt/slides/slide7.xml><?xml version="1.0" encoding="utf-8"?>
+<file path=ppt/slides/slide3.xml><?xml version="1.0" encoding="utf-8"?>
 <p:sld xmlns:a="http://schemas.openxmlformats.org/drawingml/2006/main" xmlns:r="http://schemas.openxmlformats.org/officeDocument/2006/relationships" xmlns:p="http://schemas.openxmlformats.org/presentationml/2006/main">
   <p:cSld>
     <p:spTree>
@@ -15174,7 +12876,7 @@
 </p:sld>
 </file>
 
-<file path=ppt/slides/slide8.xml><?xml version="1.0" encoding="utf-8"?>
+<file path=ppt/slides/slide4.xml><?xml version="1.0" encoding="utf-8"?>
 <p:sld xmlns:a="http://schemas.openxmlformats.org/drawingml/2006/main" xmlns:r="http://schemas.openxmlformats.org/officeDocument/2006/relationships" xmlns:p="http://schemas.openxmlformats.org/presentationml/2006/main">
   <p:cSld>
     <p:spTree>
@@ -15471,7 +13173,7 @@
 </p:sld>
 </file>
 
-<file path=ppt/slides/slide9.xml><?xml version="1.0" encoding="utf-8"?>
+<file path=ppt/slides/slide5.xml><?xml version="1.0" encoding="utf-8"?>
 <p:sld xmlns:a="http://schemas.openxmlformats.org/drawingml/2006/main" xmlns:r="http://schemas.openxmlformats.org/officeDocument/2006/relationships" xmlns:p="http://schemas.openxmlformats.org/presentationml/2006/main">
   <p:cSld>
     <p:spTree>
@@ -15665,6 +13367,367 @@
     <p:extLst>
       <p:ext uri="{BB962C8B-B14F-4D97-AF65-F5344CB8AC3E}">
         <p14:creationId xmlns:p14="http://schemas.microsoft.com/office/powerpoint/2010/main" val="3570471032"/>
+      </p:ext>
+    </p:extLst>
+  </p:cSld>
+  <p:clrMapOvr>
+    <a:masterClrMapping/>
+  </p:clrMapOvr>
+</p:sld>
+</file>
+
+<file path=ppt/slides/slide6.xml><?xml version="1.0" encoding="utf-8"?>
+<p:sld xmlns:a="http://schemas.openxmlformats.org/drawingml/2006/main" xmlns:r="http://schemas.openxmlformats.org/officeDocument/2006/relationships" xmlns:p="http://schemas.openxmlformats.org/presentationml/2006/main">
+  <p:cSld>
+    <p:spTree>
+      <p:nvGrpSpPr>
+        <p:cNvPr id="1" name=""/>
+        <p:cNvGrpSpPr/>
+        <p:nvPr/>
+      </p:nvGrpSpPr>
+      <p:grpSpPr>
+        <a:xfrm>
+          <a:off x="0" y="0"/>
+          <a:ext cx="0" cy="0"/>
+          <a:chOff x="0" y="0"/>
+          <a:chExt cx="0" cy="0"/>
+        </a:xfrm>
+      </p:grpSpPr>
+      <p:sp>
+        <p:nvSpPr>
+          <p:cNvPr id="2" name="Title 1">
+            <a:extLst>
+              <a:ext uri="{FF2B5EF4-FFF2-40B4-BE49-F238E27FC236}">
+                <a16:creationId xmlns:a16="http://schemas.microsoft.com/office/drawing/2014/main" id="{3D20979F-C224-45DD-9A21-BF0CF8E7A524}"/>
+              </a:ext>
+            </a:extLst>
+          </p:cNvPr>
+          <p:cNvSpPr>
+            <a:spLocks noGrp="1"/>
+          </p:cNvSpPr>
+          <p:nvPr>
+            <p:ph type="title"/>
+          </p:nvPr>
+        </p:nvSpPr>
+        <p:spPr>
+          <a:xfrm>
+            <a:off x="155620" y="274667"/>
+            <a:ext cx="3180008" cy="1325563"/>
+          </a:xfrm>
+        </p:spPr>
+        <p:txBody>
+          <a:bodyPr/>
+          <a:lstStyle/>
+          <a:p>
+            <a:r>
+              <a:rPr lang="en-US" dirty="0">
+                <a:latin typeface="Times New Roman" panose="02020603050405020304" pitchFamily="18" charset="0"/>
+                <a:cs typeface="Times New Roman" panose="02020603050405020304" pitchFamily="18" charset="0"/>
+              </a:rPr>
+              <a:t>Current Step</a:t>
+            </a:r>
+            <a:endParaRPr lang="fr-FR" dirty="0">
+              <a:latin typeface="Times New Roman" panose="02020603050405020304" pitchFamily="18" charset="0"/>
+              <a:cs typeface="Times New Roman" panose="02020603050405020304" pitchFamily="18" charset="0"/>
+            </a:endParaRPr>
+          </a:p>
+        </p:txBody>
+      </p:sp>
+      <p:pic>
+        <p:nvPicPr>
+          <p:cNvPr id="1030" name="Picture 6" descr="Afficher l’image source">
+            <a:extLst>
+              <a:ext uri="{FF2B5EF4-FFF2-40B4-BE49-F238E27FC236}">
+                <a16:creationId xmlns:a16="http://schemas.microsoft.com/office/drawing/2014/main" id="{4D506C72-7495-492D-9C62-F747B9444F0B}"/>
+              </a:ext>
+            </a:extLst>
+          </p:cNvPr>
+          <p:cNvPicPr>
+            <a:picLocks noChangeAspect="1" noChangeArrowheads="1"/>
+          </p:cNvPicPr>
+          <p:nvPr/>
+        </p:nvPicPr>
+        <p:blipFill>
+          <a:blip r:embed="rId2">
+            <a:extLst>
+              <a:ext uri="{28A0092B-C50C-407E-A947-70E740481C1C}">
+                <a14:useLocalDpi xmlns:a14="http://schemas.microsoft.com/office/drawing/2010/main" val="0"/>
+              </a:ext>
+            </a:extLst>
+          </a:blip>
+          <a:srcRect/>
+          <a:stretch>
+            <a:fillRect/>
+          </a:stretch>
+        </p:blipFill>
+        <p:spPr bwMode="auto">
+          <a:xfrm>
+            <a:off x="6858434" y="1504186"/>
+            <a:ext cx="3857647" cy="3849627"/>
+          </a:xfrm>
+          <a:prstGeom prst="rect">
+            <a:avLst/>
+          </a:prstGeom>
+          <a:noFill/>
+          <a:extLst>
+            <a:ext uri="{909E8E84-426E-40DD-AFC4-6F175D3DCCD1}">
+              <a14:hiddenFill xmlns:a14="http://schemas.microsoft.com/office/drawing/2010/main">
+                <a:solidFill>
+                  <a:srgbClr val="FFFFFF"/>
+                </a:solidFill>
+              </a14:hiddenFill>
+            </a:ext>
+          </a:extLst>
+        </p:spPr>
+      </p:pic>
+      <p:pic>
+        <p:nvPicPr>
+          <p:cNvPr id="6" name="Graphic 5" descr="Smart Phone">
+            <a:extLst>
+              <a:ext uri="{FF2B5EF4-FFF2-40B4-BE49-F238E27FC236}">
+                <a16:creationId xmlns:a16="http://schemas.microsoft.com/office/drawing/2014/main" id="{A84BC0C8-5514-4306-A6B8-15B819A3EB3C}"/>
+              </a:ext>
+            </a:extLst>
+          </p:cNvPr>
+          <p:cNvPicPr>
+            <a:picLocks noChangeAspect="1"/>
+          </p:cNvPicPr>
+          <p:nvPr/>
+        </p:nvPicPr>
+        <p:blipFill>
+          <a:blip r:embed="rId3">
+            <a:extLst>
+              <a:ext uri="{28A0092B-C50C-407E-A947-70E740481C1C}">
+                <a14:useLocalDpi xmlns:a14="http://schemas.microsoft.com/office/drawing/2010/main" val="0"/>
+              </a:ext>
+              <a:ext uri="{96DAC541-7B7A-43D3-8B79-37D633B846F1}">
+                <asvg:svgBlip xmlns:asvg="http://schemas.microsoft.com/office/drawing/2016/SVG/main" r:embed="rId4"/>
+              </a:ext>
+            </a:extLst>
+          </a:blip>
+          <a:stretch>
+            <a:fillRect/>
+          </a:stretch>
+        </p:blipFill>
+        <p:spPr>
+          <a:xfrm>
+            <a:off x="1475919" y="2528652"/>
+            <a:ext cx="1226927" cy="1226927"/>
+          </a:xfrm>
+          <a:prstGeom prst="rect">
+            <a:avLst/>
+          </a:prstGeom>
+        </p:spPr>
+      </p:pic>
+      <p:sp>
+        <p:nvSpPr>
+          <p:cNvPr id="7" name="Rectangle 6">
+            <a:extLst>
+              <a:ext uri="{FF2B5EF4-FFF2-40B4-BE49-F238E27FC236}">
+                <a16:creationId xmlns:a16="http://schemas.microsoft.com/office/drawing/2014/main" id="{9DB97059-FE87-4E9D-B25F-B7B1A12A5528}"/>
+              </a:ext>
+            </a:extLst>
+          </p:cNvPr>
+          <p:cNvSpPr/>
+          <p:nvPr/>
+        </p:nvSpPr>
+        <p:spPr>
+          <a:xfrm>
+            <a:off x="932645" y="3965551"/>
+            <a:ext cx="2805448" cy="369332"/>
+          </a:xfrm>
+          <a:prstGeom prst="rect">
+            <a:avLst/>
+          </a:prstGeom>
+        </p:spPr>
+        <p:txBody>
+          <a:bodyPr wrap="none">
+            <a:spAutoFit/>
+          </a:bodyPr>
+          <a:lstStyle/>
+          <a:p>
+            <a:r>
+              <a:rPr lang="fr-FR" dirty="0" err="1">
+                <a:solidFill>
+                  <a:srgbClr val="24292F"/>
+                </a:solidFill>
+                <a:latin typeface="Times New Roman" panose="02020603050405020304" pitchFamily="18" charset="0"/>
+                <a:cs typeface="Times New Roman" panose="02020603050405020304" pitchFamily="18" charset="0"/>
+              </a:rPr>
+              <a:t>Traccar</a:t>
+            </a:r>
+            <a:r>
+              <a:rPr lang="fr-FR" dirty="0">
+                <a:solidFill>
+                  <a:srgbClr val="24292F"/>
+                </a:solidFill>
+                <a:latin typeface="Times New Roman" panose="02020603050405020304" pitchFamily="18" charset="0"/>
+                <a:cs typeface="Times New Roman" panose="02020603050405020304" pitchFamily="18" charset="0"/>
+              </a:rPr>
+              <a:t> Client (Application)</a:t>
+            </a:r>
+            <a:endParaRPr lang="fr-FR" dirty="0">
+              <a:latin typeface="Times New Roman" panose="02020603050405020304" pitchFamily="18" charset="0"/>
+              <a:cs typeface="Times New Roman" panose="02020603050405020304" pitchFamily="18" charset="0"/>
+            </a:endParaRPr>
+          </a:p>
+        </p:txBody>
+      </p:sp>
+      <p:sp>
+        <p:nvSpPr>
+          <p:cNvPr id="10" name="Rectangle 9">
+            <a:extLst>
+              <a:ext uri="{FF2B5EF4-FFF2-40B4-BE49-F238E27FC236}">
+                <a16:creationId xmlns:a16="http://schemas.microsoft.com/office/drawing/2014/main" id="{BF36CDF2-D11D-46DA-BB61-6D325F6CADDC}"/>
+              </a:ext>
+            </a:extLst>
+          </p:cNvPr>
+          <p:cNvSpPr/>
+          <p:nvPr/>
+        </p:nvSpPr>
+        <p:spPr>
+          <a:xfrm>
+            <a:off x="7563118" y="5637658"/>
+            <a:ext cx="2318135" cy="369332"/>
+          </a:xfrm>
+          <a:prstGeom prst="rect">
+            <a:avLst/>
+          </a:prstGeom>
+        </p:spPr>
+        <p:txBody>
+          <a:bodyPr wrap="none">
+            <a:spAutoFit/>
+          </a:bodyPr>
+          <a:lstStyle/>
+          <a:p>
+            <a:r>
+              <a:rPr lang="fr-FR" dirty="0" err="1">
+                <a:solidFill>
+                  <a:srgbClr val="24292F"/>
+                </a:solidFill>
+                <a:latin typeface="Times New Roman" panose="02020603050405020304" pitchFamily="18" charset="0"/>
+                <a:cs typeface="Times New Roman" panose="02020603050405020304" pitchFamily="18" charset="0"/>
+              </a:rPr>
+              <a:t>Traccar</a:t>
+            </a:r>
+            <a:r>
+              <a:rPr lang="fr-FR" dirty="0">
+                <a:solidFill>
+                  <a:srgbClr val="24292F"/>
+                </a:solidFill>
+                <a:latin typeface="Times New Roman" panose="02020603050405020304" pitchFamily="18" charset="0"/>
+                <a:cs typeface="Times New Roman" panose="02020603050405020304" pitchFamily="18" charset="0"/>
+              </a:rPr>
+              <a:t> Client (Server)</a:t>
+            </a:r>
+            <a:endParaRPr lang="fr-FR" dirty="0">
+              <a:latin typeface="Times New Roman" panose="02020603050405020304" pitchFamily="18" charset="0"/>
+              <a:cs typeface="Times New Roman" panose="02020603050405020304" pitchFamily="18" charset="0"/>
+            </a:endParaRPr>
+          </a:p>
+        </p:txBody>
+      </p:sp>
+      <p:cxnSp>
+        <p:nvCxnSpPr>
+          <p:cNvPr id="12" name="Straight Arrow Connector 11">
+            <a:extLst>
+              <a:ext uri="{FF2B5EF4-FFF2-40B4-BE49-F238E27FC236}">
+                <a16:creationId xmlns:a16="http://schemas.microsoft.com/office/drawing/2014/main" id="{CF7EF238-5E5E-4E90-B8F2-A651811A1352}"/>
+              </a:ext>
+            </a:extLst>
+          </p:cNvPr>
+          <p:cNvCxnSpPr/>
+          <p:nvPr/>
+        </p:nvCxnSpPr>
+        <p:spPr>
+          <a:xfrm>
+            <a:off x="3335628" y="3142115"/>
+            <a:ext cx="3181082" cy="0"/>
+          </a:xfrm>
+          <a:prstGeom prst="straightConnector1">
+            <a:avLst/>
+          </a:prstGeom>
+          <a:ln w="28575">
+            <a:solidFill>
+              <a:schemeClr val="tx1"/>
+            </a:solidFill>
+            <a:headEnd type="triangle"/>
+            <a:tailEnd type="triangle"/>
+          </a:ln>
+        </p:spPr>
+        <p:style>
+          <a:lnRef idx="1">
+            <a:schemeClr val="accent1"/>
+          </a:lnRef>
+          <a:fillRef idx="0">
+            <a:schemeClr val="accent1"/>
+          </a:fillRef>
+          <a:effectRef idx="0">
+            <a:schemeClr val="accent1"/>
+          </a:effectRef>
+          <a:fontRef idx="minor">
+            <a:schemeClr val="tx1"/>
+          </a:fontRef>
+        </p:style>
+      </p:cxnSp>
+      <p:sp>
+        <p:nvSpPr>
+          <p:cNvPr id="15" name="Rectangle 14">
+            <a:extLst>
+              <a:ext uri="{FF2B5EF4-FFF2-40B4-BE49-F238E27FC236}">
+                <a16:creationId xmlns:a16="http://schemas.microsoft.com/office/drawing/2014/main" id="{EF622F5A-7792-4884-997F-97822869CDF9}"/>
+              </a:ext>
+            </a:extLst>
+          </p:cNvPr>
+          <p:cNvSpPr/>
+          <p:nvPr/>
+        </p:nvSpPr>
+        <p:spPr>
+          <a:xfrm>
+            <a:off x="3269305" y="2667797"/>
+            <a:ext cx="3256020" cy="369332"/>
+          </a:xfrm>
+          <a:prstGeom prst="rect">
+            <a:avLst/>
+          </a:prstGeom>
+        </p:spPr>
+        <p:txBody>
+          <a:bodyPr wrap="none">
+            <a:spAutoFit/>
+          </a:bodyPr>
+          <a:lstStyle/>
+          <a:p>
+            <a:r>
+              <a:rPr lang="fr-FR" dirty="0" err="1">
+                <a:solidFill>
+                  <a:srgbClr val="24292F"/>
+                </a:solidFill>
+                <a:latin typeface="Times New Roman" panose="02020603050405020304" pitchFamily="18" charset="0"/>
+                <a:cs typeface="Times New Roman" panose="02020603050405020304" pitchFamily="18" charset="0"/>
+              </a:rPr>
+              <a:t>Bind</a:t>
+            </a:r>
+            <a:r>
+              <a:rPr lang="fr-FR" dirty="0">
+                <a:solidFill>
+                  <a:srgbClr val="24292F"/>
+                </a:solidFill>
+                <a:latin typeface="Times New Roman" panose="02020603050405020304" pitchFamily="18" charset="0"/>
+                <a:cs typeface="Times New Roman" panose="02020603050405020304" pitchFamily="18" charset="0"/>
+              </a:rPr>
+              <a:t> the application to the server</a:t>
+            </a:r>
+            <a:endParaRPr lang="fr-FR" dirty="0">
+              <a:latin typeface="Times New Roman" panose="02020603050405020304" pitchFamily="18" charset="0"/>
+              <a:cs typeface="Times New Roman" panose="02020603050405020304" pitchFamily="18" charset="0"/>
+            </a:endParaRPr>
+          </a:p>
+        </p:txBody>
+      </p:sp>
+    </p:spTree>
+    <p:extLst>
+      <p:ext uri="{BB962C8B-B14F-4D97-AF65-F5344CB8AC3E}">
+        <p14:creationId xmlns:p14="http://schemas.microsoft.com/office/powerpoint/2010/main" val="83230128"/>
       </p:ext>
     </p:extLst>
   </p:cSld>

</xml_diff>

<commit_message>
add the progress presentation v2 : [Include the team]
</commit_message>
<xml_diff>
--- a/Progress' Presentations/Etat d'avancement - S1.pptx
+++ b/Progress' Presentations/Etat d'avancement - S1.pptx
@@ -5,12 +5,14 @@
     <p:sldMasterId id="2147483648" r:id="rId1"/>
   </p:sldMasterIdLst>
   <p:sldIdLst>
-    <p:sldId id="263" r:id="rId2"/>
-    <p:sldId id="261" r:id="rId3"/>
-    <p:sldId id="256" r:id="rId4"/>
-    <p:sldId id="259" r:id="rId5"/>
-    <p:sldId id="257" r:id="rId6"/>
-    <p:sldId id="260" r:id="rId7"/>
+    <p:sldId id="262" r:id="rId2"/>
+    <p:sldId id="264" r:id="rId3"/>
+    <p:sldId id="263" r:id="rId4"/>
+    <p:sldId id="261" r:id="rId5"/>
+    <p:sldId id="256" r:id="rId6"/>
+    <p:sldId id="259" r:id="rId7"/>
+    <p:sldId id="257" r:id="rId8"/>
+    <p:sldId id="260" r:id="rId9"/>
   </p:sldIdLst>
   <p:sldSz cx="12192000" cy="6858000"/>
   <p:notesSz cx="6858000" cy="9144000"/>
@@ -266,7 +268,7 @@
           <a:p>
             <a:fld id="{33C3348E-3C1A-4598-9A7B-0D66E8588920}" type="datetimeFigureOut">
               <a:rPr lang="fr-FR" smtClean="0"/>
-              <a:t>30/11/2021</a:t>
+              <a:t>01/12/2021</a:t>
             </a:fld>
             <a:endParaRPr lang="fr-FR"/>
           </a:p>
@@ -466,7 +468,7 @@
           <a:p>
             <a:fld id="{33C3348E-3C1A-4598-9A7B-0D66E8588920}" type="datetimeFigureOut">
               <a:rPr lang="fr-FR" smtClean="0"/>
-              <a:t>30/11/2021</a:t>
+              <a:t>01/12/2021</a:t>
             </a:fld>
             <a:endParaRPr lang="fr-FR"/>
           </a:p>
@@ -676,7 +678,7 @@
           <a:p>
             <a:fld id="{33C3348E-3C1A-4598-9A7B-0D66E8588920}" type="datetimeFigureOut">
               <a:rPr lang="fr-FR" smtClean="0"/>
-              <a:t>30/11/2021</a:t>
+              <a:t>01/12/2021</a:t>
             </a:fld>
             <a:endParaRPr lang="fr-FR"/>
           </a:p>
@@ -876,7 +878,7 @@
           <a:p>
             <a:fld id="{33C3348E-3C1A-4598-9A7B-0D66E8588920}" type="datetimeFigureOut">
               <a:rPr lang="fr-FR" smtClean="0"/>
-              <a:t>30/11/2021</a:t>
+              <a:t>01/12/2021</a:t>
             </a:fld>
             <a:endParaRPr lang="fr-FR"/>
           </a:p>
@@ -1152,7 +1154,7 @@
           <a:p>
             <a:fld id="{33C3348E-3C1A-4598-9A7B-0D66E8588920}" type="datetimeFigureOut">
               <a:rPr lang="fr-FR" smtClean="0"/>
-              <a:t>30/11/2021</a:t>
+              <a:t>01/12/2021</a:t>
             </a:fld>
             <a:endParaRPr lang="fr-FR"/>
           </a:p>
@@ -1420,7 +1422,7 @@
           <a:p>
             <a:fld id="{33C3348E-3C1A-4598-9A7B-0D66E8588920}" type="datetimeFigureOut">
               <a:rPr lang="fr-FR" smtClean="0"/>
-              <a:t>30/11/2021</a:t>
+              <a:t>01/12/2021</a:t>
             </a:fld>
             <a:endParaRPr lang="fr-FR"/>
           </a:p>
@@ -1835,7 +1837,7 @@
           <a:p>
             <a:fld id="{33C3348E-3C1A-4598-9A7B-0D66E8588920}" type="datetimeFigureOut">
               <a:rPr lang="fr-FR" smtClean="0"/>
-              <a:t>30/11/2021</a:t>
+              <a:t>01/12/2021</a:t>
             </a:fld>
             <a:endParaRPr lang="fr-FR"/>
           </a:p>
@@ -1977,7 +1979,7 @@
           <a:p>
             <a:fld id="{33C3348E-3C1A-4598-9A7B-0D66E8588920}" type="datetimeFigureOut">
               <a:rPr lang="fr-FR" smtClean="0"/>
-              <a:t>30/11/2021</a:t>
+              <a:t>01/12/2021</a:t>
             </a:fld>
             <a:endParaRPr lang="fr-FR"/>
           </a:p>
@@ -2090,7 +2092,7 @@
           <a:p>
             <a:fld id="{33C3348E-3C1A-4598-9A7B-0D66E8588920}" type="datetimeFigureOut">
               <a:rPr lang="fr-FR" smtClean="0"/>
-              <a:t>30/11/2021</a:t>
+              <a:t>01/12/2021</a:t>
             </a:fld>
             <a:endParaRPr lang="fr-FR"/>
           </a:p>
@@ -2403,7 +2405,7 @@
           <a:p>
             <a:fld id="{33C3348E-3C1A-4598-9A7B-0D66E8588920}" type="datetimeFigureOut">
               <a:rPr lang="fr-FR" smtClean="0"/>
-              <a:t>30/11/2021</a:t>
+              <a:t>01/12/2021</a:t>
             </a:fld>
             <a:endParaRPr lang="fr-FR"/>
           </a:p>
@@ -2692,7 +2694,7 @@
           <a:p>
             <a:fld id="{33C3348E-3C1A-4598-9A7B-0D66E8588920}" type="datetimeFigureOut">
               <a:rPr lang="fr-FR" smtClean="0"/>
-              <a:t>30/11/2021</a:t>
+              <a:t>01/12/2021</a:t>
             </a:fld>
             <a:endParaRPr lang="fr-FR"/>
           </a:p>
@@ -2935,7 +2937,7 @@
           <a:p>
             <a:fld id="{33C3348E-3C1A-4598-9A7B-0D66E8588920}" type="datetimeFigureOut">
               <a:rPr lang="fr-FR" smtClean="0"/>
-              <a:t>30/11/2021</a:t>
+              <a:t>01/12/2021</a:t>
             </a:fld>
             <a:endParaRPr lang="fr-FR"/>
           </a:p>
@@ -3354,6 +3356,2456 @@
       </p:grpSpPr>
       <p:sp>
         <p:nvSpPr>
+          <p:cNvPr id="2" name="Titre 1"/>
+          <p:cNvSpPr>
+            <a:spLocks noGrp="1"/>
+          </p:cNvSpPr>
+          <p:nvPr>
+            <p:ph type="title"/>
+          </p:nvPr>
+        </p:nvSpPr>
+        <p:spPr/>
+        <p:txBody>
+          <a:bodyPr/>
+          <a:lstStyle/>
+          <a:p>
+            <a:r>
+              <a:rPr lang="en-US" sz="3500" dirty="0">
+                <a:solidFill>
+                  <a:schemeClr val="accent2"/>
+                </a:solidFill>
+                <a:latin typeface="Times New Roman" panose="02020603050405020304" pitchFamily="18" charset="0"/>
+                <a:ea typeface="+mn-ea"/>
+                <a:cs typeface="Times New Roman" panose="02020603050405020304" pitchFamily="18" charset="0"/>
+              </a:rPr>
+              <a:t>Overview</a:t>
+            </a:r>
+            <a:r>
+              <a:rPr lang="en-US" dirty="0"/>
+              <a:t> </a:t>
+            </a:r>
+            <a:endParaRPr lang="fr-FR" dirty="0"/>
+          </a:p>
+        </p:txBody>
+      </p:sp>
+      <p:sp>
+        <p:nvSpPr>
+          <p:cNvPr id="3" name="Espace réservé du contenu 2"/>
+          <p:cNvSpPr>
+            <a:spLocks noGrp="1"/>
+          </p:cNvSpPr>
+          <p:nvPr>
+            <p:ph idx="1"/>
+          </p:nvPr>
+        </p:nvSpPr>
+        <p:spPr/>
+        <p:txBody>
+          <a:bodyPr>
+            <a:normAutofit/>
+          </a:bodyPr>
+          <a:lstStyle/>
+          <a:p>
+            <a:pPr marL="0" indent="0">
+              <a:buNone/>
+            </a:pPr>
+            <a:r>
+              <a:rPr lang="en-US" sz="2000" dirty="0">
+                <a:latin typeface="Times New Roman" panose="02020603050405020304" pitchFamily="18" charset="0"/>
+                <a:cs typeface="Times New Roman" panose="02020603050405020304" pitchFamily="18" charset="0"/>
+              </a:rPr>
+              <a:t>I-Track  part of the IT/ T</a:t>
+            </a:r>
+            <a:r>
+              <a:rPr lang="fr-FR" sz="2000" dirty="0" err="1">
+                <a:latin typeface="Times New Roman" panose="02020603050405020304" pitchFamily="18" charset="0"/>
+                <a:cs typeface="Times New Roman" panose="02020603050405020304" pitchFamily="18" charset="0"/>
+              </a:rPr>
+              <a:t>echnology</a:t>
+            </a:r>
+            <a:r>
+              <a:rPr lang="fr-FR" sz="2000" dirty="0">
+                <a:latin typeface="Times New Roman" panose="02020603050405020304" pitchFamily="18" charset="0"/>
+                <a:cs typeface="Times New Roman" panose="02020603050405020304" pitchFamily="18" charset="0"/>
+              </a:rPr>
+              <a:t> Services, </a:t>
+            </a:r>
+            <a:r>
+              <a:rPr lang="fr-FR" sz="2000" dirty="0" err="1">
+                <a:latin typeface="Times New Roman" panose="02020603050405020304" pitchFamily="18" charset="0"/>
+                <a:cs typeface="Times New Roman" panose="02020603050405020304" pitchFamily="18" charset="0"/>
+              </a:rPr>
+              <a:t>was</a:t>
+            </a:r>
+            <a:r>
+              <a:rPr lang="fr-FR" sz="2000" dirty="0">
+                <a:latin typeface="Times New Roman" panose="02020603050405020304" pitchFamily="18" charset="0"/>
+                <a:cs typeface="Times New Roman" panose="02020603050405020304" pitchFamily="18" charset="0"/>
+              </a:rPr>
+              <a:t> </a:t>
+            </a:r>
+            <a:r>
+              <a:rPr lang="fr-FR" sz="2000" dirty="0" err="1">
+                <a:latin typeface="Times New Roman" panose="02020603050405020304" pitchFamily="18" charset="0"/>
+                <a:cs typeface="Times New Roman" panose="02020603050405020304" pitchFamily="18" charset="0"/>
+              </a:rPr>
+              <a:t>established</a:t>
+            </a:r>
+            <a:r>
+              <a:rPr lang="fr-FR" sz="2000" dirty="0">
+                <a:latin typeface="Times New Roman" panose="02020603050405020304" pitchFamily="18" charset="0"/>
+                <a:cs typeface="Times New Roman" panose="02020603050405020304" pitchFamily="18" charset="0"/>
+              </a:rPr>
+              <a:t> in 2021.</a:t>
+            </a:r>
+          </a:p>
+          <a:p>
+            <a:pPr marL="0" indent="0">
+              <a:buNone/>
+            </a:pPr>
+            <a:r>
+              <a:rPr lang="en-US" sz="2000" dirty="0">
+                <a:latin typeface="Times New Roman" panose="02020603050405020304" pitchFamily="18" charset="0"/>
+                <a:cs typeface="Times New Roman" panose="02020603050405020304" pitchFamily="18" charset="0"/>
+              </a:rPr>
+              <a:t>One such path breaking technology is tracking based on GPS. We at, </a:t>
+            </a:r>
+            <a:r>
+              <a:rPr lang="en-US" sz="2000" dirty="0" err="1">
+                <a:latin typeface="Times New Roman" panose="02020603050405020304" pitchFamily="18" charset="0"/>
+                <a:cs typeface="Times New Roman" panose="02020603050405020304" pitchFamily="18" charset="0"/>
+              </a:rPr>
+              <a:t>ITrack</a:t>
+            </a:r>
+            <a:r>
+              <a:rPr lang="en-US" sz="2000" dirty="0">
+                <a:latin typeface="Times New Roman" panose="02020603050405020304" pitchFamily="18" charset="0"/>
+                <a:cs typeface="Times New Roman" panose="02020603050405020304" pitchFamily="18" charset="0"/>
+              </a:rPr>
+              <a:t>, have used this technology for providing innovative services</a:t>
+            </a:r>
+            <a:r>
+              <a:rPr lang="en-US" sz="2400" dirty="0">
+                <a:latin typeface="Times New Roman" panose="02020603050405020304" pitchFamily="18" charset="0"/>
+                <a:cs typeface="Times New Roman" panose="02020603050405020304" pitchFamily="18" charset="0"/>
+              </a:rPr>
+              <a:t>.</a:t>
+            </a:r>
+          </a:p>
+          <a:p>
+            <a:pPr marL="0" indent="0">
+              <a:buNone/>
+            </a:pPr>
+            <a:r>
+              <a:rPr lang="fr-FR" sz="2400" b="1" u="sng" dirty="0" err="1">
+                <a:latin typeface="Times New Roman" panose="02020603050405020304" pitchFamily="18" charset="0"/>
+                <a:cs typeface="Times New Roman" panose="02020603050405020304" pitchFamily="18" charset="0"/>
+              </a:rPr>
+              <a:t>What</a:t>
+            </a:r>
+            <a:r>
+              <a:rPr lang="fr-FR" sz="2400" b="1" u="sng" dirty="0">
+                <a:latin typeface="Times New Roman" panose="02020603050405020304" pitchFamily="18" charset="0"/>
+                <a:cs typeface="Times New Roman" panose="02020603050405020304" pitchFamily="18" charset="0"/>
+              </a:rPr>
+              <a:t> </a:t>
+            </a:r>
+            <a:r>
+              <a:rPr lang="fr-FR" sz="2400" b="1" u="sng" dirty="0" err="1">
+                <a:latin typeface="Times New Roman" panose="02020603050405020304" pitchFamily="18" charset="0"/>
+                <a:cs typeface="Times New Roman" panose="02020603050405020304" pitchFamily="18" charset="0"/>
+              </a:rPr>
+              <a:t>we</a:t>
+            </a:r>
+            <a:r>
+              <a:rPr lang="fr-FR" sz="2400" b="1" u="sng" dirty="0">
+                <a:latin typeface="Times New Roman" panose="02020603050405020304" pitchFamily="18" charset="0"/>
+                <a:cs typeface="Times New Roman" panose="02020603050405020304" pitchFamily="18" charset="0"/>
+              </a:rPr>
+              <a:t> do?</a:t>
+            </a:r>
+          </a:p>
+          <a:p>
+            <a:pPr marL="0" indent="0">
+              <a:buNone/>
+            </a:pPr>
+            <a:r>
+              <a:rPr lang="en-US" sz="2000" dirty="0">
+                <a:latin typeface="Times New Roman" panose="02020603050405020304" pitchFamily="18" charset="0"/>
+                <a:cs typeface="Times New Roman" panose="02020603050405020304" pitchFamily="18" charset="0"/>
+              </a:rPr>
+              <a:t>We, at </a:t>
+            </a:r>
+            <a:r>
+              <a:rPr lang="en-US" sz="2000" dirty="0" err="1">
+                <a:latin typeface="Times New Roman" panose="02020603050405020304" pitchFamily="18" charset="0"/>
+                <a:cs typeface="Times New Roman" panose="02020603050405020304" pitchFamily="18" charset="0"/>
+              </a:rPr>
+              <a:t>ITrack</a:t>
+            </a:r>
+            <a:r>
+              <a:rPr lang="en-US" sz="2000" dirty="0">
+                <a:latin typeface="Times New Roman" panose="02020603050405020304" pitchFamily="18" charset="0"/>
+                <a:cs typeface="Times New Roman" panose="02020603050405020304" pitchFamily="18" charset="0"/>
+              </a:rPr>
+              <a:t>, are fully dedicated to ensure the best tracking services for all our clients. We provide services related to tracking </a:t>
+            </a:r>
+            <a:r>
+              <a:rPr lang="fr-FR" sz="2000" dirty="0" err="1">
+                <a:latin typeface="Times New Roman" panose="02020603050405020304" pitchFamily="18" charset="0"/>
+                <a:cs typeface="Times New Roman" panose="02020603050405020304" pitchFamily="18" charset="0"/>
+              </a:rPr>
+              <a:t>available</a:t>
+            </a:r>
+            <a:r>
+              <a:rPr lang="fr-FR" sz="2000" dirty="0">
+                <a:latin typeface="Times New Roman" panose="02020603050405020304" pitchFamily="18" charset="0"/>
+                <a:cs typeface="Times New Roman" panose="02020603050405020304" pitchFamily="18" charset="0"/>
+              </a:rPr>
+              <a:t> in four </a:t>
+            </a:r>
+            <a:r>
+              <a:rPr lang="fr-FR" sz="2000" dirty="0" err="1">
+                <a:latin typeface="Times New Roman" panose="02020603050405020304" pitchFamily="18" charset="0"/>
+                <a:cs typeface="Times New Roman" panose="02020603050405020304" pitchFamily="18" charset="0"/>
+              </a:rPr>
+              <a:t>domains</a:t>
+            </a:r>
+            <a:r>
+              <a:rPr lang="fr-FR" sz="2000" dirty="0">
+                <a:latin typeface="Times New Roman" panose="02020603050405020304" pitchFamily="18" charset="0"/>
+                <a:cs typeface="Times New Roman" panose="02020603050405020304" pitchFamily="18" charset="0"/>
+              </a:rPr>
+              <a:t> :</a:t>
+            </a:r>
+            <a:endParaRPr lang="en-US" sz="2000" dirty="0">
+              <a:latin typeface="Times New Roman" panose="02020603050405020304" pitchFamily="18" charset="0"/>
+              <a:cs typeface="Times New Roman" panose="02020603050405020304" pitchFamily="18" charset="0"/>
+            </a:endParaRPr>
+          </a:p>
+          <a:p>
+            <a:r>
+              <a:rPr lang="en-US" sz="2000" dirty="0">
+                <a:latin typeface="Times New Roman" panose="02020603050405020304" pitchFamily="18" charset="0"/>
+                <a:ea typeface="Tahoma" panose="020B0604030504040204" pitchFamily="34" charset="0"/>
+                <a:cs typeface="Times New Roman" panose="02020603050405020304" pitchFamily="18" charset="0"/>
+              </a:rPr>
+              <a:t>Personal Tracking</a:t>
+            </a:r>
+          </a:p>
+          <a:p>
+            <a:r>
+              <a:rPr lang="en-US" sz="2000" dirty="0">
+                <a:latin typeface="Times New Roman" panose="02020603050405020304" pitchFamily="18" charset="0"/>
+                <a:ea typeface="Tahoma" panose="020B0604030504040204" pitchFamily="34" charset="0"/>
+                <a:cs typeface="Times New Roman" panose="02020603050405020304" pitchFamily="18" charset="0"/>
+              </a:rPr>
+              <a:t>Vehicle Tracking</a:t>
+            </a:r>
+          </a:p>
+          <a:p>
+            <a:r>
+              <a:rPr lang="en-US" sz="2000" dirty="0">
+                <a:latin typeface="Times New Roman" panose="02020603050405020304" pitchFamily="18" charset="0"/>
+                <a:ea typeface="Tahoma" panose="020B0604030504040204" pitchFamily="34" charset="0"/>
+                <a:cs typeface="Times New Roman" panose="02020603050405020304" pitchFamily="18" charset="0"/>
+              </a:rPr>
+              <a:t>Pets Tracking</a:t>
+            </a:r>
+          </a:p>
+          <a:p>
+            <a:r>
+              <a:rPr lang="en-US" sz="2000" dirty="0">
+                <a:latin typeface="Times New Roman" panose="02020603050405020304" pitchFamily="18" charset="0"/>
+                <a:ea typeface="Tahoma" panose="020B0604030504040204" pitchFamily="34" charset="0"/>
+                <a:cs typeface="Times New Roman" panose="02020603050405020304" pitchFamily="18" charset="0"/>
+              </a:rPr>
+              <a:t>Mobile Tracking</a:t>
+            </a:r>
+          </a:p>
+          <a:p>
+            <a:pPr marL="0" indent="0">
+              <a:buNone/>
+            </a:pPr>
+            <a:endParaRPr lang="en-US" sz="2400" dirty="0">
+              <a:latin typeface="Times New Roman" panose="02020603050405020304" pitchFamily="18" charset="0"/>
+              <a:cs typeface="Times New Roman" panose="02020603050405020304" pitchFamily="18" charset="0"/>
+            </a:endParaRPr>
+          </a:p>
+        </p:txBody>
+      </p:sp>
+    </p:spTree>
+    <p:extLst>
+      <p:ext uri="{BB962C8B-B14F-4D97-AF65-F5344CB8AC3E}">
+        <p14:creationId xmlns:p14="http://schemas.microsoft.com/office/powerpoint/2010/main" val="829068564"/>
+      </p:ext>
+    </p:extLst>
+  </p:cSld>
+  <p:clrMapOvr>
+    <a:masterClrMapping/>
+  </p:clrMapOvr>
+</p:sld>
+</file>
+
+<file path=ppt/slides/slide2.xml><?xml version="1.0" encoding="utf-8"?>
+<p:sld xmlns:a="http://schemas.openxmlformats.org/drawingml/2006/main" xmlns:r="http://schemas.openxmlformats.org/officeDocument/2006/relationships" xmlns:p="http://schemas.openxmlformats.org/presentationml/2006/main">
+  <p:cSld>
+    <p:spTree>
+      <p:nvGrpSpPr>
+        <p:cNvPr id="1" name=""/>
+        <p:cNvGrpSpPr/>
+        <p:nvPr/>
+      </p:nvGrpSpPr>
+      <p:grpSpPr>
+        <a:xfrm>
+          <a:off x="0" y="0"/>
+          <a:ext cx="0" cy="0"/>
+          <a:chOff x="0" y="0"/>
+          <a:chExt cx="0" cy="0"/>
+        </a:xfrm>
+      </p:grpSpPr>
+      <p:sp>
+        <p:nvSpPr>
+          <p:cNvPr id="2" name="Titre 1"/>
+          <p:cNvSpPr>
+            <a:spLocks noGrp="1"/>
+          </p:cNvSpPr>
+          <p:nvPr>
+            <p:ph type="title"/>
+          </p:nvPr>
+        </p:nvSpPr>
+        <p:spPr/>
+        <p:txBody>
+          <a:bodyPr/>
+          <a:lstStyle/>
+          <a:p>
+            <a:r>
+              <a:rPr lang="en-US" dirty="0">
+                <a:solidFill>
+                  <a:schemeClr val="accent2"/>
+                </a:solidFill>
+                <a:latin typeface="Times New Roman" panose="02020603050405020304" pitchFamily="18" charset="0"/>
+                <a:cs typeface="Times New Roman" panose="02020603050405020304" pitchFamily="18" charset="0"/>
+              </a:rPr>
+              <a:t>Our Members </a:t>
+            </a:r>
+            <a:endParaRPr lang="fr-FR" dirty="0"/>
+          </a:p>
+        </p:txBody>
+      </p:sp>
+      <p:sp>
+        <p:nvSpPr>
+          <p:cNvPr id="6" name="Rectangle 9">
+            <a:extLst>
+              <a:ext uri="{FF2B5EF4-FFF2-40B4-BE49-F238E27FC236}">
+                <a16:creationId xmlns:a16="http://schemas.microsoft.com/office/drawing/2014/main" id="{1CF2E0EF-678D-4DB7-94EC-E888F9DAE5AA}"/>
+              </a:ext>
+            </a:extLst>
+          </p:cNvPr>
+          <p:cNvSpPr/>
+          <p:nvPr/>
+        </p:nvSpPr>
+        <p:spPr>
+          <a:xfrm>
+            <a:off x="4836596" y="3122299"/>
+            <a:ext cx="2518808" cy="1631644"/>
+          </a:xfrm>
+          <a:custGeom>
+            <a:avLst/>
+            <a:gdLst/>
+            <a:ahLst/>
+            <a:cxnLst/>
+            <a:rect l="l" t="t" r="r" b="b"/>
+            <a:pathLst>
+              <a:path w="3816424" h="2472220">
+                <a:moveTo>
+                  <a:pt x="1972064" y="0"/>
+                </a:moveTo>
+                <a:cubicBezTo>
+                  <a:pt x="2225646" y="0"/>
+                  <a:pt x="2443064" y="140235"/>
+                  <a:pt x="2531016" y="340937"/>
+                </a:cubicBezTo>
+                <a:cubicBezTo>
+                  <a:pt x="2600132" y="306460"/>
+                  <a:pt x="2678169" y="288032"/>
+                  <a:pt x="2760510" y="288032"/>
+                </a:cubicBezTo>
+                <a:cubicBezTo>
+                  <a:pt x="3009887" y="288032"/>
+                  <a:pt x="3219786" y="457055"/>
+                  <a:pt x="3279705" y="687381"/>
+                </a:cubicBezTo>
+                <a:cubicBezTo>
+                  <a:pt x="3582169" y="717391"/>
+                  <a:pt x="3816424" y="950318"/>
+                  <a:pt x="3816424" y="1232795"/>
+                </a:cubicBezTo>
+                <a:lnTo>
+                  <a:pt x="3816055" y="1236110"/>
+                </a:lnTo>
+                <a:cubicBezTo>
+                  <a:pt x="3816421" y="1237213"/>
+                  <a:pt x="3816424" y="1238319"/>
+                  <a:pt x="3816424" y="1239425"/>
+                </a:cubicBezTo>
+                <a:cubicBezTo>
+                  <a:pt x="3816424" y="1544322"/>
+                  <a:pt x="3543509" y="1791490"/>
+                  <a:pt x="3206852" y="1791490"/>
+                </a:cubicBezTo>
+                <a:lnTo>
+                  <a:pt x="3136943" y="1786289"/>
+                </a:lnTo>
+                <a:cubicBezTo>
+                  <a:pt x="3133151" y="1787239"/>
+                  <a:pt x="3129282" y="1787343"/>
+                  <a:pt x="3125386" y="1787343"/>
+                </a:cubicBezTo>
+                <a:lnTo>
+                  <a:pt x="3087511" y="1787343"/>
+                </a:lnTo>
+                <a:cubicBezTo>
+                  <a:pt x="3038440" y="1991344"/>
+                  <a:pt x="2837482" y="2143516"/>
+                  <a:pt x="2597280" y="2143516"/>
+                </a:cubicBezTo>
+                <a:cubicBezTo>
+                  <a:pt x="2532520" y="2143516"/>
+                  <a:pt x="2470613" y="2132455"/>
+                  <a:pt x="2414162" y="2111319"/>
+                </a:cubicBezTo>
+                <a:cubicBezTo>
+                  <a:pt x="2330064" y="2322315"/>
+                  <a:pt x="2106542" y="2472220"/>
+                  <a:pt x="1844361" y="2472220"/>
+                </a:cubicBezTo>
+                <a:cubicBezTo>
+                  <a:pt x="1529851" y="2472220"/>
+                  <a:pt x="1270971" y="2256501"/>
+                  <a:pt x="1241364" y="1979223"/>
+                </a:cubicBezTo>
+                <a:cubicBezTo>
+                  <a:pt x="1233180" y="1981311"/>
+                  <a:pt x="1224850" y="1981496"/>
+                  <a:pt x="1216474" y="1981496"/>
+                </a:cubicBezTo>
+                <a:cubicBezTo>
+                  <a:pt x="1047138" y="1981496"/>
+                  <a:pt x="897304" y="1905869"/>
+                  <a:pt x="810084" y="1787343"/>
+                </a:cubicBezTo>
+                <a:lnTo>
+                  <a:pt x="683468" y="1787343"/>
+                </a:lnTo>
+                <a:lnTo>
+                  <a:pt x="669303" y="1786050"/>
+                </a:lnTo>
+                <a:cubicBezTo>
+                  <a:pt x="649856" y="1790596"/>
+                  <a:pt x="629830" y="1791490"/>
+                  <a:pt x="609572" y="1791490"/>
+                </a:cubicBezTo>
+                <a:cubicBezTo>
+                  <a:pt x="272915" y="1791490"/>
+                  <a:pt x="0" y="1544322"/>
+                  <a:pt x="0" y="1239425"/>
+                </a:cubicBezTo>
+                <a:lnTo>
+                  <a:pt x="369" y="1236110"/>
+                </a:lnTo>
+                <a:cubicBezTo>
+                  <a:pt x="3" y="1235007"/>
+                  <a:pt x="0" y="1233901"/>
+                  <a:pt x="0" y="1232795"/>
+                </a:cubicBezTo>
+                <a:cubicBezTo>
+                  <a:pt x="0" y="927898"/>
+                  <a:pt x="272915" y="680730"/>
+                  <a:pt x="609572" y="680730"/>
+                </a:cubicBezTo>
+                <a:lnTo>
+                  <a:pt x="648332" y="683614"/>
+                </a:lnTo>
+                <a:cubicBezTo>
+                  <a:pt x="648074" y="682757"/>
+                  <a:pt x="648072" y="681899"/>
+                  <a:pt x="648072" y="681040"/>
+                </a:cubicBezTo>
+                <a:cubicBezTo>
+                  <a:pt x="648072" y="382773"/>
+                  <a:pt x="889865" y="140980"/>
+                  <a:pt x="1188132" y="140980"/>
+                </a:cubicBezTo>
+                <a:cubicBezTo>
+                  <a:pt x="1296209" y="140980"/>
+                  <a:pt x="1396871" y="172727"/>
+                  <a:pt x="1480802" y="228175"/>
+                </a:cubicBezTo>
+                <a:cubicBezTo>
+                  <a:pt x="1589955" y="89512"/>
+                  <a:pt x="1769468" y="0"/>
+                  <a:pt x="1972064" y="0"/>
+                </a:cubicBezTo>
+                <a:close/>
+              </a:path>
+            </a:pathLst>
+          </a:custGeom>
+          <a:noFill/>
+          <a:ln w="76200">
+            <a:solidFill>
+              <a:schemeClr val="tx1"/>
+            </a:solidFill>
+          </a:ln>
+          <a:effectLst/>
+        </p:spPr>
+        <p:style>
+          <a:lnRef idx="2">
+            <a:schemeClr val="accent1">
+              <a:shade val="50000"/>
+            </a:schemeClr>
+          </a:lnRef>
+          <a:fillRef idx="1">
+            <a:schemeClr val="accent1"/>
+          </a:fillRef>
+          <a:effectRef idx="0">
+            <a:schemeClr val="accent1"/>
+          </a:effectRef>
+          <a:fontRef idx="minor">
+            <a:schemeClr val="lt1"/>
+          </a:fontRef>
+        </p:style>
+        <p:txBody>
+          <a:bodyPr rtlCol="0" anchor="ctr"/>
+          <a:lstStyle/>
+          <a:p>
+            <a:pPr algn="ctr"/>
+            <a:endParaRPr lang="ko-KR" altLang="en-US" sz="2700">
+              <a:solidFill>
+                <a:schemeClr val="tx1">
+                  <a:lumMod val="75000"/>
+                  <a:lumOff val="25000"/>
+                </a:schemeClr>
+              </a:solidFill>
+            </a:endParaRPr>
+          </a:p>
+        </p:txBody>
+      </p:sp>
+      <p:grpSp>
+        <p:nvGrpSpPr>
+          <p:cNvPr id="7" name="Group 3">
+            <a:extLst>
+              <a:ext uri="{FF2B5EF4-FFF2-40B4-BE49-F238E27FC236}">
+                <a16:creationId xmlns:a16="http://schemas.microsoft.com/office/drawing/2014/main" id="{105EC22C-4DE9-4BD1-9132-96A276430CDC}"/>
+              </a:ext>
+            </a:extLst>
+          </p:cNvPr>
+          <p:cNvGrpSpPr/>
+          <p:nvPr/>
+        </p:nvGrpSpPr>
+        <p:grpSpPr>
+          <a:xfrm rot="-3060000">
+            <a:off x="4565780" y="3130544"/>
+            <a:ext cx="120077" cy="443661"/>
+            <a:chOff x="1408027" y="3329887"/>
+            <a:chExt cx="155342" cy="573958"/>
+          </a:xfrm>
+          <a:solidFill>
+            <a:schemeClr val="tx1"/>
+          </a:solidFill>
+        </p:grpSpPr>
+        <p:sp>
+          <p:nvSpPr>
+            <p:cNvPr id="8" name="Oval 4">
+              <a:extLst>
+                <a:ext uri="{FF2B5EF4-FFF2-40B4-BE49-F238E27FC236}">
+                  <a16:creationId xmlns:a16="http://schemas.microsoft.com/office/drawing/2014/main" id="{32CBD9ED-874C-4E6E-B6D1-477FF7FCA179}"/>
+                </a:ext>
+              </a:extLst>
+            </p:cNvPr>
+            <p:cNvSpPr/>
+            <p:nvPr/>
+          </p:nvSpPr>
+          <p:spPr>
+            <a:xfrm>
+              <a:off x="1408027" y="3748503"/>
+              <a:ext cx="155342" cy="155342"/>
+            </a:xfrm>
+            <a:prstGeom prst="ellipse">
+              <a:avLst/>
+            </a:prstGeom>
+            <a:grpFill/>
+            <a:ln>
+              <a:noFill/>
+            </a:ln>
+          </p:spPr>
+          <p:style>
+            <a:lnRef idx="2">
+              <a:schemeClr val="accent1">
+                <a:shade val="50000"/>
+              </a:schemeClr>
+            </a:lnRef>
+            <a:fillRef idx="1">
+              <a:schemeClr val="accent1"/>
+            </a:fillRef>
+            <a:effectRef idx="0">
+              <a:schemeClr val="accent1"/>
+            </a:effectRef>
+            <a:fontRef idx="minor">
+              <a:schemeClr val="lt1"/>
+            </a:fontRef>
+          </p:style>
+          <p:txBody>
+            <a:bodyPr rtlCol="0" anchor="ctr"/>
+            <a:lstStyle/>
+            <a:p>
+              <a:pPr algn="ctr"/>
+              <a:endParaRPr lang="ko-KR" altLang="en-US" sz="2700">
+                <a:solidFill>
+                  <a:schemeClr val="tx1">
+                    <a:lumMod val="75000"/>
+                    <a:lumOff val="25000"/>
+                  </a:schemeClr>
+                </a:solidFill>
+              </a:endParaRPr>
+            </a:p>
+          </p:txBody>
+        </p:sp>
+        <p:sp>
+          <p:nvSpPr>
+            <p:cNvPr id="9" name="Oval 5">
+              <a:extLst>
+                <a:ext uri="{FF2B5EF4-FFF2-40B4-BE49-F238E27FC236}">
+                  <a16:creationId xmlns:a16="http://schemas.microsoft.com/office/drawing/2014/main" id="{12E01523-AB69-4CC1-BE3D-3FA3DBE5B65F}"/>
+                </a:ext>
+              </a:extLst>
+            </p:cNvPr>
+            <p:cNvSpPr/>
+            <p:nvPr/>
+          </p:nvSpPr>
+          <p:spPr>
+            <a:xfrm>
+              <a:off x="1408027" y="3539195"/>
+              <a:ext cx="155342" cy="155342"/>
+            </a:xfrm>
+            <a:prstGeom prst="ellipse">
+              <a:avLst/>
+            </a:prstGeom>
+            <a:grpFill/>
+            <a:ln>
+              <a:noFill/>
+            </a:ln>
+          </p:spPr>
+          <p:style>
+            <a:lnRef idx="2">
+              <a:schemeClr val="accent1">
+                <a:shade val="50000"/>
+              </a:schemeClr>
+            </a:lnRef>
+            <a:fillRef idx="1">
+              <a:schemeClr val="accent1"/>
+            </a:fillRef>
+            <a:effectRef idx="0">
+              <a:schemeClr val="accent1"/>
+            </a:effectRef>
+            <a:fontRef idx="minor">
+              <a:schemeClr val="lt1"/>
+            </a:fontRef>
+          </p:style>
+          <p:txBody>
+            <a:bodyPr rtlCol="0" anchor="ctr"/>
+            <a:lstStyle/>
+            <a:p>
+              <a:pPr algn="ctr"/>
+              <a:endParaRPr lang="ko-KR" altLang="en-US" sz="2700">
+                <a:solidFill>
+                  <a:schemeClr val="tx1">
+                    <a:lumMod val="75000"/>
+                    <a:lumOff val="25000"/>
+                  </a:schemeClr>
+                </a:solidFill>
+              </a:endParaRPr>
+            </a:p>
+          </p:txBody>
+        </p:sp>
+        <p:sp>
+          <p:nvSpPr>
+            <p:cNvPr id="10" name="Oval 6">
+              <a:extLst>
+                <a:ext uri="{FF2B5EF4-FFF2-40B4-BE49-F238E27FC236}">
+                  <a16:creationId xmlns:a16="http://schemas.microsoft.com/office/drawing/2014/main" id="{0DDBCF2A-058F-4084-A436-4E592317F773}"/>
+                </a:ext>
+              </a:extLst>
+            </p:cNvPr>
+            <p:cNvSpPr/>
+            <p:nvPr/>
+          </p:nvSpPr>
+          <p:spPr>
+            <a:xfrm>
+              <a:off x="1408027" y="3329887"/>
+              <a:ext cx="155342" cy="155342"/>
+            </a:xfrm>
+            <a:prstGeom prst="ellipse">
+              <a:avLst/>
+            </a:prstGeom>
+            <a:grpFill/>
+            <a:ln>
+              <a:noFill/>
+            </a:ln>
+          </p:spPr>
+          <p:style>
+            <a:lnRef idx="2">
+              <a:schemeClr val="accent1">
+                <a:shade val="50000"/>
+              </a:schemeClr>
+            </a:lnRef>
+            <a:fillRef idx="1">
+              <a:schemeClr val="accent1"/>
+            </a:fillRef>
+            <a:effectRef idx="0">
+              <a:schemeClr val="accent1"/>
+            </a:effectRef>
+            <a:fontRef idx="minor">
+              <a:schemeClr val="lt1"/>
+            </a:fontRef>
+          </p:style>
+          <p:txBody>
+            <a:bodyPr rtlCol="0" anchor="ctr"/>
+            <a:lstStyle/>
+            <a:p>
+              <a:pPr algn="ctr"/>
+              <a:endParaRPr lang="ko-KR" altLang="en-US" sz="2700">
+                <a:solidFill>
+                  <a:schemeClr val="tx1">
+                    <a:lumMod val="75000"/>
+                    <a:lumOff val="25000"/>
+                  </a:schemeClr>
+                </a:solidFill>
+              </a:endParaRPr>
+            </a:p>
+          </p:txBody>
+        </p:sp>
+      </p:grpSp>
+      <p:grpSp>
+        <p:nvGrpSpPr>
+          <p:cNvPr id="11" name="Group 14">
+            <a:extLst>
+              <a:ext uri="{FF2B5EF4-FFF2-40B4-BE49-F238E27FC236}">
+                <a16:creationId xmlns:a16="http://schemas.microsoft.com/office/drawing/2014/main" id="{F5E6B61C-3CD4-411A-AD1B-5F4FED3043DC}"/>
+              </a:ext>
+            </a:extLst>
+          </p:cNvPr>
+          <p:cNvGrpSpPr/>
+          <p:nvPr/>
+        </p:nvGrpSpPr>
+        <p:grpSpPr>
+          <a:xfrm rot="3060000" flipH="1">
+            <a:off x="7237482" y="3035763"/>
+            <a:ext cx="120077" cy="443661"/>
+            <a:chOff x="1408027" y="3329887"/>
+            <a:chExt cx="155342" cy="573958"/>
+          </a:xfrm>
+          <a:solidFill>
+            <a:schemeClr val="tx1"/>
+          </a:solidFill>
+        </p:grpSpPr>
+        <p:sp>
+          <p:nvSpPr>
+            <p:cNvPr id="12" name="Oval 15">
+              <a:extLst>
+                <a:ext uri="{FF2B5EF4-FFF2-40B4-BE49-F238E27FC236}">
+                  <a16:creationId xmlns:a16="http://schemas.microsoft.com/office/drawing/2014/main" id="{73C158E8-06A7-48B5-926C-DD53A48BBEA1}"/>
+                </a:ext>
+              </a:extLst>
+            </p:cNvPr>
+            <p:cNvSpPr/>
+            <p:nvPr/>
+          </p:nvSpPr>
+          <p:spPr>
+            <a:xfrm>
+              <a:off x="1408027" y="3748503"/>
+              <a:ext cx="155342" cy="155342"/>
+            </a:xfrm>
+            <a:prstGeom prst="ellipse">
+              <a:avLst/>
+            </a:prstGeom>
+            <a:grpFill/>
+            <a:ln>
+              <a:noFill/>
+            </a:ln>
+          </p:spPr>
+          <p:style>
+            <a:lnRef idx="2">
+              <a:schemeClr val="accent1">
+                <a:shade val="50000"/>
+              </a:schemeClr>
+            </a:lnRef>
+            <a:fillRef idx="1">
+              <a:schemeClr val="accent1"/>
+            </a:fillRef>
+            <a:effectRef idx="0">
+              <a:schemeClr val="accent1"/>
+            </a:effectRef>
+            <a:fontRef idx="minor">
+              <a:schemeClr val="lt1"/>
+            </a:fontRef>
+          </p:style>
+          <p:txBody>
+            <a:bodyPr rtlCol="0" anchor="ctr"/>
+            <a:lstStyle/>
+            <a:p>
+              <a:pPr algn="ctr"/>
+              <a:endParaRPr lang="ko-KR" altLang="en-US" sz="2700">
+                <a:solidFill>
+                  <a:schemeClr val="tx1">
+                    <a:lumMod val="75000"/>
+                    <a:lumOff val="25000"/>
+                  </a:schemeClr>
+                </a:solidFill>
+              </a:endParaRPr>
+            </a:p>
+          </p:txBody>
+        </p:sp>
+        <p:sp>
+          <p:nvSpPr>
+            <p:cNvPr id="13" name="Oval 16">
+              <a:extLst>
+                <a:ext uri="{FF2B5EF4-FFF2-40B4-BE49-F238E27FC236}">
+                  <a16:creationId xmlns:a16="http://schemas.microsoft.com/office/drawing/2014/main" id="{327A44B7-EBD7-43B2-8762-448D87FAC0C9}"/>
+                </a:ext>
+              </a:extLst>
+            </p:cNvPr>
+            <p:cNvSpPr/>
+            <p:nvPr/>
+          </p:nvSpPr>
+          <p:spPr>
+            <a:xfrm>
+              <a:off x="1408027" y="3539195"/>
+              <a:ext cx="155342" cy="155342"/>
+            </a:xfrm>
+            <a:prstGeom prst="ellipse">
+              <a:avLst/>
+            </a:prstGeom>
+            <a:grpFill/>
+            <a:ln>
+              <a:noFill/>
+            </a:ln>
+          </p:spPr>
+          <p:style>
+            <a:lnRef idx="2">
+              <a:schemeClr val="accent1">
+                <a:shade val="50000"/>
+              </a:schemeClr>
+            </a:lnRef>
+            <a:fillRef idx="1">
+              <a:schemeClr val="accent1"/>
+            </a:fillRef>
+            <a:effectRef idx="0">
+              <a:schemeClr val="accent1"/>
+            </a:effectRef>
+            <a:fontRef idx="minor">
+              <a:schemeClr val="lt1"/>
+            </a:fontRef>
+          </p:style>
+          <p:txBody>
+            <a:bodyPr rtlCol="0" anchor="ctr"/>
+            <a:lstStyle/>
+            <a:p>
+              <a:pPr algn="ctr"/>
+              <a:endParaRPr lang="ko-KR" altLang="en-US" sz="2700">
+                <a:solidFill>
+                  <a:schemeClr val="tx1">
+                    <a:lumMod val="75000"/>
+                    <a:lumOff val="25000"/>
+                  </a:schemeClr>
+                </a:solidFill>
+              </a:endParaRPr>
+            </a:p>
+          </p:txBody>
+        </p:sp>
+        <p:sp>
+          <p:nvSpPr>
+            <p:cNvPr id="14" name="Oval 17">
+              <a:extLst>
+                <a:ext uri="{FF2B5EF4-FFF2-40B4-BE49-F238E27FC236}">
+                  <a16:creationId xmlns:a16="http://schemas.microsoft.com/office/drawing/2014/main" id="{2DADC528-5D04-47B3-BB38-3473572E2C71}"/>
+                </a:ext>
+              </a:extLst>
+            </p:cNvPr>
+            <p:cNvSpPr/>
+            <p:nvPr/>
+          </p:nvSpPr>
+          <p:spPr>
+            <a:xfrm>
+              <a:off x="1408027" y="3329887"/>
+              <a:ext cx="155342" cy="155342"/>
+            </a:xfrm>
+            <a:prstGeom prst="ellipse">
+              <a:avLst/>
+            </a:prstGeom>
+            <a:grpFill/>
+            <a:ln>
+              <a:noFill/>
+            </a:ln>
+          </p:spPr>
+          <p:style>
+            <a:lnRef idx="2">
+              <a:schemeClr val="accent1">
+                <a:shade val="50000"/>
+              </a:schemeClr>
+            </a:lnRef>
+            <a:fillRef idx="1">
+              <a:schemeClr val="accent1"/>
+            </a:fillRef>
+            <a:effectRef idx="0">
+              <a:schemeClr val="accent1"/>
+            </a:effectRef>
+            <a:fontRef idx="minor">
+              <a:schemeClr val="lt1"/>
+            </a:fontRef>
+          </p:style>
+          <p:txBody>
+            <a:bodyPr rtlCol="0" anchor="ctr"/>
+            <a:lstStyle/>
+            <a:p>
+              <a:pPr algn="ctr"/>
+              <a:endParaRPr lang="ko-KR" altLang="en-US" sz="2700">
+                <a:solidFill>
+                  <a:schemeClr val="tx1">
+                    <a:lumMod val="75000"/>
+                    <a:lumOff val="25000"/>
+                  </a:schemeClr>
+                </a:solidFill>
+              </a:endParaRPr>
+            </a:p>
+          </p:txBody>
+        </p:sp>
+      </p:grpSp>
+      <p:grpSp>
+        <p:nvGrpSpPr>
+          <p:cNvPr id="15" name="Group 18">
+            <a:extLst>
+              <a:ext uri="{FF2B5EF4-FFF2-40B4-BE49-F238E27FC236}">
+                <a16:creationId xmlns:a16="http://schemas.microsoft.com/office/drawing/2014/main" id="{88A4D763-8802-4CE9-985E-76AF2B24C180}"/>
+              </a:ext>
+            </a:extLst>
+          </p:cNvPr>
+          <p:cNvGrpSpPr/>
+          <p:nvPr/>
+        </p:nvGrpSpPr>
+        <p:grpSpPr>
+          <a:xfrm flipH="1">
+            <a:off x="6015003" y="2628564"/>
+            <a:ext cx="120077" cy="443661"/>
+            <a:chOff x="1408027" y="3329887"/>
+            <a:chExt cx="155342" cy="573958"/>
+          </a:xfrm>
+          <a:solidFill>
+            <a:schemeClr val="tx1"/>
+          </a:solidFill>
+        </p:grpSpPr>
+        <p:sp>
+          <p:nvSpPr>
+            <p:cNvPr id="16" name="Oval 19">
+              <a:extLst>
+                <a:ext uri="{FF2B5EF4-FFF2-40B4-BE49-F238E27FC236}">
+                  <a16:creationId xmlns:a16="http://schemas.microsoft.com/office/drawing/2014/main" id="{D271A80E-6BB4-4688-9510-FAB78E2F68B0}"/>
+                </a:ext>
+              </a:extLst>
+            </p:cNvPr>
+            <p:cNvSpPr/>
+            <p:nvPr/>
+          </p:nvSpPr>
+          <p:spPr>
+            <a:xfrm>
+              <a:off x="1408027" y="3748503"/>
+              <a:ext cx="155342" cy="155342"/>
+            </a:xfrm>
+            <a:prstGeom prst="ellipse">
+              <a:avLst/>
+            </a:prstGeom>
+            <a:grpFill/>
+            <a:ln>
+              <a:noFill/>
+            </a:ln>
+          </p:spPr>
+          <p:style>
+            <a:lnRef idx="2">
+              <a:schemeClr val="accent1">
+                <a:shade val="50000"/>
+              </a:schemeClr>
+            </a:lnRef>
+            <a:fillRef idx="1">
+              <a:schemeClr val="accent1"/>
+            </a:fillRef>
+            <a:effectRef idx="0">
+              <a:schemeClr val="accent1"/>
+            </a:effectRef>
+            <a:fontRef idx="minor">
+              <a:schemeClr val="lt1"/>
+            </a:fontRef>
+          </p:style>
+          <p:txBody>
+            <a:bodyPr rtlCol="0" anchor="ctr"/>
+            <a:lstStyle/>
+            <a:p>
+              <a:pPr algn="ctr"/>
+              <a:endParaRPr lang="ko-KR" altLang="en-US" sz="2700">
+                <a:solidFill>
+                  <a:schemeClr val="tx1">
+                    <a:lumMod val="75000"/>
+                    <a:lumOff val="25000"/>
+                  </a:schemeClr>
+                </a:solidFill>
+              </a:endParaRPr>
+            </a:p>
+          </p:txBody>
+        </p:sp>
+        <p:sp>
+          <p:nvSpPr>
+            <p:cNvPr id="17" name="Oval 20">
+              <a:extLst>
+                <a:ext uri="{FF2B5EF4-FFF2-40B4-BE49-F238E27FC236}">
+                  <a16:creationId xmlns:a16="http://schemas.microsoft.com/office/drawing/2014/main" id="{C61D6485-9DF4-47AC-894A-E504C1FACB72}"/>
+                </a:ext>
+              </a:extLst>
+            </p:cNvPr>
+            <p:cNvSpPr/>
+            <p:nvPr/>
+          </p:nvSpPr>
+          <p:spPr>
+            <a:xfrm>
+              <a:off x="1408027" y="3539195"/>
+              <a:ext cx="155342" cy="155342"/>
+            </a:xfrm>
+            <a:prstGeom prst="ellipse">
+              <a:avLst/>
+            </a:prstGeom>
+            <a:grpFill/>
+            <a:ln>
+              <a:noFill/>
+            </a:ln>
+          </p:spPr>
+          <p:style>
+            <a:lnRef idx="2">
+              <a:schemeClr val="accent1">
+                <a:shade val="50000"/>
+              </a:schemeClr>
+            </a:lnRef>
+            <a:fillRef idx="1">
+              <a:schemeClr val="accent1"/>
+            </a:fillRef>
+            <a:effectRef idx="0">
+              <a:schemeClr val="accent1"/>
+            </a:effectRef>
+            <a:fontRef idx="minor">
+              <a:schemeClr val="lt1"/>
+            </a:fontRef>
+          </p:style>
+          <p:txBody>
+            <a:bodyPr rtlCol="0" anchor="ctr"/>
+            <a:lstStyle/>
+            <a:p>
+              <a:pPr algn="ctr"/>
+              <a:endParaRPr lang="ko-KR" altLang="en-US" sz="2700">
+                <a:solidFill>
+                  <a:schemeClr val="tx1">
+                    <a:lumMod val="75000"/>
+                    <a:lumOff val="25000"/>
+                  </a:schemeClr>
+                </a:solidFill>
+              </a:endParaRPr>
+            </a:p>
+          </p:txBody>
+        </p:sp>
+        <p:sp>
+          <p:nvSpPr>
+            <p:cNvPr id="18" name="Oval 21">
+              <a:extLst>
+                <a:ext uri="{FF2B5EF4-FFF2-40B4-BE49-F238E27FC236}">
+                  <a16:creationId xmlns:a16="http://schemas.microsoft.com/office/drawing/2014/main" id="{86198F9C-C4C9-4992-9C26-E91569BE6302}"/>
+                </a:ext>
+              </a:extLst>
+            </p:cNvPr>
+            <p:cNvSpPr/>
+            <p:nvPr/>
+          </p:nvSpPr>
+          <p:spPr>
+            <a:xfrm>
+              <a:off x="1408027" y="3329887"/>
+              <a:ext cx="155342" cy="155342"/>
+            </a:xfrm>
+            <a:prstGeom prst="ellipse">
+              <a:avLst/>
+            </a:prstGeom>
+            <a:grpFill/>
+            <a:ln>
+              <a:noFill/>
+            </a:ln>
+          </p:spPr>
+          <p:style>
+            <a:lnRef idx="2">
+              <a:schemeClr val="accent1">
+                <a:shade val="50000"/>
+              </a:schemeClr>
+            </a:lnRef>
+            <a:fillRef idx="1">
+              <a:schemeClr val="accent1"/>
+            </a:fillRef>
+            <a:effectRef idx="0">
+              <a:schemeClr val="accent1"/>
+            </a:effectRef>
+            <a:fontRef idx="minor">
+              <a:schemeClr val="lt1"/>
+            </a:fontRef>
+          </p:style>
+          <p:txBody>
+            <a:bodyPr rtlCol="0" anchor="ctr"/>
+            <a:lstStyle/>
+            <a:p>
+              <a:pPr algn="ctr"/>
+              <a:endParaRPr lang="ko-KR" altLang="en-US" sz="2700">
+                <a:solidFill>
+                  <a:schemeClr val="tx1">
+                    <a:lumMod val="75000"/>
+                    <a:lumOff val="25000"/>
+                  </a:schemeClr>
+                </a:solidFill>
+              </a:endParaRPr>
+            </a:p>
+          </p:txBody>
+        </p:sp>
+      </p:grpSp>
+      <p:grpSp>
+        <p:nvGrpSpPr>
+          <p:cNvPr id="19" name="Group 22">
+            <a:extLst>
+              <a:ext uri="{FF2B5EF4-FFF2-40B4-BE49-F238E27FC236}">
+                <a16:creationId xmlns:a16="http://schemas.microsoft.com/office/drawing/2014/main" id="{7BCA6098-0224-489D-B107-0F70C08ACEA3}"/>
+              </a:ext>
+            </a:extLst>
+          </p:cNvPr>
+          <p:cNvGrpSpPr/>
+          <p:nvPr/>
+        </p:nvGrpSpPr>
+        <p:grpSpPr>
+          <a:xfrm rot="2880000">
+            <a:off x="4516344" y="4215287"/>
+            <a:ext cx="120077" cy="443661"/>
+            <a:chOff x="1408027" y="3329887"/>
+            <a:chExt cx="155342" cy="573958"/>
+          </a:xfrm>
+          <a:solidFill>
+            <a:schemeClr val="tx1"/>
+          </a:solidFill>
+        </p:grpSpPr>
+        <p:sp>
+          <p:nvSpPr>
+            <p:cNvPr id="20" name="Oval 23">
+              <a:extLst>
+                <a:ext uri="{FF2B5EF4-FFF2-40B4-BE49-F238E27FC236}">
+                  <a16:creationId xmlns:a16="http://schemas.microsoft.com/office/drawing/2014/main" id="{019E2016-2856-448D-9C65-51979562478A}"/>
+                </a:ext>
+              </a:extLst>
+            </p:cNvPr>
+            <p:cNvSpPr/>
+            <p:nvPr/>
+          </p:nvSpPr>
+          <p:spPr>
+            <a:xfrm>
+              <a:off x="1408027" y="3748503"/>
+              <a:ext cx="155342" cy="155342"/>
+            </a:xfrm>
+            <a:prstGeom prst="ellipse">
+              <a:avLst/>
+            </a:prstGeom>
+            <a:grpFill/>
+            <a:ln>
+              <a:noFill/>
+            </a:ln>
+          </p:spPr>
+          <p:style>
+            <a:lnRef idx="2">
+              <a:schemeClr val="accent1">
+                <a:shade val="50000"/>
+              </a:schemeClr>
+            </a:lnRef>
+            <a:fillRef idx="1">
+              <a:schemeClr val="accent1"/>
+            </a:fillRef>
+            <a:effectRef idx="0">
+              <a:schemeClr val="accent1"/>
+            </a:effectRef>
+            <a:fontRef idx="minor">
+              <a:schemeClr val="lt1"/>
+            </a:fontRef>
+          </p:style>
+          <p:txBody>
+            <a:bodyPr rtlCol="0" anchor="ctr"/>
+            <a:lstStyle/>
+            <a:p>
+              <a:pPr algn="ctr"/>
+              <a:endParaRPr lang="ko-KR" altLang="en-US" sz="2700">
+                <a:solidFill>
+                  <a:schemeClr val="tx1">
+                    <a:lumMod val="75000"/>
+                    <a:lumOff val="25000"/>
+                  </a:schemeClr>
+                </a:solidFill>
+              </a:endParaRPr>
+            </a:p>
+          </p:txBody>
+        </p:sp>
+        <p:sp>
+          <p:nvSpPr>
+            <p:cNvPr id="21" name="Oval 24">
+              <a:extLst>
+                <a:ext uri="{FF2B5EF4-FFF2-40B4-BE49-F238E27FC236}">
+                  <a16:creationId xmlns:a16="http://schemas.microsoft.com/office/drawing/2014/main" id="{A9A3B023-5622-4794-966F-8304C55A35A6}"/>
+                </a:ext>
+              </a:extLst>
+            </p:cNvPr>
+            <p:cNvSpPr/>
+            <p:nvPr/>
+          </p:nvSpPr>
+          <p:spPr>
+            <a:xfrm>
+              <a:off x="1408027" y="3539195"/>
+              <a:ext cx="155342" cy="155342"/>
+            </a:xfrm>
+            <a:prstGeom prst="ellipse">
+              <a:avLst/>
+            </a:prstGeom>
+            <a:grpFill/>
+            <a:ln>
+              <a:noFill/>
+            </a:ln>
+          </p:spPr>
+          <p:style>
+            <a:lnRef idx="2">
+              <a:schemeClr val="accent1">
+                <a:shade val="50000"/>
+              </a:schemeClr>
+            </a:lnRef>
+            <a:fillRef idx="1">
+              <a:schemeClr val="accent1"/>
+            </a:fillRef>
+            <a:effectRef idx="0">
+              <a:schemeClr val="accent1"/>
+            </a:effectRef>
+            <a:fontRef idx="minor">
+              <a:schemeClr val="lt1"/>
+            </a:fontRef>
+          </p:style>
+          <p:txBody>
+            <a:bodyPr rtlCol="0" anchor="ctr"/>
+            <a:lstStyle/>
+            <a:p>
+              <a:pPr algn="ctr"/>
+              <a:endParaRPr lang="ko-KR" altLang="en-US" sz="2700">
+                <a:solidFill>
+                  <a:schemeClr val="tx1">
+                    <a:lumMod val="75000"/>
+                    <a:lumOff val="25000"/>
+                  </a:schemeClr>
+                </a:solidFill>
+              </a:endParaRPr>
+            </a:p>
+          </p:txBody>
+        </p:sp>
+        <p:sp>
+          <p:nvSpPr>
+            <p:cNvPr id="22" name="Oval 25">
+              <a:extLst>
+                <a:ext uri="{FF2B5EF4-FFF2-40B4-BE49-F238E27FC236}">
+                  <a16:creationId xmlns:a16="http://schemas.microsoft.com/office/drawing/2014/main" id="{73ADCB25-59D9-4EC2-8534-D0DEE77B2C87}"/>
+                </a:ext>
+              </a:extLst>
+            </p:cNvPr>
+            <p:cNvSpPr/>
+            <p:nvPr/>
+          </p:nvSpPr>
+          <p:spPr>
+            <a:xfrm>
+              <a:off x="1408027" y="3329887"/>
+              <a:ext cx="155342" cy="155342"/>
+            </a:xfrm>
+            <a:prstGeom prst="ellipse">
+              <a:avLst/>
+            </a:prstGeom>
+            <a:grpFill/>
+            <a:ln>
+              <a:noFill/>
+            </a:ln>
+          </p:spPr>
+          <p:style>
+            <a:lnRef idx="2">
+              <a:schemeClr val="accent1">
+                <a:shade val="50000"/>
+              </a:schemeClr>
+            </a:lnRef>
+            <a:fillRef idx="1">
+              <a:schemeClr val="accent1"/>
+            </a:fillRef>
+            <a:effectRef idx="0">
+              <a:schemeClr val="accent1"/>
+            </a:effectRef>
+            <a:fontRef idx="minor">
+              <a:schemeClr val="lt1"/>
+            </a:fontRef>
+          </p:style>
+          <p:txBody>
+            <a:bodyPr rtlCol="0" anchor="ctr"/>
+            <a:lstStyle/>
+            <a:p>
+              <a:pPr algn="ctr"/>
+              <a:endParaRPr lang="ko-KR" altLang="en-US" sz="2700">
+                <a:solidFill>
+                  <a:schemeClr val="tx1">
+                    <a:lumMod val="75000"/>
+                    <a:lumOff val="25000"/>
+                  </a:schemeClr>
+                </a:solidFill>
+              </a:endParaRPr>
+            </a:p>
+          </p:txBody>
+        </p:sp>
+      </p:grpSp>
+      <p:grpSp>
+        <p:nvGrpSpPr>
+          <p:cNvPr id="23" name="Group 26">
+            <a:extLst>
+              <a:ext uri="{FF2B5EF4-FFF2-40B4-BE49-F238E27FC236}">
+                <a16:creationId xmlns:a16="http://schemas.microsoft.com/office/drawing/2014/main" id="{EF81DC42-BB69-4DC0-B9AF-75C64B750AA8}"/>
+              </a:ext>
+            </a:extLst>
+          </p:cNvPr>
+          <p:cNvGrpSpPr/>
+          <p:nvPr/>
+        </p:nvGrpSpPr>
+        <p:grpSpPr>
+          <a:xfrm rot="18720000" flipH="1">
+            <a:off x="7610020" y="4155420"/>
+            <a:ext cx="120077" cy="443661"/>
+            <a:chOff x="1408027" y="3329887"/>
+            <a:chExt cx="155342" cy="573958"/>
+          </a:xfrm>
+          <a:solidFill>
+            <a:schemeClr val="tx1"/>
+          </a:solidFill>
+        </p:grpSpPr>
+        <p:sp>
+          <p:nvSpPr>
+            <p:cNvPr id="24" name="Oval 27">
+              <a:extLst>
+                <a:ext uri="{FF2B5EF4-FFF2-40B4-BE49-F238E27FC236}">
+                  <a16:creationId xmlns:a16="http://schemas.microsoft.com/office/drawing/2014/main" id="{A565B945-FF18-4EE1-9C02-DFD01E05C5B4}"/>
+                </a:ext>
+              </a:extLst>
+            </p:cNvPr>
+            <p:cNvSpPr/>
+            <p:nvPr/>
+          </p:nvSpPr>
+          <p:spPr>
+            <a:xfrm>
+              <a:off x="1408027" y="3748503"/>
+              <a:ext cx="155342" cy="155342"/>
+            </a:xfrm>
+            <a:prstGeom prst="ellipse">
+              <a:avLst/>
+            </a:prstGeom>
+            <a:grpFill/>
+            <a:ln>
+              <a:noFill/>
+            </a:ln>
+          </p:spPr>
+          <p:style>
+            <a:lnRef idx="2">
+              <a:schemeClr val="accent1">
+                <a:shade val="50000"/>
+              </a:schemeClr>
+            </a:lnRef>
+            <a:fillRef idx="1">
+              <a:schemeClr val="accent1"/>
+            </a:fillRef>
+            <a:effectRef idx="0">
+              <a:schemeClr val="accent1"/>
+            </a:effectRef>
+            <a:fontRef idx="minor">
+              <a:schemeClr val="lt1"/>
+            </a:fontRef>
+          </p:style>
+          <p:txBody>
+            <a:bodyPr rtlCol="0" anchor="ctr"/>
+            <a:lstStyle/>
+            <a:p>
+              <a:pPr algn="ctr"/>
+              <a:endParaRPr lang="ko-KR" altLang="en-US" sz="2700">
+                <a:solidFill>
+                  <a:schemeClr val="tx1">
+                    <a:lumMod val="75000"/>
+                    <a:lumOff val="25000"/>
+                  </a:schemeClr>
+                </a:solidFill>
+              </a:endParaRPr>
+            </a:p>
+          </p:txBody>
+        </p:sp>
+        <p:sp>
+          <p:nvSpPr>
+            <p:cNvPr id="25" name="Oval 28">
+              <a:extLst>
+                <a:ext uri="{FF2B5EF4-FFF2-40B4-BE49-F238E27FC236}">
+                  <a16:creationId xmlns:a16="http://schemas.microsoft.com/office/drawing/2014/main" id="{4FF79FFB-363A-4240-B2C9-408F2D39B3BF}"/>
+                </a:ext>
+              </a:extLst>
+            </p:cNvPr>
+            <p:cNvSpPr/>
+            <p:nvPr/>
+          </p:nvSpPr>
+          <p:spPr>
+            <a:xfrm>
+              <a:off x="1408027" y="3539195"/>
+              <a:ext cx="155342" cy="155342"/>
+            </a:xfrm>
+            <a:prstGeom prst="ellipse">
+              <a:avLst/>
+            </a:prstGeom>
+            <a:grpFill/>
+            <a:ln>
+              <a:noFill/>
+            </a:ln>
+          </p:spPr>
+          <p:style>
+            <a:lnRef idx="2">
+              <a:schemeClr val="accent1">
+                <a:shade val="50000"/>
+              </a:schemeClr>
+            </a:lnRef>
+            <a:fillRef idx="1">
+              <a:schemeClr val="accent1"/>
+            </a:fillRef>
+            <a:effectRef idx="0">
+              <a:schemeClr val="accent1"/>
+            </a:effectRef>
+            <a:fontRef idx="minor">
+              <a:schemeClr val="lt1"/>
+            </a:fontRef>
+          </p:style>
+          <p:txBody>
+            <a:bodyPr rtlCol="0" anchor="ctr"/>
+            <a:lstStyle/>
+            <a:p>
+              <a:pPr algn="ctr"/>
+              <a:endParaRPr lang="ko-KR" altLang="en-US" sz="2700">
+                <a:solidFill>
+                  <a:schemeClr val="tx1">
+                    <a:lumMod val="75000"/>
+                    <a:lumOff val="25000"/>
+                  </a:schemeClr>
+                </a:solidFill>
+              </a:endParaRPr>
+            </a:p>
+          </p:txBody>
+        </p:sp>
+        <p:sp>
+          <p:nvSpPr>
+            <p:cNvPr id="26" name="Oval 29">
+              <a:extLst>
+                <a:ext uri="{FF2B5EF4-FFF2-40B4-BE49-F238E27FC236}">
+                  <a16:creationId xmlns:a16="http://schemas.microsoft.com/office/drawing/2014/main" id="{4F160FBB-D2A8-4779-82A8-96FA110DD751}"/>
+                </a:ext>
+              </a:extLst>
+            </p:cNvPr>
+            <p:cNvSpPr/>
+            <p:nvPr/>
+          </p:nvSpPr>
+          <p:spPr>
+            <a:xfrm>
+              <a:off x="1408027" y="3329887"/>
+              <a:ext cx="155342" cy="155342"/>
+            </a:xfrm>
+            <a:prstGeom prst="ellipse">
+              <a:avLst/>
+            </a:prstGeom>
+            <a:grpFill/>
+            <a:ln>
+              <a:noFill/>
+            </a:ln>
+          </p:spPr>
+          <p:style>
+            <a:lnRef idx="2">
+              <a:schemeClr val="accent1">
+                <a:shade val="50000"/>
+              </a:schemeClr>
+            </a:lnRef>
+            <a:fillRef idx="1">
+              <a:schemeClr val="accent1"/>
+            </a:fillRef>
+            <a:effectRef idx="0">
+              <a:schemeClr val="accent1"/>
+            </a:effectRef>
+            <a:fontRef idx="minor">
+              <a:schemeClr val="lt1"/>
+            </a:fontRef>
+          </p:style>
+          <p:txBody>
+            <a:bodyPr rtlCol="0" anchor="ctr"/>
+            <a:lstStyle/>
+            <a:p>
+              <a:pPr algn="ctr"/>
+              <a:endParaRPr lang="ko-KR" altLang="en-US" sz="2700">
+                <a:solidFill>
+                  <a:schemeClr val="tx1">
+                    <a:lumMod val="75000"/>
+                    <a:lumOff val="25000"/>
+                  </a:schemeClr>
+                </a:solidFill>
+              </a:endParaRPr>
+            </a:p>
+          </p:txBody>
+        </p:sp>
+      </p:grpSp>
+      <p:sp>
+        <p:nvSpPr>
+          <p:cNvPr id="35" name="TextBox 38">
+            <a:extLst>
+              <a:ext uri="{FF2B5EF4-FFF2-40B4-BE49-F238E27FC236}">
+                <a16:creationId xmlns:a16="http://schemas.microsoft.com/office/drawing/2014/main" id="{CB71E602-2873-4B06-965F-238AF6E09A4A}"/>
+              </a:ext>
+            </a:extLst>
+          </p:cNvPr>
+          <p:cNvSpPr txBox="1"/>
+          <p:nvPr/>
+        </p:nvSpPr>
+        <p:spPr>
+          <a:xfrm>
+            <a:off x="5207200" y="3615287"/>
+            <a:ext cx="1777600" cy="502766"/>
+          </a:xfrm>
+          <a:prstGeom prst="rect">
+            <a:avLst/>
+          </a:prstGeom>
+          <a:noFill/>
+        </p:spPr>
+        <p:txBody>
+          <a:bodyPr wrap="square" rtlCol="0">
+            <a:spAutoFit/>
+          </a:bodyPr>
+          <a:lstStyle/>
+          <a:p>
+            <a:pPr algn="ctr"/>
+            <a:r>
+              <a:rPr lang="en-US" altLang="ko-KR" sz="2667" b="1" dirty="0">
+                <a:solidFill>
+                  <a:schemeClr val="tx1">
+                    <a:lumMod val="75000"/>
+                    <a:lumOff val="25000"/>
+                  </a:schemeClr>
+                </a:solidFill>
+                <a:latin typeface="Times New Roman" panose="02020603050405020304" pitchFamily="18" charset="0"/>
+                <a:ea typeface="FZShuTi" pitchFamily="2" charset="-122"/>
+                <a:cs typeface="Times New Roman" panose="02020603050405020304" pitchFamily="18" charset="0"/>
+              </a:rPr>
+              <a:t>Members</a:t>
+            </a:r>
+            <a:endParaRPr lang="ko-KR" altLang="en-US" sz="2667" b="1" dirty="0">
+              <a:solidFill>
+                <a:schemeClr val="tx1">
+                  <a:lumMod val="75000"/>
+                  <a:lumOff val="25000"/>
+                </a:schemeClr>
+              </a:solidFill>
+              <a:latin typeface="Times New Roman" panose="02020603050405020304" pitchFamily="18" charset="0"/>
+              <a:cs typeface="Times New Roman" panose="02020603050405020304" pitchFamily="18" charset="0"/>
+            </a:endParaRPr>
+          </a:p>
+        </p:txBody>
+      </p:sp>
+      <p:sp>
+        <p:nvSpPr>
+          <p:cNvPr id="36" name="Rectangle 35"/>
+          <p:cNvSpPr/>
+          <p:nvPr/>
+        </p:nvSpPr>
+        <p:spPr>
+          <a:xfrm>
+            <a:off x="1999130" y="2250142"/>
+            <a:ext cx="2093882" cy="821190"/>
+          </a:xfrm>
+          <a:prstGeom prst="rect">
+            <a:avLst/>
+          </a:prstGeom>
+          <a:ln w="38100">
+            <a:solidFill>
+              <a:schemeClr val="tx1"/>
+            </a:solidFill>
+          </a:ln>
+        </p:spPr>
+        <p:style>
+          <a:lnRef idx="2">
+            <a:schemeClr val="accent2"/>
+          </a:lnRef>
+          <a:fillRef idx="1">
+            <a:schemeClr val="lt1"/>
+          </a:fillRef>
+          <a:effectRef idx="0">
+            <a:schemeClr val="accent2"/>
+          </a:effectRef>
+          <a:fontRef idx="minor">
+            <a:schemeClr val="dk1"/>
+          </a:fontRef>
+        </p:style>
+        <p:txBody>
+          <a:bodyPr rtlCol="0" anchor="ctr"/>
+          <a:lstStyle/>
+          <a:p>
+            <a:pPr algn="ctr"/>
+            <a:endParaRPr lang="en-US" sz="1600" dirty="0">
+              <a:solidFill>
+                <a:schemeClr val="tx1"/>
+              </a:solidFill>
+              <a:latin typeface="Times New Roman" panose="02020603050405020304" pitchFamily="18" charset="0"/>
+              <a:cs typeface="Times New Roman" panose="02020603050405020304" pitchFamily="18" charset="0"/>
+            </a:endParaRPr>
+          </a:p>
+          <a:p>
+            <a:pPr algn="ctr"/>
+            <a:r>
+              <a:rPr lang="en-US" sz="1600" dirty="0" err="1">
+                <a:solidFill>
+                  <a:schemeClr val="tx1"/>
+                </a:solidFill>
+                <a:latin typeface="Times New Roman" panose="02020603050405020304" pitchFamily="18" charset="0"/>
+                <a:cs typeface="Times New Roman" panose="02020603050405020304" pitchFamily="18" charset="0"/>
+              </a:rPr>
+              <a:t>Abdelali</a:t>
+            </a:r>
+            <a:r>
+              <a:rPr lang="en-US" sz="1600" dirty="0">
+                <a:solidFill>
+                  <a:schemeClr val="tx1"/>
+                </a:solidFill>
+                <a:latin typeface="Times New Roman" panose="02020603050405020304" pitchFamily="18" charset="0"/>
+                <a:cs typeface="Times New Roman" panose="02020603050405020304" pitchFamily="18" charset="0"/>
+              </a:rPr>
+              <a:t> </a:t>
+            </a:r>
+            <a:r>
+              <a:rPr lang="en-US" sz="1600" dirty="0" err="1">
+                <a:solidFill>
+                  <a:schemeClr val="tx1"/>
+                </a:solidFill>
+                <a:latin typeface="Times New Roman" panose="02020603050405020304" pitchFamily="18" charset="0"/>
+                <a:cs typeface="Times New Roman" panose="02020603050405020304" pitchFamily="18" charset="0"/>
+              </a:rPr>
+              <a:t>Jad</a:t>
+            </a:r>
+            <a:endParaRPr lang="en-US" sz="1600" dirty="0">
+              <a:solidFill>
+                <a:schemeClr val="tx1"/>
+              </a:solidFill>
+              <a:latin typeface="Times New Roman" panose="02020603050405020304" pitchFamily="18" charset="0"/>
+              <a:cs typeface="Times New Roman" panose="02020603050405020304" pitchFamily="18" charset="0"/>
+            </a:endParaRPr>
+          </a:p>
+          <a:p>
+            <a:pPr algn="ctr"/>
+            <a:r>
+              <a:rPr lang="fr-FR" sz="1600" dirty="0" err="1">
+                <a:solidFill>
+                  <a:schemeClr val="accent1"/>
+                </a:solidFill>
+                <a:latin typeface="Times New Roman" panose="02020603050405020304" pitchFamily="18" charset="0"/>
+                <a:cs typeface="Times New Roman" panose="02020603050405020304" pitchFamily="18" charset="0"/>
+              </a:rPr>
+              <a:t>Systems</a:t>
+            </a:r>
+            <a:r>
+              <a:rPr lang="fr-FR" sz="1600" dirty="0">
+                <a:solidFill>
+                  <a:schemeClr val="accent1"/>
+                </a:solidFill>
+                <a:latin typeface="Times New Roman" panose="02020603050405020304" pitchFamily="18" charset="0"/>
+                <a:cs typeface="Times New Roman" panose="02020603050405020304" pitchFamily="18" charset="0"/>
+              </a:rPr>
+              <a:t>/</a:t>
+            </a:r>
+            <a:r>
+              <a:rPr lang="fr-FR" sz="1600" dirty="0" err="1">
+                <a:solidFill>
+                  <a:schemeClr val="accent1"/>
+                </a:solidFill>
+                <a:latin typeface="Times New Roman" panose="02020603050405020304" pitchFamily="18" charset="0"/>
+                <a:cs typeface="Times New Roman" panose="02020603050405020304" pitchFamily="18" charset="0"/>
+              </a:rPr>
+              <a:t>Database</a:t>
+            </a:r>
+            <a:r>
+              <a:rPr lang="fr-FR" sz="1600" dirty="0">
+                <a:solidFill>
+                  <a:schemeClr val="accent1"/>
+                </a:solidFill>
+                <a:latin typeface="Times New Roman" panose="02020603050405020304" pitchFamily="18" charset="0"/>
+                <a:cs typeface="Times New Roman" panose="02020603050405020304" pitchFamily="18" charset="0"/>
+              </a:rPr>
+              <a:t> Engineer</a:t>
+            </a:r>
+          </a:p>
+          <a:p>
+            <a:pPr algn="ctr"/>
+            <a:endParaRPr lang="fr-FR" sz="1600" dirty="0">
+              <a:latin typeface="Times New Roman" panose="02020603050405020304" pitchFamily="18" charset="0"/>
+              <a:cs typeface="Times New Roman" panose="02020603050405020304" pitchFamily="18" charset="0"/>
+            </a:endParaRPr>
+          </a:p>
+        </p:txBody>
+      </p:sp>
+      <p:sp>
+        <p:nvSpPr>
+          <p:cNvPr id="37" name="Rectangle 36"/>
+          <p:cNvSpPr/>
+          <p:nvPr/>
+        </p:nvSpPr>
+        <p:spPr>
+          <a:xfrm>
+            <a:off x="5050771" y="1768225"/>
+            <a:ext cx="2048541" cy="609495"/>
+          </a:xfrm>
+          <a:prstGeom prst="rect">
+            <a:avLst/>
+          </a:prstGeom>
+          <a:ln w="38100">
+            <a:solidFill>
+              <a:schemeClr val="tx1"/>
+            </a:solidFill>
+          </a:ln>
+        </p:spPr>
+        <p:style>
+          <a:lnRef idx="2">
+            <a:schemeClr val="accent2"/>
+          </a:lnRef>
+          <a:fillRef idx="1">
+            <a:schemeClr val="lt1"/>
+          </a:fillRef>
+          <a:effectRef idx="0">
+            <a:schemeClr val="accent2"/>
+          </a:effectRef>
+          <a:fontRef idx="minor">
+            <a:schemeClr val="dk1"/>
+          </a:fontRef>
+        </p:style>
+        <p:txBody>
+          <a:bodyPr rtlCol="0" anchor="ctr"/>
+          <a:lstStyle/>
+          <a:p>
+            <a:pPr algn="ctr"/>
+            <a:r>
+              <a:rPr lang="en-US" sz="1600" dirty="0" err="1">
+                <a:solidFill>
+                  <a:schemeClr val="accent1"/>
+                </a:solidFill>
+              </a:rPr>
+              <a:t>Abdelhadi</a:t>
+            </a:r>
+            <a:r>
+              <a:rPr lang="en-US" sz="1600" dirty="0">
+                <a:solidFill>
+                  <a:schemeClr val="accent1"/>
+                </a:solidFill>
+              </a:rPr>
+              <a:t> </a:t>
+            </a:r>
+          </a:p>
+          <a:p>
+            <a:pPr algn="ctr"/>
+            <a:r>
+              <a:rPr lang="en-US" sz="1600" dirty="0">
+                <a:solidFill>
+                  <a:schemeClr val="accent1"/>
+                </a:solidFill>
+              </a:rPr>
+              <a:t>Project Manager</a:t>
+            </a:r>
+            <a:endParaRPr lang="fr-FR" sz="1600" dirty="0">
+              <a:solidFill>
+                <a:schemeClr val="accent1"/>
+              </a:solidFill>
+            </a:endParaRPr>
+          </a:p>
+        </p:txBody>
+      </p:sp>
+      <p:sp>
+        <p:nvSpPr>
+          <p:cNvPr id="39" name="Rectangle 38"/>
+          <p:cNvSpPr/>
+          <p:nvPr/>
+        </p:nvSpPr>
+        <p:spPr>
+          <a:xfrm>
+            <a:off x="7705502" y="2512805"/>
+            <a:ext cx="2048541" cy="822193"/>
+          </a:xfrm>
+          <a:prstGeom prst="rect">
+            <a:avLst/>
+          </a:prstGeom>
+          <a:ln w="38100">
+            <a:solidFill>
+              <a:schemeClr val="tx1"/>
+            </a:solidFill>
+          </a:ln>
+        </p:spPr>
+        <p:style>
+          <a:lnRef idx="2">
+            <a:schemeClr val="accent2"/>
+          </a:lnRef>
+          <a:fillRef idx="1">
+            <a:schemeClr val="lt1"/>
+          </a:fillRef>
+          <a:effectRef idx="0">
+            <a:schemeClr val="accent2"/>
+          </a:effectRef>
+          <a:fontRef idx="minor">
+            <a:schemeClr val="dk1"/>
+          </a:fontRef>
+        </p:style>
+        <p:txBody>
+          <a:bodyPr rtlCol="0" anchor="ctr"/>
+          <a:lstStyle/>
+          <a:p>
+            <a:pPr algn="ctr"/>
+            <a:r>
+              <a:rPr lang="en-US" sz="1600" dirty="0">
+                <a:solidFill>
+                  <a:schemeClr val="tx1"/>
+                </a:solidFill>
+                <a:latin typeface="Times New Roman" panose="02020603050405020304" pitchFamily="18" charset="0"/>
+                <a:cs typeface="Times New Roman" panose="02020603050405020304" pitchFamily="18" charset="0"/>
+              </a:rPr>
+              <a:t>Mohamed </a:t>
+            </a:r>
+            <a:r>
+              <a:rPr lang="en-US" sz="1600" dirty="0" err="1">
+                <a:solidFill>
+                  <a:schemeClr val="tx1"/>
+                </a:solidFill>
+                <a:latin typeface="Times New Roman" panose="02020603050405020304" pitchFamily="18" charset="0"/>
+                <a:cs typeface="Times New Roman" panose="02020603050405020304" pitchFamily="18" charset="0"/>
+              </a:rPr>
+              <a:t>Saidi</a:t>
+            </a:r>
+            <a:endParaRPr lang="en-US" sz="1600" dirty="0">
+              <a:solidFill>
+                <a:schemeClr val="tx1"/>
+              </a:solidFill>
+              <a:latin typeface="Times New Roman" panose="02020603050405020304" pitchFamily="18" charset="0"/>
+              <a:cs typeface="Times New Roman" panose="02020603050405020304" pitchFamily="18" charset="0"/>
+            </a:endParaRPr>
+          </a:p>
+          <a:p>
+            <a:pPr algn="ctr"/>
+            <a:r>
+              <a:rPr lang="en-US" sz="1600" dirty="0">
+                <a:solidFill>
+                  <a:schemeClr val="accent1"/>
+                </a:solidFill>
+                <a:latin typeface="Times New Roman" panose="02020603050405020304" pitchFamily="18" charset="0"/>
+                <a:cs typeface="Times New Roman" panose="02020603050405020304" pitchFamily="18" charset="0"/>
+              </a:rPr>
+              <a:t>Data </a:t>
+            </a:r>
+            <a:r>
+              <a:rPr lang="fr-FR" sz="1600" dirty="0">
+                <a:solidFill>
+                  <a:schemeClr val="accent1"/>
+                </a:solidFill>
+                <a:latin typeface="Times New Roman" panose="02020603050405020304" pitchFamily="18" charset="0"/>
+                <a:cs typeface="Times New Roman" panose="02020603050405020304" pitchFamily="18" charset="0"/>
+              </a:rPr>
+              <a:t>Engineer/Designer</a:t>
+            </a:r>
+          </a:p>
+        </p:txBody>
+      </p:sp>
+      <p:sp>
+        <p:nvSpPr>
+          <p:cNvPr id="40" name="Rectangle 39"/>
+          <p:cNvSpPr/>
+          <p:nvPr/>
+        </p:nvSpPr>
+        <p:spPr>
+          <a:xfrm>
+            <a:off x="8177397" y="4339601"/>
+            <a:ext cx="2143072" cy="609495"/>
+          </a:xfrm>
+          <a:prstGeom prst="rect">
+            <a:avLst/>
+          </a:prstGeom>
+          <a:ln w="38100">
+            <a:solidFill>
+              <a:schemeClr val="tx1"/>
+            </a:solidFill>
+          </a:ln>
+        </p:spPr>
+        <p:style>
+          <a:lnRef idx="2">
+            <a:schemeClr val="accent2"/>
+          </a:lnRef>
+          <a:fillRef idx="1">
+            <a:schemeClr val="lt1"/>
+          </a:fillRef>
+          <a:effectRef idx="0">
+            <a:schemeClr val="accent2"/>
+          </a:effectRef>
+          <a:fontRef idx="minor">
+            <a:schemeClr val="dk1"/>
+          </a:fontRef>
+        </p:style>
+        <p:txBody>
+          <a:bodyPr rtlCol="0" anchor="ctr"/>
+          <a:lstStyle/>
+          <a:p>
+            <a:pPr algn="ctr"/>
+            <a:r>
+              <a:rPr lang="en-US" sz="1600" dirty="0" err="1">
+                <a:solidFill>
+                  <a:schemeClr val="tx1"/>
+                </a:solidFill>
+                <a:latin typeface="Times New Roman" panose="02020603050405020304" pitchFamily="18" charset="0"/>
+                <a:cs typeface="Times New Roman" panose="02020603050405020304" pitchFamily="18" charset="0"/>
+              </a:rPr>
+              <a:t>Ikram</a:t>
+            </a:r>
+            <a:r>
+              <a:rPr lang="en-US" sz="1600" dirty="0">
+                <a:solidFill>
+                  <a:schemeClr val="tx1"/>
+                </a:solidFill>
+                <a:latin typeface="Times New Roman" panose="02020603050405020304" pitchFamily="18" charset="0"/>
+                <a:cs typeface="Times New Roman" panose="02020603050405020304" pitchFamily="18" charset="0"/>
+              </a:rPr>
+              <a:t> Bel </a:t>
+            </a:r>
+            <a:r>
+              <a:rPr lang="en-US" sz="1600" dirty="0" err="1">
+                <a:solidFill>
+                  <a:schemeClr val="tx1"/>
+                </a:solidFill>
+                <a:latin typeface="Times New Roman" panose="02020603050405020304" pitchFamily="18" charset="0"/>
+                <a:cs typeface="Times New Roman" panose="02020603050405020304" pitchFamily="18" charset="0"/>
+              </a:rPr>
+              <a:t>Amria</a:t>
+            </a:r>
+            <a:endParaRPr lang="en-US" sz="1600" dirty="0">
+              <a:solidFill>
+                <a:schemeClr val="tx1"/>
+              </a:solidFill>
+              <a:latin typeface="Times New Roman" panose="02020603050405020304" pitchFamily="18" charset="0"/>
+              <a:cs typeface="Times New Roman" panose="02020603050405020304" pitchFamily="18" charset="0"/>
+            </a:endParaRPr>
+          </a:p>
+          <a:p>
+            <a:pPr algn="ctr"/>
+            <a:r>
+              <a:rPr lang="en-US" sz="1600" dirty="0">
+                <a:solidFill>
+                  <a:schemeClr val="accent1"/>
+                </a:solidFill>
+                <a:latin typeface="Times New Roman" panose="02020603050405020304" pitchFamily="18" charset="0"/>
+                <a:cs typeface="Times New Roman" panose="02020603050405020304" pitchFamily="18" charset="0"/>
+              </a:rPr>
+              <a:t>Data analyst</a:t>
+            </a:r>
+            <a:endParaRPr lang="fr-FR" sz="1600" dirty="0">
+              <a:solidFill>
+                <a:schemeClr val="accent1"/>
+              </a:solidFill>
+              <a:latin typeface="Times New Roman" panose="02020603050405020304" pitchFamily="18" charset="0"/>
+              <a:cs typeface="Times New Roman" panose="02020603050405020304" pitchFamily="18" charset="0"/>
+            </a:endParaRPr>
+          </a:p>
+        </p:txBody>
+      </p:sp>
+      <p:sp>
+        <p:nvSpPr>
+          <p:cNvPr id="41" name="Rectangle 40"/>
+          <p:cNvSpPr/>
+          <p:nvPr/>
+        </p:nvSpPr>
+        <p:spPr>
+          <a:xfrm>
+            <a:off x="4990732" y="5334623"/>
+            <a:ext cx="2048541" cy="609495"/>
+          </a:xfrm>
+          <a:prstGeom prst="rect">
+            <a:avLst/>
+          </a:prstGeom>
+          <a:ln w="38100">
+            <a:solidFill>
+              <a:schemeClr val="tx1"/>
+            </a:solidFill>
+          </a:ln>
+        </p:spPr>
+        <p:style>
+          <a:lnRef idx="2">
+            <a:schemeClr val="accent2"/>
+          </a:lnRef>
+          <a:fillRef idx="1">
+            <a:schemeClr val="lt1"/>
+          </a:fillRef>
+          <a:effectRef idx="0">
+            <a:schemeClr val="accent2"/>
+          </a:effectRef>
+          <a:fontRef idx="minor">
+            <a:schemeClr val="dk1"/>
+          </a:fontRef>
+        </p:style>
+        <p:txBody>
+          <a:bodyPr rtlCol="0" anchor="ctr"/>
+          <a:lstStyle/>
+          <a:p>
+            <a:pPr algn="ctr"/>
+            <a:r>
+              <a:rPr lang="en-US" sz="1600" dirty="0">
+                <a:solidFill>
+                  <a:schemeClr val="tx1"/>
+                </a:solidFill>
+                <a:latin typeface="Times New Roman" panose="02020603050405020304" pitchFamily="18" charset="0"/>
+                <a:cs typeface="Times New Roman" panose="02020603050405020304" pitchFamily="18" charset="0"/>
+              </a:rPr>
+              <a:t>Salaheddine El </a:t>
+            </a:r>
+            <a:r>
+              <a:rPr lang="en-US" sz="1600" dirty="0" err="1">
+                <a:solidFill>
+                  <a:schemeClr val="tx1"/>
+                </a:solidFill>
+                <a:latin typeface="Times New Roman" panose="02020603050405020304" pitchFamily="18" charset="0"/>
+                <a:cs typeface="Times New Roman" panose="02020603050405020304" pitchFamily="18" charset="0"/>
+              </a:rPr>
+              <a:t>Baidoury</a:t>
+            </a:r>
+            <a:endParaRPr lang="en-US" sz="1600" dirty="0">
+              <a:solidFill>
+                <a:schemeClr val="tx1"/>
+              </a:solidFill>
+              <a:latin typeface="Times New Roman" panose="02020603050405020304" pitchFamily="18" charset="0"/>
+              <a:cs typeface="Times New Roman" panose="02020603050405020304" pitchFamily="18" charset="0"/>
+            </a:endParaRPr>
+          </a:p>
+          <a:p>
+            <a:pPr algn="ctr"/>
+            <a:r>
+              <a:rPr lang="en-US" sz="1600" dirty="0">
+                <a:solidFill>
+                  <a:schemeClr val="accent1"/>
+                </a:solidFill>
+                <a:latin typeface="Times New Roman" panose="02020603050405020304" pitchFamily="18" charset="0"/>
+                <a:cs typeface="Times New Roman" panose="02020603050405020304" pitchFamily="18" charset="0"/>
+              </a:rPr>
+              <a:t>Data architect</a:t>
+            </a:r>
+            <a:endParaRPr lang="fr-FR" sz="1600" dirty="0">
+              <a:solidFill>
+                <a:schemeClr val="accent1"/>
+              </a:solidFill>
+              <a:latin typeface="Times New Roman" panose="02020603050405020304" pitchFamily="18" charset="0"/>
+              <a:cs typeface="Times New Roman" panose="02020603050405020304" pitchFamily="18" charset="0"/>
+            </a:endParaRPr>
+          </a:p>
+        </p:txBody>
+      </p:sp>
+      <p:sp>
+        <p:nvSpPr>
+          <p:cNvPr id="42" name="Rectangle 41"/>
+          <p:cNvSpPr/>
+          <p:nvPr/>
+        </p:nvSpPr>
+        <p:spPr>
+          <a:xfrm>
+            <a:off x="1571223" y="4118742"/>
+            <a:ext cx="2669999" cy="609495"/>
+          </a:xfrm>
+          <a:prstGeom prst="rect">
+            <a:avLst/>
+          </a:prstGeom>
+          <a:ln w="38100">
+            <a:solidFill>
+              <a:schemeClr val="tx1"/>
+            </a:solidFill>
+          </a:ln>
+        </p:spPr>
+        <p:style>
+          <a:lnRef idx="2">
+            <a:schemeClr val="accent2"/>
+          </a:lnRef>
+          <a:fillRef idx="1">
+            <a:schemeClr val="lt1"/>
+          </a:fillRef>
+          <a:effectRef idx="0">
+            <a:schemeClr val="accent2"/>
+          </a:effectRef>
+          <a:fontRef idx="minor">
+            <a:schemeClr val="dk1"/>
+          </a:fontRef>
+        </p:style>
+        <p:txBody>
+          <a:bodyPr rtlCol="0" anchor="ctr"/>
+          <a:lstStyle/>
+          <a:p>
+            <a:pPr algn="ctr"/>
+            <a:r>
+              <a:rPr lang="en-US" sz="1600" dirty="0">
+                <a:solidFill>
+                  <a:schemeClr val="tx1"/>
+                </a:solidFill>
+                <a:latin typeface="Times New Roman" panose="02020603050405020304" pitchFamily="18" charset="0"/>
+                <a:cs typeface="Times New Roman" panose="02020603050405020304" pitchFamily="18" charset="0"/>
+              </a:rPr>
+              <a:t>Chaimaa El KABBACH</a:t>
+            </a:r>
+          </a:p>
+          <a:p>
+            <a:pPr algn="ctr"/>
+            <a:r>
+              <a:rPr lang="en-US" sz="1600" dirty="0">
+                <a:solidFill>
+                  <a:schemeClr val="accent1"/>
+                </a:solidFill>
+                <a:latin typeface="Times New Roman" panose="02020603050405020304" pitchFamily="18" charset="0"/>
+                <a:cs typeface="Times New Roman" panose="02020603050405020304" pitchFamily="18" charset="0"/>
+              </a:rPr>
+              <a:t>Data analyst</a:t>
+            </a:r>
+            <a:endParaRPr lang="fr-FR" sz="1600" dirty="0">
+              <a:solidFill>
+                <a:schemeClr val="accent1"/>
+              </a:solidFill>
+              <a:latin typeface="Times New Roman" panose="02020603050405020304" pitchFamily="18" charset="0"/>
+              <a:cs typeface="Times New Roman" panose="02020603050405020304" pitchFamily="18" charset="0"/>
+            </a:endParaRPr>
+          </a:p>
+        </p:txBody>
+      </p:sp>
+      <p:grpSp>
+        <p:nvGrpSpPr>
+          <p:cNvPr id="43" name="Group 18">
+            <a:extLst>
+              <a:ext uri="{FF2B5EF4-FFF2-40B4-BE49-F238E27FC236}">
+                <a16:creationId xmlns:a16="http://schemas.microsoft.com/office/drawing/2014/main" id="{88A4D763-8802-4CE9-985E-76AF2B24C180}"/>
+              </a:ext>
+            </a:extLst>
+          </p:cNvPr>
+          <p:cNvGrpSpPr/>
+          <p:nvPr/>
+        </p:nvGrpSpPr>
+        <p:grpSpPr>
+          <a:xfrm flipH="1">
+            <a:off x="6015003" y="4849247"/>
+            <a:ext cx="120077" cy="443661"/>
+            <a:chOff x="1408027" y="3329887"/>
+            <a:chExt cx="155342" cy="573958"/>
+          </a:xfrm>
+          <a:solidFill>
+            <a:schemeClr val="tx1"/>
+          </a:solidFill>
+        </p:grpSpPr>
+        <p:sp>
+          <p:nvSpPr>
+            <p:cNvPr id="44" name="Oval 19">
+              <a:extLst>
+                <a:ext uri="{FF2B5EF4-FFF2-40B4-BE49-F238E27FC236}">
+                  <a16:creationId xmlns:a16="http://schemas.microsoft.com/office/drawing/2014/main" id="{D271A80E-6BB4-4688-9510-FAB78E2F68B0}"/>
+                </a:ext>
+              </a:extLst>
+            </p:cNvPr>
+            <p:cNvSpPr/>
+            <p:nvPr/>
+          </p:nvSpPr>
+          <p:spPr>
+            <a:xfrm>
+              <a:off x="1408027" y="3748503"/>
+              <a:ext cx="155342" cy="155342"/>
+            </a:xfrm>
+            <a:prstGeom prst="ellipse">
+              <a:avLst/>
+            </a:prstGeom>
+            <a:grpFill/>
+            <a:ln>
+              <a:noFill/>
+            </a:ln>
+          </p:spPr>
+          <p:style>
+            <a:lnRef idx="2">
+              <a:schemeClr val="accent1">
+                <a:shade val="50000"/>
+              </a:schemeClr>
+            </a:lnRef>
+            <a:fillRef idx="1">
+              <a:schemeClr val="accent1"/>
+            </a:fillRef>
+            <a:effectRef idx="0">
+              <a:schemeClr val="accent1"/>
+            </a:effectRef>
+            <a:fontRef idx="minor">
+              <a:schemeClr val="lt1"/>
+            </a:fontRef>
+          </p:style>
+          <p:txBody>
+            <a:bodyPr rtlCol="0" anchor="ctr"/>
+            <a:lstStyle/>
+            <a:p>
+              <a:pPr algn="ctr"/>
+              <a:endParaRPr lang="ko-KR" altLang="en-US" sz="2700">
+                <a:solidFill>
+                  <a:schemeClr val="tx1">
+                    <a:lumMod val="75000"/>
+                    <a:lumOff val="25000"/>
+                  </a:schemeClr>
+                </a:solidFill>
+              </a:endParaRPr>
+            </a:p>
+          </p:txBody>
+        </p:sp>
+        <p:sp>
+          <p:nvSpPr>
+            <p:cNvPr id="45" name="Oval 20">
+              <a:extLst>
+                <a:ext uri="{FF2B5EF4-FFF2-40B4-BE49-F238E27FC236}">
+                  <a16:creationId xmlns:a16="http://schemas.microsoft.com/office/drawing/2014/main" id="{C61D6485-9DF4-47AC-894A-E504C1FACB72}"/>
+                </a:ext>
+              </a:extLst>
+            </p:cNvPr>
+            <p:cNvSpPr/>
+            <p:nvPr/>
+          </p:nvSpPr>
+          <p:spPr>
+            <a:xfrm>
+              <a:off x="1408027" y="3539195"/>
+              <a:ext cx="155342" cy="155342"/>
+            </a:xfrm>
+            <a:prstGeom prst="ellipse">
+              <a:avLst/>
+            </a:prstGeom>
+            <a:grpFill/>
+            <a:ln>
+              <a:noFill/>
+            </a:ln>
+          </p:spPr>
+          <p:style>
+            <a:lnRef idx="2">
+              <a:schemeClr val="accent1">
+                <a:shade val="50000"/>
+              </a:schemeClr>
+            </a:lnRef>
+            <a:fillRef idx="1">
+              <a:schemeClr val="accent1"/>
+            </a:fillRef>
+            <a:effectRef idx="0">
+              <a:schemeClr val="accent1"/>
+            </a:effectRef>
+            <a:fontRef idx="minor">
+              <a:schemeClr val="lt1"/>
+            </a:fontRef>
+          </p:style>
+          <p:txBody>
+            <a:bodyPr rtlCol="0" anchor="ctr"/>
+            <a:lstStyle/>
+            <a:p>
+              <a:pPr algn="ctr"/>
+              <a:endParaRPr lang="ko-KR" altLang="en-US" sz="2700">
+                <a:solidFill>
+                  <a:schemeClr val="tx1">
+                    <a:lumMod val="75000"/>
+                    <a:lumOff val="25000"/>
+                  </a:schemeClr>
+                </a:solidFill>
+              </a:endParaRPr>
+            </a:p>
+          </p:txBody>
+        </p:sp>
+        <p:sp>
+          <p:nvSpPr>
+            <p:cNvPr id="46" name="Oval 21">
+              <a:extLst>
+                <a:ext uri="{FF2B5EF4-FFF2-40B4-BE49-F238E27FC236}">
+                  <a16:creationId xmlns:a16="http://schemas.microsoft.com/office/drawing/2014/main" id="{86198F9C-C4C9-4992-9C26-E91569BE6302}"/>
+                </a:ext>
+              </a:extLst>
+            </p:cNvPr>
+            <p:cNvSpPr/>
+            <p:nvPr/>
+          </p:nvSpPr>
+          <p:spPr>
+            <a:xfrm>
+              <a:off x="1408027" y="3329887"/>
+              <a:ext cx="155342" cy="155342"/>
+            </a:xfrm>
+            <a:prstGeom prst="ellipse">
+              <a:avLst/>
+            </a:prstGeom>
+            <a:grpFill/>
+            <a:ln>
+              <a:noFill/>
+            </a:ln>
+          </p:spPr>
+          <p:style>
+            <a:lnRef idx="2">
+              <a:schemeClr val="accent1">
+                <a:shade val="50000"/>
+              </a:schemeClr>
+            </a:lnRef>
+            <a:fillRef idx="1">
+              <a:schemeClr val="accent1"/>
+            </a:fillRef>
+            <a:effectRef idx="0">
+              <a:schemeClr val="accent1"/>
+            </a:effectRef>
+            <a:fontRef idx="minor">
+              <a:schemeClr val="lt1"/>
+            </a:fontRef>
+          </p:style>
+          <p:txBody>
+            <a:bodyPr rtlCol="0" anchor="ctr"/>
+            <a:lstStyle/>
+            <a:p>
+              <a:pPr algn="ctr"/>
+              <a:endParaRPr lang="ko-KR" altLang="en-US" sz="2700">
+                <a:solidFill>
+                  <a:schemeClr val="tx1">
+                    <a:lumMod val="75000"/>
+                    <a:lumOff val="25000"/>
+                  </a:schemeClr>
+                </a:solidFill>
+              </a:endParaRPr>
+            </a:p>
+          </p:txBody>
+        </p:sp>
+      </p:grpSp>
+      <p:sp>
+        <p:nvSpPr>
+          <p:cNvPr id="3" name="ZoneTexte 2">
+            <a:extLst>
+              <a:ext uri="{FF2B5EF4-FFF2-40B4-BE49-F238E27FC236}">
+                <a16:creationId xmlns:a16="http://schemas.microsoft.com/office/drawing/2014/main" id="{3A33E31C-EF4C-416B-8EB3-C44FE2EEA618}"/>
+              </a:ext>
+            </a:extLst>
+          </p:cNvPr>
+          <p:cNvSpPr txBox="1"/>
+          <p:nvPr/>
+        </p:nvSpPr>
+        <p:spPr>
+          <a:xfrm>
+            <a:off x="6303965" y="54454"/>
+            <a:ext cx="5737782" cy="1754326"/>
+          </a:xfrm>
+          <a:prstGeom prst="rect">
+            <a:avLst/>
+          </a:prstGeom>
+          <a:noFill/>
+        </p:spPr>
+        <p:txBody>
+          <a:bodyPr wrap="square" rtlCol="0">
+            <a:spAutoFit/>
+          </a:bodyPr>
+          <a:lstStyle/>
+          <a:p>
+            <a:r>
+              <a:rPr lang="en-US" dirty="0"/>
+              <a:t>Project MANAGER 		: Salaheddine EL BAIDOURY</a:t>
+            </a:r>
+          </a:p>
+          <a:p>
+            <a:r>
+              <a:rPr lang="en-US" dirty="0"/>
+              <a:t>Data Scientist 		: </a:t>
+            </a:r>
+            <a:r>
+              <a:rPr lang="en-US" dirty="0" err="1"/>
+              <a:t>Abdelhadi</a:t>
+            </a:r>
+            <a:r>
+              <a:rPr lang="en-US" dirty="0"/>
+              <a:t> ESSABRI</a:t>
+            </a:r>
+          </a:p>
+          <a:p>
+            <a:r>
+              <a:rPr lang="en-US" dirty="0"/>
+              <a:t>Data Analyst 		: </a:t>
+            </a:r>
+            <a:r>
+              <a:rPr lang="en-US" dirty="0" err="1"/>
+              <a:t>Chaimaa</a:t>
+            </a:r>
+            <a:r>
+              <a:rPr lang="en-US" dirty="0"/>
+              <a:t> EL KABBACH</a:t>
+            </a:r>
+          </a:p>
+          <a:p>
+            <a:r>
+              <a:rPr lang="en-US" dirty="0"/>
+              <a:t>Data Engineer 		: Ikram BEL ARMIA </a:t>
+            </a:r>
+          </a:p>
+          <a:p>
+            <a:r>
+              <a:rPr lang="en-US" dirty="0"/>
+              <a:t>Developer/Designer 	: Mohamed SAIDI</a:t>
+            </a:r>
+          </a:p>
+          <a:p>
+            <a:r>
+              <a:rPr lang="en-US" dirty="0" err="1"/>
+              <a:t>Devops</a:t>
+            </a:r>
+            <a:r>
+              <a:rPr lang="en-US" dirty="0"/>
+              <a:t>/Cloud Engineer 	: </a:t>
+            </a:r>
+            <a:r>
+              <a:rPr lang="en-US" dirty="0" err="1"/>
+              <a:t>Abdelali</a:t>
+            </a:r>
+            <a:r>
+              <a:rPr lang="en-US" dirty="0"/>
+              <a:t> JADEMOULA</a:t>
+            </a:r>
+          </a:p>
+        </p:txBody>
+      </p:sp>
+    </p:spTree>
+    <p:extLst>
+      <p:ext uri="{BB962C8B-B14F-4D97-AF65-F5344CB8AC3E}">
+        <p14:creationId xmlns:p14="http://schemas.microsoft.com/office/powerpoint/2010/main" val="1168721972"/>
+      </p:ext>
+    </p:extLst>
+  </p:cSld>
+  <p:clrMapOvr>
+    <a:masterClrMapping/>
+  </p:clrMapOvr>
+</p:sld>
+</file>
+
+<file path=ppt/slides/slide3.xml><?xml version="1.0" encoding="utf-8"?>
+<p:sld xmlns:a="http://schemas.openxmlformats.org/drawingml/2006/main" xmlns:r="http://schemas.openxmlformats.org/officeDocument/2006/relationships" xmlns:p="http://schemas.openxmlformats.org/presentationml/2006/main">
+  <p:cSld>
+    <p:spTree>
+      <p:nvGrpSpPr>
+        <p:cNvPr id="1" name=""/>
+        <p:cNvGrpSpPr/>
+        <p:nvPr/>
+      </p:nvGrpSpPr>
+      <p:grpSpPr>
+        <a:xfrm>
+          <a:off x="0" y="0"/>
+          <a:ext cx="0" cy="0"/>
+          <a:chOff x="0" y="0"/>
+          <a:chExt cx="0" cy="0"/>
+        </a:xfrm>
+      </p:grpSpPr>
+      <p:sp>
+        <p:nvSpPr>
           <p:cNvPr id="104" name="Rectangle 103">
             <a:extLst>
               <a:ext uri="{FF2B5EF4-FFF2-40B4-BE49-F238E27FC236}">
@@ -6278,7 +8730,7 @@
 </p:sld>
 </file>
 
-<file path=ppt/slides/slide2.xml><?xml version="1.0" encoding="utf-8"?>
+<file path=ppt/slides/slide4.xml><?xml version="1.0" encoding="utf-8"?>
 <p:sld xmlns:a="http://schemas.openxmlformats.org/drawingml/2006/main" xmlns:r="http://schemas.openxmlformats.org/officeDocument/2006/relationships" xmlns:p="http://schemas.openxmlformats.org/presentationml/2006/main">
   <p:cSld>
     <p:spTree>
@@ -12605,7 +15057,7 @@
 </p:sld>
 </file>
 
-<file path=ppt/slides/slide3.xml><?xml version="1.0" encoding="utf-8"?>
+<file path=ppt/slides/slide5.xml><?xml version="1.0" encoding="utf-8"?>
 <p:sld xmlns:a="http://schemas.openxmlformats.org/drawingml/2006/main" xmlns:r="http://schemas.openxmlformats.org/officeDocument/2006/relationships" xmlns:p="http://schemas.openxmlformats.org/presentationml/2006/main">
   <p:cSld>
     <p:spTree>
@@ -12876,7 +15328,7 @@
 </p:sld>
 </file>
 
-<file path=ppt/slides/slide4.xml><?xml version="1.0" encoding="utf-8"?>
+<file path=ppt/slides/slide6.xml><?xml version="1.0" encoding="utf-8"?>
 <p:sld xmlns:a="http://schemas.openxmlformats.org/drawingml/2006/main" xmlns:r="http://schemas.openxmlformats.org/officeDocument/2006/relationships" xmlns:p="http://schemas.openxmlformats.org/presentationml/2006/main">
   <p:cSld>
     <p:spTree>
@@ -13173,7 +15625,7 @@
 </p:sld>
 </file>
 
-<file path=ppt/slides/slide5.xml><?xml version="1.0" encoding="utf-8"?>
+<file path=ppt/slides/slide7.xml><?xml version="1.0" encoding="utf-8"?>
 <p:sld xmlns:a="http://schemas.openxmlformats.org/drawingml/2006/main" xmlns:r="http://schemas.openxmlformats.org/officeDocument/2006/relationships" xmlns:p="http://schemas.openxmlformats.org/presentationml/2006/main">
   <p:cSld>
     <p:spTree>
@@ -13376,7 +15828,7 @@
 </p:sld>
 </file>
 
-<file path=ppt/slides/slide6.xml><?xml version="1.0" encoding="utf-8"?>
+<file path=ppt/slides/slide8.xml><?xml version="1.0" encoding="utf-8"?>
 <p:sld xmlns:a="http://schemas.openxmlformats.org/drawingml/2006/main" xmlns:r="http://schemas.openxmlformats.org/officeDocument/2006/relationships" xmlns:p="http://schemas.openxmlformats.org/presentationml/2006/main">
   <p:cSld>
     <p:spTree>

</xml_diff>

<commit_message>
add the progress presentation v2 : [Page de garde - done]
</commit_message>
<xml_diff>
--- a/Progress' Presentations/Etat d'avancement - S1.pptx
+++ b/Progress' Presentations/Etat d'avancement - S1.pptx
@@ -5,14 +5,17 @@
     <p:sldMasterId id="2147483648" r:id="rId1"/>
   </p:sldMasterIdLst>
   <p:sldIdLst>
-    <p:sldId id="262" r:id="rId2"/>
-    <p:sldId id="264" r:id="rId3"/>
-    <p:sldId id="263" r:id="rId4"/>
-    <p:sldId id="261" r:id="rId5"/>
-    <p:sldId id="256" r:id="rId6"/>
-    <p:sldId id="259" r:id="rId7"/>
-    <p:sldId id="257" r:id="rId8"/>
-    <p:sldId id="260" r:id="rId9"/>
+    <p:sldId id="266" r:id="rId2"/>
+    <p:sldId id="267" r:id="rId3"/>
+    <p:sldId id="262" r:id="rId4"/>
+    <p:sldId id="264" r:id="rId5"/>
+    <p:sldId id="265" r:id="rId6"/>
+    <p:sldId id="263" r:id="rId7"/>
+    <p:sldId id="261" r:id="rId8"/>
+    <p:sldId id="256" r:id="rId9"/>
+    <p:sldId id="259" r:id="rId10"/>
+    <p:sldId id="257" r:id="rId11"/>
+    <p:sldId id="260" r:id="rId12"/>
   </p:sldIdLst>
   <p:sldSz cx="12192000" cy="6858000"/>
   <p:notesSz cx="6858000" cy="9144000"/>
@@ -3354,6 +3357,1617 @@
           <a:chExt cx="0" cy="0"/>
         </a:xfrm>
       </p:grpSpPr>
+    </p:spTree>
+    <p:extLst>
+      <p:ext uri="{BB962C8B-B14F-4D97-AF65-F5344CB8AC3E}">
+        <p14:creationId xmlns:p14="http://schemas.microsoft.com/office/powerpoint/2010/main" val="1058695649"/>
+      </p:ext>
+    </p:extLst>
+  </p:cSld>
+  <p:clrMapOvr>
+    <a:masterClrMapping/>
+  </p:clrMapOvr>
+</p:sld>
+</file>
+
+<file path=ppt/slides/slide10.xml><?xml version="1.0" encoding="utf-8"?>
+<p:sld xmlns:a="http://schemas.openxmlformats.org/drawingml/2006/main" xmlns:r="http://schemas.openxmlformats.org/officeDocument/2006/relationships" xmlns:p="http://schemas.openxmlformats.org/presentationml/2006/main">
+  <p:cSld>
+    <p:spTree>
+      <p:nvGrpSpPr>
+        <p:cNvPr id="1" name=""/>
+        <p:cNvGrpSpPr/>
+        <p:nvPr/>
+      </p:nvGrpSpPr>
+      <p:grpSpPr>
+        <a:xfrm>
+          <a:off x="0" y="0"/>
+          <a:ext cx="0" cy="0"/>
+          <a:chOff x="0" y="0"/>
+          <a:chExt cx="0" cy="0"/>
+        </a:xfrm>
+      </p:grpSpPr>
+      <p:pic>
+        <p:nvPicPr>
+          <p:cNvPr id="5" name="Picture 4">
+            <a:extLst>
+              <a:ext uri="{FF2B5EF4-FFF2-40B4-BE49-F238E27FC236}">
+                <a16:creationId xmlns:a16="http://schemas.microsoft.com/office/drawing/2014/main" id="{94097EE7-94DD-4E24-9003-3241EDB20939}"/>
+              </a:ext>
+            </a:extLst>
+          </p:cNvPr>
+          <p:cNvPicPr>
+            <a:picLocks noChangeAspect="1"/>
+          </p:cNvPicPr>
+          <p:nvPr/>
+        </p:nvPicPr>
+        <p:blipFill rotWithShape="1">
+          <a:blip r:embed="rId2"/>
+          <a:srcRect t="4485"/>
+          <a:stretch/>
+        </p:blipFill>
+        <p:spPr>
+          <a:xfrm>
+            <a:off x="710408" y="758195"/>
+            <a:ext cx="10970569" cy="5891311"/>
+          </a:xfrm>
+          <a:prstGeom prst="rect">
+            <a:avLst/>
+          </a:prstGeom>
+        </p:spPr>
+      </p:pic>
+      <p:sp>
+        <p:nvSpPr>
+          <p:cNvPr id="2" name="Rectangle 1">
+            <a:extLst>
+              <a:ext uri="{FF2B5EF4-FFF2-40B4-BE49-F238E27FC236}">
+                <a16:creationId xmlns:a16="http://schemas.microsoft.com/office/drawing/2014/main" id="{33B04812-7A7A-4C77-9AC0-CEA76040736E}"/>
+              </a:ext>
+            </a:extLst>
+          </p:cNvPr>
+          <p:cNvSpPr/>
+          <p:nvPr/>
+        </p:nvSpPr>
+        <p:spPr>
+          <a:xfrm>
+            <a:off x="131193" y="196477"/>
+            <a:ext cx="4483856" cy="369332"/>
+          </a:xfrm>
+          <a:prstGeom prst="rect">
+            <a:avLst/>
+          </a:prstGeom>
+        </p:spPr>
+        <p:txBody>
+          <a:bodyPr wrap="none">
+            <a:spAutoFit/>
+          </a:bodyPr>
+          <a:lstStyle/>
+          <a:p>
+            <a:r>
+              <a:rPr lang="en-US" dirty="0">
+                <a:solidFill>
+                  <a:srgbClr val="333333"/>
+                </a:solidFill>
+                <a:latin typeface="Times New Roman" panose="02020603050405020304" pitchFamily="18" charset="0"/>
+                <a:cs typeface="Times New Roman" panose="02020603050405020304" pitchFamily="18" charset="0"/>
+              </a:rPr>
+              <a:t>To see your device on map you can register on</a:t>
+            </a:r>
+            <a:endParaRPr lang="fr-FR" dirty="0">
+              <a:latin typeface="Times New Roman" panose="02020603050405020304" pitchFamily="18" charset="0"/>
+              <a:cs typeface="Times New Roman" panose="02020603050405020304" pitchFamily="18" charset="0"/>
+            </a:endParaRPr>
+          </a:p>
+        </p:txBody>
+      </p:sp>
+      <p:sp>
+        <p:nvSpPr>
+          <p:cNvPr id="6" name="Rectangle 5">
+            <a:extLst>
+              <a:ext uri="{FF2B5EF4-FFF2-40B4-BE49-F238E27FC236}">
+                <a16:creationId xmlns:a16="http://schemas.microsoft.com/office/drawing/2014/main" id="{15371709-8667-494A-B838-999788A1DB81}"/>
+              </a:ext>
+            </a:extLst>
+          </p:cNvPr>
+          <p:cNvSpPr/>
+          <p:nvPr/>
+        </p:nvSpPr>
+        <p:spPr>
+          <a:xfrm>
+            <a:off x="4422869" y="196477"/>
+            <a:ext cx="2621874" cy="369332"/>
+          </a:xfrm>
+          <a:prstGeom prst="rect">
+            <a:avLst/>
+          </a:prstGeom>
+        </p:spPr>
+        <p:txBody>
+          <a:bodyPr wrap="square">
+            <a:spAutoFit/>
+          </a:bodyPr>
+          <a:lstStyle/>
+          <a:p>
+            <a:r>
+              <a:rPr lang="en-US" b="0" i="0" dirty="0">
+                <a:solidFill>
+                  <a:srgbClr val="333333"/>
+                </a:solidFill>
+                <a:effectLst/>
+                <a:latin typeface="Roboto"/>
+              </a:rPr>
+              <a:t> </a:t>
+            </a:r>
+            <a:r>
+              <a:rPr lang="en-US" b="0" i="0" dirty="0">
+                <a:solidFill>
+                  <a:schemeClr val="accent2"/>
+                </a:solidFill>
+                <a:effectLst/>
+                <a:latin typeface="Times New Roman" panose="02020603050405020304" pitchFamily="18" charset="0"/>
+                <a:cs typeface="Times New Roman" panose="02020603050405020304" pitchFamily="18" charset="0"/>
+              </a:rPr>
+              <a:t>http://demo.traccar.org/</a:t>
+            </a:r>
+            <a:endParaRPr lang="fr-FR" dirty="0">
+              <a:latin typeface="Times New Roman" panose="02020603050405020304" pitchFamily="18" charset="0"/>
+              <a:cs typeface="Times New Roman" panose="02020603050405020304" pitchFamily="18" charset="0"/>
+            </a:endParaRPr>
+          </a:p>
+        </p:txBody>
+      </p:sp>
+      <p:sp>
+        <p:nvSpPr>
+          <p:cNvPr id="7" name="Rectangle 6">
+            <a:extLst>
+              <a:ext uri="{FF2B5EF4-FFF2-40B4-BE49-F238E27FC236}">
+                <a16:creationId xmlns:a16="http://schemas.microsoft.com/office/drawing/2014/main" id="{575CA3F9-BF43-4B2C-A7D2-0A5638BA44B0}"/>
+              </a:ext>
+            </a:extLst>
+          </p:cNvPr>
+          <p:cNvSpPr/>
+          <p:nvPr/>
+        </p:nvSpPr>
+        <p:spPr>
+          <a:xfrm>
+            <a:off x="6715940" y="208494"/>
+            <a:ext cx="3680088" cy="369332"/>
+          </a:xfrm>
+          <a:prstGeom prst="rect">
+            <a:avLst/>
+          </a:prstGeom>
+        </p:spPr>
+        <p:txBody>
+          <a:bodyPr wrap="square">
+            <a:spAutoFit/>
+          </a:bodyPr>
+          <a:lstStyle/>
+          <a:p>
+            <a:r>
+              <a:rPr lang="en-US" b="0" i="0" dirty="0">
+                <a:solidFill>
+                  <a:srgbClr val="333333"/>
+                </a:solidFill>
+                <a:effectLst/>
+                <a:latin typeface="Times New Roman" panose="02020603050405020304" pitchFamily="18" charset="0"/>
+                <a:cs typeface="Times New Roman" panose="02020603050405020304" pitchFamily="18" charset="0"/>
+              </a:rPr>
+              <a:t>and add your device with identifier.</a:t>
+            </a:r>
+            <a:endParaRPr lang="fr-FR" dirty="0">
+              <a:latin typeface="Times New Roman" panose="02020603050405020304" pitchFamily="18" charset="0"/>
+              <a:cs typeface="Times New Roman" panose="02020603050405020304" pitchFamily="18" charset="0"/>
+            </a:endParaRPr>
+          </a:p>
+        </p:txBody>
+      </p:sp>
+    </p:spTree>
+    <p:extLst>
+      <p:ext uri="{BB962C8B-B14F-4D97-AF65-F5344CB8AC3E}">
+        <p14:creationId xmlns:p14="http://schemas.microsoft.com/office/powerpoint/2010/main" val="3570471032"/>
+      </p:ext>
+    </p:extLst>
+  </p:cSld>
+  <p:clrMapOvr>
+    <a:masterClrMapping/>
+  </p:clrMapOvr>
+</p:sld>
+</file>
+
+<file path=ppt/slides/slide11.xml><?xml version="1.0" encoding="utf-8"?>
+<p:sld xmlns:a="http://schemas.openxmlformats.org/drawingml/2006/main" xmlns:r="http://schemas.openxmlformats.org/officeDocument/2006/relationships" xmlns:p="http://schemas.openxmlformats.org/presentationml/2006/main">
+  <p:cSld>
+    <p:spTree>
+      <p:nvGrpSpPr>
+        <p:cNvPr id="1" name=""/>
+        <p:cNvGrpSpPr/>
+        <p:nvPr/>
+      </p:nvGrpSpPr>
+      <p:grpSpPr>
+        <a:xfrm>
+          <a:off x="0" y="0"/>
+          <a:ext cx="0" cy="0"/>
+          <a:chOff x="0" y="0"/>
+          <a:chExt cx="0" cy="0"/>
+        </a:xfrm>
+      </p:grpSpPr>
+      <p:sp>
+        <p:nvSpPr>
+          <p:cNvPr id="2" name="Title 1">
+            <a:extLst>
+              <a:ext uri="{FF2B5EF4-FFF2-40B4-BE49-F238E27FC236}">
+                <a16:creationId xmlns:a16="http://schemas.microsoft.com/office/drawing/2014/main" id="{3D20979F-C224-45DD-9A21-BF0CF8E7A524}"/>
+              </a:ext>
+            </a:extLst>
+          </p:cNvPr>
+          <p:cNvSpPr>
+            <a:spLocks noGrp="1"/>
+          </p:cNvSpPr>
+          <p:nvPr>
+            <p:ph type="title"/>
+          </p:nvPr>
+        </p:nvSpPr>
+        <p:spPr>
+          <a:xfrm>
+            <a:off x="155620" y="274667"/>
+            <a:ext cx="3180008" cy="1325563"/>
+          </a:xfrm>
+        </p:spPr>
+        <p:txBody>
+          <a:bodyPr/>
+          <a:lstStyle/>
+          <a:p>
+            <a:r>
+              <a:rPr lang="en-US" dirty="0">
+                <a:latin typeface="Times New Roman" panose="02020603050405020304" pitchFamily="18" charset="0"/>
+                <a:cs typeface="Times New Roman" panose="02020603050405020304" pitchFamily="18" charset="0"/>
+              </a:rPr>
+              <a:t>Current Step</a:t>
+            </a:r>
+            <a:endParaRPr lang="fr-FR" dirty="0">
+              <a:latin typeface="Times New Roman" panose="02020603050405020304" pitchFamily="18" charset="0"/>
+              <a:cs typeface="Times New Roman" panose="02020603050405020304" pitchFamily="18" charset="0"/>
+            </a:endParaRPr>
+          </a:p>
+        </p:txBody>
+      </p:sp>
+      <p:pic>
+        <p:nvPicPr>
+          <p:cNvPr id="1030" name="Picture 6" descr="Afficher l’image source">
+            <a:extLst>
+              <a:ext uri="{FF2B5EF4-FFF2-40B4-BE49-F238E27FC236}">
+                <a16:creationId xmlns:a16="http://schemas.microsoft.com/office/drawing/2014/main" id="{4D506C72-7495-492D-9C62-F747B9444F0B}"/>
+              </a:ext>
+            </a:extLst>
+          </p:cNvPr>
+          <p:cNvPicPr>
+            <a:picLocks noChangeAspect="1" noChangeArrowheads="1"/>
+          </p:cNvPicPr>
+          <p:nvPr/>
+        </p:nvPicPr>
+        <p:blipFill>
+          <a:blip r:embed="rId2">
+            <a:extLst>
+              <a:ext uri="{28A0092B-C50C-407E-A947-70E740481C1C}">
+                <a14:useLocalDpi xmlns:a14="http://schemas.microsoft.com/office/drawing/2010/main" val="0"/>
+              </a:ext>
+            </a:extLst>
+          </a:blip>
+          <a:srcRect/>
+          <a:stretch>
+            <a:fillRect/>
+          </a:stretch>
+        </p:blipFill>
+        <p:spPr bwMode="auto">
+          <a:xfrm>
+            <a:off x="6858434" y="1504186"/>
+            <a:ext cx="3857647" cy="3849627"/>
+          </a:xfrm>
+          <a:prstGeom prst="rect">
+            <a:avLst/>
+          </a:prstGeom>
+          <a:noFill/>
+          <a:extLst>
+            <a:ext uri="{909E8E84-426E-40DD-AFC4-6F175D3DCCD1}">
+              <a14:hiddenFill xmlns:a14="http://schemas.microsoft.com/office/drawing/2010/main">
+                <a:solidFill>
+                  <a:srgbClr val="FFFFFF"/>
+                </a:solidFill>
+              </a14:hiddenFill>
+            </a:ext>
+          </a:extLst>
+        </p:spPr>
+      </p:pic>
+      <p:pic>
+        <p:nvPicPr>
+          <p:cNvPr id="6" name="Graphic 5" descr="Smart Phone">
+            <a:extLst>
+              <a:ext uri="{FF2B5EF4-FFF2-40B4-BE49-F238E27FC236}">
+                <a16:creationId xmlns:a16="http://schemas.microsoft.com/office/drawing/2014/main" id="{A84BC0C8-5514-4306-A6B8-15B819A3EB3C}"/>
+              </a:ext>
+            </a:extLst>
+          </p:cNvPr>
+          <p:cNvPicPr>
+            <a:picLocks noChangeAspect="1"/>
+          </p:cNvPicPr>
+          <p:nvPr/>
+        </p:nvPicPr>
+        <p:blipFill>
+          <a:blip r:embed="rId3">
+            <a:extLst>
+              <a:ext uri="{28A0092B-C50C-407E-A947-70E740481C1C}">
+                <a14:useLocalDpi xmlns:a14="http://schemas.microsoft.com/office/drawing/2010/main" val="0"/>
+              </a:ext>
+              <a:ext uri="{96DAC541-7B7A-43D3-8B79-37D633B846F1}">
+                <asvg:svgBlip xmlns:asvg="http://schemas.microsoft.com/office/drawing/2016/SVG/main" r:embed="rId4"/>
+              </a:ext>
+            </a:extLst>
+          </a:blip>
+          <a:stretch>
+            <a:fillRect/>
+          </a:stretch>
+        </p:blipFill>
+        <p:spPr>
+          <a:xfrm>
+            <a:off x="1475919" y="2528652"/>
+            <a:ext cx="1226927" cy="1226927"/>
+          </a:xfrm>
+          <a:prstGeom prst="rect">
+            <a:avLst/>
+          </a:prstGeom>
+        </p:spPr>
+      </p:pic>
+      <p:sp>
+        <p:nvSpPr>
+          <p:cNvPr id="7" name="Rectangle 6">
+            <a:extLst>
+              <a:ext uri="{FF2B5EF4-FFF2-40B4-BE49-F238E27FC236}">
+                <a16:creationId xmlns:a16="http://schemas.microsoft.com/office/drawing/2014/main" id="{9DB97059-FE87-4E9D-B25F-B7B1A12A5528}"/>
+              </a:ext>
+            </a:extLst>
+          </p:cNvPr>
+          <p:cNvSpPr/>
+          <p:nvPr/>
+        </p:nvSpPr>
+        <p:spPr>
+          <a:xfrm>
+            <a:off x="932645" y="3965551"/>
+            <a:ext cx="2805448" cy="369332"/>
+          </a:xfrm>
+          <a:prstGeom prst="rect">
+            <a:avLst/>
+          </a:prstGeom>
+        </p:spPr>
+        <p:txBody>
+          <a:bodyPr wrap="none">
+            <a:spAutoFit/>
+          </a:bodyPr>
+          <a:lstStyle/>
+          <a:p>
+            <a:r>
+              <a:rPr lang="fr-FR" dirty="0" err="1">
+                <a:solidFill>
+                  <a:srgbClr val="24292F"/>
+                </a:solidFill>
+                <a:latin typeface="Times New Roman" panose="02020603050405020304" pitchFamily="18" charset="0"/>
+                <a:cs typeface="Times New Roman" panose="02020603050405020304" pitchFamily="18" charset="0"/>
+              </a:rPr>
+              <a:t>Traccar</a:t>
+            </a:r>
+            <a:r>
+              <a:rPr lang="fr-FR" dirty="0">
+                <a:solidFill>
+                  <a:srgbClr val="24292F"/>
+                </a:solidFill>
+                <a:latin typeface="Times New Roman" panose="02020603050405020304" pitchFamily="18" charset="0"/>
+                <a:cs typeface="Times New Roman" panose="02020603050405020304" pitchFamily="18" charset="0"/>
+              </a:rPr>
+              <a:t> Client (Application)</a:t>
+            </a:r>
+            <a:endParaRPr lang="fr-FR" dirty="0">
+              <a:latin typeface="Times New Roman" panose="02020603050405020304" pitchFamily="18" charset="0"/>
+              <a:cs typeface="Times New Roman" panose="02020603050405020304" pitchFamily="18" charset="0"/>
+            </a:endParaRPr>
+          </a:p>
+        </p:txBody>
+      </p:sp>
+      <p:sp>
+        <p:nvSpPr>
+          <p:cNvPr id="10" name="Rectangle 9">
+            <a:extLst>
+              <a:ext uri="{FF2B5EF4-FFF2-40B4-BE49-F238E27FC236}">
+                <a16:creationId xmlns:a16="http://schemas.microsoft.com/office/drawing/2014/main" id="{BF36CDF2-D11D-46DA-BB61-6D325F6CADDC}"/>
+              </a:ext>
+            </a:extLst>
+          </p:cNvPr>
+          <p:cNvSpPr/>
+          <p:nvPr/>
+        </p:nvSpPr>
+        <p:spPr>
+          <a:xfrm>
+            <a:off x="7563118" y="5637658"/>
+            <a:ext cx="2318135" cy="369332"/>
+          </a:xfrm>
+          <a:prstGeom prst="rect">
+            <a:avLst/>
+          </a:prstGeom>
+        </p:spPr>
+        <p:txBody>
+          <a:bodyPr wrap="none">
+            <a:spAutoFit/>
+          </a:bodyPr>
+          <a:lstStyle/>
+          <a:p>
+            <a:r>
+              <a:rPr lang="fr-FR" dirty="0" err="1">
+                <a:solidFill>
+                  <a:srgbClr val="24292F"/>
+                </a:solidFill>
+                <a:latin typeface="Times New Roman" panose="02020603050405020304" pitchFamily="18" charset="0"/>
+                <a:cs typeface="Times New Roman" panose="02020603050405020304" pitchFamily="18" charset="0"/>
+              </a:rPr>
+              <a:t>Traccar</a:t>
+            </a:r>
+            <a:r>
+              <a:rPr lang="fr-FR" dirty="0">
+                <a:solidFill>
+                  <a:srgbClr val="24292F"/>
+                </a:solidFill>
+                <a:latin typeface="Times New Roman" panose="02020603050405020304" pitchFamily="18" charset="0"/>
+                <a:cs typeface="Times New Roman" panose="02020603050405020304" pitchFamily="18" charset="0"/>
+              </a:rPr>
+              <a:t> Client (Server)</a:t>
+            </a:r>
+            <a:endParaRPr lang="fr-FR" dirty="0">
+              <a:latin typeface="Times New Roman" panose="02020603050405020304" pitchFamily="18" charset="0"/>
+              <a:cs typeface="Times New Roman" panose="02020603050405020304" pitchFamily="18" charset="0"/>
+            </a:endParaRPr>
+          </a:p>
+        </p:txBody>
+      </p:sp>
+      <p:cxnSp>
+        <p:nvCxnSpPr>
+          <p:cNvPr id="12" name="Straight Arrow Connector 11">
+            <a:extLst>
+              <a:ext uri="{FF2B5EF4-FFF2-40B4-BE49-F238E27FC236}">
+                <a16:creationId xmlns:a16="http://schemas.microsoft.com/office/drawing/2014/main" id="{CF7EF238-5E5E-4E90-B8F2-A651811A1352}"/>
+              </a:ext>
+            </a:extLst>
+          </p:cNvPr>
+          <p:cNvCxnSpPr/>
+          <p:nvPr/>
+        </p:nvCxnSpPr>
+        <p:spPr>
+          <a:xfrm>
+            <a:off x="3335628" y="3142115"/>
+            <a:ext cx="3181082" cy="0"/>
+          </a:xfrm>
+          <a:prstGeom prst="straightConnector1">
+            <a:avLst/>
+          </a:prstGeom>
+          <a:ln w="28575">
+            <a:solidFill>
+              <a:schemeClr val="tx1"/>
+            </a:solidFill>
+            <a:headEnd type="triangle"/>
+            <a:tailEnd type="triangle"/>
+          </a:ln>
+        </p:spPr>
+        <p:style>
+          <a:lnRef idx="1">
+            <a:schemeClr val="accent1"/>
+          </a:lnRef>
+          <a:fillRef idx="0">
+            <a:schemeClr val="accent1"/>
+          </a:fillRef>
+          <a:effectRef idx="0">
+            <a:schemeClr val="accent1"/>
+          </a:effectRef>
+          <a:fontRef idx="minor">
+            <a:schemeClr val="tx1"/>
+          </a:fontRef>
+        </p:style>
+      </p:cxnSp>
+      <p:sp>
+        <p:nvSpPr>
+          <p:cNvPr id="15" name="Rectangle 14">
+            <a:extLst>
+              <a:ext uri="{FF2B5EF4-FFF2-40B4-BE49-F238E27FC236}">
+                <a16:creationId xmlns:a16="http://schemas.microsoft.com/office/drawing/2014/main" id="{EF622F5A-7792-4884-997F-97822869CDF9}"/>
+              </a:ext>
+            </a:extLst>
+          </p:cNvPr>
+          <p:cNvSpPr/>
+          <p:nvPr/>
+        </p:nvSpPr>
+        <p:spPr>
+          <a:xfrm>
+            <a:off x="3269305" y="2667797"/>
+            <a:ext cx="3256020" cy="369332"/>
+          </a:xfrm>
+          <a:prstGeom prst="rect">
+            <a:avLst/>
+          </a:prstGeom>
+        </p:spPr>
+        <p:txBody>
+          <a:bodyPr wrap="none">
+            <a:spAutoFit/>
+          </a:bodyPr>
+          <a:lstStyle/>
+          <a:p>
+            <a:r>
+              <a:rPr lang="fr-FR" dirty="0" err="1">
+                <a:solidFill>
+                  <a:srgbClr val="24292F"/>
+                </a:solidFill>
+                <a:latin typeface="Times New Roman" panose="02020603050405020304" pitchFamily="18" charset="0"/>
+                <a:cs typeface="Times New Roman" panose="02020603050405020304" pitchFamily="18" charset="0"/>
+              </a:rPr>
+              <a:t>Bind</a:t>
+            </a:r>
+            <a:r>
+              <a:rPr lang="fr-FR" dirty="0">
+                <a:solidFill>
+                  <a:srgbClr val="24292F"/>
+                </a:solidFill>
+                <a:latin typeface="Times New Roman" panose="02020603050405020304" pitchFamily="18" charset="0"/>
+                <a:cs typeface="Times New Roman" panose="02020603050405020304" pitchFamily="18" charset="0"/>
+              </a:rPr>
+              <a:t> the application to the server</a:t>
+            </a:r>
+            <a:endParaRPr lang="fr-FR" dirty="0">
+              <a:latin typeface="Times New Roman" panose="02020603050405020304" pitchFamily="18" charset="0"/>
+              <a:cs typeface="Times New Roman" panose="02020603050405020304" pitchFamily="18" charset="0"/>
+            </a:endParaRPr>
+          </a:p>
+        </p:txBody>
+      </p:sp>
+    </p:spTree>
+    <p:extLst>
+      <p:ext uri="{BB962C8B-B14F-4D97-AF65-F5344CB8AC3E}">
+        <p14:creationId xmlns:p14="http://schemas.microsoft.com/office/powerpoint/2010/main" val="83230128"/>
+      </p:ext>
+    </p:extLst>
+  </p:cSld>
+  <p:clrMapOvr>
+    <a:masterClrMapping/>
+  </p:clrMapOvr>
+</p:sld>
+</file>
+
+<file path=ppt/slides/slide2.xml><?xml version="1.0" encoding="utf-8"?>
+<p:sld xmlns:a="http://schemas.openxmlformats.org/drawingml/2006/main" xmlns:r="http://schemas.openxmlformats.org/officeDocument/2006/relationships" xmlns:p="http://schemas.openxmlformats.org/presentationml/2006/main">
+  <p:cSld>
+    <p:spTree>
+      <p:nvGrpSpPr>
+        <p:cNvPr id="1" name=""/>
+        <p:cNvGrpSpPr/>
+        <p:nvPr/>
+      </p:nvGrpSpPr>
+      <p:grpSpPr>
+        <a:xfrm>
+          <a:off x="0" y="0"/>
+          <a:ext cx="0" cy="0"/>
+          <a:chOff x="0" y="0"/>
+          <a:chExt cx="0" cy="0"/>
+        </a:xfrm>
+      </p:grpSpPr>
+      <p:sp>
+        <p:nvSpPr>
+          <p:cNvPr id="5" name="ZoneTexte 4"/>
+          <p:cNvSpPr txBox="1"/>
+          <p:nvPr/>
+        </p:nvSpPr>
+        <p:spPr>
+          <a:xfrm>
+            <a:off x="281906" y="672943"/>
+            <a:ext cx="4969838" cy="2185214"/>
+          </a:xfrm>
+          <a:prstGeom prst="rect">
+            <a:avLst/>
+          </a:prstGeom>
+          <a:noFill/>
+        </p:spPr>
+        <p:txBody>
+          <a:bodyPr wrap="square" rtlCol="0">
+            <a:spAutoFit/>
+          </a:bodyPr>
+          <a:lstStyle/>
+          <a:p>
+            <a:r>
+              <a:rPr lang="fr-FR" sz="4000" dirty="0">
+                <a:solidFill>
+                  <a:srgbClr val="4466A0"/>
+                </a:solidFill>
+                <a:latin typeface="Arial Black" panose="020B0A04020102020204" pitchFamily="34" charset="0"/>
+                <a:ea typeface="Tahoma" panose="020B0604030504040204" pitchFamily="34" charset="0"/>
+                <a:cs typeface="Tahoma" panose="020B0604030504040204" pitchFamily="34" charset="0"/>
+              </a:rPr>
+              <a:t>I</a:t>
+            </a:r>
+            <a:r>
+              <a:rPr lang="fr-FR" sz="4000" dirty="0">
+                <a:solidFill>
+                  <a:schemeClr val="tx1">
+                    <a:lumMod val="75000"/>
+                    <a:lumOff val="25000"/>
+                  </a:schemeClr>
+                </a:solidFill>
+                <a:latin typeface="Arial Black" panose="020B0A04020102020204" pitchFamily="34" charset="0"/>
+                <a:ea typeface="Tahoma" panose="020B0604030504040204" pitchFamily="34" charset="0"/>
+                <a:cs typeface="Tahoma" panose="020B0604030504040204" pitchFamily="34" charset="0"/>
+              </a:rPr>
+              <a:t>-Track</a:t>
+            </a:r>
+          </a:p>
+          <a:p>
+            <a:endParaRPr lang="fr-FR" sz="3200" dirty="0">
+              <a:solidFill>
+                <a:schemeClr val="tx1">
+                  <a:lumMod val="75000"/>
+                  <a:lumOff val="25000"/>
+                </a:schemeClr>
+              </a:solidFill>
+              <a:latin typeface="Arial Black" panose="020B0A04020102020204" pitchFamily="34" charset="0"/>
+              <a:ea typeface="Tahoma" panose="020B0604030504040204" pitchFamily="34" charset="0"/>
+              <a:cs typeface="Tahoma" panose="020B0604030504040204" pitchFamily="34" charset="0"/>
+            </a:endParaRPr>
+          </a:p>
+          <a:p>
+            <a:r>
+              <a:rPr lang="en-US" sz="3200" dirty="0">
+                <a:solidFill>
+                  <a:schemeClr val="tx1">
+                    <a:lumMod val="75000"/>
+                    <a:lumOff val="25000"/>
+                  </a:schemeClr>
+                </a:solidFill>
+                <a:latin typeface="Arial Black" panose="020B0A04020102020204" pitchFamily="34" charset="0"/>
+                <a:ea typeface="Tahoma" panose="020B0604030504040204" pitchFamily="34" charset="0"/>
+                <a:cs typeface="Tahoma" panose="020B0604030504040204" pitchFamily="34" charset="0"/>
+              </a:rPr>
+              <a:t>B</a:t>
+            </a:r>
+            <a:r>
+              <a:rPr lang="fr-FR" sz="3200" dirty="0" err="1">
+                <a:solidFill>
+                  <a:schemeClr val="tx1">
+                    <a:lumMod val="75000"/>
+                    <a:lumOff val="25000"/>
+                  </a:schemeClr>
+                </a:solidFill>
+                <a:latin typeface="Arial Black" panose="020B0A04020102020204" pitchFamily="34" charset="0"/>
+                <a:ea typeface="Tahoma" panose="020B0604030504040204" pitchFamily="34" charset="0"/>
+                <a:cs typeface="Tahoma" panose="020B0604030504040204" pitchFamily="34" charset="0"/>
+              </a:rPr>
+              <a:t>ecause</a:t>
+            </a:r>
+            <a:r>
+              <a:rPr lang="fr-FR" sz="3200" dirty="0">
+                <a:solidFill>
+                  <a:schemeClr val="tx1">
+                    <a:lumMod val="75000"/>
+                    <a:lumOff val="25000"/>
+                  </a:schemeClr>
+                </a:solidFill>
+                <a:latin typeface="Arial Black" panose="020B0A04020102020204" pitchFamily="34" charset="0"/>
+                <a:ea typeface="Tahoma" panose="020B0604030504040204" pitchFamily="34" charset="0"/>
+                <a:cs typeface="Tahoma" panose="020B0604030504040204" pitchFamily="34" charset="0"/>
+              </a:rPr>
+              <a:t> </a:t>
+            </a:r>
+            <a:r>
+              <a:rPr lang="fr-FR" sz="3200" dirty="0" err="1">
+                <a:solidFill>
+                  <a:schemeClr val="tx1">
+                    <a:lumMod val="75000"/>
+                    <a:lumOff val="25000"/>
+                  </a:schemeClr>
+                </a:solidFill>
+                <a:latin typeface="Arial Black" panose="020B0A04020102020204" pitchFamily="34" charset="0"/>
+                <a:ea typeface="Tahoma" panose="020B0604030504040204" pitchFamily="34" charset="0"/>
+                <a:cs typeface="Tahoma" panose="020B0604030504040204" pitchFamily="34" charset="0"/>
+              </a:rPr>
+              <a:t>we</a:t>
+            </a:r>
+            <a:r>
+              <a:rPr lang="fr-FR" sz="3200" dirty="0">
+                <a:solidFill>
+                  <a:schemeClr val="tx1">
+                    <a:lumMod val="75000"/>
+                    <a:lumOff val="25000"/>
+                  </a:schemeClr>
+                </a:solidFill>
+                <a:latin typeface="Arial Black" panose="020B0A04020102020204" pitchFamily="34" charset="0"/>
+                <a:ea typeface="Tahoma" panose="020B0604030504040204" pitchFamily="34" charset="0"/>
+                <a:cs typeface="Tahoma" panose="020B0604030504040204" pitchFamily="34" charset="0"/>
+              </a:rPr>
+              <a:t> </a:t>
+            </a:r>
+            <a:r>
+              <a:rPr lang="fr-FR" sz="3200" dirty="0" err="1">
+                <a:solidFill>
+                  <a:schemeClr val="tx1">
+                    <a:lumMod val="75000"/>
+                    <a:lumOff val="25000"/>
+                  </a:schemeClr>
+                </a:solidFill>
+                <a:latin typeface="Arial Black" panose="020B0A04020102020204" pitchFamily="34" charset="0"/>
+                <a:ea typeface="Tahoma" panose="020B0604030504040204" pitchFamily="34" charset="0"/>
+                <a:cs typeface="Tahoma" panose="020B0604030504040204" pitchFamily="34" charset="0"/>
+              </a:rPr>
+              <a:t>track</a:t>
+            </a:r>
+            <a:r>
+              <a:rPr lang="fr-FR" sz="3200" dirty="0">
+                <a:solidFill>
+                  <a:schemeClr val="tx1">
+                    <a:lumMod val="75000"/>
+                    <a:lumOff val="25000"/>
+                  </a:schemeClr>
+                </a:solidFill>
+                <a:latin typeface="Arial Black" panose="020B0A04020102020204" pitchFamily="34" charset="0"/>
+                <a:ea typeface="Tahoma" panose="020B0604030504040204" pitchFamily="34" charset="0"/>
+                <a:cs typeface="Tahoma" panose="020B0604030504040204" pitchFamily="34" charset="0"/>
+              </a:rPr>
+              <a:t> </a:t>
+            </a:r>
+            <a:r>
+              <a:rPr lang="fr-FR" sz="3200" dirty="0" err="1">
+                <a:solidFill>
+                  <a:schemeClr val="tx1">
+                    <a:lumMod val="75000"/>
+                    <a:lumOff val="25000"/>
+                  </a:schemeClr>
+                </a:solidFill>
+                <a:latin typeface="Arial Black" panose="020B0A04020102020204" pitchFamily="34" charset="0"/>
+                <a:ea typeface="Tahoma" panose="020B0604030504040204" pitchFamily="34" charset="0"/>
+                <a:cs typeface="Tahoma" panose="020B0604030504040204" pitchFamily="34" charset="0"/>
+              </a:rPr>
+              <a:t>it</a:t>
+            </a:r>
+            <a:r>
+              <a:rPr lang="fr-FR" sz="3200" dirty="0">
+                <a:solidFill>
+                  <a:schemeClr val="tx1">
+                    <a:lumMod val="75000"/>
+                    <a:lumOff val="25000"/>
+                  </a:schemeClr>
+                </a:solidFill>
+                <a:latin typeface="Arial Black" panose="020B0A04020102020204" pitchFamily="34" charset="0"/>
+                <a:ea typeface="Tahoma" panose="020B0604030504040204" pitchFamily="34" charset="0"/>
+                <a:cs typeface="Tahoma" panose="020B0604030504040204" pitchFamily="34" charset="0"/>
+              </a:rPr>
+              <a:t> </a:t>
+            </a:r>
+          </a:p>
+          <a:p>
+            <a:r>
+              <a:rPr lang="fr-FR" sz="3200" dirty="0">
+                <a:solidFill>
+                  <a:schemeClr val="tx1">
+                    <a:lumMod val="75000"/>
+                    <a:lumOff val="25000"/>
+                  </a:schemeClr>
+                </a:solidFill>
+                <a:latin typeface="Arial Black" panose="020B0A04020102020204" pitchFamily="34" charset="0"/>
+                <a:ea typeface="Tahoma" panose="020B0604030504040204" pitchFamily="34" charset="0"/>
+                <a:cs typeface="Tahoma" panose="020B0604030504040204" pitchFamily="34" charset="0"/>
+              </a:rPr>
+              <a:t>for You</a:t>
+            </a:r>
+            <a:endParaRPr lang="en-US" sz="3200" dirty="0">
+              <a:solidFill>
+                <a:schemeClr val="tx1">
+                  <a:lumMod val="75000"/>
+                  <a:lumOff val="25000"/>
+                </a:schemeClr>
+              </a:solidFill>
+              <a:latin typeface="Arial Black" panose="020B0A04020102020204" pitchFamily="34" charset="0"/>
+              <a:ea typeface="Tahoma" panose="020B0604030504040204" pitchFamily="34" charset="0"/>
+              <a:cs typeface="Tahoma" panose="020B0604030504040204" pitchFamily="34" charset="0"/>
+            </a:endParaRPr>
+          </a:p>
+        </p:txBody>
+      </p:sp>
+      <p:sp>
+        <p:nvSpPr>
+          <p:cNvPr id="22" name="Ellipse 21">
+            <a:extLst>
+              <a:ext uri="{FF2B5EF4-FFF2-40B4-BE49-F238E27FC236}">
+                <a16:creationId xmlns:a16="http://schemas.microsoft.com/office/drawing/2014/main" id="{069FC104-74F1-48BD-8127-A4367084A6DD}"/>
+              </a:ext>
+            </a:extLst>
+          </p:cNvPr>
+          <p:cNvSpPr/>
+          <p:nvPr/>
+        </p:nvSpPr>
+        <p:spPr>
+          <a:xfrm>
+            <a:off x="6363102" y="-3625515"/>
+            <a:ext cx="11513418" cy="10483515"/>
+          </a:xfrm>
+          <a:prstGeom prst="ellipse">
+            <a:avLst/>
+          </a:prstGeom>
+          <a:noFill/>
+          <a:ln w="9525" cap="flat" cmpd="sng" algn="ctr">
+            <a:solidFill>
+              <a:srgbClr val="4466A0"/>
+            </a:solidFill>
+            <a:prstDash val="solid"/>
+            <a:round/>
+            <a:headEnd type="none" w="med" len="med"/>
+            <a:tailEnd type="none" w="med" len="med"/>
+          </a:ln>
+        </p:spPr>
+        <p:style>
+          <a:lnRef idx="0">
+            <a:scrgbClr r="0" g="0" b="0"/>
+          </a:lnRef>
+          <a:fillRef idx="0">
+            <a:scrgbClr r="0" g="0" b="0"/>
+          </a:fillRef>
+          <a:effectRef idx="0">
+            <a:scrgbClr r="0" g="0" b="0"/>
+          </a:effectRef>
+          <a:fontRef idx="minor">
+            <a:schemeClr val="dk1"/>
+          </a:fontRef>
+        </p:style>
+        <p:txBody>
+          <a:bodyPr rtlCol="0" anchor="ctr"/>
+          <a:lstStyle/>
+          <a:p>
+            <a:pPr algn="ctr"/>
+            <a:endParaRPr lang="en-US"/>
+          </a:p>
+        </p:txBody>
+      </p:sp>
+      <p:sp>
+        <p:nvSpPr>
+          <p:cNvPr id="23" name="Rectangle à coins arrondis 11">
+            <a:extLst>
+              <a:ext uri="{FF2B5EF4-FFF2-40B4-BE49-F238E27FC236}">
+                <a16:creationId xmlns:a16="http://schemas.microsoft.com/office/drawing/2014/main" id="{1EE54939-D0FE-423F-AEC9-92E5C03099D8}"/>
+              </a:ext>
+            </a:extLst>
+          </p:cNvPr>
+          <p:cNvSpPr/>
+          <p:nvPr/>
+        </p:nvSpPr>
+        <p:spPr>
+          <a:xfrm rot="1756744">
+            <a:off x="6143446" y="2303088"/>
+            <a:ext cx="775855" cy="775855"/>
+          </a:xfrm>
+          <a:prstGeom prst="roundRect">
+            <a:avLst>
+              <a:gd name="adj" fmla="val 26301"/>
+            </a:avLst>
+          </a:prstGeom>
+          <a:solidFill>
+            <a:srgbClr val="4466A0"/>
+          </a:solidFill>
+          <a:ln>
+            <a:noFill/>
+          </a:ln>
+        </p:spPr>
+        <p:style>
+          <a:lnRef idx="2">
+            <a:schemeClr val="accent1">
+              <a:shade val="50000"/>
+            </a:schemeClr>
+          </a:lnRef>
+          <a:fillRef idx="1">
+            <a:schemeClr val="accent1"/>
+          </a:fillRef>
+          <a:effectRef idx="0">
+            <a:schemeClr val="accent1"/>
+          </a:effectRef>
+          <a:fontRef idx="minor">
+            <a:schemeClr val="lt1"/>
+          </a:fontRef>
+        </p:style>
+        <p:txBody>
+          <a:bodyPr rtlCol="0" anchor="ctr"/>
+          <a:lstStyle/>
+          <a:p>
+            <a:pPr algn="ctr"/>
+            <a:endParaRPr lang="en-US" dirty="0"/>
+          </a:p>
+        </p:txBody>
+      </p:sp>
+      <p:sp>
+        <p:nvSpPr>
+          <p:cNvPr id="24" name="Rectangle à coins arrondis 12">
+            <a:extLst>
+              <a:ext uri="{FF2B5EF4-FFF2-40B4-BE49-F238E27FC236}">
+                <a16:creationId xmlns:a16="http://schemas.microsoft.com/office/drawing/2014/main" id="{7B083DF8-9B0F-4731-BB70-D4517A89F7ED}"/>
+              </a:ext>
+            </a:extLst>
+          </p:cNvPr>
+          <p:cNvSpPr/>
+          <p:nvPr/>
+        </p:nvSpPr>
+        <p:spPr>
+          <a:xfrm rot="19168094">
+            <a:off x="6348492" y="3788050"/>
+            <a:ext cx="365760" cy="365760"/>
+          </a:xfrm>
+          <a:prstGeom prst="roundRect">
+            <a:avLst>
+              <a:gd name="adj" fmla="val 26301"/>
+            </a:avLst>
+          </a:prstGeom>
+          <a:gradFill flip="none" rotWithShape="1">
+            <a:gsLst>
+              <a:gs pos="0">
+                <a:srgbClr val="4466A0">
+                  <a:shade val="30000"/>
+                  <a:satMod val="115000"/>
+                </a:srgbClr>
+              </a:gs>
+              <a:gs pos="50000">
+                <a:srgbClr val="4466A0">
+                  <a:shade val="67500"/>
+                  <a:satMod val="115000"/>
+                </a:srgbClr>
+              </a:gs>
+              <a:gs pos="100000">
+                <a:srgbClr val="4466A0">
+                  <a:shade val="100000"/>
+                  <a:satMod val="115000"/>
+                </a:srgbClr>
+              </a:gs>
+            </a:gsLst>
+            <a:lin ang="5400000" scaled="1"/>
+            <a:tileRect/>
+          </a:gradFill>
+          <a:ln>
+            <a:noFill/>
+          </a:ln>
+        </p:spPr>
+        <p:style>
+          <a:lnRef idx="2">
+            <a:schemeClr val="accent1">
+              <a:shade val="50000"/>
+            </a:schemeClr>
+          </a:lnRef>
+          <a:fillRef idx="1">
+            <a:schemeClr val="accent1"/>
+          </a:fillRef>
+          <a:effectRef idx="0">
+            <a:schemeClr val="accent1"/>
+          </a:effectRef>
+          <a:fontRef idx="minor">
+            <a:schemeClr val="lt1"/>
+          </a:fontRef>
+        </p:style>
+        <p:txBody>
+          <a:bodyPr rtlCol="0" anchor="ctr"/>
+          <a:lstStyle/>
+          <a:p>
+            <a:pPr algn="ctr"/>
+            <a:endParaRPr lang="en-US"/>
+          </a:p>
+        </p:txBody>
+      </p:sp>
+      <p:pic>
+        <p:nvPicPr>
+          <p:cNvPr id="4" name="Image 3">
+            <a:extLst>
+              <a:ext uri="{FF2B5EF4-FFF2-40B4-BE49-F238E27FC236}">
+                <a16:creationId xmlns:a16="http://schemas.microsoft.com/office/drawing/2014/main" id="{C782FFA9-F00D-42CE-910C-58DCF33D1A93}"/>
+              </a:ext>
+            </a:extLst>
+          </p:cNvPr>
+          <p:cNvPicPr>
+            <a:picLocks noChangeAspect="1"/>
+          </p:cNvPicPr>
+          <p:nvPr/>
+        </p:nvPicPr>
+        <p:blipFill rotWithShape="1">
+          <a:blip r:embed="rId2">
+            <a:extLst>
+              <a:ext uri="{BEBA8EAE-BF5A-486C-A8C5-ECC9F3942E4B}">
+                <a14:imgProps xmlns:a14="http://schemas.microsoft.com/office/drawing/2010/main">
+                  <a14:imgLayer r:embed="rId3">
+                    <a14:imgEffect>
+                      <a14:brightnessContrast bright="20000" contrast="-40000"/>
+                    </a14:imgEffect>
+                  </a14:imgLayer>
+                </a14:imgProps>
+              </a:ext>
+              <a:ext uri="{28A0092B-C50C-407E-A947-70E740481C1C}">
+                <a14:useLocalDpi xmlns:a14="http://schemas.microsoft.com/office/drawing/2010/main" val="0"/>
+              </a:ext>
+            </a:extLst>
+          </a:blip>
+          <a:srcRect t="8310" b="11489"/>
+          <a:stretch/>
+        </p:blipFill>
+        <p:spPr>
+          <a:xfrm>
+            <a:off x="7149040" y="78083"/>
+            <a:ext cx="3931910" cy="2780074"/>
+          </a:xfrm>
+          <a:prstGeom prst="rect">
+            <a:avLst/>
+          </a:prstGeom>
+        </p:spPr>
+      </p:pic>
+      <p:sp>
+        <p:nvSpPr>
+          <p:cNvPr id="25" name="Rectangle à coins arrondis 13">
+            <a:extLst>
+              <a:ext uri="{FF2B5EF4-FFF2-40B4-BE49-F238E27FC236}">
+                <a16:creationId xmlns:a16="http://schemas.microsoft.com/office/drawing/2014/main" id="{8D6E9728-1B1E-406A-91ED-266BCD04C663}"/>
+              </a:ext>
+            </a:extLst>
+          </p:cNvPr>
+          <p:cNvSpPr/>
+          <p:nvPr/>
+        </p:nvSpPr>
+        <p:spPr>
+          <a:xfrm rot="20048946">
+            <a:off x="6101634" y="3036020"/>
+            <a:ext cx="8638507" cy="5055609"/>
+          </a:xfrm>
+          <a:prstGeom prst="roundRect">
+            <a:avLst>
+              <a:gd name="adj" fmla="val 19890"/>
+            </a:avLst>
+          </a:prstGeom>
+          <a:gradFill flip="none" rotWithShape="1">
+            <a:gsLst>
+              <a:gs pos="0">
+                <a:srgbClr val="7FAFFF">
+                  <a:shade val="30000"/>
+                  <a:satMod val="115000"/>
+                </a:srgbClr>
+              </a:gs>
+              <a:gs pos="50000">
+                <a:srgbClr val="7FAFFF">
+                  <a:shade val="67500"/>
+                  <a:satMod val="115000"/>
+                </a:srgbClr>
+              </a:gs>
+              <a:gs pos="100000">
+                <a:srgbClr val="7FAFFF">
+                  <a:shade val="100000"/>
+                  <a:satMod val="115000"/>
+                </a:srgbClr>
+              </a:gs>
+            </a:gsLst>
+            <a:lin ang="5400000" scaled="1"/>
+            <a:tileRect/>
+          </a:gradFill>
+          <a:ln>
+            <a:solidFill>
+              <a:srgbClr val="7FAFFF"/>
+            </a:solidFill>
+          </a:ln>
+        </p:spPr>
+        <p:style>
+          <a:lnRef idx="2">
+            <a:schemeClr val="accent1">
+              <a:shade val="50000"/>
+            </a:schemeClr>
+          </a:lnRef>
+          <a:fillRef idx="1">
+            <a:schemeClr val="accent1"/>
+          </a:fillRef>
+          <a:effectRef idx="0">
+            <a:schemeClr val="accent1"/>
+          </a:effectRef>
+          <a:fontRef idx="minor">
+            <a:schemeClr val="lt1"/>
+          </a:fontRef>
+        </p:style>
+        <p:txBody>
+          <a:bodyPr rtlCol="0" anchor="ctr"/>
+          <a:lstStyle/>
+          <a:p>
+            <a:pPr algn="ctr"/>
+            <a:endParaRPr lang="en-US" dirty="0"/>
+          </a:p>
+        </p:txBody>
+      </p:sp>
+      <p:sp>
+        <p:nvSpPr>
+          <p:cNvPr id="26" name="Rectangle à coins arrondis 14">
+            <a:extLst>
+              <a:ext uri="{FF2B5EF4-FFF2-40B4-BE49-F238E27FC236}">
+                <a16:creationId xmlns:a16="http://schemas.microsoft.com/office/drawing/2014/main" id="{ED962B84-936B-405D-8FA8-14C4DA839682}"/>
+              </a:ext>
+            </a:extLst>
+          </p:cNvPr>
+          <p:cNvSpPr/>
+          <p:nvPr/>
+        </p:nvSpPr>
+        <p:spPr>
+          <a:xfrm>
+            <a:off x="7559739" y="4305093"/>
+            <a:ext cx="4385518" cy="1282907"/>
+          </a:xfrm>
+          <a:prstGeom prst="roundRect">
+            <a:avLst>
+              <a:gd name="adj" fmla="val 5790"/>
+            </a:avLst>
+          </a:prstGeom>
+          <a:solidFill>
+            <a:schemeClr val="bg1"/>
+          </a:solidFill>
+          <a:ln>
+            <a:solidFill>
+              <a:schemeClr val="accent1">
+                <a:lumMod val="75000"/>
+              </a:schemeClr>
+            </a:solidFill>
+          </a:ln>
+        </p:spPr>
+        <p:style>
+          <a:lnRef idx="2">
+            <a:schemeClr val="accent1">
+              <a:shade val="50000"/>
+            </a:schemeClr>
+          </a:lnRef>
+          <a:fillRef idx="1">
+            <a:schemeClr val="accent1"/>
+          </a:fillRef>
+          <a:effectRef idx="0">
+            <a:schemeClr val="accent1"/>
+          </a:effectRef>
+          <a:fontRef idx="minor">
+            <a:schemeClr val="lt1"/>
+          </a:fontRef>
+        </p:style>
+        <p:txBody>
+          <a:bodyPr rtlCol="0" anchor="ctr"/>
+          <a:lstStyle/>
+          <a:p>
+            <a:pPr algn="ctr"/>
+            <a:endParaRPr lang="en-US"/>
+          </a:p>
+        </p:txBody>
+      </p:sp>
+      <p:sp>
+        <p:nvSpPr>
+          <p:cNvPr id="27" name="Rectangle à coins arrondis 15">
+            <a:extLst>
+              <a:ext uri="{FF2B5EF4-FFF2-40B4-BE49-F238E27FC236}">
+                <a16:creationId xmlns:a16="http://schemas.microsoft.com/office/drawing/2014/main" id="{A19D4E44-B0B8-4F9F-AE6B-49DA2672182B}"/>
+              </a:ext>
+            </a:extLst>
+          </p:cNvPr>
+          <p:cNvSpPr/>
+          <p:nvPr/>
+        </p:nvSpPr>
+        <p:spPr>
+          <a:xfrm rot="19168094">
+            <a:off x="7669167" y="4472314"/>
+            <a:ext cx="137160" cy="137160"/>
+          </a:xfrm>
+          <a:prstGeom prst="roundRect">
+            <a:avLst>
+              <a:gd name="adj" fmla="val 26301"/>
+            </a:avLst>
+          </a:prstGeom>
+          <a:gradFill flip="none" rotWithShape="1">
+            <a:gsLst>
+              <a:gs pos="0">
+                <a:srgbClr val="7FB0FF">
+                  <a:shade val="30000"/>
+                  <a:satMod val="115000"/>
+                </a:srgbClr>
+              </a:gs>
+              <a:gs pos="50000">
+                <a:srgbClr val="7FB0FF">
+                  <a:shade val="67500"/>
+                  <a:satMod val="115000"/>
+                </a:srgbClr>
+              </a:gs>
+              <a:gs pos="100000">
+                <a:srgbClr val="7FB0FF">
+                  <a:shade val="100000"/>
+                  <a:satMod val="115000"/>
+                </a:srgbClr>
+              </a:gs>
+            </a:gsLst>
+            <a:lin ang="8100000" scaled="1"/>
+            <a:tileRect/>
+          </a:gradFill>
+          <a:ln>
+            <a:noFill/>
+          </a:ln>
+        </p:spPr>
+        <p:style>
+          <a:lnRef idx="2">
+            <a:schemeClr val="accent1">
+              <a:shade val="50000"/>
+            </a:schemeClr>
+          </a:lnRef>
+          <a:fillRef idx="1">
+            <a:schemeClr val="accent1"/>
+          </a:fillRef>
+          <a:effectRef idx="0">
+            <a:schemeClr val="accent1"/>
+          </a:effectRef>
+          <a:fontRef idx="minor">
+            <a:schemeClr val="lt1"/>
+          </a:fontRef>
+        </p:style>
+        <p:txBody>
+          <a:bodyPr rtlCol="0" anchor="ctr"/>
+          <a:lstStyle/>
+          <a:p>
+            <a:pPr algn="ctr"/>
+            <a:endParaRPr lang="en-US"/>
+          </a:p>
+        </p:txBody>
+      </p:sp>
+      <p:sp>
+        <p:nvSpPr>
+          <p:cNvPr id="28" name="ZoneTexte 27">
+            <a:extLst>
+              <a:ext uri="{FF2B5EF4-FFF2-40B4-BE49-F238E27FC236}">
+                <a16:creationId xmlns:a16="http://schemas.microsoft.com/office/drawing/2014/main" id="{D1078B9B-25BF-482C-92D8-87DEA5D15F3E}"/>
+              </a:ext>
+            </a:extLst>
+          </p:cNvPr>
+          <p:cNvSpPr txBox="1"/>
+          <p:nvPr/>
+        </p:nvSpPr>
+        <p:spPr>
+          <a:xfrm>
+            <a:off x="7846874" y="4349397"/>
+            <a:ext cx="4385518" cy="1477328"/>
+          </a:xfrm>
+          <a:prstGeom prst="rect">
+            <a:avLst/>
+          </a:prstGeom>
+          <a:noFill/>
+        </p:spPr>
+        <p:txBody>
+          <a:bodyPr wrap="square" numCol="2" rtlCol="0">
+            <a:spAutoFit/>
+          </a:bodyPr>
+          <a:lstStyle/>
+          <a:p>
+            <a:pPr>
+              <a:lnSpc>
+                <a:spcPct val="150000"/>
+              </a:lnSpc>
+            </a:pPr>
+            <a:r>
+              <a:rPr lang="fr-FR" sz="1200" b="1" dirty="0">
+                <a:latin typeface="Tahoma" panose="020B0604030504040204" pitchFamily="34" charset="0"/>
+                <a:ea typeface="Tahoma" panose="020B0604030504040204" pitchFamily="34" charset="0"/>
+                <a:cs typeface="Tahoma" panose="020B0604030504040204" pitchFamily="34" charset="0"/>
+              </a:rPr>
+              <a:t>Team : </a:t>
+            </a:r>
+          </a:p>
+          <a:p>
+            <a:pPr>
+              <a:lnSpc>
+                <a:spcPct val="150000"/>
+              </a:lnSpc>
+            </a:pPr>
+            <a:r>
+              <a:rPr lang="fr-FR" sz="1200" b="1" dirty="0">
+                <a:solidFill>
+                  <a:schemeClr val="bg2">
+                    <a:lumMod val="50000"/>
+                  </a:schemeClr>
+                </a:solidFill>
+                <a:latin typeface="Tahoma" panose="020B0604030504040204" pitchFamily="34" charset="0"/>
+                <a:ea typeface="Tahoma" panose="020B0604030504040204" pitchFamily="34" charset="0"/>
+                <a:cs typeface="Tahoma" panose="020B0604030504040204" pitchFamily="34" charset="0"/>
+              </a:rPr>
+              <a:t>Salaheddine EL BAIDOURY</a:t>
+            </a:r>
+          </a:p>
+          <a:p>
+            <a:pPr>
+              <a:lnSpc>
+                <a:spcPct val="150000"/>
+              </a:lnSpc>
+            </a:pPr>
+            <a:r>
+              <a:rPr lang="fr-FR" sz="1200" b="1" dirty="0">
+                <a:solidFill>
+                  <a:schemeClr val="bg2">
+                    <a:lumMod val="50000"/>
+                  </a:schemeClr>
+                </a:solidFill>
+                <a:latin typeface="Tahoma" panose="020B0604030504040204" pitchFamily="34" charset="0"/>
+                <a:ea typeface="Tahoma" panose="020B0604030504040204" pitchFamily="34" charset="0"/>
+                <a:cs typeface="Tahoma" panose="020B0604030504040204" pitchFamily="34" charset="0"/>
+              </a:rPr>
+              <a:t>Abdelhadi ESSABRI</a:t>
+            </a:r>
+          </a:p>
+          <a:p>
+            <a:pPr>
+              <a:lnSpc>
+                <a:spcPct val="150000"/>
+              </a:lnSpc>
+            </a:pPr>
+            <a:r>
+              <a:rPr lang="fr-FR" sz="1200" b="1" dirty="0">
+                <a:solidFill>
+                  <a:schemeClr val="bg2">
+                    <a:lumMod val="50000"/>
+                  </a:schemeClr>
+                </a:solidFill>
+                <a:latin typeface="Tahoma" panose="020B0604030504040204" pitchFamily="34" charset="0"/>
+                <a:ea typeface="Tahoma" panose="020B0604030504040204" pitchFamily="34" charset="0"/>
+                <a:cs typeface="Tahoma" panose="020B0604030504040204" pitchFamily="34" charset="0"/>
+              </a:rPr>
+              <a:t>Mohamed SAIDI</a:t>
+            </a:r>
+          </a:p>
+          <a:p>
+            <a:pPr>
+              <a:lnSpc>
+                <a:spcPct val="150000"/>
+              </a:lnSpc>
+            </a:pPr>
+            <a:endParaRPr lang="fr-FR" sz="1200" b="1" dirty="0">
+              <a:solidFill>
+                <a:schemeClr val="bg2">
+                  <a:lumMod val="50000"/>
+                </a:schemeClr>
+              </a:solidFill>
+              <a:latin typeface="Tahoma" panose="020B0604030504040204" pitchFamily="34" charset="0"/>
+              <a:ea typeface="Tahoma" panose="020B0604030504040204" pitchFamily="34" charset="0"/>
+              <a:cs typeface="Tahoma" panose="020B0604030504040204" pitchFamily="34" charset="0"/>
+            </a:endParaRPr>
+          </a:p>
+          <a:p>
+            <a:pPr>
+              <a:lnSpc>
+                <a:spcPct val="150000"/>
+              </a:lnSpc>
+            </a:pPr>
+            <a:endParaRPr lang="en-US" sz="1200" b="1" dirty="0">
+              <a:solidFill>
+                <a:schemeClr val="bg2">
+                  <a:lumMod val="50000"/>
+                </a:schemeClr>
+              </a:solidFill>
+              <a:latin typeface="Tahoma" panose="020B0604030504040204" pitchFamily="34" charset="0"/>
+              <a:ea typeface="Tahoma" panose="020B0604030504040204" pitchFamily="34" charset="0"/>
+              <a:cs typeface="Tahoma" panose="020B0604030504040204" pitchFamily="34" charset="0"/>
+            </a:endParaRPr>
+          </a:p>
+          <a:p>
+            <a:pPr>
+              <a:lnSpc>
+                <a:spcPct val="150000"/>
+              </a:lnSpc>
+            </a:pPr>
+            <a:r>
+              <a:rPr lang="en-US" sz="1200" b="1" dirty="0">
+                <a:solidFill>
+                  <a:schemeClr val="bg2">
+                    <a:lumMod val="50000"/>
+                  </a:schemeClr>
+                </a:solidFill>
+                <a:latin typeface="Tahoma" panose="020B0604030504040204" pitchFamily="34" charset="0"/>
+                <a:ea typeface="Tahoma" panose="020B0604030504040204" pitchFamily="34" charset="0"/>
+                <a:cs typeface="Tahoma" panose="020B0604030504040204" pitchFamily="34" charset="0"/>
+              </a:rPr>
+              <a:t>A</a:t>
+            </a:r>
+            <a:r>
+              <a:rPr lang="fr-FR" sz="1200" b="1" dirty="0" err="1">
+                <a:solidFill>
+                  <a:schemeClr val="bg2">
+                    <a:lumMod val="50000"/>
+                  </a:schemeClr>
+                </a:solidFill>
+                <a:latin typeface="Tahoma" panose="020B0604030504040204" pitchFamily="34" charset="0"/>
+                <a:ea typeface="Tahoma" panose="020B0604030504040204" pitchFamily="34" charset="0"/>
+                <a:cs typeface="Tahoma" panose="020B0604030504040204" pitchFamily="34" charset="0"/>
+              </a:rPr>
+              <a:t>bdelali</a:t>
+            </a:r>
+            <a:r>
+              <a:rPr lang="fr-FR" sz="1200" b="1" dirty="0">
+                <a:solidFill>
+                  <a:schemeClr val="bg2">
+                    <a:lumMod val="50000"/>
+                  </a:schemeClr>
+                </a:solidFill>
+                <a:latin typeface="Tahoma" panose="020B0604030504040204" pitchFamily="34" charset="0"/>
+                <a:ea typeface="Tahoma" panose="020B0604030504040204" pitchFamily="34" charset="0"/>
+                <a:cs typeface="Tahoma" panose="020B0604030504040204" pitchFamily="34" charset="0"/>
+              </a:rPr>
+              <a:t> JADELMOULA</a:t>
+            </a:r>
+          </a:p>
+          <a:p>
+            <a:pPr>
+              <a:lnSpc>
+                <a:spcPct val="150000"/>
+              </a:lnSpc>
+            </a:pPr>
+            <a:r>
+              <a:rPr lang="en-US" sz="1200" b="1" dirty="0">
+                <a:solidFill>
+                  <a:schemeClr val="bg2">
+                    <a:lumMod val="50000"/>
+                  </a:schemeClr>
+                </a:solidFill>
+                <a:latin typeface="Tahoma" panose="020B0604030504040204" pitchFamily="34" charset="0"/>
+                <a:ea typeface="Tahoma" panose="020B0604030504040204" pitchFamily="34" charset="0"/>
+                <a:cs typeface="Tahoma" panose="020B0604030504040204" pitchFamily="34" charset="0"/>
+              </a:rPr>
+              <a:t>C</a:t>
+            </a:r>
+            <a:r>
+              <a:rPr lang="fr-FR" sz="1200" b="1" dirty="0" err="1">
+                <a:solidFill>
+                  <a:schemeClr val="bg2">
+                    <a:lumMod val="50000"/>
+                  </a:schemeClr>
+                </a:solidFill>
+                <a:latin typeface="Tahoma" panose="020B0604030504040204" pitchFamily="34" charset="0"/>
+                <a:ea typeface="Tahoma" panose="020B0604030504040204" pitchFamily="34" charset="0"/>
+                <a:cs typeface="Tahoma" panose="020B0604030504040204" pitchFamily="34" charset="0"/>
+              </a:rPr>
+              <a:t>haimaa</a:t>
+            </a:r>
+            <a:r>
+              <a:rPr lang="fr-FR" sz="1200" b="1" dirty="0">
+                <a:solidFill>
+                  <a:schemeClr val="bg2">
+                    <a:lumMod val="50000"/>
+                  </a:schemeClr>
+                </a:solidFill>
+                <a:latin typeface="Tahoma" panose="020B0604030504040204" pitchFamily="34" charset="0"/>
+                <a:ea typeface="Tahoma" panose="020B0604030504040204" pitchFamily="34" charset="0"/>
+                <a:cs typeface="Tahoma" panose="020B0604030504040204" pitchFamily="34" charset="0"/>
+              </a:rPr>
+              <a:t> EL KABBACH</a:t>
+            </a:r>
+          </a:p>
+          <a:p>
+            <a:pPr>
+              <a:lnSpc>
+                <a:spcPct val="150000"/>
+              </a:lnSpc>
+            </a:pPr>
+            <a:r>
+              <a:rPr lang="en-US" sz="1200" b="1" dirty="0">
+                <a:solidFill>
+                  <a:schemeClr val="bg2">
+                    <a:lumMod val="50000"/>
+                  </a:schemeClr>
+                </a:solidFill>
+                <a:latin typeface="Tahoma" panose="020B0604030504040204" pitchFamily="34" charset="0"/>
+                <a:ea typeface="Tahoma" panose="020B0604030504040204" pitchFamily="34" charset="0"/>
+                <a:cs typeface="Tahoma" panose="020B0604030504040204" pitchFamily="34" charset="0"/>
+              </a:rPr>
+              <a:t>Ikram BEL ARMIA</a:t>
+            </a:r>
+            <a:endParaRPr lang="fr-FR" sz="1200" b="1" dirty="0">
+              <a:solidFill>
+                <a:schemeClr val="bg2">
+                  <a:lumMod val="50000"/>
+                </a:schemeClr>
+              </a:solidFill>
+              <a:latin typeface="Tahoma" panose="020B0604030504040204" pitchFamily="34" charset="0"/>
+              <a:ea typeface="Tahoma" panose="020B0604030504040204" pitchFamily="34" charset="0"/>
+              <a:cs typeface="Tahoma" panose="020B0604030504040204" pitchFamily="34" charset="0"/>
+            </a:endParaRPr>
+          </a:p>
+        </p:txBody>
+      </p:sp>
+      <p:pic>
+        <p:nvPicPr>
+          <p:cNvPr id="7" name="Image 6">
+            <a:extLst>
+              <a:ext uri="{FF2B5EF4-FFF2-40B4-BE49-F238E27FC236}">
+                <a16:creationId xmlns:a16="http://schemas.microsoft.com/office/drawing/2014/main" id="{4A137B9D-A25B-4D2E-B00B-5EBB95B0D353}"/>
+              </a:ext>
+            </a:extLst>
+          </p:cNvPr>
+          <p:cNvPicPr>
+            <a:picLocks noChangeAspect="1"/>
+          </p:cNvPicPr>
+          <p:nvPr/>
+        </p:nvPicPr>
+        <p:blipFill>
+          <a:blip r:embed="rId4">
+            <a:extLst>
+              <a:ext uri="{28A0092B-C50C-407E-A947-70E740481C1C}">
+                <a14:useLocalDpi xmlns:a14="http://schemas.microsoft.com/office/drawing/2010/main" val="0"/>
+              </a:ext>
+            </a:extLst>
+          </a:blip>
+          <a:stretch>
+            <a:fillRect/>
+          </a:stretch>
+        </p:blipFill>
+        <p:spPr>
+          <a:xfrm>
+            <a:off x="288090" y="6031241"/>
+            <a:ext cx="1828800" cy="668680"/>
+          </a:xfrm>
+          <a:prstGeom prst="rect">
+            <a:avLst/>
+          </a:prstGeom>
+        </p:spPr>
+      </p:pic>
+      <p:pic>
+        <p:nvPicPr>
+          <p:cNvPr id="9" name="Image 8">
+            <a:extLst>
+              <a:ext uri="{FF2B5EF4-FFF2-40B4-BE49-F238E27FC236}">
+                <a16:creationId xmlns:a16="http://schemas.microsoft.com/office/drawing/2014/main" id="{D47015DF-7A73-43B6-A004-D12297042E2A}"/>
+              </a:ext>
+            </a:extLst>
+          </p:cNvPr>
+          <p:cNvPicPr>
+            <a:picLocks noChangeAspect="1"/>
+          </p:cNvPicPr>
+          <p:nvPr/>
+        </p:nvPicPr>
+        <p:blipFill>
+          <a:blip r:embed="rId5">
+            <a:extLst>
+              <a:ext uri="{28A0092B-C50C-407E-A947-70E740481C1C}">
+                <a14:useLocalDpi xmlns:a14="http://schemas.microsoft.com/office/drawing/2010/main" val="0"/>
+              </a:ext>
+            </a:extLst>
+          </a:blip>
+          <a:stretch>
+            <a:fillRect/>
+          </a:stretch>
+        </p:blipFill>
+        <p:spPr>
+          <a:xfrm>
+            <a:off x="2527129" y="6140112"/>
+            <a:ext cx="1645920" cy="450938"/>
+          </a:xfrm>
+          <a:prstGeom prst="rect">
+            <a:avLst/>
+          </a:prstGeom>
+        </p:spPr>
+      </p:pic>
+    </p:spTree>
+    <p:extLst>
+      <p:ext uri="{BB962C8B-B14F-4D97-AF65-F5344CB8AC3E}">
+        <p14:creationId xmlns:p14="http://schemas.microsoft.com/office/powerpoint/2010/main" val="1879863132"/>
+      </p:ext>
+    </p:extLst>
+  </p:cSld>
+  <p:clrMapOvr>
+    <a:masterClrMapping/>
+  </p:clrMapOvr>
+</p:sld>
+</file>
+
+<file path=ppt/slides/slide3.xml><?xml version="1.0" encoding="utf-8"?>
+<p:sld xmlns:a="http://schemas.openxmlformats.org/drawingml/2006/main" xmlns:r="http://schemas.openxmlformats.org/officeDocument/2006/relationships" xmlns:p="http://schemas.openxmlformats.org/presentationml/2006/main">
+  <p:cSld>
+    <p:spTree>
+      <p:nvGrpSpPr>
+        <p:cNvPr id="1" name=""/>
+        <p:cNvGrpSpPr/>
+        <p:nvPr/>
+      </p:nvGrpSpPr>
+      <p:grpSpPr>
+        <a:xfrm>
+          <a:off x="0" y="0"/>
+          <a:ext cx="0" cy="0"/>
+          <a:chOff x="0" y="0"/>
+          <a:chExt cx="0" cy="0"/>
+        </a:xfrm>
+      </p:grpSpPr>
       <p:sp>
         <p:nvSpPr>
           <p:cNvPr id="2" name="Titre 1"/>
@@ -3646,7 +5260,7 @@
 </p:sld>
 </file>
 
-<file path=ppt/slides/slide2.xml><?xml version="1.0" encoding="utf-8"?>
+<file path=ppt/slides/slide4.xml><?xml version="1.0" encoding="utf-8"?>
 <p:sld xmlns:a="http://schemas.openxmlformats.org/drawingml/2006/main" xmlns:r="http://schemas.openxmlformats.org/officeDocument/2006/relationships" xmlns:p="http://schemas.openxmlformats.org/presentationml/2006/main">
   <p:cSld>
     <p:spTree>
@@ -5787,7 +7401,219 @@
 </p:sld>
 </file>
 
-<file path=ppt/slides/slide3.xml><?xml version="1.0" encoding="utf-8"?>
+<file path=ppt/slides/slide5.xml><?xml version="1.0" encoding="utf-8"?>
+<p:sld xmlns:a="http://schemas.openxmlformats.org/drawingml/2006/main" xmlns:r="http://schemas.openxmlformats.org/officeDocument/2006/relationships" xmlns:p="http://schemas.openxmlformats.org/presentationml/2006/main">
+  <p:cSld>
+    <p:spTree>
+      <p:nvGrpSpPr>
+        <p:cNvPr id="1" name=""/>
+        <p:cNvGrpSpPr/>
+        <p:nvPr/>
+      </p:nvGrpSpPr>
+      <p:grpSpPr>
+        <a:xfrm>
+          <a:off x="0" y="0"/>
+          <a:ext cx="0" cy="0"/>
+          <a:chOff x="0" y="0"/>
+          <a:chExt cx="0" cy="0"/>
+        </a:xfrm>
+      </p:grpSpPr>
+      <p:pic>
+        <p:nvPicPr>
+          <p:cNvPr id="5" name="Image 4">
+            <a:extLst>
+              <a:ext uri="{FF2B5EF4-FFF2-40B4-BE49-F238E27FC236}">
+                <a16:creationId xmlns:a16="http://schemas.microsoft.com/office/drawing/2014/main" id="{C8828942-BE6A-40E0-9566-976FBE6A5B42}"/>
+              </a:ext>
+            </a:extLst>
+          </p:cNvPr>
+          <p:cNvPicPr>
+            <a:picLocks noChangeAspect="1"/>
+          </p:cNvPicPr>
+          <p:nvPr/>
+        </p:nvPicPr>
+        <p:blipFill>
+          <a:blip r:embed="rId2">
+            <a:extLst>
+              <a:ext uri="{28A0092B-C50C-407E-A947-70E740481C1C}">
+                <a14:useLocalDpi xmlns:a14="http://schemas.microsoft.com/office/drawing/2010/main" val="0"/>
+              </a:ext>
+            </a:extLst>
+          </a:blip>
+          <a:stretch>
+            <a:fillRect/>
+          </a:stretch>
+        </p:blipFill>
+        <p:spPr>
+          <a:xfrm>
+            <a:off x="471689" y="1541816"/>
+            <a:ext cx="2194560" cy="2194560"/>
+          </a:xfrm>
+          <a:prstGeom prst="parallelogram">
+            <a:avLst>
+              <a:gd name="adj" fmla="val 12089"/>
+            </a:avLst>
+          </a:prstGeom>
+        </p:spPr>
+      </p:pic>
+      <p:pic>
+        <p:nvPicPr>
+          <p:cNvPr id="7" name="Image 6">
+            <a:extLst>
+              <a:ext uri="{FF2B5EF4-FFF2-40B4-BE49-F238E27FC236}">
+                <a16:creationId xmlns:a16="http://schemas.microsoft.com/office/drawing/2014/main" id="{BD615EAD-343B-4C07-89E6-44C900B1D801}"/>
+              </a:ext>
+            </a:extLst>
+          </p:cNvPr>
+          <p:cNvPicPr>
+            <a:picLocks noChangeAspect="1"/>
+          </p:cNvPicPr>
+          <p:nvPr/>
+        </p:nvPicPr>
+        <p:blipFill>
+          <a:blip r:embed="rId3">
+            <a:extLst>
+              <a:ext uri="{28A0092B-C50C-407E-A947-70E740481C1C}">
+                <a14:useLocalDpi xmlns:a14="http://schemas.microsoft.com/office/drawing/2010/main" val="0"/>
+              </a:ext>
+            </a:extLst>
+          </a:blip>
+          <a:stretch>
+            <a:fillRect/>
+          </a:stretch>
+        </p:blipFill>
+        <p:spPr>
+          <a:xfrm>
+            <a:off x="3510647" y="1541816"/>
+            <a:ext cx="2194560" cy="2194560"/>
+          </a:xfrm>
+          <a:prstGeom prst="ellipse">
+            <a:avLst/>
+          </a:prstGeom>
+        </p:spPr>
+      </p:pic>
+      <p:pic>
+        <p:nvPicPr>
+          <p:cNvPr id="9" name="Image 8">
+            <a:extLst>
+              <a:ext uri="{FF2B5EF4-FFF2-40B4-BE49-F238E27FC236}">
+                <a16:creationId xmlns:a16="http://schemas.microsoft.com/office/drawing/2014/main" id="{3795AD88-E386-40AE-8470-5E3E9C11DA10}"/>
+              </a:ext>
+            </a:extLst>
+          </p:cNvPr>
+          <p:cNvPicPr>
+            <a:picLocks noChangeAspect="1"/>
+          </p:cNvPicPr>
+          <p:nvPr/>
+        </p:nvPicPr>
+        <p:blipFill>
+          <a:blip r:embed="rId4">
+            <a:extLst>
+              <a:ext uri="{28A0092B-C50C-407E-A947-70E740481C1C}">
+                <a14:useLocalDpi xmlns:a14="http://schemas.microsoft.com/office/drawing/2010/main" val="0"/>
+              </a:ext>
+            </a:extLst>
+          </a:blip>
+          <a:stretch>
+            <a:fillRect/>
+          </a:stretch>
+        </p:blipFill>
+        <p:spPr>
+          <a:xfrm>
+            <a:off x="6486795" y="1541816"/>
+            <a:ext cx="2194560" cy="2194560"/>
+          </a:xfrm>
+          <a:prstGeom prst="ellipse">
+            <a:avLst/>
+          </a:prstGeom>
+        </p:spPr>
+      </p:pic>
+      <p:pic>
+        <p:nvPicPr>
+          <p:cNvPr id="11" name="Image 10">
+            <a:extLst>
+              <a:ext uri="{FF2B5EF4-FFF2-40B4-BE49-F238E27FC236}">
+                <a16:creationId xmlns:a16="http://schemas.microsoft.com/office/drawing/2014/main" id="{B0385FD6-D593-4AC8-8F20-60A12DF61555}"/>
+              </a:ext>
+            </a:extLst>
+          </p:cNvPr>
+          <p:cNvPicPr>
+            <a:picLocks noChangeAspect="1"/>
+          </p:cNvPicPr>
+          <p:nvPr/>
+        </p:nvPicPr>
+        <p:blipFill>
+          <a:blip r:embed="rId5">
+            <a:extLst>
+              <a:ext uri="{28A0092B-C50C-407E-A947-70E740481C1C}">
+                <a14:useLocalDpi xmlns:a14="http://schemas.microsoft.com/office/drawing/2010/main" val="0"/>
+              </a:ext>
+            </a:extLst>
+          </a:blip>
+          <a:stretch>
+            <a:fillRect/>
+          </a:stretch>
+        </p:blipFill>
+        <p:spPr>
+          <a:xfrm>
+            <a:off x="9462943" y="1540585"/>
+            <a:ext cx="2190750" cy="2190750"/>
+          </a:xfrm>
+          <a:prstGeom prst="ellipse">
+            <a:avLst/>
+          </a:prstGeom>
+        </p:spPr>
+      </p:pic>
+      <p:pic>
+        <p:nvPicPr>
+          <p:cNvPr id="13" name="Image 12">
+            <a:extLst>
+              <a:ext uri="{FF2B5EF4-FFF2-40B4-BE49-F238E27FC236}">
+                <a16:creationId xmlns:a16="http://schemas.microsoft.com/office/drawing/2014/main" id="{7FD2E9B5-9858-41E5-BA85-D38FEB54BA1E}"/>
+              </a:ext>
+            </a:extLst>
+          </p:cNvPr>
+          <p:cNvPicPr>
+            <a:picLocks noChangeAspect="1"/>
+          </p:cNvPicPr>
+          <p:nvPr/>
+        </p:nvPicPr>
+        <p:blipFill>
+          <a:blip r:embed="rId6">
+            <a:extLst>
+              <a:ext uri="{28A0092B-C50C-407E-A947-70E740481C1C}">
+                <a14:useLocalDpi xmlns:a14="http://schemas.microsoft.com/office/drawing/2010/main" val="0"/>
+              </a:ext>
+            </a:extLst>
+          </a:blip>
+          <a:stretch>
+            <a:fillRect/>
+          </a:stretch>
+        </p:blipFill>
+        <p:spPr>
+          <a:xfrm>
+            <a:off x="2055791" y="4334814"/>
+            <a:ext cx="2194560" cy="2194560"/>
+          </a:xfrm>
+          <a:prstGeom prst="ellipse">
+            <a:avLst/>
+          </a:prstGeom>
+        </p:spPr>
+      </p:pic>
+    </p:spTree>
+    <p:extLst>
+      <p:ext uri="{BB962C8B-B14F-4D97-AF65-F5344CB8AC3E}">
+        <p14:creationId xmlns:p14="http://schemas.microsoft.com/office/powerpoint/2010/main" val="1843387703"/>
+      </p:ext>
+    </p:extLst>
+  </p:cSld>
+  <p:clrMapOvr>
+    <a:masterClrMapping/>
+  </p:clrMapOvr>
+</p:sld>
+</file>
+
+<file path=ppt/slides/slide6.xml><?xml version="1.0" encoding="utf-8"?>
 <p:sld xmlns:a="http://schemas.openxmlformats.org/drawingml/2006/main" xmlns:r="http://schemas.openxmlformats.org/officeDocument/2006/relationships" xmlns:p="http://schemas.openxmlformats.org/presentationml/2006/main">
   <p:cSld>
     <p:spTree>
@@ -8730,7 +10556,7 @@
 </p:sld>
 </file>
 
-<file path=ppt/slides/slide4.xml><?xml version="1.0" encoding="utf-8"?>
+<file path=ppt/slides/slide7.xml><?xml version="1.0" encoding="utf-8"?>
 <p:sld xmlns:a="http://schemas.openxmlformats.org/drawingml/2006/main" xmlns:r="http://schemas.openxmlformats.org/officeDocument/2006/relationships" xmlns:p="http://schemas.openxmlformats.org/presentationml/2006/main">
   <p:cSld>
     <p:spTree>
@@ -15057,7 +16883,7 @@
 </p:sld>
 </file>
 
-<file path=ppt/slides/slide5.xml><?xml version="1.0" encoding="utf-8"?>
+<file path=ppt/slides/slide8.xml><?xml version="1.0" encoding="utf-8"?>
 <p:sld xmlns:a="http://schemas.openxmlformats.org/drawingml/2006/main" xmlns:r="http://schemas.openxmlformats.org/officeDocument/2006/relationships" xmlns:p="http://schemas.openxmlformats.org/presentationml/2006/main">
   <p:cSld>
     <p:spTree>
@@ -15328,7 +17154,7 @@
 </p:sld>
 </file>
 
-<file path=ppt/slides/slide6.xml><?xml version="1.0" encoding="utf-8"?>
+<file path=ppt/slides/slide9.xml><?xml version="1.0" encoding="utf-8"?>
 <p:sld xmlns:a="http://schemas.openxmlformats.org/drawingml/2006/main" xmlns:r="http://schemas.openxmlformats.org/officeDocument/2006/relationships" xmlns:p="http://schemas.openxmlformats.org/presentationml/2006/main">
   <p:cSld>
     <p:spTree>
@@ -15616,570 +17442,6 @@
     <p:extLst>
       <p:ext uri="{BB962C8B-B14F-4D97-AF65-F5344CB8AC3E}">
         <p14:creationId xmlns:p14="http://schemas.microsoft.com/office/powerpoint/2010/main" val="2052349678"/>
-      </p:ext>
-    </p:extLst>
-  </p:cSld>
-  <p:clrMapOvr>
-    <a:masterClrMapping/>
-  </p:clrMapOvr>
-</p:sld>
-</file>
-
-<file path=ppt/slides/slide7.xml><?xml version="1.0" encoding="utf-8"?>
-<p:sld xmlns:a="http://schemas.openxmlformats.org/drawingml/2006/main" xmlns:r="http://schemas.openxmlformats.org/officeDocument/2006/relationships" xmlns:p="http://schemas.openxmlformats.org/presentationml/2006/main">
-  <p:cSld>
-    <p:spTree>
-      <p:nvGrpSpPr>
-        <p:cNvPr id="1" name=""/>
-        <p:cNvGrpSpPr/>
-        <p:nvPr/>
-      </p:nvGrpSpPr>
-      <p:grpSpPr>
-        <a:xfrm>
-          <a:off x="0" y="0"/>
-          <a:ext cx="0" cy="0"/>
-          <a:chOff x="0" y="0"/>
-          <a:chExt cx="0" cy="0"/>
-        </a:xfrm>
-      </p:grpSpPr>
-      <p:pic>
-        <p:nvPicPr>
-          <p:cNvPr id="5" name="Picture 4">
-            <a:extLst>
-              <a:ext uri="{FF2B5EF4-FFF2-40B4-BE49-F238E27FC236}">
-                <a16:creationId xmlns:a16="http://schemas.microsoft.com/office/drawing/2014/main" id="{94097EE7-94DD-4E24-9003-3241EDB20939}"/>
-              </a:ext>
-            </a:extLst>
-          </p:cNvPr>
-          <p:cNvPicPr>
-            <a:picLocks noChangeAspect="1"/>
-          </p:cNvPicPr>
-          <p:nvPr/>
-        </p:nvPicPr>
-        <p:blipFill rotWithShape="1">
-          <a:blip r:embed="rId2"/>
-          <a:srcRect t="4485"/>
-          <a:stretch/>
-        </p:blipFill>
-        <p:spPr>
-          <a:xfrm>
-            <a:off x="710408" y="758195"/>
-            <a:ext cx="10970569" cy="5891311"/>
-          </a:xfrm>
-          <a:prstGeom prst="rect">
-            <a:avLst/>
-          </a:prstGeom>
-        </p:spPr>
-      </p:pic>
-      <p:sp>
-        <p:nvSpPr>
-          <p:cNvPr id="2" name="Rectangle 1">
-            <a:extLst>
-              <a:ext uri="{FF2B5EF4-FFF2-40B4-BE49-F238E27FC236}">
-                <a16:creationId xmlns:a16="http://schemas.microsoft.com/office/drawing/2014/main" id="{33B04812-7A7A-4C77-9AC0-CEA76040736E}"/>
-              </a:ext>
-            </a:extLst>
-          </p:cNvPr>
-          <p:cNvSpPr/>
-          <p:nvPr/>
-        </p:nvSpPr>
-        <p:spPr>
-          <a:xfrm>
-            <a:off x="131193" y="196477"/>
-            <a:ext cx="4483856" cy="369332"/>
-          </a:xfrm>
-          <a:prstGeom prst="rect">
-            <a:avLst/>
-          </a:prstGeom>
-        </p:spPr>
-        <p:txBody>
-          <a:bodyPr wrap="none">
-            <a:spAutoFit/>
-          </a:bodyPr>
-          <a:lstStyle/>
-          <a:p>
-            <a:r>
-              <a:rPr lang="en-US" dirty="0">
-                <a:solidFill>
-                  <a:srgbClr val="333333"/>
-                </a:solidFill>
-                <a:latin typeface="Times New Roman" panose="02020603050405020304" pitchFamily="18" charset="0"/>
-                <a:cs typeface="Times New Roman" panose="02020603050405020304" pitchFamily="18" charset="0"/>
-              </a:rPr>
-              <a:t>To see your device on map you can register on</a:t>
-            </a:r>
-            <a:endParaRPr lang="fr-FR" dirty="0">
-              <a:latin typeface="Times New Roman" panose="02020603050405020304" pitchFamily="18" charset="0"/>
-              <a:cs typeface="Times New Roman" panose="02020603050405020304" pitchFamily="18" charset="0"/>
-            </a:endParaRPr>
-          </a:p>
-        </p:txBody>
-      </p:sp>
-      <p:sp>
-        <p:nvSpPr>
-          <p:cNvPr id="6" name="Rectangle 5">
-            <a:extLst>
-              <a:ext uri="{FF2B5EF4-FFF2-40B4-BE49-F238E27FC236}">
-                <a16:creationId xmlns:a16="http://schemas.microsoft.com/office/drawing/2014/main" id="{15371709-8667-494A-B838-999788A1DB81}"/>
-              </a:ext>
-            </a:extLst>
-          </p:cNvPr>
-          <p:cNvSpPr/>
-          <p:nvPr/>
-        </p:nvSpPr>
-        <p:spPr>
-          <a:xfrm>
-            <a:off x="4422869" y="196477"/>
-            <a:ext cx="2621874" cy="369332"/>
-          </a:xfrm>
-          <a:prstGeom prst="rect">
-            <a:avLst/>
-          </a:prstGeom>
-        </p:spPr>
-        <p:txBody>
-          <a:bodyPr wrap="square">
-            <a:spAutoFit/>
-          </a:bodyPr>
-          <a:lstStyle/>
-          <a:p>
-            <a:r>
-              <a:rPr lang="en-US" b="0" i="0" dirty="0">
-                <a:solidFill>
-                  <a:srgbClr val="333333"/>
-                </a:solidFill>
-                <a:effectLst/>
-                <a:latin typeface="Roboto"/>
-              </a:rPr>
-              <a:t> </a:t>
-            </a:r>
-            <a:r>
-              <a:rPr lang="en-US" b="0" i="0" dirty="0">
-                <a:solidFill>
-                  <a:schemeClr val="accent2"/>
-                </a:solidFill>
-                <a:effectLst/>
-                <a:latin typeface="Times New Roman" panose="02020603050405020304" pitchFamily="18" charset="0"/>
-                <a:cs typeface="Times New Roman" panose="02020603050405020304" pitchFamily="18" charset="0"/>
-              </a:rPr>
-              <a:t>http://demo.traccar.org/</a:t>
-            </a:r>
-            <a:endParaRPr lang="fr-FR" dirty="0">
-              <a:latin typeface="Times New Roman" panose="02020603050405020304" pitchFamily="18" charset="0"/>
-              <a:cs typeface="Times New Roman" panose="02020603050405020304" pitchFamily="18" charset="0"/>
-            </a:endParaRPr>
-          </a:p>
-        </p:txBody>
-      </p:sp>
-      <p:sp>
-        <p:nvSpPr>
-          <p:cNvPr id="7" name="Rectangle 6">
-            <a:extLst>
-              <a:ext uri="{FF2B5EF4-FFF2-40B4-BE49-F238E27FC236}">
-                <a16:creationId xmlns:a16="http://schemas.microsoft.com/office/drawing/2014/main" id="{575CA3F9-BF43-4B2C-A7D2-0A5638BA44B0}"/>
-              </a:ext>
-            </a:extLst>
-          </p:cNvPr>
-          <p:cNvSpPr/>
-          <p:nvPr/>
-        </p:nvSpPr>
-        <p:spPr>
-          <a:xfrm>
-            <a:off x="6715940" y="208494"/>
-            <a:ext cx="3680088" cy="369332"/>
-          </a:xfrm>
-          <a:prstGeom prst="rect">
-            <a:avLst/>
-          </a:prstGeom>
-        </p:spPr>
-        <p:txBody>
-          <a:bodyPr wrap="square">
-            <a:spAutoFit/>
-          </a:bodyPr>
-          <a:lstStyle/>
-          <a:p>
-            <a:r>
-              <a:rPr lang="en-US" b="0" i="0" dirty="0">
-                <a:solidFill>
-                  <a:srgbClr val="333333"/>
-                </a:solidFill>
-                <a:effectLst/>
-                <a:latin typeface="Times New Roman" panose="02020603050405020304" pitchFamily="18" charset="0"/>
-                <a:cs typeface="Times New Roman" panose="02020603050405020304" pitchFamily="18" charset="0"/>
-              </a:rPr>
-              <a:t>and add your device with identifier.</a:t>
-            </a:r>
-            <a:endParaRPr lang="fr-FR" dirty="0">
-              <a:latin typeface="Times New Roman" panose="02020603050405020304" pitchFamily="18" charset="0"/>
-              <a:cs typeface="Times New Roman" panose="02020603050405020304" pitchFamily="18" charset="0"/>
-            </a:endParaRPr>
-          </a:p>
-        </p:txBody>
-      </p:sp>
-    </p:spTree>
-    <p:extLst>
-      <p:ext uri="{BB962C8B-B14F-4D97-AF65-F5344CB8AC3E}">
-        <p14:creationId xmlns:p14="http://schemas.microsoft.com/office/powerpoint/2010/main" val="3570471032"/>
-      </p:ext>
-    </p:extLst>
-  </p:cSld>
-  <p:clrMapOvr>
-    <a:masterClrMapping/>
-  </p:clrMapOvr>
-</p:sld>
-</file>
-
-<file path=ppt/slides/slide8.xml><?xml version="1.0" encoding="utf-8"?>
-<p:sld xmlns:a="http://schemas.openxmlformats.org/drawingml/2006/main" xmlns:r="http://schemas.openxmlformats.org/officeDocument/2006/relationships" xmlns:p="http://schemas.openxmlformats.org/presentationml/2006/main">
-  <p:cSld>
-    <p:spTree>
-      <p:nvGrpSpPr>
-        <p:cNvPr id="1" name=""/>
-        <p:cNvGrpSpPr/>
-        <p:nvPr/>
-      </p:nvGrpSpPr>
-      <p:grpSpPr>
-        <a:xfrm>
-          <a:off x="0" y="0"/>
-          <a:ext cx="0" cy="0"/>
-          <a:chOff x="0" y="0"/>
-          <a:chExt cx="0" cy="0"/>
-        </a:xfrm>
-      </p:grpSpPr>
-      <p:sp>
-        <p:nvSpPr>
-          <p:cNvPr id="2" name="Title 1">
-            <a:extLst>
-              <a:ext uri="{FF2B5EF4-FFF2-40B4-BE49-F238E27FC236}">
-                <a16:creationId xmlns:a16="http://schemas.microsoft.com/office/drawing/2014/main" id="{3D20979F-C224-45DD-9A21-BF0CF8E7A524}"/>
-              </a:ext>
-            </a:extLst>
-          </p:cNvPr>
-          <p:cNvSpPr>
-            <a:spLocks noGrp="1"/>
-          </p:cNvSpPr>
-          <p:nvPr>
-            <p:ph type="title"/>
-          </p:nvPr>
-        </p:nvSpPr>
-        <p:spPr>
-          <a:xfrm>
-            <a:off x="155620" y="274667"/>
-            <a:ext cx="3180008" cy="1325563"/>
-          </a:xfrm>
-        </p:spPr>
-        <p:txBody>
-          <a:bodyPr/>
-          <a:lstStyle/>
-          <a:p>
-            <a:r>
-              <a:rPr lang="en-US" dirty="0">
-                <a:latin typeface="Times New Roman" panose="02020603050405020304" pitchFamily="18" charset="0"/>
-                <a:cs typeface="Times New Roman" panose="02020603050405020304" pitchFamily="18" charset="0"/>
-              </a:rPr>
-              <a:t>Current Step</a:t>
-            </a:r>
-            <a:endParaRPr lang="fr-FR" dirty="0">
-              <a:latin typeface="Times New Roman" panose="02020603050405020304" pitchFamily="18" charset="0"/>
-              <a:cs typeface="Times New Roman" panose="02020603050405020304" pitchFamily="18" charset="0"/>
-            </a:endParaRPr>
-          </a:p>
-        </p:txBody>
-      </p:sp>
-      <p:pic>
-        <p:nvPicPr>
-          <p:cNvPr id="1030" name="Picture 6" descr="Afficher l’image source">
-            <a:extLst>
-              <a:ext uri="{FF2B5EF4-FFF2-40B4-BE49-F238E27FC236}">
-                <a16:creationId xmlns:a16="http://schemas.microsoft.com/office/drawing/2014/main" id="{4D506C72-7495-492D-9C62-F747B9444F0B}"/>
-              </a:ext>
-            </a:extLst>
-          </p:cNvPr>
-          <p:cNvPicPr>
-            <a:picLocks noChangeAspect="1" noChangeArrowheads="1"/>
-          </p:cNvPicPr>
-          <p:nvPr/>
-        </p:nvPicPr>
-        <p:blipFill>
-          <a:blip r:embed="rId2">
-            <a:extLst>
-              <a:ext uri="{28A0092B-C50C-407E-A947-70E740481C1C}">
-                <a14:useLocalDpi xmlns:a14="http://schemas.microsoft.com/office/drawing/2010/main" val="0"/>
-              </a:ext>
-            </a:extLst>
-          </a:blip>
-          <a:srcRect/>
-          <a:stretch>
-            <a:fillRect/>
-          </a:stretch>
-        </p:blipFill>
-        <p:spPr bwMode="auto">
-          <a:xfrm>
-            <a:off x="6858434" y="1504186"/>
-            <a:ext cx="3857647" cy="3849627"/>
-          </a:xfrm>
-          <a:prstGeom prst="rect">
-            <a:avLst/>
-          </a:prstGeom>
-          <a:noFill/>
-          <a:extLst>
-            <a:ext uri="{909E8E84-426E-40DD-AFC4-6F175D3DCCD1}">
-              <a14:hiddenFill xmlns:a14="http://schemas.microsoft.com/office/drawing/2010/main">
-                <a:solidFill>
-                  <a:srgbClr val="FFFFFF"/>
-                </a:solidFill>
-              </a14:hiddenFill>
-            </a:ext>
-          </a:extLst>
-        </p:spPr>
-      </p:pic>
-      <p:pic>
-        <p:nvPicPr>
-          <p:cNvPr id="6" name="Graphic 5" descr="Smart Phone">
-            <a:extLst>
-              <a:ext uri="{FF2B5EF4-FFF2-40B4-BE49-F238E27FC236}">
-                <a16:creationId xmlns:a16="http://schemas.microsoft.com/office/drawing/2014/main" id="{A84BC0C8-5514-4306-A6B8-15B819A3EB3C}"/>
-              </a:ext>
-            </a:extLst>
-          </p:cNvPr>
-          <p:cNvPicPr>
-            <a:picLocks noChangeAspect="1"/>
-          </p:cNvPicPr>
-          <p:nvPr/>
-        </p:nvPicPr>
-        <p:blipFill>
-          <a:blip r:embed="rId3">
-            <a:extLst>
-              <a:ext uri="{28A0092B-C50C-407E-A947-70E740481C1C}">
-                <a14:useLocalDpi xmlns:a14="http://schemas.microsoft.com/office/drawing/2010/main" val="0"/>
-              </a:ext>
-              <a:ext uri="{96DAC541-7B7A-43D3-8B79-37D633B846F1}">
-                <asvg:svgBlip xmlns:asvg="http://schemas.microsoft.com/office/drawing/2016/SVG/main" r:embed="rId4"/>
-              </a:ext>
-            </a:extLst>
-          </a:blip>
-          <a:stretch>
-            <a:fillRect/>
-          </a:stretch>
-        </p:blipFill>
-        <p:spPr>
-          <a:xfrm>
-            <a:off x="1475919" y="2528652"/>
-            <a:ext cx="1226927" cy="1226927"/>
-          </a:xfrm>
-          <a:prstGeom prst="rect">
-            <a:avLst/>
-          </a:prstGeom>
-        </p:spPr>
-      </p:pic>
-      <p:sp>
-        <p:nvSpPr>
-          <p:cNvPr id="7" name="Rectangle 6">
-            <a:extLst>
-              <a:ext uri="{FF2B5EF4-FFF2-40B4-BE49-F238E27FC236}">
-                <a16:creationId xmlns:a16="http://schemas.microsoft.com/office/drawing/2014/main" id="{9DB97059-FE87-4E9D-B25F-B7B1A12A5528}"/>
-              </a:ext>
-            </a:extLst>
-          </p:cNvPr>
-          <p:cNvSpPr/>
-          <p:nvPr/>
-        </p:nvSpPr>
-        <p:spPr>
-          <a:xfrm>
-            <a:off x="932645" y="3965551"/>
-            <a:ext cx="2805448" cy="369332"/>
-          </a:xfrm>
-          <a:prstGeom prst="rect">
-            <a:avLst/>
-          </a:prstGeom>
-        </p:spPr>
-        <p:txBody>
-          <a:bodyPr wrap="none">
-            <a:spAutoFit/>
-          </a:bodyPr>
-          <a:lstStyle/>
-          <a:p>
-            <a:r>
-              <a:rPr lang="fr-FR" dirty="0" err="1">
-                <a:solidFill>
-                  <a:srgbClr val="24292F"/>
-                </a:solidFill>
-                <a:latin typeface="Times New Roman" panose="02020603050405020304" pitchFamily="18" charset="0"/>
-                <a:cs typeface="Times New Roman" panose="02020603050405020304" pitchFamily="18" charset="0"/>
-              </a:rPr>
-              <a:t>Traccar</a:t>
-            </a:r>
-            <a:r>
-              <a:rPr lang="fr-FR" dirty="0">
-                <a:solidFill>
-                  <a:srgbClr val="24292F"/>
-                </a:solidFill>
-                <a:latin typeface="Times New Roman" panose="02020603050405020304" pitchFamily="18" charset="0"/>
-                <a:cs typeface="Times New Roman" panose="02020603050405020304" pitchFamily="18" charset="0"/>
-              </a:rPr>
-              <a:t> Client (Application)</a:t>
-            </a:r>
-            <a:endParaRPr lang="fr-FR" dirty="0">
-              <a:latin typeface="Times New Roman" panose="02020603050405020304" pitchFamily="18" charset="0"/>
-              <a:cs typeface="Times New Roman" panose="02020603050405020304" pitchFamily="18" charset="0"/>
-            </a:endParaRPr>
-          </a:p>
-        </p:txBody>
-      </p:sp>
-      <p:sp>
-        <p:nvSpPr>
-          <p:cNvPr id="10" name="Rectangle 9">
-            <a:extLst>
-              <a:ext uri="{FF2B5EF4-FFF2-40B4-BE49-F238E27FC236}">
-                <a16:creationId xmlns:a16="http://schemas.microsoft.com/office/drawing/2014/main" id="{BF36CDF2-D11D-46DA-BB61-6D325F6CADDC}"/>
-              </a:ext>
-            </a:extLst>
-          </p:cNvPr>
-          <p:cNvSpPr/>
-          <p:nvPr/>
-        </p:nvSpPr>
-        <p:spPr>
-          <a:xfrm>
-            <a:off x="7563118" y="5637658"/>
-            <a:ext cx="2318135" cy="369332"/>
-          </a:xfrm>
-          <a:prstGeom prst="rect">
-            <a:avLst/>
-          </a:prstGeom>
-        </p:spPr>
-        <p:txBody>
-          <a:bodyPr wrap="none">
-            <a:spAutoFit/>
-          </a:bodyPr>
-          <a:lstStyle/>
-          <a:p>
-            <a:r>
-              <a:rPr lang="fr-FR" dirty="0" err="1">
-                <a:solidFill>
-                  <a:srgbClr val="24292F"/>
-                </a:solidFill>
-                <a:latin typeface="Times New Roman" panose="02020603050405020304" pitchFamily="18" charset="0"/>
-                <a:cs typeface="Times New Roman" panose="02020603050405020304" pitchFamily="18" charset="0"/>
-              </a:rPr>
-              <a:t>Traccar</a:t>
-            </a:r>
-            <a:r>
-              <a:rPr lang="fr-FR" dirty="0">
-                <a:solidFill>
-                  <a:srgbClr val="24292F"/>
-                </a:solidFill>
-                <a:latin typeface="Times New Roman" panose="02020603050405020304" pitchFamily="18" charset="0"/>
-                <a:cs typeface="Times New Roman" panose="02020603050405020304" pitchFamily="18" charset="0"/>
-              </a:rPr>
-              <a:t> Client (Server)</a:t>
-            </a:r>
-            <a:endParaRPr lang="fr-FR" dirty="0">
-              <a:latin typeface="Times New Roman" panose="02020603050405020304" pitchFamily="18" charset="0"/>
-              <a:cs typeface="Times New Roman" panose="02020603050405020304" pitchFamily="18" charset="0"/>
-            </a:endParaRPr>
-          </a:p>
-        </p:txBody>
-      </p:sp>
-      <p:cxnSp>
-        <p:nvCxnSpPr>
-          <p:cNvPr id="12" name="Straight Arrow Connector 11">
-            <a:extLst>
-              <a:ext uri="{FF2B5EF4-FFF2-40B4-BE49-F238E27FC236}">
-                <a16:creationId xmlns:a16="http://schemas.microsoft.com/office/drawing/2014/main" id="{CF7EF238-5E5E-4E90-B8F2-A651811A1352}"/>
-              </a:ext>
-            </a:extLst>
-          </p:cNvPr>
-          <p:cNvCxnSpPr/>
-          <p:nvPr/>
-        </p:nvCxnSpPr>
-        <p:spPr>
-          <a:xfrm>
-            <a:off x="3335628" y="3142115"/>
-            <a:ext cx="3181082" cy="0"/>
-          </a:xfrm>
-          <a:prstGeom prst="straightConnector1">
-            <a:avLst/>
-          </a:prstGeom>
-          <a:ln w="28575">
-            <a:solidFill>
-              <a:schemeClr val="tx1"/>
-            </a:solidFill>
-            <a:headEnd type="triangle"/>
-            <a:tailEnd type="triangle"/>
-          </a:ln>
-        </p:spPr>
-        <p:style>
-          <a:lnRef idx="1">
-            <a:schemeClr val="accent1"/>
-          </a:lnRef>
-          <a:fillRef idx="0">
-            <a:schemeClr val="accent1"/>
-          </a:fillRef>
-          <a:effectRef idx="0">
-            <a:schemeClr val="accent1"/>
-          </a:effectRef>
-          <a:fontRef idx="minor">
-            <a:schemeClr val="tx1"/>
-          </a:fontRef>
-        </p:style>
-      </p:cxnSp>
-      <p:sp>
-        <p:nvSpPr>
-          <p:cNvPr id="15" name="Rectangle 14">
-            <a:extLst>
-              <a:ext uri="{FF2B5EF4-FFF2-40B4-BE49-F238E27FC236}">
-                <a16:creationId xmlns:a16="http://schemas.microsoft.com/office/drawing/2014/main" id="{EF622F5A-7792-4884-997F-97822869CDF9}"/>
-              </a:ext>
-            </a:extLst>
-          </p:cNvPr>
-          <p:cNvSpPr/>
-          <p:nvPr/>
-        </p:nvSpPr>
-        <p:spPr>
-          <a:xfrm>
-            <a:off x="3269305" y="2667797"/>
-            <a:ext cx="3256020" cy="369332"/>
-          </a:xfrm>
-          <a:prstGeom prst="rect">
-            <a:avLst/>
-          </a:prstGeom>
-        </p:spPr>
-        <p:txBody>
-          <a:bodyPr wrap="none">
-            <a:spAutoFit/>
-          </a:bodyPr>
-          <a:lstStyle/>
-          <a:p>
-            <a:r>
-              <a:rPr lang="fr-FR" dirty="0" err="1">
-                <a:solidFill>
-                  <a:srgbClr val="24292F"/>
-                </a:solidFill>
-                <a:latin typeface="Times New Roman" panose="02020603050405020304" pitchFamily="18" charset="0"/>
-                <a:cs typeface="Times New Roman" panose="02020603050405020304" pitchFamily="18" charset="0"/>
-              </a:rPr>
-              <a:t>Bind</a:t>
-            </a:r>
-            <a:r>
-              <a:rPr lang="fr-FR" dirty="0">
-                <a:solidFill>
-                  <a:srgbClr val="24292F"/>
-                </a:solidFill>
-                <a:latin typeface="Times New Roman" panose="02020603050405020304" pitchFamily="18" charset="0"/>
-                <a:cs typeface="Times New Roman" panose="02020603050405020304" pitchFamily="18" charset="0"/>
-              </a:rPr>
-              <a:t> the application to the server</a:t>
-            </a:r>
-            <a:endParaRPr lang="fr-FR" dirty="0">
-              <a:latin typeface="Times New Roman" panose="02020603050405020304" pitchFamily="18" charset="0"/>
-              <a:cs typeface="Times New Roman" panose="02020603050405020304" pitchFamily="18" charset="0"/>
-            </a:endParaRPr>
-          </a:p>
-        </p:txBody>
-      </p:sp>
-    </p:spTree>
-    <p:extLst>
-      <p:ext uri="{BB962C8B-B14F-4D97-AF65-F5344CB8AC3E}">
-        <p14:creationId xmlns:p14="http://schemas.microsoft.com/office/powerpoint/2010/main" val="83230128"/>
       </p:ext>
     </p:extLst>
   </p:cSld>

</xml_diff>

<commit_message>
add the progress presentation v2 : [WHO ARE WE & WHAT WE DO - done]
</commit_message>
<xml_diff>
--- a/Progress' Presentations/Etat d'avancement - S1.pptx
+++ b/Progress' Presentations/Etat d'avancement - S1.pptx
@@ -5,8 +5,8 @@
     <p:sldMasterId id="2147483648" r:id="rId1"/>
   </p:sldMasterIdLst>
   <p:sldIdLst>
-    <p:sldId id="266" r:id="rId2"/>
-    <p:sldId id="267" r:id="rId3"/>
+    <p:sldId id="267" r:id="rId2"/>
+    <p:sldId id="258" r:id="rId3"/>
     <p:sldId id="262" r:id="rId4"/>
     <p:sldId id="264" r:id="rId5"/>
     <p:sldId id="265" r:id="rId6"/>
@@ -3357,600 +3357,6 @@
           <a:chExt cx="0" cy="0"/>
         </a:xfrm>
       </p:grpSpPr>
-    </p:spTree>
-    <p:extLst>
-      <p:ext uri="{BB962C8B-B14F-4D97-AF65-F5344CB8AC3E}">
-        <p14:creationId xmlns:p14="http://schemas.microsoft.com/office/powerpoint/2010/main" val="1058695649"/>
-      </p:ext>
-    </p:extLst>
-  </p:cSld>
-  <p:clrMapOvr>
-    <a:masterClrMapping/>
-  </p:clrMapOvr>
-</p:sld>
-</file>
-
-<file path=ppt/slides/slide10.xml><?xml version="1.0" encoding="utf-8"?>
-<p:sld xmlns:a="http://schemas.openxmlformats.org/drawingml/2006/main" xmlns:r="http://schemas.openxmlformats.org/officeDocument/2006/relationships" xmlns:p="http://schemas.openxmlformats.org/presentationml/2006/main">
-  <p:cSld>
-    <p:spTree>
-      <p:nvGrpSpPr>
-        <p:cNvPr id="1" name=""/>
-        <p:cNvGrpSpPr/>
-        <p:nvPr/>
-      </p:nvGrpSpPr>
-      <p:grpSpPr>
-        <a:xfrm>
-          <a:off x="0" y="0"/>
-          <a:ext cx="0" cy="0"/>
-          <a:chOff x="0" y="0"/>
-          <a:chExt cx="0" cy="0"/>
-        </a:xfrm>
-      </p:grpSpPr>
-      <p:pic>
-        <p:nvPicPr>
-          <p:cNvPr id="5" name="Picture 4">
-            <a:extLst>
-              <a:ext uri="{FF2B5EF4-FFF2-40B4-BE49-F238E27FC236}">
-                <a16:creationId xmlns:a16="http://schemas.microsoft.com/office/drawing/2014/main" id="{94097EE7-94DD-4E24-9003-3241EDB20939}"/>
-              </a:ext>
-            </a:extLst>
-          </p:cNvPr>
-          <p:cNvPicPr>
-            <a:picLocks noChangeAspect="1"/>
-          </p:cNvPicPr>
-          <p:nvPr/>
-        </p:nvPicPr>
-        <p:blipFill rotWithShape="1">
-          <a:blip r:embed="rId2"/>
-          <a:srcRect t="4485"/>
-          <a:stretch/>
-        </p:blipFill>
-        <p:spPr>
-          <a:xfrm>
-            <a:off x="710408" y="758195"/>
-            <a:ext cx="10970569" cy="5891311"/>
-          </a:xfrm>
-          <a:prstGeom prst="rect">
-            <a:avLst/>
-          </a:prstGeom>
-        </p:spPr>
-      </p:pic>
-      <p:sp>
-        <p:nvSpPr>
-          <p:cNvPr id="2" name="Rectangle 1">
-            <a:extLst>
-              <a:ext uri="{FF2B5EF4-FFF2-40B4-BE49-F238E27FC236}">
-                <a16:creationId xmlns:a16="http://schemas.microsoft.com/office/drawing/2014/main" id="{33B04812-7A7A-4C77-9AC0-CEA76040736E}"/>
-              </a:ext>
-            </a:extLst>
-          </p:cNvPr>
-          <p:cNvSpPr/>
-          <p:nvPr/>
-        </p:nvSpPr>
-        <p:spPr>
-          <a:xfrm>
-            <a:off x="131193" y="196477"/>
-            <a:ext cx="4483856" cy="369332"/>
-          </a:xfrm>
-          <a:prstGeom prst="rect">
-            <a:avLst/>
-          </a:prstGeom>
-        </p:spPr>
-        <p:txBody>
-          <a:bodyPr wrap="none">
-            <a:spAutoFit/>
-          </a:bodyPr>
-          <a:lstStyle/>
-          <a:p>
-            <a:r>
-              <a:rPr lang="en-US" dirty="0">
-                <a:solidFill>
-                  <a:srgbClr val="333333"/>
-                </a:solidFill>
-                <a:latin typeface="Times New Roman" panose="02020603050405020304" pitchFamily="18" charset="0"/>
-                <a:cs typeface="Times New Roman" panose="02020603050405020304" pitchFamily="18" charset="0"/>
-              </a:rPr>
-              <a:t>To see your device on map you can register on</a:t>
-            </a:r>
-            <a:endParaRPr lang="fr-FR" dirty="0">
-              <a:latin typeface="Times New Roman" panose="02020603050405020304" pitchFamily="18" charset="0"/>
-              <a:cs typeface="Times New Roman" panose="02020603050405020304" pitchFamily="18" charset="0"/>
-            </a:endParaRPr>
-          </a:p>
-        </p:txBody>
-      </p:sp>
-      <p:sp>
-        <p:nvSpPr>
-          <p:cNvPr id="6" name="Rectangle 5">
-            <a:extLst>
-              <a:ext uri="{FF2B5EF4-FFF2-40B4-BE49-F238E27FC236}">
-                <a16:creationId xmlns:a16="http://schemas.microsoft.com/office/drawing/2014/main" id="{15371709-8667-494A-B838-999788A1DB81}"/>
-              </a:ext>
-            </a:extLst>
-          </p:cNvPr>
-          <p:cNvSpPr/>
-          <p:nvPr/>
-        </p:nvSpPr>
-        <p:spPr>
-          <a:xfrm>
-            <a:off x="4422869" y="196477"/>
-            <a:ext cx="2621874" cy="369332"/>
-          </a:xfrm>
-          <a:prstGeom prst="rect">
-            <a:avLst/>
-          </a:prstGeom>
-        </p:spPr>
-        <p:txBody>
-          <a:bodyPr wrap="square">
-            <a:spAutoFit/>
-          </a:bodyPr>
-          <a:lstStyle/>
-          <a:p>
-            <a:r>
-              <a:rPr lang="en-US" b="0" i="0" dirty="0">
-                <a:solidFill>
-                  <a:srgbClr val="333333"/>
-                </a:solidFill>
-                <a:effectLst/>
-                <a:latin typeface="Roboto"/>
-              </a:rPr>
-              <a:t> </a:t>
-            </a:r>
-            <a:r>
-              <a:rPr lang="en-US" b="0" i="0" dirty="0">
-                <a:solidFill>
-                  <a:schemeClr val="accent2"/>
-                </a:solidFill>
-                <a:effectLst/>
-                <a:latin typeface="Times New Roman" panose="02020603050405020304" pitchFamily="18" charset="0"/>
-                <a:cs typeface="Times New Roman" panose="02020603050405020304" pitchFamily="18" charset="0"/>
-              </a:rPr>
-              <a:t>http://demo.traccar.org/</a:t>
-            </a:r>
-            <a:endParaRPr lang="fr-FR" dirty="0">
-              <a:latin typeface="Times New Roman" panose="02020603050405020304" pitchFamily="18" charset="0"/>
-              <a:cs typeface="Times New Roman" panose="02020603050405020304" pitchFamily="18" charset="0"/>
-            </a:endParaRPr>
-          </a:p>
-        </p:txBody>
-      </p:sp>
-      <p:sp>
-        <p:nvSpPr>
-          <p:cNvPr id="7" name="Rectangle 6">
-            <a:extLst>
-              <a:ext uri="{FF2B5EF4-FFF2-40B4-BE49-F238E27FC236}">
-                <a16:creationId xmlns:a16="http://schemas.microsoft.com/office/drawing/2014/main" id="{575CA3F9-BF43-4B2C-A7D2-0A5638BA44B0}"/>
-              </a:ext>
-            </a:extLst>
-          </p:cNvPr>
-          <p:cNvSpPr/>
-          <p:nvPr/>
-        </p:nvSpPr>
-        <p:spPr>
-          <a:xfrm>
-            <a:off x="6715940" y="208494"/>
-            <a:ext cx="3680088" cy="369332"/>
-          </a:xfrm>
-          <a:prstGeom prst="rect">
-            <a:avLst/>
-          </a:prstGeom>
-        </p:spPr>
-        <p:txBody>
-          <a:bodyPr wrap="square">
-            <a:spAutoFit/>
-          </a:bodyPr>
-          <a:lstStyle/>
-          <a:p>
-            <a:r>
-              <a:rPr lang="en-US" b="0" i="0" dirty="0">
-                <a:solidFill>
-                  <a:srgbClr val="333333"/>
-                </a:solidFill>
-                <a:effectLst/>
-                <a:latin typeface="Times New Roman" panose="02020603050405020304" pitchFamily="18" charset="0"/>
-                <a:cs typeface="Times New Roman" panose="02020603050405020304" pitchFamily="18" charset="0"/>
-              </a:rPr>
-              <a:t>and add your device with identifier.</a:t>
-            </a:r>
-            <a:endParaRPr lang="fr-FR" dirty="0">
-              <a:latin typeface="Times New Roman" panose="02020603050405020304" pitchFamily="18" charset="0"/>
-              <a:cs typeface="Times New Roman" panose="02020603050405020304" pitchFamily="18" charset="0"/>
-            </a:endParaRPr>
-          </a:p>
-        </p:txBody>
-      </p:sp>
-    </p:spTree>
-    <p:extLst>
-      <p:ext uri="{BB962C8B-B14F-4D97-AF65-F5344CB8AC3E}">
-        <p14:creationId xmlns:p14="http://schemas.microsoft.com/office/powerpoint/2010/main" val="3570471032"/>
-      </p:ext>
-    </p:extLst>
-  </p:cSld>
-  <p:clrMapOvr>
-    <a:masterClrMapping/>
-  </p:clrMapOvr>
-</p:sld>
-</file>
-
-<file path=ppt/slides/slide11.xml><?xml version="1.0" encoding="utf-8"?>
-<p:sld xmlns:a="http://schemas.openxmlformats.org/drawingml/2006/main" xmlns:r="http://schemas.openxmlformats.org/officeDocument/2006/relationships" xmlns:p="http://schemas.openxmlformats.org/presentationml/2006/main">
-  <p:cSld>
-    <p:spTree>
-      <p:nvGrpSpPr>
-        <p:cNvPr id="1" name=""/>
-        <p:cNvGrpSpPr/>
-        <p:nvPr/>
-      </p:nvGrpSpPr>
-      <p:grpSpPr>
-        <a:xfrm>
-          <a:off x="0" y="0"/>
-          <a:ext cx="0" cy="0"/>
-          <a:chOff x="0" y="0"/>
-          <a:chExt cx="0" cy="0"/>
-        </a:xfrm>
-      </p:grpSpPr>
-      <p:sp>
-        <p:nvSpPr>
-          <p:cNvPr id="2" name="Title 1">
-            <a:extLst>
-              <a:ext uri="{FF2B5EF4-FFF2-40B4-BE49-F238E27FC236}">
-                <a16:creationId xmlns:a16="http://schemas.microsoft.com/office/drawing/2014/main" id="{3D20979F-C224-45DD-9A21-BF0CF8E7A524}"/>
-              </a:ext>
-            </a:extLst>
-          </p:cNvPr>
-          <p:cNvSpPr>
-            <a:spLocks noGrp="1"/>
-          </p:cNvSpPr>
-          <p:nvPr>
-            <p:ph type="title"/>
-          </p:nvPr>
-        </p:nvSpPr>
-        <p:spPr>
-          <a:xfrm>
-            <a:off x="155620" y="274667"/>
-            <a:ext cx="3180008" cy="1325563"/>
-          </a:xfrm>
-        </p:spPr>
-        <p:txBody>
-          <a:bodyPr/>
-          <a:lstStyle/>
-          <a:p>
-            <a:r>
-              <a:rPr lang="en-US" dirty="0">
-                <a:latin typeface="Times New Roman" panose="02020603050405020304" pitchFamily="18" charset="0"/>
-                <a:cs typeface="Times New Roman" panose="02020603050405020304" pitchFamily="18" charset="0"/>
-              </a:rPr>
-              <a:t>Current Step</a:t>
-            </a:r>
-            <a:endParaRPr lang="fr-FR" dirty="0">
-              <a:latin typeface="Times New Roman" panose="02020603050405020304" pitchFamily="18" charset="0"/>
-              <a:cs typeface="Times New Roman" panose="02020603050405020304" pitchFamily="18" charset="0"/>
-            </a:endParaRPr>
-          </a:p>
-        </p:txBody>
-      </p:sp>
-      <p:pic>
-        <p:nvPicPr>
-          <p:cNvPr id="1030" name="Picture 6" descr="Afficher l’image source">
-            <a:extLst>
-              <a:ext uri="{FF2B5EF4-FFF2-40B4-BE49-F238E27FC236}">
-                <a16:creationId xmlns:a16="http://schemas.microsoft.com/office/drawing/2014/main" id="{4D506C72-7495-492D-9C62-F747B9444F0B}"/>
-              </a:ext>
-            </a:extLst>
-          </p:cNvPr>
-          <p:cNvPicPr>
-            <a:picLocks noChangeAspect="1" noChangeArrowheads="1"/>
-          </p:cNvPicPr>
-          <p:nvPr/>
-        </p:nvPicPr>
-        <p:blipFill>
-          <a:blip r:embed="rId2">
-            <a:extLst>
-              <a:ext uri="{28A0092B-C50C-407E-A947-70E740481C1C}">
-                <a14:useLocalDpi xmlns:a14="http://schemas.microsoft.com/office/drawing/2010/main" val="0"/>
-              </a:ext>
-            </a:extLst>
-          </a:blip>
-          <a:srcRect/>
-          <a:stretch>
-            <a:fillRect/>
-          </a:stretch>
-        </p:blipFill>
-        <p:spPr bwMode="auto">
-          <a:xfrm>
-            <a:off x="6858434" y="1504186"/>
-            <a:ext cx="3857647" cy="3849627"/>
-          </a:xfrm>
-          <a:prstGeom prst="rect">
-            <a:avLst/>
-          </a:prstGeom>
-          <a:noFill/>
-          <a:extLst>
-            <a:ext uri="{909E8E84-426E-40DD-AFC4-6F175D3DCCD1}">
-              <a14:hiddenFill xmlns:a14="http://schemas.microsoft.com/office/drawing/2010/main">
-                <a:solidFill>
-                  <a:srgbClr val="FFFFFF"/>
-                </a:solidFill>
-              </a14:hiddenFill>
-            </a:ext>
-          </a:extLst>
-        </p:spPr>
-      </p:pic>
-      <p:pic>
-        <p:nvPicPr>
-          <p:cNvPr id="6" name="Graphic 5" descr="Smart Phone">
-            <a:extLst>
-              <a:ext uri="{FF2B5EF4-FFF2-40B4-BE49-F238E27FC236}">
-                <a16:creationId xmlns:a16="http://schemas.microsoft.com/office/drawing/2014/main" id="{A84BC0C8-5514-4306-A6B8-15B819A3EB3C}"/>
-              </a:ext>
-            </a:extLst>
-          </p:cNvPr>
-          <p:cNvPicPr>
-            <a:picLocks noChangeAspect="1"/>
-          </p:cNvPicPr>
-          <p:nvPr/>
-        </p:nvPicPr>
-        <p:blipFill>
-          <a:blip r:embed="rId3">
-            <a:extLst>
-              <a:ext uri="{28A0092B-C50C-407E-A947-70E740481C1C}">
-                <a14:useLocalDpi xmlns:a14="http://schemas.microsoft.com/office/drawing/2010/main" val="0"/>
-              </a:ext>
-              <a:ext uri="{96DAC541-7B7A-43D3-8B79-37D633B846F1}">
-                <asvg:svgBlip xmlns:asvg="http://schemas.microsoft.com/office/drawing/2016/SVG/main" r:embed="rId4"/>
-              </a:ext>
-            </a:extLst>
-          </a:blip>
-          <a:stretch>
-            <a:fillRect/>
-          </a:stretch>
-        </p:blipFill>
-        <p:spPr>
-          <a:xfrm>
-            <a:off x="1475919" y="2528652"/>
-            <a:ext cx="1226927" cy="1226927"/>
-          </a:xfrm>
-          <a:prstGeom prst="rect">
-            <a:avLst/>
-          </a:prstGeom>
-        </p:spPr>
-      </p:pic>
-      <p:sp>
-        <p:nvSpPr>
-          <p:cNvPr id="7" name="Rectangle 6">
-            <a:extLst>
-              <a:ext uri="{FF2B5EF4-FFF2-40B4-BE49-F238E27FC236}">
-                <a16:creationId xmlns:a16="http://schemas.microsoft.com/office/drawing/2014/main" id="{9DB97059-FE87-4E9D-B25F-B7B1A12A5528}"/>
-              </a:ext>
-            </a:extLst>
-          </p:cNvPr>
-          <p:cNvSpPr/>
-          <p:nvPr/>
-        </p:nvSpPr>
-        <p:spPr>
-          <a:xfrm>
-            <a:off x="932645" y="3965551"/>
-            <a:ext cx="2805448" cy="369332"/>
-          </a:xfrm>
-          <a:prstGeom prst="rect">
-            <a:avLst/>
-          </a:prstGeom>
-        </p:spPr>
-        <p:txBody>
-          <a:bodyPr wrap="none">
-            <a:spAutoFit/>
-          </a:bodyPr>
-          <a:lstStyle/>
-          <a:p>
-            <a:r>
-              <a:rPr lang="fr-FR" dirty="0" err="1">
-                <a:solidFill>
-                  <a:srgbClr val="24292F"/>
-                </a:solidFill>
-                <a:latin typeface="Times New Roman" panose="02020603050405020304" pitchFamily="18" charset="0"/>
-                <a:cs typeface="Times New Roman" panose="02020603050405020304" pitchFamily="18" charset="0"/>
-              </a:rPr>
-              <a:t>Traccar</a:t>
-            </a:r>
-            <a:r>
-              <a:rPr lang="fr-FR" dirty="0">
-                <a:solidFill>
-                  <a:srgbClr val="24292F"/>
-                </a:solidFill>
-                <a:latin typeface="Times New Roman" panose="02020603050405020304" pitchFamily="18" charset="0"/>
-                <a:cs typeface="Times New Roman" panose="02020603050405020304" pitchFamily="18" charset="0"/>
-              </a:rPr>
-              <a:t> Client (Application)</a:t>
-            </a:r>
-            <a:endParaRPr lang="fr-FR" dirty="0">
-              <a:latin typeface="Times New Roman" panose="02020603050405020304" pitchFamily="18" charset="0"/>
-              <a:cs typeface="Times New Roman" panose="02020603050405020304" pitchFamily="18" charset="0"/>
-            </a:endParaRPr>
-          </a:p>
-        </p:txBody>
-      </p:sp>
-      <p:sp>
-        <p:nvSpPr>
-          <p:cNvPr id="10" name="Rectangle 9">
-            <a:extLst>
-              <a:ext uri="{FF2B5EF4-FFF2-40B4-BE49-F238E27FC236}">
-                <a16:creationId xmlns:a16="http://schemas.microsoft.com/office/drawing/2014/main" id="{BF36CDF2-D11D-46DA-BB61-6D325F6CADDC}"/>
-              </a:ext>
-            </a:extLst>
-          </p:cNvPr>
-          <p:cNvSpPr/>
-          <p:nvPr/>
-        </p:nvSpPr>
-        <p:spPr>
-          <a:xfrm>
-            <a:off x="7563118" y="5637658"/>
-            <a:ext cx="2318135" cy="369332"/>
-          </a:xfrm>
-          <a:prstGeom prst="rect">
-            <a:avLst/>
-          </a:prstGeom>
-        </p:spPr>
-        <p:txBody>
-          <a:bodyPr wrap="none">
-            <a:spAutoFit/>
-          </a:bodyPr>
-          <a:lstStyle/>
-          <a:p>
-            <a:r>
-              <a:rPr lang="fr-FR" dirty="0" err="1">
-                <a:solidFill>
-                  <a:srgbClr val="24292F"/>
-                </a:solidFill>
-                <a:latin typeface="Times New Roman" panose="02020603050405020304" pitchFamily="18" charset="0"/>
-                <a:cs typeface="Times New Roman" panose="02020603050405020304" pitchFamily="18" charset="0"/>
-              </a:rPr>
-              <a:t>Traccar</a:t>
-            </a:r>
-            <a:r>
-              <a:rPr lang="fr-FR" dirty="0">
-                <a:solidFill>
-                  <a:srgbClr val="24292F"/>
-                </a:solidFill>
-                <a:latin typeface="Times New Roman" panose="02020603050405020304" pitchFamily="18" charset="0"/>
-                <a:cs typeface="Times New Roman" panose="02020603050405020304" pitchFamily="18" charset="0"/>
-              </a:rPr>
-              <a:t> Client (Server)</a:t>
-            </a:r>
-            <a:endParaRPr lang="fr-FR" dirty="0">
-              <a:latin typeface="Times New Roman" panose="02020603050405020304" pitchFamily="18" charset="0"/>
-              <a:cs typeface="Times New Roman" panose="02020603050405020304" pitchFamily="18" charset="0"/>
-            </a:endParaRPr>
-          </a:p>
-        </p:txBody>
-      </p:sp>
-      <p:cxnSp>
-        <p:nvCxnSpPr>
-          <p:cNvPr id="12" name="Straight Arrow Connector 11">
-            <a:extLst>
-              <a:ext uri="{FF2B5EF4-FFF2-40B4-BE49-F238E27FC236}">
-                <a16:creationId xmlns:a16="http://schemas.microsoft.com/office/drawing/2014/main" id="{CF7EF238-5E5E-4E90-B8F2-A651811A1352}"/>
-              </a:ext>
-            </a:extLst>
-          </p:cNvPr>
-          <p:cNvCxnSpPr/>
-          <p:nvPr/>
-        </p:nvCxnSpPr>
-        <p:spPr>
-          <a:xfrm>
-            <a:off x="3335628" y="3142115"/>
-            <a:ext cx="3181082" cy="0"/>
-          </a:xfrm>
-          <a:prstGeom prst="straightConnector1">
-            <a:avLst/>
-          </a:prstGeom>
-          <a:ln w="28575">
-            <a:solidFill>
-              <a:schemeClr val="tx1"/>
-            </a:solidFill>
-            <a:headEnd type="triangle"/>
-            <a:tailEnd type="triangle"/>
-          </a:ln>
-        </p:spPr>
-        <p:style>
-          <a:lnRef idx="1">
-            <a:schemeClr val="accent1"/>
-          </a:lnRef>
-          <a:fillRef idx="0">
-            <a:schemeClr val="accent1"/>
-          </a:fillRef>
-          <a:effectRef idx="0">
-            <a:schemeClr val="accent1"/>
-          </a:effectRef>
-          <a:fontRef idx="minor">
-            <a:schemeClr val="tx1"/>
-          </a:fontRef>
-        </p:style>
-      </p:cxnSp>
-      <p:sp>
-        <p:nvSpPr>
-          <p:cNvPr id="15" name="Rectangle 14">
-            <a:extLst>
-              <a:ext uri="{FF2B5EF4-FFF2-40B4-BE49-F238E27FC236}">
-                <a16:creationId xmlns:a16="http://schemas.microsoft.com/office/drawing/2014/main" id="{EF622F5A-7792-4884-997F-97822869CDF9}"/>
-              </a:ext>
-            </a:extLst>
-          </p:cNvPr>
-          <p:cNvSpPr/>
-          <p:nvPr/>
-        </p:nvSpPr>
-        <p:spPr>
-          <a:xfrm>
-            <a:off x="3269305" y="2667797"/>
-            <a:ext cx="3256020" cy="369332"/>
-          </a:xfrm>
-          <a:prstGeom prst="rect">
-            <a:avLst/>
-          </a:prstGeom>
-        </p:spPr>
-        <p:txBody>
-          <a:bodyPr wrap="none">
-            <a:spAutoFit/>
-          </a:bodyPr>
-          <a:lstStyle/>
-          <a:p>
-            <a:r>
-              <a:rPr lang="fr-FR" dirty="0" err="1">
-                <a:solidFill>
-                  <a:srgbClr val="24292F"/>
-                </a:solidFill>
-                <a:latin typeface="Times New Roman" panose="02020603050405020304" pitchFamily="18" charset="0"/>
-                <a:cs typeface="Times New Roman" panose="02020603050405020304" pitchFamily="18" charset="0"/>
-              </a:rPr>
-              <a:t>Bind</a:t>
-            </a:r>
-            <a:r>
-              <a:rPr lang="fr-FR" dirty="0">
-                <a:solidFill>
-                  <a:srgbClr val="24292F"/>
-                </a:solidFill>
-                <a:latin typeface="Times New Roman" panose="02020603050405020304" pitchFamily="18" charset="0"/>
-                <a:cs typeface="Times New Roman" panose="02020603050405020304" pitchFamily="18" charset="0"/>
-              </a:rPr>
-              <a:t> the application to the server</a:t>
-            </a:r>
-            <a:endParaRPr lang="fr-FR" dirty="0">
-              <a:latin typeface="Times New Roman" panose="02020603050405020304" pitchFamily="18" charset="0"/>
-              <a:cs typeface="Times New Roman" panose="02020603050405020304" pitchFamily="18" charset="0"/>
-            </a:endParaRPr>
-          </a:p>
-        </p:txBody>
-      </p:sp>
-    </p:spTree>
-    <p:extLst>
-      <p:ext uri="{BB962C8B-B14F-4D97-AF65-F5344CB8AC3E}">
-        <p14:creationId xmlns:p14="http://schemas.microsoft.com/office/powerpoint/2010/main" val="83230128"/>
-      </p:ext>
-    </p:extLst>
-  </p:cSld>
-  <p:clrMapOvr>
-    <a:masterClrMapping/>
-  </p:clrMapOvr>
-</p:sld>
-</file>
-
-<file path=ppt/slides/slide2.xml><?xml version="1.0" encoding="utf-8"?>
-<p:sld xmlns:a="http://schemas.openxmlformats.org/drawingml/2006/main" xmlns:r="http://schemas.openxmlformats.org/officeDocument/2006/relationships" xmlns:p="http://schemas.openxmlformats.org/presentationml/2006/main">
-  <p:cSld>
-    <p:spTree>
-      <p:nvGrpSpPr>
-        <p:cNvPr id="1" name=""/>
-        <p:cNvGrpSpPr/>
-        <p:nvPr/>
-      </p:nvGrpSpPr>
-      <p:grpSpPr>
-        <a:xfrm>
-          <a:off x="0" y="0"/>
-          <a:ext cx="0" cy="0"/>
-          <a:chOff x="0" y="0"/>
-          <a:chExt cx="0" cy="0"/>
-        </a:xfrm>
-      </p:grpSpPr>
       <p:sp>
         <p:nvSpPr>
           <p:cNvPr id="5" name="ZoneTexte 4"/>
@@ -3959,8 +3365,8 @@
         </p:nvSpPr>
         <p:spPr>
           <a:xfrm>
-            <a:off x="281906" y="672943"/>
-            <a:ext cx="4969838" cy="2185214"/>
+            <a:off x="281906" y="1293274"/>
+            <a:ext cx="5814094" cy="2739211"/>
           </a:xfrm>
           <a:prstGeom prst="rect">
             <a:avLst/>
@@ -3974,15 +3380,72 @@
           <a:lstStyle/>
           <a:p>
             <a:r>
-              <a:rPr lang="fr-FR" sz="4000" dirty="0">
+              <a:rPr lang="fr-FR" sz="6000" dirty="0">
                 <a:solidFill>
                   <a:srgbClr val="4466A0"/>
                 </a:solidFill>
-                <a:latin typeface="Arial Black" panose="020B0A04020102020204" pitchFamily="34" charset="0"/>
+                <a:latin typeface="Aharoni" panose="02010803020104030203" pitchFamily="2" charset="-79"/>
                 <a:ea typeface="Tahoma" panose="020B0604030504040204" pitchFamily="34" charset="0"/>
-                <a:cs typeface="Tahoma" panose="020B0604030504040204" pitchFamily="34" charset="0"/>
+                <a:cs typeface="Aharoni" panose="02010803020104030203" pitchFamily="2" charset="-79"/>
               </a:rPr>
               <a:t>I</a:t>
+            </a:r>
+            <a:r>
+              <a:rPr lang="fr-FR" sz="6000" dirty="0">
+                <a:solidFill>
+                  <a:schemeClr val="tx1">
+                    <a:lumMod val="75000"/>
+                    <a:lumOff val="25000"/>
+                  </a:schemeClr>
+                </a:solidFill>
+                <a:latin typeface="Aharoni" panose="02010803020104030203" pitchFamily="2" charset="-79"/>
+                <a:ea typeface="Tahoma" panose="020B0604030504040204" pitchFamily="34" charset="0"/>
+                <a:cs typeface="Aharoni" panose="02010803020104030203" pitchFamily="2" charset="-79"/>
+              </a:rPr>
+              <a:t>-Track</a:t>
+            </a:r>
+          </a:p>
+          <a:p>
+            <a:endParaRPr lang="fr-FR" sz="3200" dirty="0">
+              <a:solidFill>
+                <a:schemeClr val="tx1">
+                  <a:lumMod val="75000"/>
+                  <a:lumOff val="25000"/>
+                </a:schemeClr>
+              </a:solidFill>
+              <a:latin typeface="Aharoni" panose="02010803020104030203" pitchFamily="2" charset="-79"/>
+              <a:ea typeface="Tahoma" panose="020B0604030504040204" pitchFamily="34" charset="0"/>
+              <a:cs typeface="Aharoni" panose="02010803020104030203" pitchFamily="2" charset="-79"/>
+            </a:endParaRPr>
+          </a:p>
+          <a:p>
+            <a:r>
+              <a:rPr lang="en-US" sz="4000" dirty="0">
+                <a:solidFill>
+                  <a:schemeClr val="tx1">
+                    <a:lumMod val="75000"/>
+                    <a:lumOff val="25000"/>
+                  </a:schemeClr>
+                </a:solidFill>
+                <a:latin typeface="Aharoni" panose="02010803020104030203" pitchFamily="2" charset="-79"/>
+                <a:ea typeface="Tahoma" panose="020B0604030504040204" pitchFamily="34" charset="0"/>
+                <a:cs typeface="Aharoni" panose="02010803020104030203" pitchFamily="2" charset="-79"/>
+              </a:rPr>
+              <a:t>B</a:t>
+            </a:r>
+            <a:r>
+              <a:rPr lang="fr-FR" sz="4000" dirty="0" err="1">
+                <a:solidFill>
+                  <a:schemeClr val="tx1">
+                    <a:lumMod val="75000"/>
+                    <a:lumOff val="25000"/>
+                  </a:schemeClr>
+                </a:solidFill>
+                <a:latin typeface="Aharoni" panose="02010803020104030203" pitchFamily="2" charset="-79"/>
+                <a:ea typeface="Tahoma" panose="020B0604030504040204" pitchFamily="34" charset="0"/>
+                <a:cs typeface="Aharoni" panose="02010803020104030203" pitchFamily="2" charset="-79"/>
+              </a:rPr>
+              <a:t>ecause</a:t>
             </a:r>
             <a:r>
               <a:rPr lang="fr-FR" sz="4000" dirty="0">
@@ -3992,179 +3455,122 @@
                     <a:lumOff val="25000"/>
                   </a:schemeClr>
                 </a:solidFill>
-                <a:latin typeface="Arial Black" panose="020B0A04020102020204" pitchFamily="34" charset="0"/>
+                <a:latin typeface="Aharoni" panose="02010803020104030203" pitchFamily="2" charset="-79"/>
                 <a:ea typeface="Tahoma" panose="020B0604030504040204" pitchFamily="34" charset="0"/>
-                <a:cs typeface="Tahoma" panose="020B0604030504040204" pitchFamily="34" charset="0"/>
+                <a:cs typeface="Aharoni" panose="02010803020104030203" pitchFamily="2" charset="-79"/>
               </a:rPr>
-              <a:t>-Track</a:t>
-            </a:r>
-          </a:p>
-          <a:p>
-            <a:endParaRPr lang="fr-FR" sz="3200" dirty="0">
+              <a:t> </a:t>
+            </a:r>
+            <a:r>
+              <a:rPr lang="fr-FR" sz="4000" dirty="0" err="1">
+                <a:solidFill>
+                  <a:schemeClr val="tx1">
+                    <a:lumMod val="75000"/>
+                    <a:lumOff val="25000"/>
+                  </a:schemeClr>
+                </a:solidFill>
+                <a:latin typeface="Aharoni" panose="02010803020104030203" pitchFamily="2" charset="-79"/>
+                <a:ea typeface="Tahoma" panose="020B0604030504040204" pitchFamily="34" charset="0"/>
+                <a:cs typeface="Aharoni" panose="02010803020104030203" pitchFamily="2" charset="-79"/>
+              </a:rPr>
+              <a:t>we</a:t>
+            </a:r>
+            <a:r>
+              <a:rPr lang="fr-FR" sz="4000" dirty="0">
+                <a:solidFill>
+                  <a:schemeClr val="tx1">
+                    <a:lumMod val="75000"/>
+                    <a:lumOff val="25000"/>
+                  </a:schemeClr>
+                </a:solidFill>
+                <a:latin typeface="Aharoni" panose="02010803020104030203" pitchFamily="2" charset="-79"/>
+                <a:ea typeface="Tahoma" panose="020B0604030504040204" pitchFamily="34" charset="0"/>
+                <a:cs typeface="Aharoni" panose="02010803020104030203" pitchFamily="2" charset="-79"/>
+              </a:rPr>
+              <a:t> </a:t>
+            </a:r>
+            <a:r>
+              <a:rPr lang="fr-FR" sz="4000" dirty="0" err="1">
+                <a:solidFill>
+                  <a:schemeClr val="tx1">
+                    <a:lumMod val="75000"/>
+                    <a:lumOff val="25000"/>
+                  </a:schemeClr>
+                </a:solidFill>
+                <a:latin typeface="Aharoni" panose="02010803020104030203" pitchFamily="2" charset="-79"/>
+                <a:ea typeface="Tahoma" panose="020B0604030504040204" pitchFamily="34" charset="0"/>
+                <a:cs typeface="Aharoni" panose="02010803020104030203" pitchFamily="2" charset="-79"/>
+              </a:rPr>
+              <a:t>track</a:t>
+            </a:r>
+            <a:r>
+              <a:rPr lang="fr-FR" sz="4000" dirty="0">
+                <a:solidFill>
+                  <a:schemeClr val="tx1">
+                    <a:lumMod val="75000"/>
+                    <a:lumOff val="25000"/>
+                  </a:schemeClr>
+                </a:solidFill>
+                <a:latin typeface="Aharoni" panose="02010803020104030203" pitchFamily="2" charset="-79"/>
+                <a:ea typeface="Tahoma" panose="020B0604030504040204" pitchFamily="34" charset="0"/>
+                <a:cs typeface="Aharoni" panose="02010803020104030203" pitchFamily="2" charset="-79"/>
+              </a:rPr>
+              <a:t> </a:t>
+            </a:r>
+            <a:r>
+              <a:rPr lang="fr-FR" sz="4000" dirty="0" err="1">
+                <a:solidFill>
+                  <a:schemeClr val="tx1">
+                    <a:lumMod val="75000"/>
+                    <a:lumOff val="25000"/>
+                  </a:schemeClr>
+                </a:solidFill>
+                <a:latin typeface="Aharoni" panose="02010803020104030203" pitchFamily="2" charset="-79"/>
+                <a:ea typeface="Tahoma" panose="020B0604030504040204" pitchFamily="34" charset="0"/>
+                <a:cs typeface="Aharoni" panose="02010803020104030203" pitchFamily="2" charset="-79"/>
+              </a:rPr>
+              <a:t>it</a:t>
+            </a:r>
+            <a:r>
+              <a:rPr lang="fr-FR" sz="4000" dirty="0">
+                <a:solidFill>
+                  <a:schemeClr val="tx1">
+                    <a:lumMod val="75000"/>
+                    <a:lumOff val="25000"/>
+                  </a:schemeClr>
+                </a:solidFill>
+                <a:latin typeface="Aharoni" panose="02010803020104030203" pitchFamily="2" charset="-79"/>
+                <a:ea typeface="Tahoma" panose="020B0604030504040204" pitchFamily="34" charset="0"/>
+                <a:cs typeface="Aharoni" panose="02010803020104030203" pitchFamily="2" charset="-79"/>
+              </a:rPr>
+              <a:t> </a:t>
+            </a:r>
+          </a:p>
+          <a:p>
+            <a:r>
+              <a:rPr lang="fr-FR" sz="4000" dirty="0">
+                <a:solidFill>
+                  <a:schemeClr val="tx1">
+                    <a:lumMod val="75000"/>
+                    <a:lumOff val="25000"/>
+                  </a:schemeClr>
+                </a:solidFill>
+                <a:latin typeface="Aharoni" panose="02010803020104030203" pitchFamily="2" charset="-79"/>
+                <a:ea typeface="Tahoma" panose="020B0604030504040204" pitchFamily="34" charset="0"/>
+                <a:cs typeface="Aharoni" panose="02010803020104030203" pitchFamily="2" charset="-79"/>
+              </a:rPr>
+              <a:t>for You</a:t>
+            </a:r>
+            <a:endParaRPr lang="en-US" sz="4000" dirty="0">
               <a:solidFill>
                 <a:schemeClr val="tx1">
                   <a:lumMod val="75000"/>
                   <a:lumOff val="25000"/>
                 </a:schemeClr>
               </a:solidFill>
-              <a:latin typeface="Arial Black" panose="020B0A04020102020204" pitchFamily="34" charset="0"/>
+              <a:latin typeface="Aharoni" panose="02010803020104030203" pitchFamily="2" charset="-79"/>
               <a:ea typeface="Tahoma" panose="020B0604030504040204" pitchFamily="34" charset="0"/>
-              <a:cs typeface="Tahoma" panose="020B0604030504040204" pitchFamily="34" charset="0"/>
-            </a:endParaRPr>
-          </a:p>
-          <a:p>
-            <a:r>
-              <a:rPr lang="en-US" sz="3200" dirty="0">
-                <a:solidFill>
-                  <a:schemeClr val="tx1">
-                    <a:lumMod val="75000"/>
-                    <a:lumOff val="25000"/>
-                  </a:schemeClr>
-                </a:solidFill>
-                <a:latin typeface="Arial Black" panose="020B0A04020102020204" pitchFamily="34" charset="0"/>
-                <a:ea typeface="Tahoma" panose="020B0604030504040204" pitchFamily="34" charset="0"/>
-                <a:cs typeface="Tahoma" panose="020B0604030504040204" pitchFamily="34" charset="0"/>
-              </a:rPr>
-              <a:t>B</a:t>
-            </a:r>
-            <a:r>
-              <a:rPr lang="fr-FR" sz="3200" dirty="0" err="1">
-                <a:solidFill>
-                  <a:schemeClr val="tx1">
-                    <a:lumMod val="75000"/>
-                    <a:lumOff val="25000"/>
-                  </a:schemeClr>
-                </a:solidFill>
-                <a:latin typeface="Arial Black" panose="020B0A04020102020204" pitchFamily="34" charset="0"/>
-                <a:ea typeface="Tahoma" panose="020B0604030504040204" pitchFamily="34" charset="0"/>
-                <a:cs typeface="Tahoma" panose="020B0604030504040204" pitchFamily="34" charset="0"/>
-              </a:rPr>
-              <a:t>ecause</a:t>
-            </a:r>
-            <a:r>
-              <a:rPr lang="fr-FR" sz="3200" dirty="0">
-                <a:solidFill>
-                  <a:schemeClr val="tx1">
-                    <a:lumMod val="75000"/>
-                    <a:lumOff val="25000"/>
-                  </a:schemeClr>
-                </a:solidFill>
-                <a:latin typeface="Arial Black" panose="020B0A04020102020204" pitchFamily="34" charset="0"/>
-                <a:ea typeface="Tahoma" panose="020B0604030504040204" pitchFamily="34" charset="0"/>
-                <a:cs typeface="Tahoma" panose="020B0604030504040204" pitchFamily="34" charset="0"/>
-              </a:rPr>
-              <a:t> </a:t>
-            </a:r>
-            <a:r>
-              <a:rPr lang="fr-FR" sz="3200" dirty="0" err="1">
-                <a:solidFill>
-                  <a:schemeClr val="tx1">
-                    <a:lumMod val="75000"/>
-                    <a:lumOff val="25000"/>
-                  </a:schemeClr>
-                </a:solidFill>
-                <a:latin typeface="Arial Black" panose="020B0A04020102020204" pitchFamily="34" charset="0"/>
-                <a:ea typeface="Tahoma" panose="020B0604030504040204" pitchFamily="34" charset="0"/>
-                <a:cs typeface="Tahoma" panose="020B0604030504040204" pitchFamily="34" charset="0"/>
-              </a:rPr>
-              <a:t>we</a:t>
-            </a:r>
-            <a:r>
-              <a:rPr lang="fr-FR" sz="3200" dirty="0">
-                <a:solidFill>
-                  <a:schemeClr val="tx1">
-                    <a:lumMod val="75000"/>
-                    <a:lumOff val="25000"/>
-                  </a:schemeClr>
-                </a:solidFill>
-                <a:latin typeface="Arial Black" panose="020B0A04020102020204" pitchFamily="34" charset="0"/>
-                <a:ea typeface="Tahoma" panose="020B0604030504040204" pitchFamily="34" charset="0"/>
-                <a:cs typeface="Tahoma" panose="020B0604030504040204" pitchFamily="34" charset="0"/>
-              </a:rPr>
-              <a:t> </a:t>
-            </a:r>
-            <a:r>
-              <a:rPr lang="fr-FR" sz="3200" dirty="0" err="1">
-                <a:solidFill>
-                  <a:schemeClr val="tx1">
-                    <a:lumMod val="75000"/>
-                    <a:lumOff val="25000"/>
-                  </a:schemeClr>
-                </a:solidFill>
-                <a:latin typeface="Arial Black" panose="020B0A04020102020204" pitchFamily="34" charset="0"/>
-                <a:ea typeface="Tahoma" panose="020B0604030504040204" pitchFamily="34" charset="0"/>
-                <a:cs typeface="Tahoma" panose="020B0604030504040204" pitchFamily="34" charset="0"/>
-              </a:rPr>
-              <a:t>track</a:t>
-            </a:r>
-            <a:r>
-              <a:rPr lang="fr-FR" sz="3200" dirty="0">
-                <a:solidFill>
-                  <a:schemeClr val="tx1">
-                    <a:lumMod val="75000"/>
-                    <a:lumOff val="25000"/>
-                  </a:schemeClr>
-                </a:solidFill>
-                <a:latin typeface="Arial Black" panose="020B0A04020102020204" pitchFamily="34" charset="0"/>
-                <a:ea typeface="Tahoma" panose="020B0604030504040204" pitchFamily="34" charset="0"/>
-                <a:cs typeface="Tahoma" panose="020B0604030504040204" pitchFamily="34" charset="0"/>
-              </a:rPr>
-              <a:t> </a:t>
-            </a:r>
-            <a:r>
-              <a:rPr lang="fr-FR" sz="3200" dirty="0" err="1">
-                <a:solidFill>
-                  <a:schemeClr val="tx1">
-                    <a:lumMod val="75000"/>
-                    <a:lumOff val="25000"/>
-                  </a:schemeClr>
-                </a:solidFill>
-                <a:latin typeface="Arial Black" panose="020B0A04020102020204" pitchFamily="34" charset="0"/>
-                <a:ea typeface="Tahoma" panose="020B0604030504040204" pitchFamily="34" charset="0"/>
-                <a:cs typeface="Tahoma" panose="020B0604030504040204" pitchFamily="34" charset="0"/>
-              </a:rPr>
-              <a:t>it</a:t>
-            </a:r>
-            <a:r>
-              <a:rPr lang="fr-FR" sz="3200" dirty="0">
-                <a:solidFill>
-                  <a:schemeClr val="tx1">
-                    <a:lumMod val="75000"/>
-                    <a:lumOff val="25000"/>
-                  </a:schemeClr>
-                </a:solidFill>
-                <a:latin typeface="Arial Black" panose="020B0A04020102020204" pitchFamily="34" charset="0"/>
-                <a:ea typeface="Tahoma" panose="020B0604030504040204" pitchFamily="34" charset="0"/>
-                <a:cs typeface="Tahoma" panose="020B0604030504040204" pitchFamily="34" charset="0"/>
-              </a:rPr>
-              <a:t> </a:t>
-            </a:r>
-          </a:p>
-          <a:p>
-            <a:r>
-              <a:rPr lang="fr-FR" sz="3200" dirty="0">
-                <a:solidFill>
-                  <a:schemeClr val="tx1">
-                    <a:lumMod val="75000"/>
-                    <a:lumOff val="25000"/>
-                  </a:schemeClr>
-                </a:solidFill>
-                <a:latin typeface="Arial Black" panose="020B0A04020102020204" pitchFamily="34" charset="0"/>
-                <a:ea typeface="Tahoma" panose="020B0604030504040204" pitchFamily="34" charset="0"/>
-                <a:cs typeface="Tahoma" panose="020B0604030504040204" pitchFamily="34" charset="0"/>
-              </a:rPr>
-              <a:t>for You</a:t>
-            </a:r>
-            <a:endParaRPr lang="en-US" sz="3200" dirty="0">
-              <a:solidFill>
-                <a:schemeClr val="tx1">
-                  <a:lumMod val="75000"/>
-                  <a:lumOff val="25000"/>
-                </a:schemeClr>
-              </a:solidFill>
-              <a:latin typeface="Arial Black" panose="020B0A04020102020204" pitchFamily="34" charset="0"/>
-              <a:ea typeface="Tahoma" panose="020B0604030504040204" pitchFamily="34" charset="0"/>
-              <a:cs typeface="Tahoma" panose="020B0604030504040204" pitchFamily="34" charset="0"/>
+              <a:cs typeface="Aharoni" panose="02010803020104030203" pitchFamily="2" charset="-79"/>
             </a:endParaRPr>
           </a:p>
         </p:txBody>
@@ -4488,7 +3894,7 @@
         <p:spPr>
           <a:xfrm>
             <a:off x="7559739" y="4305093"/>
-            <a:ext cx="4385518" cy="1282907"/>
+            <a:ext cx="4385518" cy="1355478"/>
           </a:xfrm>
           <a:prstGeom prst="roundRect">
             <a:avLst>
@@ -4665,7 +4071,7 @@
                 <a:ea typeface="Tahoma" panose="020B0604030504040204" pitchFamily="34" charset="0"/>
                 <a:cs typeface="Tahoma" panose="020B0604030504040204" pitchFamily="34" charset="0"/>
               </a:rPr>
-              <a:t>Salaheddine EL BAIDOURY</a:t>
+              <a:t>Salaheddine EL BAIDOURY   </a:t>
             </a:r>
           </a:p>
           <a:p>
@@ -4759,7 +4165,7 @@
                 <a:ea typeface="Tahoma" panose="020B0604030504040204" pitchFamily="34" charset="0"/>
                 <a:cs typeface="Tahoma" panose="020B0604030504040204" pitchFamily="34" charset="0"/>
               </a:rPr>
-              <a:t>A</a:t>
+              <a:t> A</a:t>
             </a:r>
             <a:r>
               <a:rPr lang="fr-FR" sz="1200" b="1" dirty="0" err="1">
@@ -4805,7 +4211,7 @@
                 <a:ea typeface="Tahoma" panose="020B0604030504040204" pitchFamily="34" charset="0"/>
                 <a:cs typeface="Tahoma" panose="020B0604030504040204" pitchFamily="34" charset="0"/>
               </a:rPr>
-              <a:t>C</a:t>
+              <a:t> C</a:t>
             </a:r>
             <a:r>
               <a:rPr lang="fr-FR" sz="1200" b="1" dirty="0" err="1">
@@ -4851,7 +4257,7 @@
                 <a:ea typeface="Tahoma" panose="020B0604030504040204" pitchFamily="34" charset="0"/>
                 <a:cs typeface="Tahoma" panose="020B0604030504040204" pitchFamily="34" charset="0"/>
               </a:rPr>
-              <a:t>Ikram BEL ARMIA</a:t>
+              <a:t> Ikram BEL ARMIA</a:t>
             </a:r>
             <a:endParaRPr lang="fr-FR" sz="1200" b="1" dirty="0">
               <a:solidFill>
@@ -4942,6 +4348,1939 @@
     <p:extLst>
       <p:ext uri="{BB962C8B-B14F-4D97-AF65-F5344CB8AC3E}">
         <p14:creationId xmlns:p14="http://schemas.microsoft.com/office/powerpoint/2010/main" val="1879863132"/>
+      </p:ext>
+    </p:extLst>
+  </p:cSld>
+  <p:clrMapOvr>
+    <a:masterClrMapping/>
+  </p:clrMapOvr>
+</p:sld>
+</file>
+
+<file path=ppt/slides/slide10.xml><?xml version="1.0" encoding="utf-8"?>
+<p:sld xmlns:a="http://schemas.openxmlformats.org/drawingml/2006/main" xmlns:r="http://schemas.openxmlformats.org/officeDocument/2006/relationships" xmlns:p="http://schemas.openxmlformats.org/presentationml/2006/main">
+  <p:cSld>
+    <p:spTree>
+      <p:nvGrpSpPr>
+        <p:cNvPr id="1" name=""/>
+        <p:cNvGrpSpPr/>
+        <p:nvPr/>
+      </p:nvGrpSpPr>
+      <p:grpSpPr>
+        <a:xfrm>
+          <a:off x="0" y="0"/>
+          <a:ext cx="0" cy="0"/>
+          <a:chOff x="0" y="0"/>
+          <a:chExt cx="0" cy="0"/>
+        </a:xfrm>
+      </p:grpSpPr>
+      <p:pic>
+        <p:nvPicPr>
+          <p:cNvPr id="5" name="Picture 4">
+            <a:extLst>
+              <a:ext uri="{FF2B5EF4-FFF2-40B4-BE49-F238E27FC236}">
+                <a16:creationId xmlns:a16="http://schemas.microsoft.com/office/drawing/2014/main" id="{94097EE7-94DD-4E24-9003-3241EDB20939}"/>
+              </a:ext>
+            </a:extLst>
+          </p:cNvPr>
+          <p:cNvPicPr>
+            <a:picLocks noChangeAspect="1"/>
+          </p:cNvPicPr>
+          <p:nvPr/>
+        </p:nvPicPr>
+        <p:blipFill rotWithShape="1">
+          <a:blip r:embed="rId2"/>
+          <a:srcRect t="4485"/>
+          <a:stretch/>
+        </p:blipFill>
+        <p:spPr>
+          <a:xfrm>
+            <a:off x="710408" y="758195"/>
+            <a:ext cx="10970569" cy="5891311"/>
+          </a:xfrm>
+          <a:prstGeom prst="rect">
+            <a:avLst/>
+          </a:prstGeom>
+        </p:spPr>
+      </p:pic>
+      <p:sp>
+        <p:nvSpPr>
+          <p:cNvPr id="2" name="Rectangle 1">
+            <a:extLst>
+              <a:ext uri="{FF2B5EF4-FFF2-40B4-BE49-F238E27FC236}">
+                <a16:creationId xmlns:a16="http://schemas.microsoft.com/office/drawing/2014/main" id="{33B04812-7A7A-4C77-9AC0-CEA76040736E}"/>
+              </a:ext>
+            </a:extLst>
+          </p:cNvPr>
+          <p:cNvSpPr/>
+          <p:nvPr/>
+        </p:nvSpPr>
+        <p:spPr>
+          <a:xfrm>
+            <a:off x="131193" y="196477"/>
+            <a:ext cx="4483856" cy="369332"/>
+          </a:xfrm>
+          <a:prstGeom prst="rect">
+            <a:avLst/>
+          </a:prstGeom>
+        </p:spPr>
+        <p:txBody>
+          <a:bodyPr wrap="none">
+            <a:spAutoFit/>
+          </a:bodyPr>
+          <a:lstStyle/>
+          <a:p>
+            <a:r>
+              <a:rPr lang="en-US" dirty="0">
+                <a:solidFill>
+                  <a:srgbClr val="333333"/>
+                </a:solidFill>
+                <a:latin typeface="Times New Roman" panose="02020603050405020304" pitchFamily="18" charset="0"/>
+                <a:cs typeface="Times New Roman" panose="02020603050405020304" pitchFamily="18" charset="0"/>
+              </a:rPr>
+              <a:t>To see your device on map you can register on</a:t>
+            </a:r>
+            <a:endParaRPr lang="fr-FR" dirty="0">
+              <a:latin typeface="Times New Roman" panose="02020603050405020304" pitchFamily="18" charset="0"/>
+              <a:cs typeface="Times New Roman" panose="02020603050405020304" pitchFamily="18" charset="0"/>
+            </a:endParaRPr>
+          </a:p>
+        </p:txBody>
+      </p:sp>
+      <p:sp>
+        <p:nvSpPr>
+          <p:cNvPr id="6" name="Rectangle 5">
+            <a:extLst>
+              <a:ext uri="{FF2B5EF4-FFF2-40B4-BE49-F238E27FC236}">
+                <a16:creationId xmlns:a16="http://schemas.microsoft.com/office/drawing/2014/main" id="{15371709-8667-494A-B838-999788A1DB81}"/>
+              </a:ext>
+            </a:extLst>
+          </p:cNvPr>
+          <p:cNvSpPr/>
+          <p:nvPr/>
+        </p:nvSpPr>
+        <p:spPr>
+          <a:xfrm>
+            <a:off x="4422869" y="196477"/>
+            <a:ext cx="2621874" cy="369332"/>
+          </a:xfrm>
+          <a:prstGeom prst="rect">
+            <a:avLst/>
+          </a:prstGeom>
+        </p:spPr>
+        <p:txBody>
+          <a:bodyPr wrap="square">
+            <a:spAutoFit/>
+          </a:bodyPr>
+          <a:lstStyle/>
+          <a:p>
+            <a:r>
+              <a:rPr lang="en-US" b="0" i="0" dirty="0">
+                <a:solidFill>
+                  <a:srgbClr val="333333"/>
+                </a:solidFill>
+                <a:effectLst/>
+                <a:latin typeface="Roboto"/>
+              </a:rPr>
+              <a:t> </a:t>
+            </a:r>
+            <a:r>
+              <a:rPr lang="en-US" b="0" i="0" dirty="0">
+                <a:solidFill>
+                  <a:schemeClr val="accent2"/>
+                </a:solidFill>
+                <a:effectLst/>
+                <a:latin typeface="Times New Roman" panose="02020603050405020304" pitchFamily="18" charset="0"/>
+                <a:cs typeface="Times New Roman" panose="02020603050405020304" pitchFamily="18" charset="0"/>
+              </a:rPr>
+              <a:t>http://demo.traccar.org/</a:t>
+            </a:r>
+            <a:endParaRPr lang="fr-FR" dirty="0">
+              <a:latin typeface="Times New Roman" panose="02020603050405020304" pitchFamily="18" charset="0"/>
+              <a:cs typeface="Times New Roman" panose="02020603050405020304" pitchFamily="18" charset="0"/>
+            </a:endParaRPr>
+          </a:p>
+        </p:txBody>
+      </p:sp>
+      <p:sp>
+        <p:nvSpPr>
+          <p:cNvPr id="7" name="Rectangle 6">
+            <a:extLst>
+              <a:ext uri="{FF2B5EF4-FFF2-40B4-BE49-F238E27FC236}">
+                <a16:creationId xmlns:a16="http://schemas.microsoft.com/office/drawing/2014/main" id="{575CA3F9-BF43-4B2C-A7D2-0A5638BA44B0}"/>
+              </a:ext>
+            </a:extLst>
+          </p:cNvPr>
+          <p:cNvSpPr/>
+          <p:nvPr/>
+        </p:nvSpPr>
+        <p:spPr>
+          <a:xfrm>
+            <a:off x="6715940" y="208494"/>
+            <a:ext cx="3680088" cy="369332"/>
+          </a:xfrm>
+          <a:prstGeom prst="rect">
+            <a:avLst/>
+          </a:prstGeom>
+        </p:spPr>
+        <p:txBody>
+          <a:bodyPr wrap="square">
+            <a:spAutoFit/>
+          </a:bodyPr>
+          <a:lstStyle/>
+          <a:p>
+            <a:r>
+              <a:rPr lang="en-US" b="0" i="0" dirty="0">
+                <a:solidFill>
+                  <a:srgbClr val="333333"/>
+                </a:solidFill>
+                <a:effectLst/>
+                <a:latin typeface="Times New Roman" panose="02020603050405020304" pitchFamily="18" charset="0"/>
+                <a:cs typeface="Times New Roman" panose="02020603050405020304" pitchFamily="18" charset="0"/>
+              </a:rPr>
+              <a:t>and add your device with identifier.</a:t>
+            </a:r>
+            <a:endParaRPr lang="fr-FR" dirty="0">
+              <a:latin typeface="Times New Roman" panose="02020603050405020304" pitchFamily="18" charset="0"/>
+              <a:cs typeface="Times New Roman" panose="02020603050405020304" pitchFamily="18" charset="0"/>
+            </a:endParaRPr>
+          </a:p>
+        </p:txBody>
+      </p:sp>
+    </p:spTree>
+    <p:extLst>
+      <p:ext uri="{BB962C8B-B14F-4D97-AF65-F5344CB8AC3E}">
+        <p14:creationId xmlns:p14="http://schemas.microsoft.com/office/powerpoint/2010/main" val="3570471032"/>
+      </p:ext>
+    </p:extLst>
+  </p:cSld>
+  <p:clrMapOvr>
+    <a:masterClrMapping/>
+  </p:clrMapOvr>
+</p:sld>
+</file>
+
+<file path=ppt/slides/slide11.xml><?xml version="1.0" encoding="utf-8"?>
+<p:sld xmlns:a="http://schemas.openxmlformats.org/drawingml/2006/main" xmlns:r="http://schemas.openxmlformats.org/officeDocument/2006/relationships" xmlns:p="http://schemas.openxmlformats.org/presentationml/2006/main">
+  <p:cSld>
+    <p:spTree>
+      <p:nvGrpSpPr>
+        <p:cNvPr id="1" name=""/>
+        <p:cNvGrpSpPr/>
+        <p:nvPr/>
+      </p:nvGrpSpPr>
+      <p:grpSpPr>
+        <a:xfrm>
+          <a:off x="0" y="0"/>
+          <a:ext cx="0" cy="0"/>
+          <a:chOff x="0" y="0"/>
+          <a:chExt cx="0" cy="0"/>
+        </a:xfrm>
+      </p:grpSpPr>
+      <p:sp>
+        <p:nvSpPr>
+          <p:cNvPr id="2" name="Title 1">
+            <a:extLst>
+              <a:ext uri="{FF2B5EF4-FFF2-40B4-BE49-F238E27FC236}">
+                <a16:creationId xmlns:a16="http://schemas.microsoft.com/office/drawing/2014/main" id="{3D20979F-C224-45DD-9A21-BF0CF8E7A524}"/>
+              </a:ext>
+            </a:extLst>
+          </p:cNvPr>
+          <p:cNvSpPr>
+            <a:spLocks noGrp="1"/>
+          </p:cNvSpPr>
+          <p:nvPr>
+            <p:ph type="title"/>
+          </p:nvPr>
+        </p:nvSpPr>
+        <p:spPr>
+          <a:xfrm>
+            <a:off x="155620" y="274667"/>
+            <a:ext cx="3180008" cy="1325563"/>
+          </a:xfrm>
+        </p:spPr>
+        <p:txBody>
+          <a:bodyPr/>
+          <a:lstStyle/>
+          <a:p>
+            <a:r>
+              <a:rPr lang="en-US" dirty="0">
+                <a:latin typeface="Times New Roman" panose="02020603050405020304" pitchFamily="18" charset="0"/>
+                <a:cs typeface="Times New Roman" panose="02020603050405020304" pitchFamily="18" charset="0"/>
+              </a:rPr>
+              <a:t>Current Step</a:t>
+            </a:r>
+            <a:endParaRPr lang="fr-FR" dirty="0">
+              <a:latin typeface="Times New Roman" panose="02020603050405020304" pitchFamily="18" charset="0"/>
+              <a:cs typeface="Times New Roman" panose="02020603050405020304" pitchFamily="18" charset="0"/>
+            </a:endParaRPr>
+          </a:p>
+        </p:txBody>
+      </p:sp>
+      <p:pic>
+        <p:nvPicPr>
+          <p:cNvPr id="1030" name="Picture 6" descr="Afficher l’image source">
+            <a:extLst>
+              <a:ext uri="{FF2B5EF4-FFF2-40B4-BE49-F238E27FC236}">
+                <a16:creationId xmlns:a16="http://schemas.microsoft.com/office/drawing/2014/main" id="{4D506C72-7495-492D-9C62-F747B9444F0B}"/>
+              </a:ext>
+            </a:extLst>
+          </p:cNvPr>
+          <p:cNvPicPr>
+            <a:picLocks noChangeAspect="1" noChangeArrowheads="1"/>
+          </p:cNvPicPr>
+          <p:nvPr/>
+        </p:nvPicPr>
+        <p:blipFill>
+          <a:blip r:embed="rId2">
+            <a:extLst>
+              <a:ext uri="{28A0092B-C50C-407E-A947-70E740481C1C}">
+                <a14:useLocalDpi xmlns:a14="http://schemas.microsoft.com/office/drawing/2010/main" val="0"/>
+              </a:ext>
+            </a:extLst>
+          </a:blip>
+          <a:srcRect/>
+          <a:stretch>
+            <a:fillRect/>
+          </a:stretch>
+        </p:blipFill>
+        <p:spPr bwMode="auto">
+          <a:xfrm>
+            <a:off x="6858434" y="1504186"/>
+            <a:ext cx="3857647" cy="3849627"/>
+          </a:xfrm>
+          <a:prstGeom prst="rect">
+            <a:avLst/>
+          </a:prstGeom>
+          <a:noFill/>
+          <a:extLst>
+            <a:ext uri="{909E8E84-426E-40DD-AFC4-6F175D3DCCD1}">
+              <a14:hiddenFill xmlns:a14="http://schemas.microsoft.com/office/drawing/2010/main">
+                <a:solidFill>
+                  <a:srgbClr val="FFFFFF"/>
+                </a:solidFill>
+              </a14:hiddenFill>
+            </a:ext>
+          </a:extLst>
+        </p:spPr>
+      </p:pic>
+      <p:pic>
+        <p:nvPicPr>
+          <p:cNvPr id="6" name="Graphic 5" descr="Smart Phone">
+            <a:extLst>
+              <a:ext uri="{FF2B5EF4-FFF2-40B4-BE49-F238E27FC236}">
+                <a16:creationId xmlns:a16="http://schemas.microsoft.com/office/drawing/2014/main" id="{A84BC0C8-5514-4306-A6B8-15B819A3EB3C}"/>
+              </a:ext>
+            </a:extLst>
+          </p:cNvPr>
+          <p:cNvPicPr>
+            <a:picLocks noChangeAspect="1"/>
+          </p:cNvPicPr>
+          <p:nvPr/>
+        </p:nvPicPr>
+        <p:blipFill>
+          <a:blip r:embed="rId3">
+            <a:extLst>
+              <a:ext uri="{28A0092B-C50C-407E-A947-70E740481C1C}">
+                <a14:useLocalDpi xmlns:a14="http://schemas.microsoft.com/office/drawing/2010/main" val="0"/>
+              </a:ext>
+              <a:ext uri="{96DAC541-7B7A-43D3-8B79-37D633B846F1}">
+                <asvg:svgBlip xmlns:asvg="http://schemas.microsoft.com/office/drawing/2016/SVG/main" r:embed="rId4"/>
+              </a:ext>
+            </a:extLst>
+          </a:blip>
+          <a:stretch>
+            <a:fillRect/>
+          </a:stretch>
+        </p:blipFill>
+        <p:spPr>
+          <a:xfrm>
+            <a:off x="1475919" y="2528652"/>
+            <a:ext cx="1226927" cy="1226927"/>
+          </a:xfrm>
+          <a:prstGeom prst="rect">
+            <a:avLst/>
+          </a:prstGeom>
+        </p:spPr>
+      </p:pic>
+      <p:sp>
+        <p:nvSpPr>
+          <p:cNvPr id="7" name="Rectangle 6">
+            <a:extLst>
+              <a:ext uri="{FF2B5EF4-FFF2-40B4-BE49-F238E27FC236}">
+                <a16:creationId xmlns:a16="http://schemas.microsoft.com/office/drawing/2014/main" id="{9DB97059-FE87-4E9D-B25F-B7B1A12A5528}"/>
+              </a:ext>
+            </a:extLst>
+          </p:cNvPr>
+          <p:cNvSpPr/>
+          <p:nvPr/>
+        </p:nvSpPr>
+        <p:spPr>
+          <a:xfrm>
+            <a:off x="932645" y="3965551"/>
+            <a:ext cx="2805448" cy="369332"/>
+          </a:xfrm>
+          <a:prstGeom prst="rect">
+            <a:avLst/>
+          </a:prstGeom>
+        </p:spPr>
+        <p:txBody>
+          <a:bodyPr wrap="none">
+            <a:spAutoFit/>
+          </a:bodyPr>
+          <a:lstStyle/>
+          <a:p>
+            <a:r>
+              <a:rPr lang="fr-FR" dirty="0" err="1">
+                <a:solidFill>
+                  <a:srgbClr val="24292F"/>
+                </a:solidFill>
+                <a:latin typeface="Times New Roman" panose="02020603050405020304" pitchFamily="18" charset="0"/>
+                <a:cs typeface="Times New Roman" panose="02020603050405020304" pitchFamily="18" charset="0"/>
+              </a:rPr>
+              <a:t>Traccar</a:t>
+            </a:r>
+            <a:r>
+              <a:rPr lang="fr-FR" dirty="0">
+                <a:solidFill>
+                  <a:srgbClr val="24292F"/>
+                </a:solidFill>
+                <a:latin typeface="Times New Roman" panose="02020603050405020304" pitchFamily="18" charset="0"/>
+                <a:cs typeface="Times New Roman" panose="02020603050405020304" pitchFamily="18" charset="0"/>
+              </a:rPr>
+              <a:t> Client (Application)</a:t>
+            </a:r>
+            <a:endParaRPr lang="fr-FR" dirty="0">
+              <a:latin typeface="Times New Roman" panose="02020603050405020304" pitchFamily="18" charset="0"/>
+              <a:cs typeface="Times New Roman" panose="02020603050405020304" pitchFamily="18" charset="0"/>
+            </a:endParaRPr>
+          </a:p>
+        </p:txBody>
+      </p:sp>
+      <p:sp>
+        <p:nvSpPr>
+          <p:cNvPr id="10" name="Rectangle 9">
+            <a:extLst>
+              <a:ext uri="{FF2B5EF4-FFF2-40B4-BE49-F238E27FC236}">
+                <a16:creationId xmlns:a16="http://schemas.microsoft.com/office/drawing/2014/main" id="{BF36CDF2-D11D-46DA-BB61-6D325F6CADDC}"/>
+              </a:ext>
+            </a:extLst>
+          </p:cNvPr>
+          <p:cNvSpPr/>
+          <p:nvPr/>
+        </p:nvSpPr>
+        <p:spPr>
+          <a:xfrm>
+            <a:off x="7563118" y="5637658"/>
+            <a:ext cx="2318135" cy="369332"/>
+          </a:xfrm>
+          <a:prstGeom prst="rect">
+            <a:avLst/>
+          </a:prstGeom>
+        </p:spPr>
+        <p:txBody>
+          <a:bodyPr wrap="none">
+            <a:spAutoFit/>
+          </a:bodyPr>
+          <a:lstStyle/>
+          <a:p>
+            <a:r>
+              <a:rPr lang="fr-FR" dirty="0" err="1">
+                <a:solidFill>
+                  <a:srgbClr val="24292F"/>
+                </a:solidFill>
+                <a:latin typeface="Times New Roman" panose="02020603050405020304" pitchFamily="18" charset="0"/>
+                <a:cs typeface="Times New Roman" panose="02020603050405020304" pitchFamily="18" charset="0"/>
+              </a:rPr>
+              <a:t>Traccar</a:t>
+            </a:r>
+            <a:r>
+              <a:rPr lang="fr-FR" dirty="0">
+                <a:solidFill>
+                  <a:srgbClr val="24292F"/>
+                </a:solidFill>
+                <a:latin typeface="Times New Roman" panose="02020603050405020304" pitchFamily="18" charset="0"/>
+                <a:cs typeface="Times New Roman" panose="02020603050405020304" pitchFamily="18" charset="0"/>
+              </a:rPr>
+              <a:t> Client (Server)</a:t>
+            </a:r>
+            <a:endParaRPr lang="fr-FR" dirty="0">
+              <a:latin typeface="Times New Roman" panose="02020603050405020304" pitchFamily="18" charset="0"/>
+              <a:cs typeface="Times New Roman" panose="02020603050405020304" pitchFamily="18" charset="0"/>
+            </a:endParaRPr>
+          </a:p>
+        </p:txBody>
+      </p:sp>
+      <p:cxnSp>
+        <p:nvCxnSpPr>
+          <p:cNvPr id="12" name="Straight Arrow Connector 11">
+            <a:extLst>
+              <a:ext uri="{FF2B5EF4-FFF2-40B4-BE49-F238E27FC236}">
+                <a16:creationId xmlns:a16="http://schemas.microsoft.com/office/drawing/2014/main" id="{CF7EF238-5E5E-4E90-B8F2-A651811A1352}"/>
+              </a:ext>
+            </a:extLst>
+          </p:cNvPr>
+          <p:cNvCxnSpPr/>
+          <p:nvPr/>
+        </p:nvCxnSpPr>
+        <p:spPr>
+          <a:xfrm>
+            <a:off x="3335628" y="3142115"/>
+            <a:ext cx="3181082" cy="0"/>
+          </a:xfrm>
+          <a:prstGeom prst="straightConnector1">
+            <a:avLst/>
+          </a:prstGeom>
+          <a:ln w="28575">
+            <a:solidFill>
+              <a:schemeClr val="tx1"/>
+            </a:solidFill>
+            <a:headEnd type="triangle"/>
+            <a:tailEnd type="triangle"/>
+          </a:ln>
+        </p:spPr>
+        <p:style>
+          <a:lnRef idx="1">
+            <a:schemeClr val="accent1"/>
+          </a:lnRef>
+          <a:fillRef idx="0">
+            <a:schemeClr val="accent1"/>
+          </a:fillRef>
+          <a:effectRef idx="0">
+            <a:schemeClr val="accent1"/>
+          </a:effectRef>
+          <a:fontRef idx="minor">
+            <a:schemeClr val="tx1"/>
+          </a:fontRef>
+        </p:style>
+      </p:cxnSp>
+      <p:sp>
+        <p:nvSpPr>
+          <p:cNvPr id="15" name="Rectangle 14">
+            <a:extLst>
+              <a:ext uri="{FF2B5EF4-FFF2-40B4-BE49-F238E27FC236}">
+                <a16:creationId xmlns:a16="http://schemas.microsoft.com/office/drawing/2014/main" id="{EF622F5A-7792-4884-997F-97822869CDF9}"/>
+              </a:ext>
+            </a:extLst>
+          </p:cNvPr>
+          <p:cNvSpPr/>
+          <p:nvPr/>
+        </p:nvSpPr>
+        <p:spPr>
+          <a:xfrm>
+            <a:off x="3269305" y="2667797"/>
+            <a:ext cx="3256020" cy="369332"/>
+          </a:xfrm>
+          <a:prstGeom prst="rect">
+            <a:avLst/>
+          </a:prstGeom>
+        </p:spPr>
+        <p:txBody>
+          <a:bodyPr wrap="none">
+            <a:spAutoFit/>
+          </a:bodyPr>
+          <a:lstStyle/>
+          <a:p>
+            <a:r>
+              <a:rPr lang="fr-FR" dirty="0" err="1">
+                <a:solidFill>
+                  <a:srgbClr val="24292F"/>
+                </a:solidFill>
+                <a:latin typeface="Times New Roman" panose="02020603050405020304" pitchFamily="18" charset="0"/>
+                <a:cs typeface="Times New Roman" panose="02020603050405020304" pitchFamily="18" charset="0"/>
+              </a:rPr>
+              <a:t>Bind</a:t>
+            </a:r>
+            <a:r>
+              <a:rPr lang="fr-FR" dirty="0">
+                <a:solidFill>
+                  <a:srgbClr val="24292F"/>
+                </a:solidFill>
+                <a:latin typeface="Times New Roman" panose="02020603050405020304" pitchFamily="18" charset="0"/>
+                <a:cs typeface="Times New Roman" panose="02020603050405020304" pitchFamily="18" charset="0"/>
+              </a:rPr>
+              <a:t> the application to the server</a:t>
+            </a:r>
+            <a:endParaRPr lang="fr-FR" dirty="0">
+              <a:latin typeface="Times New Roman" panose="02020603050405020304" pitchFamily="18" charset="0"/>
+              <a:cs typeface="Times New Roman" panose="02020603050405020304" pitchFamily="18" charset="0"/>
+            </a:endParaRPr>
+          </a:p>
+        </p:txBody>
+      </p:sp>
+    </p:spTree>
+    <p:extLst>
+      <p:ext uri="{BB962C8B-B14F-4D97-AF65-F5344CB8AC3E}">
+        <p14:creationId xmlns:p14="http://schemas.microsoft.com/office/powerpoint/2010/main" val="83230128"/>
+      </p:ext>
+    </p:extLst>
+  </p:cSld>
+  <p:clrMapOvr>
+    <a:masterClrMapping/>
+  </p:clrMapOvr>
+</p:sld>
+</file>
+
+<file path=ppt/slides/slide2.xml><?xml version="1.0" encoding="utf-8"?>
+<p:sld xmlns:a="http://schemas.openxmlformats.org/drawingml/2006/main" xmlns:r="http://schemas.openxmlformats.org/officeDocument/2006/relationships" xmlns:p="http://schemas.openxmlformats.org/presentationml/2006/main">
+  <p:cSld>
+    <p:spTree>
+      <p:nvGrpSpPr>
+        <p:cNvPr id="1" name=""/>
+        <p:cNvGrpSpPr/>
+        <p:nvPr/>
+      </p:nvGrpSpPr>
+      <p:grpSpPr>
+        <a:xfrm>
+          <a:off x="0" y="0"/>
+          <a:ext cx="0" cy="0"/>
+          <a:chOff x="0" y="0"/>
+          <a:chExt cx="0" cy="0"/>
+        </a:xfrm>
+      </p:grpSpPr>
+      <p:sp>
+        <p:nvSpPr>
+          <p:cNvPr id="4" name="Rectangle à coins arrondis 3"/>
+          <p:cNvSpPr/>
+          <p:nvPr/>
+        </p:nvSpPr>
+        <p:spPr>
+          <a:xfrm>
+            <a:off x="674255" y="4186755"/>
+            <a:ext cx="1737360" cy="1737360"/>
+          </a:xfrm>
+          <a:prstGeom prst="roundRect">
+            <a:avLst>
+              <a:gd name="adj" fmla="val 21896"/>
+            </a:avLst>
+          </a:prstGeom>
+          <a:noFill/>
+          <a:ln>
+            <a:solidFill>
+              <a:srgbClr val="4466A0"/>
+            </a:solidFill>
+          </a:ln>
+        </p:spPr>
+        <p:style>
+          <a:lnRef idx="2">
+            <a:schemeClr val="accent1">
+              <a:shade val="50000"/>
+            </a:schemeClr>
+          </a:lnRef>
+          <a:fillRef idx="1">
+            <a:schemeClr val="accent1"/>
+          </a:fillRef>
+          <a:effectRef idx="0">
+            <a:schemeClr val="accent1"/>
+          </a:effectRef>
+          <a:fontRef idx="minor">
+            <a:schemeClr val="lt1"/>
+          </a:fontRef>
+        </p:style>
+        <p:txBody>
+          <a:bodyPr rtlCol="0" anchor="ctr"/>
+          <a:lstStyle/>
+          <a:p>
+            <a:pPr algn="ctr"/>
+            <a:endParaRPr lang="en-US"/>
+          </a:p>
+        </p:txBody>
+      </p:sp>
+      <p:sp>
+        <p:nvSpPr>
+          <p:cNvPr id="5" name="Rectangle à coins arrondis 4"/>
+          <p:cNvSpPr/>
+          <p:nvPr/>
+        </p:nvSpPr>
+        <p:spPr>
+          <a:xfrm>
+            <a:off x="3747616" y="4186755"/>
+            <a:ext cx="1737360" cy="1737360"/>
+          </a:xfrm>
+          <a:prstGeom prst="roundRect">
+            <a:avLst>
+              <a:gd name="adj" fmla="val 21896"/>
+            </a:avLst>
+          </a:prstGeom>
+          <a:noFill/>
+          <a:ln>
+            <a:solidFill>
+              <a:srgbClr val="4466A0"/>
+            </a:solidFill>
+          </a:ln>
+        </p:spPr>
+        <p:style>
+          <a:lnRef idx="2">
+            <a:schemeClr val="accent1">
+              <a:shade val="50000"/>
+            </a:schemeClr>
+          </a:lnRef>
+          <a:fillRef idx="1">
+            <a:schemeClr val="accent1"/>
+          </a:fillRef>
+          <a:effectRef idx="0">
+            <a:schemeClr val="accent1"/>
+          </a:effectRef>
+          <a:fontRef idx="minor">
+            <a:schemeClr val="lt1"/>
+          </a:fontRef>
+        </p:style>
+        <p:txBody>
+          <a:bodyPr rtlCol="0" anchor="ctr"/>
+          <a:lstStyle/>
+          <a:p>
+            <a:pPr algn="ctr"/>
+            <a:endParaRPr lang="en-US"/>
+          </a:p>
+        </p:txBody>
+      </p:sp>
+      <p:cxnSp>
+        <p:nvCxnSpPr>
+          <p:cNvPr id="9" name="Connecteur droit 8"/>
+          <p:cNvCxnSpPr/>
+          <p:nvPr/>
+        </p:nvCxnSpPr>
+        <p:spPr>
+          <a:xfrm flipV="1">
+            <a:off x="2672519" y="5041125"/>
+            <a:ext cx="814193" cy="0"/>
+          </a:xfrm>
+          <a:prstGeom prst="line">
+            <a:avLst/>
+          </a:prstGeom>
+          <a:ln>
+            <a:solidFill>
+              <a:srgbClr val="D4D4D4"/>
+            </a:solidFill>
+          </a:ln>
+        </p:spPr>
+        <p:style>
+          <a:lnRef idx="3">
+            <a:schemeClr val="dk1"/>
+          </a:lnRef>
+          <a:fillRef idx="0">
+            <a:schemeClr val="dk1"/>
+          </a:fillRef>
+          <a:effectRef idx="2">
+            <a:schemeClr val="dk1"/>
+          </a:effectRef>
+          <a:fontRef idx="minor">
+            <a:schemeClr val="tx1"/>
+          </a:fontRef>
+        </p:style>
+      </p:cxnSp>
+      <p:sp>
+        <p:nvSpPr>
+          <p:cNvPr id="15" name="Rectangle 14"/>
+          <p:cNvSpPr/>
+          <p:nvPr/>
+        </p:nvSpPr>
+        <p:spPr>
+          <a:xfrm>
+            <a:off x="3383085" y="6179618"/>
+            <a:ext cx="2521844" cy="430887"/>
+          </a:xfrm>
+          <a:prstGeom prst="rect">
+            <a:avLst/>
+          </a:prstGeom>
+        </p:spPr>
+        <p:txBody>
+          <a:bodyPr wrap="none">
+            <a:spAutoFit/>
+          </a:bodyPr>
+          <a:lstStyle/>
+          <a:p>
+            <a:r>
+              <a:rPr lang="en-US" sz="2200" b="1" i="0" dirty="0">
+                <a:solidFill>
+                  <a:srgbClr val="4466A0"/>
+                </a:solidFill>
+                <a:effectLst/>
+                <a:latin typeface="Tahoma" panose="020B0604030504040204" pitchFamily="34" charset="0"/>
+                <a:ea typeface="Tahoma" panose="020B0604030504040204" pitchFamily="34" charset="0"/>
+                <a:cs typeface="Tahoma" panose="020B0604030504040204" pitchFamily="34" charset="0"/>
+              </a:rPr>
+              <a:t>Vehicle Tracking</a:t>
+            </a:r>
+            <a:endParaRPr lang="en-US" sz="2200" b="1" dirty="0">
+              <a:solidFill>
+                <a:srgbClr val="4466A0"/>
+              </a:solidFill>
+              <a:latin typeface="Tahoma" panose="020B0604030504040204" pitchFamily="34" charset="0"/>
+              <a:ea typeface="Tahoma" panose="020B0604030504040204" pitchFamily="34" charset="0"/>
+              <a:cs typeface="Tahoma" panose="020B0604030504040204" pitchFamily="34" charset="0"/>
+            </a:endParaRPr>
+          </a:p>
+        </p:txBody>
+      </p:sp>
+      <p:sp>
+        <p:nvSpPr>
+          <p:cNvPr id="16" name="Rectangle 15"/>
+          <p:cNvSpPr/>
+          <p:nvPr/>
+        </p:nvSpPr>
+        <p:spPr>
+          <a:xfrm>
+            <a:off x="180222" y="6178387"/>
+            <a:ext cx="2725426" cy="430887"/>
+          </a:xfrm>
+          <a:prstGeom prst="rect">
+            <a:avLst/>
+          </a:prstGeom>
+        </p:spPr>
+        <p:txBody>
+          <a:bodyPr wrap="none">
+            <a:spAutoFit/>
+          </a:bodyPr>
+          <a:lstStyle/>
+          <a:p>
+            <a:r>
+              <a:rPr lang="en-US" sz="2200" b="1" i="0" dirty="0">
+                <a:solidFill>
+                  <a:srgbClr val="4466A0"/>
+                </a:solidFill>
+                <a:effectLst/>
+                <a:latin typeface="Tahoma" panose="020B0604030504040204" pitchFamily="34" charset="0"/>
+                <a:ea typeface="Tahoma" panose="020B0604030504040204" pitchFamily="34" charset="0"/>
+                <a:cs typeface="Tahoma" panose="020B0604030504040204" pitchFamily="34" charset="0"/>
+              </a:rPr>
+              <a:t>Personal Tracking</a:t>
+            </a:r>
+            <a:endParaRPr lang="en-US" sz="2200" b="1" dirty="0">
+              <a:solidFill>
+                <a:srgbClr val="4466A0"/>
+              </a:solidFill>
+              <a:latin typeface="Tahoma" panose="020B0604030504040204" pitchFamily="34" charset="0"/>
+              <a:ea typeface="Tahoma" panose="020B0604030504040204" pitchFamily="34" charset="0"/>
+              <a:cs typeface="Tahoma" panose="020B0604030504040204" pitchFamily="34" charset="0"/>
+            </a:endParaRPr>
+          </a:p>
+        </p:txBody>
+      </p:sp>
+      <p:pic>
+        <p:nvPicPr>
+          <p:cNvPr id="35" name="Image 34">
+            <a:extLst>
+              <a:ext uri="{FF2B5EF4-FFF2-40B4-BE49-F238E27FC236}">
+                <a16:creationId xmlns:a16="http://schemas.microsoft.com/office/drawing/2014/main" id="{8F15C605-997B-4B11-8A14-742BD36E054F}"/>
+              </a:ext>
+            </a:extLst>
+          </p:cNvPr>
+          <p:cNvPicPr>
+            <a:picLocks noChangeAspect="1"/>
+          </p:cNvPicPr>
+          <p:nvPr/>
+        </p:nvPicPr>
+        <p:blipFill rotWithShape="1">
+          <a:blip r:embed="rId2">
+            <a:extLst>
+              <a:ext uri="{BEBA8EAE-BF5A-486C-A8C5-ECC9F3942E4B}">
+                <a14:imgProps xmlns:a14="http://schemas.microsoft.com/office/drawing/2010/main">
+                  <a14:imgLayer r:embed="rId3">
+                    <a14:imgEffect>
+                      <a14:sharpenSoften amount="50000"/>
+                    </a14:imgEffect>
+                    <a14:imgEffect>
+                      <a14:brightnessContrast bright="20000" contrast="-40000"/>
+                    </a14:imgEffect>
+                  </a14:imgLayer>
+                </a14:imgProps>
+              </a:ext>
+              <a:ext uri="{28A0092B-C50C-407E-A947-70E740481C1C}">
+                <a14:useLocalDpi xmlns:a14="http://schemas.microsoft.com/office/drawing/2010/main" val="0"/>
+              </a:ext>
+            </a:extLst>
+          </a:blip>
+          <a:srcRect l="15230" t="8310" r="14955" b="11489"/>
+          <a:stretch/>
+        </p:blipFill>
+        <p:spPr>
+          <a:xfrm>
+            <a:off x="220559" y="220374"/>
+            <a:ext cx="655852" cy="664213"/>
+          </a:xfrm>
+          <a:prstGeom prst="rect">
+            <a:avLst/>
+          </a:prstGeom>
+        </p:spPr>
+      </p:pic>
+      <p:sp>
+        <p:nvSpPr>
+          <p:cNvPr id="8" name="Rectangle 7">
+            <a:extLst>
+              <a:ext uri="{FF2B5EF4-FFF2-40B4-BE49-F238E27FC236}">
+                <a16:creationId xmlns:a16="http://schemas.microsoft.com/office/drawing/2014/main" id="{FD7EA413-1E7B-4308-8721-9A1477E50078}"/>
+              </a:ext>
+            </a:extLst>
+          </p:cNvPr>
+          <p:cNvSpPr/>
+          <p:nvPr/>
+        </p:nvSpPr>
+        <p:spPr>
+          <a:xfrm>
+            <a:off x="934396" y="337036"/>
+            <a:ext cx="3629520" cy="430887"/>
+          </a:xfrm>
+          <a:prstGeom prst="rect">
+            <a:avLst/>
+          </a:prstGeom>
+        </p:spPr>
+        <p:txBody>
+          <a:bodyPr wrap="none">
+            <a:spAutoFit/>
+          </a:bodyPr>
+          <a:lstStyle/>
+          <a:p>
+            <a:r>
+              <a:rPr lang="en-US" sz="2200" dirty="0">
+                <a:solidFill>
+                  <a:srgbClr val="4466A0"/>
+                </a:solidFill>
+                <a:latin typeface="Aharoni" panose="02010803020104030203" pitchFamily="2" charset="-79"/>
+                <a:ea typeface="Tahoma" panose="020B0604030504040204" pitchFamily="34" charset="0"/>
+                <a:cs typeface="Aharoni" panose="02010803020104030203" pitchFamily="2" charset="-79"/>
+              </a:rPr>
+              <a:t>OVERVIEW ABOUT I-</a:t>
+            </a:r>
+            <a:r>
+              <a:rPr lang="en-US" sz="2200" dirty="0">
+                <a:latin typeface="Aharoni" panose="02010803020104030203" pitchFamily="2" charset="-79"/>
+                <a:ea typeface="Tahoma" panose="020B0604030504040204" pitchFamily="34" charset="0"/>
+                <a:cs typeface="Aharoni" panose="02010803020104030203" pitchFamily="2" charset="-79"/>
+              </a:rPr>
+              <a:t>Track</a:t>
+            </a:r>
+            <a:endParaRPr lang="fr-FR" sz="2200" dirty="0">
+              <a:latin typeface="Aharoni" panose="02010803020104030203" pitchFamily="2" charset="-79"/>
+              <a:ea typeface="Tahoma" panose="020B0604030504040204" pitchFamily="34" charset="0"/>
+              <a:cs typeface="Aharoni" panose="02010803020104030203" pitchFamily="2" charset="-79"/>
+            </a:endParaRPr>
+          </a:p>
+        </p:txBody>
+      </p:sp>
+      <p:sp>
+        <p:nvSpPr>
+          <p:cNvPr id="36" name="Rectangle à coins arrondis 3">
+            <a:extLst>
+              <a:ext uri="{FF2B5EF4-FFF2-40B4-BE49-F238E27FC236}">
+                <a16:creationId xmlns:a16="http://schemas.microsoft.com/office/drawing/2014/main" id="{7CFBF3D0-9FFD-453B-BAE1-298B876F4153}"/>
+              </a:ext>
+            </a:extLst>
+          </p:cNvPr>
+          <p:cNvSpPr/>
+          <p:nvPr/>
+        </p:nvSpPr>
+        <p:spPr>
+          <a:xfrm>
+            <a:off x="6707024" y="4186755"/>
+            <a:ext cx="1737360" cy="1737360"/>
+          </a:xfrm>
+          <a:prstGeom prst="roundRect">
+            <a:avLst>
+              <a:gd name="adj" fmla="val 21896"/>
+            </a:avLst>
+          </a:prstGeom>
+          <a:noFill/>
+          <a:ln>
+            <a:solidFill>
+              <a:srgbClr val="4466A0"/>
+            </a:solidFill>
+          </a:ln>
+        </p:spPr>
+        <p:style>
+          <a:lnRef idx="2">
+            <a:schemeClr val="accent1">
+              <a:shade val="50000"/>
+            </a:schemeClr>
+          </a:lnRef>
+          <a:fillRef idx="1">
+            <a:schemeClr val="accent1"/>
+          </a:fillRef>
+          <a:effectRef idx="0">
+            <a:schemeClr val="accent1"/>
+          </a:effectRef>
+          <a:fontRef idx="minor">
+            <a:schemeClr val="lt1"/>
+          </a:fontRef>
+        </p:style>
+        <p:txBody>
+          <a:bodyPr rtlCol="0" anchor="ctr"/>
+          <a:lstStyle/>
+          <a:p>
+            <a:pPr algn="ctr"/>
+            <a:endParaRPr lang="en-US"/>
+          </a:p>
+        </p:txBody>
+      </p:sp>
+      <p:sp>
+        <p:nvSpPr>
+          <p:cNvPr id="37" name="Rectangle à coins arrondis 4">
+            <a:extLst>
+              <a:ext uri="{FF2B5EF4-FFF2-40B4-BE49-F238E27FC236}">
+                <a16:creationId xmlns:a16="http://schemas.microsoft.com/office/drawing/2014/main" id="{8F796B65-7C87-447E-AFCC-E56D834D3868}"/>
+              </a:ext>
+            </a:extLst>
+          </p:cNvPr>
+          <p:cNvSpPr/>
+          <p:nvPr/>
+        </p:nvSpPr>
+        <p:spPr>
+          <a:xfrm>
+            <a:off x="9780385" y="4186755"/>
+            <a:ext cx="1737360" cy="1737360"/>
+          </a:xfrm>
+          <a:prstGeom prst="roundRect">
+            <a:avLst>
+              <a:gd name="adj" fmla="val 21896"/>
+            </a:avLst>
+          </a:prstGeom>
+          <a:noFill/>
+          <a:ln>
+            <a:solidFill>
+              <a:srgbClr val="4466A0"/>
+            </a:solidFill>
+          </a:ln>
+        </p:spPr>
+        <p:style>
+          <a:lnRef idx="2">
+            <a:schemeClr val="accent1">
+              <a:shade val="50000"/>
+            </a:schemeClr>
+          </a:lnRef>
+          <a:fillRef idx="1">
+            <a:schemeClr val="accent1"/>
+          </a:fillRef>
+          <a:effectRef idx="0">
+            <a:schemeClr val="accent1"/>
+          </a:effectRef>
+          <a:fontRef idx="minor">
+            <a:schemeClr val="lt1"/>
+          </a:fontRef>
+        </p:style>
+        <p:txBody>
+          <a:bodyPr rtlCol="0" anchor="ctr"/>
+          <a:lstStyle/>
+          <a:p>
+            <a:pPr algn="ctr"/>
+            <a:endParaRPr lang="en-US"/>
+          </a:p>
+        </p:txBody>
+      </p:sp>
+      <p:cxnSp>
+        <p:nvCxnSpPr>
+          <p:cNvPr id="38" name="Connecteur droit 37">
+            <a:extLst>
+              <a:ext uri="{FF2B5EF4-FFF2-40B4-BE49-F238E27FC236}">
+                <a16:creationId xmlns:a16="http://schemas.microsoft.com/office/drawing/2014/main" id="{A12D14EA-2EC2-4B0B-B9B0-C64A648F3A5A}"/>
+              </a:ext>
+            </a:extLst>
+          </p:cNvPr>
+          <p:cNvCxnSpPr/>
+          <p:nvPr/>
+        </p:nvCxnSpPr>
+        <p:spPr>
+          <a:xfrm flipV="1">
+            <a:off x="8705288" y="5041125"/>
+            <a:ext cx="814193" cy="0"/>
+          </a:xfrm>
+          <a:prstGeom prst="line">
+            <a:avLst/>
+          </a:prstGeom>
+          <a:ln>
+            <a:solidFill>
+              <a:srgbClr val="D4D4D4"/>
+            </a:solidFill>
+          </a:ln>
+        </p:spPr>
+        <p:style>
+          <a:lnRef idx="3">
+            <a:schemeClr val="dk1"/>
+          </a:lnRef>
+          <a:fillRef idx="0">
+            <a:schemeClr val="dk1"/>
+          </a:fillRef>
+          <a:effectRef idx="2">
+            <a:schemeClr val="dk1"/>
+          </a:effectRef>
+          <a:fontRef idx="minor">
+            <a:schemeClr val="tx1"/>
+          </a:fontRef>
+        </p:style>
+      </p:cxnSp>
+      <p:sp>
+        <p:nvSpPr>
+          <p:cNvPr id="40" name="Rectangle 39">
+            <a:extLst>
+              <a:ext uri="{FF2B5EF4-FFF2-40B4-BE49-F238E27FC236}">
+                <a16:creationId xmlns:a16="http://schemas.microsoft.com/office/drawing/2014/main" id="{8FB8CED3-BFD2-4E78-8261-35861FA1B302}"/>
+              </a:ext>
+            </a:extLst>
+          </p:cNvPr>
+          <p:cNvSpPr/>
+          <p:nvPr/>
+        </p:nvSpPr>
+        <p:spPr>
+          <a:xfrm>
+            <a:off x="9430622" y="6179618"/>
+            <a:ext cx="2436886" cy="430887"/>
+          </a:xfrm>
+          <a:prstGeom prst="rect">
+            <a:avLst/>
+          </a:prstGeom>
+        </p:spPr>
+        <p:txBody>
+          <a:bodyPr wrap="none">
+            <a:spAutoFit/>
+          </a:bodyPr>
+          <a:lstStyle/>
+          <a:p>
+            <a:r>
+              <a:rPr lang="en-US" sz="2200" b="1" i="0" dirty="0">
+                <a:solidFill>
+                  <a:srgbClr val="4466A0"/>
+                </a:solidFill>
+                <a:effectLst/>
+                <a:latin typeface="Tahoma" panose="020B0604030504040204" pitchFamily="34" charset="0"/>
+                <a:ea typeface="Tahoma" panose="020B0604030504040204" pitchFamily="34" charset="0"/>
+                <a:cs typeface="Tahoma" panose="020B0604030504040204" pitchFamily="34" charset="0"/>
+              </a:rPr>
+              <a:t>Mobile Tracking</a:t>
+            </a:r>
+            <a:endParaRPr lang="en-US" sz="2200" b="1" dirty="0">
+              <a:solidFill>
+                <a:srgbClr val="4466A0"/>
+              </a:solidFill>
+              <a:latin typeface="Tahoma" panose="020B0604030504040204" pitchFamily="34" charset="0"/>
+              <a:ea typeface="Tahoma" panose="020B0604030504040204" pitchFamily="34" charset="0"/>
+              <a:cs typeface="Tahoma" panose="020B0604030504040204" pitchFamily="34" charset="0"/>
+            </a:endParaRPr>
+          </a:p>
+        </p:txBody>
+      </p:sp>
+      <p:sp>
+        <p:nvSpPr>
+          <p:cNvPr id="41" name="Rectangle 40">
+            <a:extLst>
+              <a:ext uri="{FF2B5EF4-FFF2-40B4-BE49-F238E27FC236}">
+                <a16:creationId xmlns:a16="http://schemas.microsoft.com/office/drawing/2014/main" id="{12C3555A-F12B-419C-86A6-77073FEAFF93}"/>
+              </a:ext>
+            </a:extLst>
+          </p:cNvPr>
+          <p:cNvSpPr/>
+          <p:nvPr/>
+        </p:nvSpPr>
+        <p:spPr>
+          <a:xfrm>
+            <a:off x="6559539" y="6181776"/>
+            <a:ext cx="2111475" cy="430887"/>
+          </a:xfrm>
+          <a:prstGeom prst="rect">
+            <a:avLst/>
+          </a:prstGeom>
+        </p:spPr>
+        <p:txBody>
+          <a:bodyPr wrap="none">
+            <a:spAutoFit/>
+          </a:bodyPr>
+          <a:lstStyle/>
+          <a:p>
+            <a:r>
+              <a:rPr lang="en-US" sz="2200" b="1" i="0" dirty="0">
+                <a:solidFill>
+                  <a:srgbClr val="4466A0"/>
+                </a:solidFill>
+                <a:effectLst/>
+                <a:latin typeface="Tahoma" panose="020B0604030504040204" pitchFamily="34" charset="0"/>
+                <a:ea typeface="Tahoma" panose="020B0604030504040204" pitchFamily="34" charset="0"/>
+                <a:cs typeface="Tahoma" panose="020B0604030504040204" pitchFamily="34" charset="0"/>
+              </a:rPr>
+              <a:t>Pets Tracking</a:t>
+            </a:r>
+            <a:endParaRPr lang="en-US" sz="2200" b="1" dirty="0">
+              <a:solidFill>
+                <a:srgbClr val="4466A0"/>
+              </a:solidFill>
+              <a:latin typeface="Tahoma" panose="020B0604030504040204" pitchFamily="34" charset="0"/>
+              <a:ea typeface="Tahoma" panose="020B0604030504040204" pitchFamily="34" charset="0"/>
+              <a:cs typeface="Tahoma" panose="020B0604030504040204" pitchFamily="34" charset="0"/>
+            </a:endParaRPr>
+          </a:p>
+        </p:txBody>
+      </p:sp>
+      <p:cxnSp>
+        <p:nvCxnSpPr>
+          <p:cNvPr id="43" name="Connecteur droit 42">
+            <a:extLst>
+              <a:ext uri="{FF2B5EF4-FFF2-40B4-BE49-F238E27FC236}">
+                <a16:creationId xmlns:a16="http://schemas.microsoft.com/office/drawing/2014/main" id="{B52B9B95-7EC8-439E-8785-C966EC567C07}"/>
+              </a:ext>
+            </a:extLst>
+          </p:cNvPr>
+          <p:cNvCxnSpPr/>
+          <p:nvPr/>
+        </p:nvCxnSpPr>
+        <p:spPr>
+          <a:xfrm flipV="1">
+            <a:off x="5688903" y="5041125"/>
+            <a:ext cx="814193" cy="0"/>
+          </a:xfrm>
+          <a:prstGeom prst="line">
+            <a:avLst/>
+          </a:prstGeom>
+          <a:ln>
+            <a:solidFill>
+              <a:srgbClr val="D4D4D4"/>
+            </a:solidFill>
+          </a:ln>
+        </p:spPr>
+        <p:style>
+          <a:lnRef idx="3">
+            <a:schemeClr val="dk1"/>
+          </a:lnRef>
+          <a:fillRef idx="0">
+            <a:schemeClr val="dk1"/>
+          </a:fillRef>
+          <a:effectRef idx="2">
+            <a:schemeClr val="dk1"/>
+          </a:effectRef>
+          <a:fontRef idx="minor">
+            <a:schemeClr val="tx1"/>
+          </a:fontRef>
+        </p:style>
+      </p:cxnSp>
+      <p:pic>
+        <p:nvPicPr>
+          <p:cNvPr id="12" name="Graphique 11" descr="Groupe d’hommes">
+            <a:extLst>
+              <a:ext uri="{FF2B5EF4-FFF2-40B4-BE49-F238E27FC236}">
+                <a16:creationId xmlns:a16="http://schemas.microsoft.com/office/drawing/2014/main" id="{1338EA0E-4806-40F1-A030-869761931147}"/>
+              </a:ext>
+            </a:extLst>
+          </p:cNvPr>
+          <p:cNvPicPr>
+            <a:picLocks noChangeAspect="1"/>
+          </p:cNvPicPr>
+          <p:nvPr/>
+        </p:nvPicPr>
+        <p:blipFill>
+          <a:blip r:embed="rId4">
+            <a:extLst>
+              <a:ext uri="{28A0092B-C50C-407E-A947-70E740481C1C}">
+                <a14:useLocalDpi xmlns:a14="http://schemas.microsoft.com/office/drawing/2010/main" val="0"/>
+              </a:ext>
+              <a:ext uri="{96DAC541-7B7A-43D3-8B79-37D633B846F1}">
+                <asvg:svgBlip xmlns:asvg="http://schemas.microsoft.com/office/drawing/2016/SVG/main" r:embed="rId5"/>
+              </a:ext>
+            </a:extLst>
+          </a:blip>
+          <a:stretch>
+            <a:fillRect/>
+          </a:stretch>
+        </p:blipFill>
+        <p:spPr>
+          <a:xfrm>
+            <a:off x="1040015" y="4576224"/>
+            <a:ext cx="1005840" cy="1005840"/>
+          </a:xfrm>
+          <a:prstGeom prst="rect">
+            <a:avLst/>
+          </a:prstGeom>
+        </p:spPr>
+      </p:pic>
+      <p:pic>
+        <p:nvPicPr>
+          <p:cNvPr id="17" name="Graphique 16" descr="Bus">
+            <a:extLst>
+              <a:ext uri="{FF2B5EF4-FFF2-40B4-BE49-F238E27FC236}">
+                <a16:creationId xmlns:a16="http://schemas.microsoft.com/office/drawing/2014/main" id="{12AB9058-18B4-410D-B7AE-C1708D8A8CAE}"/>
+              </a:ext>
+            </a:extLst>
+          </p:cNvPr>
+          <p:cNvPicPr>
+            <a:picLocks noChangeAspect="1"/>
+          </p:cNvPicPr>
+          <p:nvPr/>
+        </p:nvPicPr>
+        <p:blipFill>
+          <a:blip r:embed="rId6">
+            <a:extLst>
+              <a:ext uri="{28A0092B-C50C-407E-A947-70E740481C1C}">
+                <a14:useLocalDpi xmlns:a14="http://schemas.microsoft.com/office/drawing/2010/main" val="0"/>
+              </a:ext>
+              <a:ext uri="{96DAC541-7B7A-43D3-8B79-37D633B846F1}">
+                <asvg:svgBlip xmlns:asvg="http://schemas.microsoft.com/office/drawing/2016/SVG/main" r:embed="rId7"/>
+              </a:ext>
+            </a:extLst>
+          </a:blip>
+          <a:stretch>
+            <a:fillRect/>
+          </a:stretch>
+        </p:blipFill>
+        <p:spPr>
+          <a:xfrm>
+            <a:off x="4504233" y="4897891"/>
+            <a:ext cx="914400" cy="914400"/>
+          </a:xfrm>
+          <a:prstGeom prst="rect">
+            <a:avLst/>
+          </a:prstGeom>
+        </p:spPr>
+      </p:pic>
+      <p:pic>
+        <p:nvPicPr>
+          <p:cNvPr id="23" name="Graphique 22" descr="Voiture">
+            <a:extLst>
+              <a:ext uri="{FF2B5EF4-FFF2-40B4-BE49-F238E27FC236}">
+                <a16:creationId xmlns:a16="http://schemas.microsoft.com/office/drawing/2014/main" id="{E7686DCC-FA3F-48F4-8946-564019C44354}"/>
+              </a:ext>
+            </a:extLst>
+          </p:cNvPr>
+          <p:cNvPicPr>
+            <a:picLocks noChangeAspect="1"/>
+          </p:cNvPicPr>
+          <p:nvPr/>
+        </p:nvPicPr>
+        <p:blipFill>
+          <a:blip r:embed="rId8">
+            <a:extLst>
+              <a:ext uri="{28A0092B-C50C-407E-A947-70E740481C1C}">
+                <a14:useLocalDpi xmlns:a14="http://schemas.microsoft.com/office/drawing/2010/main" val="0"/>
+              </a:ext>
+              <a:ext uri="{96DAC541-7B7A-43D3-8B79-37D633B846F1}">
+                <asvg:svgBlip xmlns:asvg="http://schemas.microsoft.com/office/drawing/2016/SVG/main" r:embed="rId9"/>
+              </a:ext>
+            </a:extLst>
+          </a:blip>
+          <a:stretch>
+            <a:fillRect/>
+          </a:stretch>
+        </p:blipFill>
+        <p:spPr>
+          <a:xfrm>
+            <a:off x="3884975" y="4416192"/>
+            <a:ext cx="914400" cy="914400"/>
+          </a:xfrm>
+          <a:prstGeom prst="rect">
+            <a:avLst/>
+          </a:prstGeom>
+        </p:spPr>
+      </p:pic>
+      <p:pic>
+        <p:nvPicPr>
+          <p:cNvPr id="1026" name="Picture 2" descr="Pet Icon #57962 - Free Icons Library">
+            <a:extLst>
+              <a:ext uri="{FF2B5EF4-FFF2-40B4-BE49-F238E27FC236}">
+                <a16:creationId xmlns:a16="http://schemas.microsoft.com/office/drawing/2014/main" id="{2ECCF8DB-377F-4A60-A13F-5853929FB1E2}"/>
+              </a:ext>
+            </a:extLst>
+          </p:cNvPr>
+          <p:cNvPicPr>
+            <a:picLocks noChangeAspect="1" noChangeArrowheads="1"/>
+          </p:cNvPicPr>
+          <p:nvPr/>
+        </p:nvPicPr>
+        <p:blipFill>
+          <a:blip r:embed="rId10">
+            <a:extLst>
+              <a:ext uri="{28A0092B-C50C-407E-A947-70E740481C1C}">
+                <a14:useLocalDpi xmlns:a14="http://schemas.microsoft.com/office/drawing/2010/main" val="0"/>
+              </a:ext>
+            </a:extLst>
+          </a:blip>
+          <a:srcRect/>
+          <a:stretch>
+            <a:fillRect/>
+          </a:stretch>
+        </p:blipFill>
+        <p:spPr bwMode="auto">
+          <a:xfrm>
+            <a:off x="6889904" y="4393344"/>
+            <a:ext cx="1371600" cy="1371600"/>
+          </a:xfrm>
+          <a:prstGeom prst="rect">
+            <a:avLst/>
+          </a:prstGeom>
+          <a:noFill/>
+          <a:extLst>
+            <a:ext uri="{909E8E84-426E-40DD-AFC4-6F175D3DCCD1}">
+              <a14:hiddenFill xmlns:a14="http://schemas.microsoft.com/office/drawing/2010/main">
+                <a:solidFill>
+                  <a:srgbClr val="FFFFFF"/>
+                </a:solidFill>
+              </a14:hiddenFill>
+            </a:ext>
+          </a:extLst>
+        </p:spPr>
+      </p:pic>
+      <p:pic>
+        <p:nvPicPr>
+          <p:cNvPr id="44" name="Graphique 43" descr="Smartphone">
+            <a:extLst>
+              <a:ext uri="{FF2B5EF4-FFF2-40B4-BE49-F238E27FC236}">
+                <a16:creationId xmlns:a16="http://schemas.microsoft.com/office/drawing/2014/main" id="{5B8E7CD2-5743-40ED-B4FA-DD1BB99BD6A9}"/>
+              </a:ext>
+            </a:extLst>
+          </p:cNvPr>
+          <p:cNvPicPr>
+            <a:picLocks noChangeAspect="1"/>
+          </p:cNvPicPr>
+          <p:nvPr/>
+        </p:nvPicPr>
+        <p:blipFill>
+          <a:blip r:embed="rId11">
+            <a:extLst>
+              <a:ext uri="{28A0092B-C50C-407E-A947-70E740481C1C}">
+                <a14:useLocalDpi xmlns:a14="http://schemas.microsoft.com/office/drawing/2010/main" val="0"/>
+              </a:ext>
+              <a:ext uri="{96DAC541-7B7A-43D3-8B79-37D633B846F1}">
+                <asvg:svgBlip xmlns:asvg="http://schemas.microsoft.com/office/drawing/2016/SVG/main" r:embed="rId12"/>
+              </a:ext>
+            </a:extLst>
+          </a:blip>
+          <a:stretch>
+            <a:fillRect/>
+          </a:stretch>
+        </p:blipFill>
+        <p:spPr>
+          <a:xfrm>
+            <a:off x="9878507" y="4569282"/>
+            <a:ext cx="640080" cy="640080"/>
+          </a:xfrm>
+          <a:prstGeom prst="rect">
+            <a:avLst/>
+          </a:prstGeom>
+        </p:spPr>
+      </p:pic>
+      <p:pic>
+        <p:nvPicPr>
+          <p:cNvPr id="46" name="Graphique 45" descr="Ordinateur portable">
+            <a:extLst>
+              <a:ext uri="{FF2B5EF4-FFF2-40B4-BE49-F238E27FC236}">
+                <a16:creationId xmlns:a16="http://schemas.microsoft.com/office/drawing/2014/main" id="{ABA71BC0-5C92-475E-83F4-260112DB1521}"/>
+              </a:ext>
+            </a:extLst>
+          </p:cNvPr>
+          <p:cNvPicPr>
+            <a:picLocks noChangeAspect="1"/>
+          </p:cNvPicPr>
+          <p:nvPr/>
+        </p:nvPicPr>
+        <p:blipFill>
+          <a:blip r:embed="rId13">
+            <a:extLst>
+              <a:ext uri="{28A0092B-C50C-407E-A947-70E740481C1C}">
+                <a14:useLocalDpi xmlns:a14="http://schemas.microsoft.com/office/drawing/2010/main" val="0"/>
+              </a:ext>
+              <a:ext uri="{96DAC541-7B7A-43D3-8B79-37D633B846F1}">
+                <asvg:svgBlip xmlns:asvg="http://schemas.microsoft.com/office/drawing/2016/SVG/main" r:embed="rId14"/>
+              </a:ext>
+            </a:extLst>
+          </a:blip>
+          <a:stretch>
+            <a:fillRect/>
+          </a:stretch>
+        </p:blipFill>
+        <p:spPr>
+          <a:xfrm>
+            <a:off x="10518587" y="4752162"/>
+            <a:ext cx="914400" cy="914400"/>
+          </a:xfrm>
+          <a:prstGeom prst="rect">
+            <a:avLst/>
+          </a:prstGeom>
+        </p:spPr>
+      </p:pic>
+      <p:sp>
+        <p:nvSpPr>
+          <p:cNvPr id="49" name="Rectangle : coins arrondis 48">
+            <a:extLst>
+              <a:ext uri="{FF2B5EF4-FFF2-40B4-BE49-F238E27FC236}">
+                <a16:creationId xmlns:a16="http://schemas.microsoft.com/office/drawing/2014/main" id="{07FCF986-90FC-42EB-8036-F6EE4DBD5ABC}"/>
+              </a:ext>
+            </a:extLst>
+          </p:cNvPr>
+          <p:cNvSpPr/>
+          <p:nvPr/>
+        </p:nvSpPr>
+        <p:spPr>
+          <a:xfrm>
+            <a:off x="220559" y="3120032"/>
+            <a:ext cx="11718300" cy="954107"/>
+          </a:xfrm>
+          <a:prstGeom prst="roundRect">
+            <a:avLst>
+              <a:gd name="adj" fmla="val 25679"/>
+            </a:avLst>
+          </a:prstGeom>
+          <a:solidFill>
+            <a:srgbClr val="F5F9FD"/>
+          </a:solidFill>
+          <a:ln>
+            <a:noFill/>
+          </a:ln>
+        </p:spPr>
+        <p:style>
+          <a:lnRef idx="2">
+            <a:schemeClr val="accent1">
+              <a:shade val="50000"/>
+            </a:schemeClr>
+          </a:lnRef>
+          <a:fillRef idx="1">
+            <a:schemeClr val="accent1"/>
+          </a:fillRef>
+          <a:effectRef idx="0">
+            <a:schemeClr val="accent1"/>
+          </a:effectRef>
+          <a:fontRef idx="minor">
+            <a:schemeClr val="lt1"/>
+          </a:fontRef>
+        </p:style>
+        <p:txBody>
+          <a:bodyPr rtlCol="0" anchor="ctr"/>
+          <a:lstStyle/>
+          <a:p>
+            <a:pPr algn="ctr"/>
+            <a:r>
+              <a:rPr lang="en-US" sz="1600" b="1" dirty="0">
+                <a:solidFill>
+                  <a:schemeClr val="tx1"/>
+                </a:solidFill>
+                <a:latin typeface="Tahoma" panose="020B0604030504040204" pitchFamily="34" charset="0"/>
+                <a:ea typeface="Tahoma" panose="020B0604030504040204" pitchFamily="34" charset="0"/>
+                <a:cs typeface="Tahoma" panose="020B0604030504040204" pitchFamily="34" charset="0"/>
+              </a:rPr>
+              <a:t>	     We, at I-Track, are fully dedicated to ensure the best tracking services for all our clients. We provide services related to tracking available</a:t>
+            </a:r>
+            <a:r>
+              <a:rPr lang="fr-FR" sz="1600" b="1" dirty="0">
+                <a:solidFill>
+                  <a:schemeClr val="tx1"/>
+                </a:solidFill>
+                <a:latin typeface="Tahoma" panose="020B0604030504040204" pitchFamily="34" charset="0"/>
+                <a:ea typeface="Tahoma" panose="020B0604030504040204" pitchFamily="34" charset="0"/>
+                <a:cs typeface="Tahoma" panose="020B0604030504040204" pitchFamily="34" charset="0"/>
+              </a:rPr>
+              <a:t> in four </a:t>
+            </a:r>
+            <a:r>
+              <a:rPr lang="en-US" sz="1600" b="1" dirty="0">
+                <a:solidFill>
+                  <a:schemeClr val="tx1"/>
+                </a:solidFill>
+                <a:latin typeface="Tahoma" panose="020B0604030504040204" pitchFamily="34" charset="0"/>
+                <a:ea typeface="Tahoma" panose="020B0604030504040204" pitchFamily="34" charset="0"/>
+                <a:cs typeface="Tahoma" panose="020B0604030504040204" pitchFamily="34" charset="0"/>
+              </a:rPr>
+              <a:t>domains</a:t>
+            </a:r>
+            <a:r>
+              <a:rPr lang="fr-FR" sz="1600" b="1" dirty="0">
+                <a:solidFill>
+                  <a:schemeClr val="tx1"/>
+                </a:solidFill>
+                <a:latin typeface="Tahoma" panose="020B0604030504040204" pitchFamily="34" charset="0"/>
+                <a:ea typeface="Tahoma" panose="020B0604030504040204" pitchFamily="34" charset="0"/>
+                <a:cs typeface="Tahoma" panose="020B0604030504040204" pitchFamily="34" charset="0"/>
+              </a:rPr>
+              <a:t> :</a:t>
+            </a:r>
+            <a:endParaRPr lang="en-US" sz="1600" b="1" dirty="0">
+              <a:solidFill>
+                <a:schemeClr val="tx1"/>
+              </a:solidFill>
+              <a:latin typeface="Tahoma" panose="020B0604030504040204" pitchFamily="34" charset="0"/>
+              <a:ea typeface="Tahoma" panose="020B0604030504040204" pitchFamily="34" charset="0"/>
+              <a:cs typeface="Tahoma" panose="020B0604030504040204" pitchFamily="34" charset="0"/>
+            </a:endParaRPr>
+          </a:p>
+        </p:txBody>
+      </p:sp>
+      <p:pic>
+        <p:nvPicPr>
+          <p:cNvPr id="1028" name="Picture 4" descr="Globalturn | Manage Your Job">
+            <a:extLst>
+              <a:ext uri="{FF2B5EF4-FFF2-40B4-BE49-F238E27FC236}">
+                <a16:creationId xmlns:a16="http://schemas.microsoft.com/office/drawing/2014/main" id="{F9C76E44-A52D-4BE6-B4C0-45CA5F9F5C3E}"/>
+              </a:ext>
+            </a:extLst>
+          </p:cNvPr>
+          <p:cNvPicPr>
+            <a:picLocks noChangeAspect="1" noChangeArrowheads="1"/>
+          </p:cNvPicPr>
+          <p:nvPr/>
+        </p:nvPicPr>
+        <p:blipFill>
+          <a:blip r:embed="rId15">
+            <a:extLst>
+              <a:ext uri="{28A0092B-C50C-407E-A947-70E740481C1C}">
+                <a14:useLocalDpi xmlns:a14="http://schemas.microsoft.com/office/drawing/2010/main" val="0"/>
+              </a:ext>
+            </a:extLst>
+          </a:blip>
+          <a:srcRect/>
+          <a:stretch>
+            <a:fillRect/>
+          </a:stretch>
+        </p:blipFill>
+        <p:spPr bwMode="auto">
+          <a:xfrm>
+            <a:off x="198830" y="1378955"/>
+            <a:ext cx="731520" cy="1043637"/>
+          </a:xfrm>
+          <a:prstGeom prst="rect">
+            <a:avLst/>
+          </a:prstGeom>
+          <a:noFill/>
+          <a:extLst>
+            <a:ext uri="{909E8E84-426E-40DD-AFC4-6F175D3DCCD1}">
+              <a14:hiddenFill xmlns:a14="http://schemas.microsoft.com/office/drawing/2010/main">
+                <a:solidFill>
+                  <a:srgbClr val="FFFFFF"/>
+                </a:solidFill>
+              </a14:hiddenFill>
+            </a:ext>
+          </a:extLst>
+        </p:spPr>
+      </p:pic>
+      <p:sp>
+        <p:nvSpPr>
+          <p:cNvPr id="50" name="Rectangle : coins arrondis 49">
+            <a:extLst>
+              <a:ext uri="{FF2B5EF4-FFF2-40B4-BE49-F238E27FC236}">
+                <a16:creationId xmlns:a16="http://schemas.microsoft.com/office/drawing/2014/main" id="{2806EF47-C956-458B-8D88-88C65C6F8073}"/>
+              </a:ext>
+            </a:extLst>
+          </p:cNvPr>
+          <p:cNvSpPr/>
+          <p:nvPr/>
+        </p:nvSpPr>
+        <p:spPr>
+          <a:xfrm>
+            <a:off x="3130658" y="1127181"/>
+            <a:ext cx="8808200" cy="1764394"/>
+          </a:xfrm>
+          <a:prstGeom prst="roundRect">
+            <a:avLst>
+              <a:gd name="adj" fmla="val 11397"/>
+            </a:avLst>
+          </a:prstGeom>
+          <a:solidFill>
+            <a:srgbClr val="F9F9F9"/>
+          </a:solidFill>
+          <a:ln>
+            <a:noFill/>
+          </a:ln>
+        </p:spPr>
+        <p:style>
+          <a:lnRef idx="2">
+            <a:schemeClr val="accent1">
+              <a:shade val="50000"/>
+            </a:schemeClr>
+          </a:lnRef>
+          <a:fillRef idx="1">
+            <a:schemeClr val="accent1"/>
+          </a:fillRef>
+          <a:effectRef idx="0">
+            <a:schemeClr val="accent1"/>
+          </a:effectRef>
+          <a:fontRef idx="minor">
+            <a:schemeClr val="lt1"/>
+          </a:fontRef>
+        </p:style>
+        <p:txBody>
+          <a:bodyPr rtlCol="0" anchor="ctr"/>
+          <a:lstStyle/>
+          <a:p>
+            <a:pPr marL="285750" indent="-285750" algn="just">
+              <a:buFont typeface="Arial" panose="020B0604020202020204" pitchFamily="34" charset="0"/>
+              <a:buChar char="•"/>
+            </a:pPr>
+            <a:r>
+              <a:rPr lang="en-US" sz="1700" b="1" dirty="0">
+                <a:solidFill>
+                  <a:srgbClr val="4466A0"/>
+                </a:solidFill>
+                <a:latin typeface="Tahoma" panose="020B0604030504040204" pitchFamily="34" charset="0"/>
+                <a:ea typeface="Tahoma" panose="020B0604030504040204" pitchFamily="34" charset="0"/>
+                <a:cs typeface="Tahoma" panose="020B0604030504040204" pitchFamily="34" charset="0"/>
+              </a:rPr>
+              <a:t>I-Track is a part of the IT/ T</a:t>
+            </a:r>
+            <a:r>
+              <a:rPr lang="fr-FR" sz="1700" b="1" dirty="0" err="1">
+                <a:solidFill>
+                  <a:srgbClr val="4466A0"/>
+                </a:solidFill>
+                <a:latin typeface="Tahoma" panose="020B0604030504040204" pitchFamily="34" charset="0"/>
+                <a:ea typeface="Tahoma" panose="020B0604030504040204" pitchFamily="34" charset="0"/>
+                <a:cs typeface="Tahoma" panose="020B0604030504040204" pitchFamily="34" charset="0"/>
+              </a:rPr>
+              <a:t>echnology</a:t>
+            </a:r>
+            <a:r>
+              <a:rPr lang="fr-FR" sz="1700" b="1" dirty="0">
+                <a:solidFill>
+                  <a:srgbClr val="4466A0"/>
+                </a:solidFill>
+                <a:latin typeface="Tahoma" panose="020B0604030504040204" pitchFamily="34" charset="0"/>
+                <a:ea typeface="Tahoma" panose="020B0604030504040204" pitchFamily="34" charset="0"/>
+                <a:cs typeface="Tahoma" panose="020B0604030504040204" pitchFamily="34" charset="0"/>
+              </a:rPr>
+              <a:t> Services, </a:t>
+            </a:r>
+            <a:r>
+              <a:rPr lang="fr-FR" sz="1700" b="1" dirty="0" err="1">
+                <a:solidFill>
+                  <a:srgbClr val="4466A0"/>
+                </a:solidFill>
+                <a:latin typeface="Tahoma" panose="020B0604030504040204" pitchFamily="34" charset="0"/>
+                <a:ea typeface="Tahoma" panose="020B0604030504040204" pitchFamily="34" charset="0"/>
+                <a:cs typeface="Tahoma" panose="020B0604030504040204" pitchFamily="34" charset="0"/>
+              </a:rPr>
+              <a:t>was</a:t>
+            </a:r>
+            <a:r>
+              <a:rPr lang="fr-FR" sz="1700" b="1" dirty="0">
+                <a:solidFill>
+                  <a:srgbClr val="4466A0"/>
+                </a:solidFill>
+                <a:latin typeface="Tahoma" panose="020B0604030504040204" pitchFamily="34" charset="0"/>
+                <a:ea typeface="Tahoma" panose="020B0604030504040204" pitchFamily="34" charset="0"/>
+                <a:cs typeface="Tahoma" panose="020B0604030504040204" pitchFamily="34" charset="0"/>
+              </a:rPr>
+              <a:t> </a:t>
+            </a:r>
+            <a:r>
+              <a:rPr lang="fr-FR" sz="1700" b="1" dirty="0" err="1">
+                <a:solidFill>
+                  <a:srgbClr val="4466A0"/>
+                </a:solidFill>
+                <a:latin typeface="Tahoma" panose="020B0604030504040204" pitchFamily="34" charset="0"/>
+                <a:ea typeface="Tahoma" panose="020B0604030504040204" pitchFamily="34" charset="0"/>
+                <a:cs typeface="Tahoma" panose="020B0604030504040204" pitchFamily="34" charset="0"/>
+              </a:rPr>
+              <a:t>established</a:t>
+            </a:r>
+            <a:r>
+              <a:rPr lang="fr-FR" sz="1700" b="1" dirty="0">
+                <a:solidFill>
+                  <a:srgbClr val="4466A0"/>
+                </a:solidFill>
+                <a:latin typeface="Tahoma" panose="020B0604030504040204" pitchFamily="34" charset="0"/>
+                <a:ea typeface="Tahoma" panose="020B0604030504040204" pitchFamily="34" charset="0"/>
+                <a:cs typeface="Tahoma" panose="020B0604030504040204" pitchFamily="34" charset="0"/>
+              </a:rPr>
+              <a:t> in 2021.</a:t>
+            </a:r>
+          </a:p>
+          <a:p>
+            <a:pPr marL="285750" indent="-285750" algn="just">
+              <a:buFont typeface="Arial" panose="020B0604020202020204" pitchFamily="34" charset="0"/>
+              <a:buChar char="•"/>
+            </a:pPr>
+            <a:endParaRPr lang="en-US" sz="1700" b="1" dirty="0">
+              <a:solidFill>
+                <a:srgbClr val="4466A0"/>
+              </a:solidFill>
+              <a:latin typeface="Tahoma" panose="020B0604030504040204" pitchFamily="34" charset="0"/>
+              <a:ea typeface="Tahoma" panose="020B0604030504040204" pitchFamily="34" charset="0"/>
+              <a:cs typeface="Tahoma" panose="020B0604030504040204" pitchFamily="34" charset="0"/>
+            </a:endParaRPr>
+          </a:p>
+          <a:p>
+            <a:pPr marL="285750" indent="-285750" algn="just">
+              <a:buFont typeface="Arial" panose="020B0604020202020204" pitchFamily="34" charset="0"/>
+              <a:buChar char="•"/>
+            </a:pPr>
+            <a:r>
+              <a:rPr lang="en-US" sz="1700" b="1" dirty="0">
+                <a:solidFill>
+                  <a:srgbClr val="4466A0"/>
+                </a:solidFill>
+                <a:latin typeface="Tahoma" panose="020B0604030504040204" pitchFamily="34" charset="0"/>
+                <a:ea typeface="Tahoma" panose="020B0604030504040204" pitchFamily="34" charset="0"/>
+                <a:cs typeface="Tahoma" panose="020B0604030504040204" pitchFamily="34" charset="0"/>
+              </a:rPr>
+              <a:t>One such path breaking technology is tracking based on GPS. </a:t>
+            </a:r>
+          </a:p>
+          <a:p>
+            <a:pPr marL="285750" indent="-285750" algn="just">
+              <a:buFont typeface="Arial" panose="020B0604020202020204" pitchFamily="34" charset="0"/>
+              <a:buChar char="•"/>
+            </a:pPr>
+            <a:endParaRPr lang="en-US" sz="1700" b="1" dirty="0">
+              <a:solidFill>
+                <a:srgbClr val="4466A0"/>
+              </a:solidFill>
+              <a:latin typeface="Tahoma" panose="020B0604030504040204" pitchFamily="34" charset="0"/>
+              <a:ea typeface="Tahoma" panose="020B0604030504040204" pitchFamily="34" charset="0"/>
+              <a:cs typeface="Tahoma" panose="020B0604030504040204" pitchFamily="34" charset="0"/>
+            </a:endParaRPr>
+          </a:p>
+          <a:p>
+            <a:pPr marL="285750" indent="-285750" algn="just">
+              <a:buFont typeface="Arial" panose="020B0604020202020204" pitchFamily="34" charset="0"/>
+              <a:buChar char="•"/>
+            </a:pPr>
+            <a:r>
+              <a:rPr lang="en-US" sz="1700" b="1" dirty="0">
+                <a:solidFill>
+                  <a:srgbClr val="4466A0"/>
+                </a:solidFill>
+                <a:latin typeface="Tahoma" panose="020B0604030504040204" pitchFamily="34" charset="0"/>
+                <a:ea typeface="Tahoma" panose="020B0604030504040204" pitchFamily="34" charset="0"/>
+                <a:cs typeface="Tahoma" panose="020B0604030504040204" pitchFamily="34" charset="0"/>
+              </a:rPr>
+              <a:t>We at, </a:t>
+            </a:r>
+            <a:r>
+              <a:rPr lang="en-US" sz="1700" b="1" dirty="0" err="1">
+                <a:solidFill>
+                  <a:srgbClr val="4466A0"/>
+                </a:solidFill>
+                <a:latin typeface="Tahoma" panose="020B0604030504040204" pitchFamily="34" charset="0"/>
+                <a:ea typeface="Tahoma" panose="020B0604030504040204" pitchFamily="34" charset="0"/>
+                <a:cs typeface="Tahoma" panose="020B0604030504040204" pitchFamily="34" charset="0"/>
+              </a:rPr>
+              <a:t>ITrack</a:t>
+            </a:r>
+            <a:r>
+              <a:rPr lang="en-US" sz="1700" b="1" dirty="0">
+                <a:solidFill>
+                  <a:srgbClr val="4466A0"/>
+                </a:solidFill>
+                <a:latin typeface="Tahoma" panose="020B0604030504040204" pitchFamily="34" charset="0"/>
+                <a:ea typeface="Tahoma" panose="020B0604030504040204" pitchFamily="34" charset="0"/>
+                <a:cs typeface="Tahoma" panose="020B0604030504040204" pitchFamily="34" charset="0"/>
+              </a:rPr>
+              <a:t>, have used this technology for providing innovative services.</a:t>
+            </a:r>
+          </a:p>
+        </p:txBody>
+      </p:sp>
+      <p:sp>
+        <p:nvSpPr>
+          <p:cNvPr id="56" name="Rectangle 55">
+            <a:extLst>
+              <a:ext uri="{FF2B5EF4-FFF2-40B4-BE49-F238E27FC236}">
+                <a16:creationId xmlns:a16="http://schemas.microsoft.com/office/drawing/2014/main" id="{BF7C1C9A-FA42-4655-9F5D-2C24DF7B8E31}"/>
+              </a:ext>
+            </a:extLst>
+          </p:cNvPr>
+          <p:cNvSpPr/>
+          <p:nvPr/>
+        </p:nvSpPr>
+        <p:spPr>
+          <a:xfrm>
+            <a:off x="1146764" y="1428130"/>
+            <a:ext cx="1983894" cy="954107"/>
+          </a:xfrm>
+          <a:prstGeom prst="rect">
+            <a:avLst/>
+          </a:prstGeom>
+        </p:spPr>
+        <p:txBody>
+          <a:bodyPr wrap="square">
+            <a:spAutoFit/>
+          </a:bodyPr>
+          <a:lstStyle/>
+          <a:p>
+            <a:r>
+              <a:rPr lang="en-US" sz="2800" dirty="0">
+                <a:solidFill>
+                  <a:srgbClr val="4466A0"/>
+                </a:solidFill>
+                <a:latin typeface="Aharoni" panose="02010803020104030203" pitchFamily="2" charset="-79"/>
+                <a:ea typeface="Tahoma" panose="020B0604030504040204" pitchFamily="34" charset="0"/>
+                <a:cs typeface="Aharoni" panose="02010803020104030203" pitchFamily="2" charset="-79"/>
+              </a:rPr>
+              <a:t>WHO ARE</a:t>
+            </a:r>
+          </a:p>
+          <a:p>
+            <a:r>
+              <a:rPr lang="en-US" sz="2800" dirty="0">
+                <a:solidFill>
+                  <a:srgbClr val="4466A0"/>
+                </a:solidFill>
+                <a:latin typeface="Aharoni" panose="02010803020104030203" pitchFamily="2" charset="-79"/>
+                <a:ea typeface="Tahoma" panose="020B0604030504040204" pitchFamily="34" charset="0"/>
+                <a:cs typeface="Aharoni" panose="02010803020104030203" pitchFamily="2" charset="-79"/>
+              </a:rPr>
+              <a:t>WE :</a:t>
+            </a:r>
+            <a:endParaRPr lang="fr-FR" sz="2800" dirty="0">
+              <a:latin typeface="Aharoni" panose="02010803020104030203" pitchFamily="2" charset="-79"/>
+              <a:ea typeface="Tahoma" panose="020B0604030504040204" pitchFamily="34" charset="0"/>
+              <a:cs typeface="Aharoni" panose="02010803020104030203" pitchFamily="2" charset="-79"/>
+            </a:endParaRPr>
+          </a:p>
+        </p:txBody>
+      </p:sp>
+      <p:sp>
+        <p:nvSpPr>
+          <p:cNvPr id="57" name="Rectangle 56">
+            <a:extLst>
+              <a:ext uri="{FF2B5EF4-FFF2-40B4-BE49-F238E27FC236}">
+                <a16:creationId xmlns:a16="http://schemas.microsoft.com/office/drawing/2014/main" id="{DFC98DC0-1960-40F5-9CEB-D6F534A580FE}"/>
+              </a:ext>
+            </a:extLst>
+          </p:cNvPr>
+          <p:cNvSpPr/>
+          <p:nvPr/>
+        </p:nvSpPr>
+        <p:spPr>
+          <a:xfrm>
+            <a:off x="253141" y="3284135"/>
+            <a:ext cx="1451673" cy="707886"/>
+          </a:xfrm>
+          <a:prstGeom prst="rect">
+            <a:avLst/>
+          </a:prstGeom>
+        </p:spPr>
+        <p:txBody>
+          <a:bodyPr wrap="square">
+            <a:spAutoFit/>
+          </a:bodyPr>
+          <a:lstStyle/>
+          <a:p>
+            <a:r>
+              <a:rPr lang="en-US" sz="2000" dirty="0">
+                <a:solidFill>
+                  <a:srgbClr val="4466A0"/>
+                </a:solidFill>
+                <a:latin typeface="Aharoni" panose="02010803020104030203" pitchFamily="2" charset="-79"/>
+                <a:ea typeface="Tahoma" panose="020B0604030504040204" pitchFamily="34" charset="0"/>
+                <a:cs typeface="Aharoni" panose="02010803020104030203" pitchFamily="2" charset="-79"/>
+              </a:rPr>
+              <a:t>WHAT WE </a:t>
+            </a:r>
+          </a:p>
+          <a:p>
+            <a:r>
+              <a:rPr lang="en-US" sz="2000" dirty="0">
+                <a:solidFill>
+                  <a:srgbClr val="4466A0"/>
+                </a:solidFill>
+                <a:latin typeface="Aharoni" panose="02010803020104030203" pitchFamily="2" charset="-79"/>
+                <a:ea typeface="Tahoma" panose="020B0604030504040204" pitchFamily="34" charset="0"/>
+                <a:cs typeface="Aharoni" panose="02010803020104030203" pitchFamily="2" charset="-79"/>
+              </a:rPr>
+              <a:t>DO :</a:t>
+            </a:r>
+            <a:endParaRPr lang="fr-FR" sz="2000" dirty="0">
+              <a:latin typeface="Aharoni" panose="02010803020104030203" pitchFamily="2" charset="-79"/>
+              <a:ea typeface="Tahoma" panose="020B0604030504040204" pitchFamily="34" charset="0"/>
+              <a:cs typeface="Aharoni" panose="02010803020104030203" pitchFamily="2" charset="-79"/>
+            </a:endParaRPr>
+          </a:p>
+        </p:txBody>
+      </p:sp>
+    </p:spTree>
+    <p:extLst>
+      <p:ext uri="{BB962C8B-B14F-4D97-AF65-F5344CB8AC3E}">
+        <p14:creationId xmlns:p14="http://schemas.microsoft.com/office/powerpoint/2010/main" val="2275685692"/>
       </p:ext>
     </p:extLst>
   </p:cSld>
@@ -4986,7 +6325,7 @@
             <a:r>
               <a:rPr lang="en-US" sz="3500" dirty="0">
                 <a:solidFill>
-                  <a:schemeClr val="accent2"/>
+                  <a:srgbClr val="4466A0"/>
                 </a:solidFill>
                 <a:latin typeface="Times New Roman" panose="02020603050405020304" pitchFamily="18" charset="0"/>
                 <a:ea typeface="+mn-ea"/>
@@ -4995,10 +6334,18 @@
               <a:t>Overview</a:t>
             </a:r>
             <a:r>
-              <a:rPr lang="en-US" dirty="0"/>
+              <a:rPr lang="en-US" dirty="0">
+                <a:solidFill>
+                  <a:srgbClr val="4466A0"/>
+                </a:solidFill>
+              </a:rPr>
               <a:t> </a:t>
             </a:r>
-            <a:endParaRPr lang="fr-FR" dirty="0"/>
+            <a:endParaRPr lang="fr-FR" dirty="0">
+              <a:solidFill>
+                <a:srgbClr val="4466A0"/>
+              </a:solidFill>
+            </a:endParaRPr>
           </a:p>
         </p:txBody>
       </p:sp>

</xml_diff>

<commit_message>
add the progress presentation v2 : [THE EXECUTIVE MEMBERS - Almost done]
</commit_message>
<xml_diff>
--- a/Progress' Presentations/Etat d'avancement - S1.pptx
+++ b/Progress' Presentations/Etat d'avancement - S1.pptx
@@ -5807,8 +5807,8 @@
         </p:nvSpPr>
         <p:spPr>
           <a:xfrm>
-            <a:off x="1" y="1709225"/>
-            <a:ext cx="12192000" cy="5106708"/>
+            <a:off x="0" y="1067467"/>
+            <a:ext cx="12192000" cy="5776376"/>
           </a:xfrm>
           <a:prstGeom prst="snip1Rect">
             <a:avLst>
@@ -5985,7 +5985,7 @@
         </p:nvSpPr>
         <p:spPr>
           <a:xfrm>
-            <a:off x="0" y="6770212"/>
+            <a:off x="0" y="6771394"/>
             <a:ext cx="12192000" cy="91440"/>
           </a:xfrm>
           <a:prstGeom prst="rect">
@@ -6037,7 +6037,7 @@
         </p:nvGrpSpPr>
         <p:grpSpPr>
           <a:xfrm>
-            <a:off x="191794" y="2245332"/>
+            <a:off x="191794" y="2375964"/>
             <a:ext cx="3758205" cy="1668020"/>
             <a:chOff x="316236" y="1656125"/>
             <a:chExt cx="3758205" cy="1668020"/>
@@ -6303,7 +6303,7 @@
         </p:nvGrpSpPr>
         <p:grpSpPr>
           <a:xfrm>
-            <a:off x="5039700" y="2245332"/>
+            <a:off x="5039700" y="2375964"/>
             <a:ext cx="2975190" cy="891225"/>
             <a:chOff x="1103407" y="1656125"/>
             <a:chExt cx="2975190" cy="891225"/>
@@ -6540,7 +6540,7 @@
         </p:nvGrpSpPr>
         <p:grpSpPr>
           <a:xfrm>
-            <a:off x="8986628" y="2267431"/>
+            <a:off x="8986628" y="2398063"/>
             <a:ext cx="2971034" cy="1106668"/>
             <a:chOff x="1103407" y="1656125"/>
             <a:chExt cx="2971034" cy="1106668"/>
@@ -6791,7 +6791,7 @@
         </p:nvGrpSpPr>
         <p:grpSpPr>
           <a:xfrm>
-            <a:off x="979423" y="4732502"/>
+            <a:off x="979423" y="4863134"/>
             <a:ext cx="2971034" cy="1322112"/>
             <a:chOff x="1103407" y="1656125"/>
             <a:chExt cx="2971034" cy="1322112"/>
@@ -7033,7 +7033,7 @@
         </p:nvGrpSpPr>
         <p:grpSpPr>
           <a:xfrm>
-            <a:off x="4252987" y="4732502"/>
+            <a:off x="4252987" y="4863134"/>
             <a:ext cx="3758205" cy="1668020"/>
             <a:chOff x="316236" y="1656125"/>
             <a:chExt cx="3758205" cy="1668020"/>
@@ -7313,7 +7313,7 @@
         </p:nvGrpSpPr>
         <p:grpSpPr>
           <a:xfrm>
-            <a:off x="8987086" y="4754601"/>
+            <a:off x="8987086" y="4885233"/>
             <a:ext cx="2971034" cy="894079"/>
             <a:chOff x="1103407" y="1656125"/>
             <a:chExt cx="2971034" cy="894079"/>
@@ -7553,7 +7553,7 @@
         </p:blipFill>
         <p:spPr>
           <a:xfrm>
-            <a:off x="156005" y="4751691"/>
+            <a:off x="156005" y="4882323"/>
             <a:ext cx="1645920" cy="1645920"/>
           </a:xfrm>
           <a:prstGeom prst="ellipse">
@@ -7597,7 +7597,7 @@
         </p:blipFill>
         <p:spPr>
           <a:xfrm>
-            <a:off x="8163096" y="2282928"/>
+            <a:off x="8163096" y="2413560"/>
             <a:ext cx="1645920" cy="1645920"/>
           </a:xfrm>
           <a:prstGeom prst="ellipse">
@@ -7640,7 +7640,7 @@
         </p:blipFill>
         <p:spPr>
           <a:xfrm>
-            <a:off x="4247770" y="2260830"/>
+            <a:off x="4247770" y="2391462"/>
             <a:ext cx="1645920" cy="1645911"/>
           </a:xfrm>
           <a:prstGeom prst="ellipse">
@@ -7680,7 +7680,7 @@
         </p:blipFill>
         <p:spPr>
           <a:xfrm>
-            <a:off x="8163096" y="4770168"/>
+            <a:off x="8163096" y="4900800"/>
             <a:ext cx="1645920" cy="1645126"/>
           </a:xfrm>
           <a:prstGeom prst="ellipse">
@@ -7693,57 +7693,12 @@
           </a:ln>
         </p:spPr>
       </p:pic>
-      <p:sp>
-        <p:nvSpPr>
-          <p:cNvPr id="99" name="Rectangle 98">
-            <a:extLst>
-              <a:ext uri="{FF2B5EF4-FFF2-40B4-BE49-F238E27FC236}">
-                <a16:creationId xmlns:a16="http://schemas.microsoft.com/office/drawing/2014/main" id="{3D48533D-530A-4A48-AA6C-F815AE745612}"/>
-              </a:ext>
-            </a:extLst>
-          </p:cNvPr>
-          <p:cNvSpPr/>
-          <p:nvPr/>
-        </p:nvSpPr>
-        <p:spPr>
-          <a:xfrm>
-            <a:off x="1735631" y="873825"/>
-            <a:ext cx="8316117" cy="523220"/>
-          </a:xfrm>
-          <a:prstGeom prst="rect">
-            <a:avLst/>
-          </a:prstGeom>
-        </p:spPr>
-        <p:txBody>
-          <a:bodyPr wrap="square">
-            <a:spAutoFit/>
-          </a:bodyPr>
-          <a:lstStyle/>
-          <a:p>
-            <a:pPr algn="ctr"/>
-            <a:r>
-              <a:rPr lang="en-US" sz="2800" dirty="0">
-                <a:solidFill>
-                  <a:schemeClr val="tx1">
-                    <a:lumMod val="75000"/>
-                    <a:lumOff val="25000"/>
-                  </a:schemeClr>
-                </a:solidFill>
-                <a:latin typeface="Aharoni" panose="02010803020104030203" pitchFamily="2" charset="-79"/>
-                <a:ea typeface="Tahoma" panose="020B0604030504040204" pitchFamily="34" charset="0"/>
-                <a:cs typeface="Aharoni" panose="02010803020104030203" pitchFamily="2" charset="-79"/>
-              </a:rPr>
-              <a:t>THE EXECUTIVE TEAM MEMBERS </a:t>
-            </a:r>
-          </a:p>
-        </p:txBody>
-      </p:sp>
       <p:grpSp>
         <p:nvGrpSpPr>
-          <p:cNvPr id="104" name="Groupe 103">
-            <a:extLst>
-              <a:ext uri="{FF2B5EF4-FFF2-40B4-BE49-F238E27FC236}">
-                <a16:creationId xmlns:a16="http://schemas.microsoft.com/office/drawing/2014/main" id="{BECA3FDD-C117-46A8-81D4-427E60CEC733}"/>
+          <p:cNvPr id="105" name="Groupe 104">
+            <a:extLst>
+              <a:ext uri="{FF2B5EF4-FFF2-40B4-BE49-F238E27FC236}">
+                <a16:creationId xmlns:a16="http://schemas.microsoft.com/office/drawing/2014/main" id="{45B406FA-A65E-4187-94CA-5A14737BCF16}"/>
               </a:ext>
             </a:extLst>
           </p:cNvPr>
@@ -7752,18 +7707,18 @@
         </p:nvGrpSpPr>
         <p:grpSpPr>
           <a:xfrm>
-            <a:off x="2944102" y="1404011"/>
-            <a:ext cx="5885629" cy="53990"/>
-            <a:chOff x="2944102" y="1404011"/>
-            <a:chExt cx="5885629" cy="53990"/>
+            <a:off x="1735631" y="1200405"/>
+            <a:ext cx="8316117" cy="584176"/>
+            <a:chOff x="1735631" y="873825"/>
+            <a:chExt cx="8316117" cy="584176"/>
           </a:xfrm>
         </p:grpSpPr>
         <p:sp>
           <p:nvSpPr>
-            <p:cNvPr id="100" name="Rectangle 99">
+            <p:cNvPr id="99" name="Rectangle 98">
               <a:extLst>
                 <a:ext uri="{FF2B5EF4-FFF2-40B4-BE49-F238E27FC236}">
-                  <a16:creationId xmlns:a16="http://schemas.microsoft.com/office/drawing/2014/main" id="{4295D5D3-CFF9-46B4-9313-50AC0A8821CA}"/>
+                  <a16:creationId xmlns:a16="http://schemas.microsoft.com/office/drawing/2014/main" id="{3D48533D-530A-4A48-AA6C-F815AE745612}"/>
                 </a:ext>
               </a:extLst>
             </p:cNvPr>
@@ -7772,200 +7727,266 @@
           </p:nvSpPr>
           <p:spPr>
             <a:xfrm>
-              <a:off x="2944102" y="1406768"/>
-              <a:ext cx="1416008" cy="51233"/>
+              <a:off x="1735631" y="873825"/>
+              <a:ext cx="8316117" cy="523220"/>
             </a:xfrm>
             <a:prstGeom prst="rect">
               <a:avLst/>
             </a:prstGeom>
-            <a:solidFill>
-              <a:srgbClr val="10716F"/>
-            </a:solidFill>
-            <a:ln>
-              <a:noFill/>
-            </a:ln>
           </p:spPr>
-          <p:style>
-            <a:lnRef idx="2">
-              <a:schemeClr val="accent1">
-                <a:shade val="50000"/>
-              </a:schemeClr>
-            </a:lnRef>
-            <a:fillRef idx="1">
-              <a:schemeClr val="accent1"/>
-            </a:fillRef>
-            <a:effectRef idx="0">
-              <a:schemeClr val="accent1"/>
-            </a:effectRef>
-            <a:fontRef idx="minor">
-              <a:schemeClr val="lt1"/>
-            </a:fontRef>
-          </p:style>
           <p:txBody>
-            <a:bodyPr rtlCol="0" anchor="ctr"/>
+            <a:bodyPr wrap="square">
+              <a:spAutoFit/>
+            </a:bodyPr>
             <a:lstStyle/>
             <a:p>
               <a:pPr algn="ctr"/>
-              <a:endParaRPr lang="fr-FR"/>
+              <a:r>
+                <a:rPr lang="en-US" sz="2800" dirty="0">
+                  <a:solidFill>
+                    <a:schemeClr val="tx1">
+                      <a:lumMod val="75000"/>
+                      <a:lumOff val="25000"/>
+                    </a:schemeClr>
+                  </a:solidFill>
+                  <a:latin typeface="Aharoni" panose="02010803020104030203" pitchFamily="2" charset="-79"/>
+                  <a:ea typeface="Tahoma" panose="020B0604030504040204" pitchFamily="34" charset="0"/>
+                  <a:cs typeface="Aharoni" panose="02010803020104030203" pitchFamily="2" charset="-79"/>
+                </a:rPr>
+                <a:t>THE EXECUTIVE TEAM MEMBERS </a:t>
+              </a:r>
             </a:p>
           </p:txBody>
         </p:sp>
-        <p:sp>
-          <p:nvSpPr>
-            <p:cNvPr id="101" name="Rectangle 100">
+        <p:grpSp>
+          <p:nvGrpSpPr>
+            <p:cNvPr id="104" name="Groupe 103">
               <a:extLst>
                 <a:ext uri="{FF2B5EF4-FFF2-40B4-BE49-F238E27FC236}">
-                  <a16:creationId xmlns:a16="http://schemas.microsoft.com/office/drawing/2014/main" id="{FF0D0927-4E59-43CD-8FF5-127296118716}"/>
+                  <a16:creationId xmlns:a16="http://schemas.microsoft.com/office/drawing/2014/main" id="{BECA3FDD-C117-46A8-81D4-427E60CEC733}"/>
                 </a:ext>
               </a:extLst>
             </p:cNvPr>
-            <p:cNvSpPr/>
+            <p:cNvGrpSpPr/>
             <p:nvPr/>
-          </p:nvSpPr>
-          <p:spPr>
+          </p:nvGrpSpPr>
+          <p:grpSpPr>
             <a:xfrm>
-              <a:off x="4432534" y="1406767"/>
-              <a:ext cx="1416008" cy="51233"/>
+              <a:off x="2944102" y="1404011"/>
+              <a:ext cx="5885629" cy="53990"/>
+              <a:chOff x="2944102" y="1404011"/>
+              <a:chExt cx="5885629" cy="53990"/>
             </a:xfrm>
-            <a:prstGeom prst="rect">
-              <a:avLst/>
-            </a:prstGeom>
-            <a:solidFill>
-              <a:srgbClr val="4472C4"/>
-            </a:solidFill>
-            <a:ln>
-              <a:noFill/>
-            </a:ln>
-          </p:spPr>
-          <p:style>
-            <a:lnRef idx="2">
-              <a:schemeClr val="accent1">
-                <a:shade val="50000"/>
-              </a:schemeClr>
-            </a:lnRef>
-            <a:fillRef idx="1">
-              <a:schemeClr val="accent1"/>
-            </a:fillRef>
-            <a:effectRef idx="0">
-              <a:schemeClr val="accent1"/>
-            </a:effectRef>
-            <a:fontRef idx="minor">
-              <a:schemeClr val="lt1"/>
-            </a:fontRef>
-          </p:style>
-          <p:txBody>
-            <a:bodyPr rtlCol="0" anchor="ctr"/>
-            <a:lstStyle/>
-            <a:p>
-              <a:pPr algn="ctr"/>
-              <a:endParaRPr lang="fr-FR"/>
-            </a:p>
-          </p:txBody>
-        </p:sp>
-        <p:sp>
-          <p:nvSpPr>
-            <p:cNvPr id="102" name="Rectangle 101">
-              <a:extLst>
-                <a:ext uri="{FF2B5EF4-FFF2-40B4-BE49-F238E27FC236}">
-                  <a16:creationId xmlns:a16="http://schemas.microsoft.com/office/drawing/2014/main" id="{4692601D-19A6-48C0-997C-2399FD8A870D}"/>
-                </a:ext>
-              </a:extLst>
-            </p:cNvPr>
-            <p:cNvSpPr/>
-            <p:nvPr/>
-          </p:nvSpPr>
-          <p:spPr>
-            <a:xfrm>
-              <a:off x="5925291" y="1404012"/>
-              <a:ext cx="1416008" cy="51233"/>
-            </a:xfrm>
-            <a:prstGeom prst="rect">
-              <a:avLst/>
-            </a:prstGeom>
-            <a:solidFill>
-              <a:srgbClr val="C55A11"/>
-            </a:solidFill>
-            <a:ln>
-              <a:noFill/>
-            </a:ln>
-          </p:spPr>
-          <p:style>
-            <a:lnRef idx="2">
-              <a:schemeClr val="accent1">
-                <a:shade val="50000"/>
-              </a:schemeClr>
-            </a:lnRef>
-            <a:fillRef idx="1">
-              <a:schemeClr val="accent1"/>
-            </a:fillRef>
-            <a:effectRef idx="0">
-              <a:schemeClr val="accent1"/>
-            </a:effectRef>
-            <a:fontRef idx="minor">
-              <a:schemeClr val="lt1"/>
-            </a:fontRef>
-          </p:style>
-          <p:txBody>
-            <a:bodyPr rtlCol="0" anchor="ctr"/>
-            <a:lstStyle/>
-            <a:p>
-              <a:pPr algn="ctr"/>
-              <a:endParaRPr lang="fr-FR"/>
-            </a:p>
-          </p:txBody>
-        </p:sp>
-        <p:sp>
-          <p:nvSpPr>
-            <p:cNvPr id="103" name="Rectangle 102">
-              <a:extLst>
-                <a:ext uri="{FF2B5EF4-FFF2-40B4-BE49-F238E27FC236}">
-                  <a16:creationId xmlns:a16="http://schemas.microsoft.com/office/drawing/2014/main" id="{8A27B4DF-97A1-4B3B-AC87-60785691BF5E}"/>
-                </a:ext>
-              </a:extLst>
-            </p:cNvPr>
-            <p:cNvSpPr/>
-            <p:nvPr/>
-          </p:nvSpPr>
-          <p:spPr>
-            <a:xfrm>
-              <a:off x="7413723" y="1404011"/>
-              <a:ext cx="1416008" cy="51233"/>
-            </a:xfrm>
-            <a:prstGeom prst="rect">
-              <a:avLst/>
-            </a:prstGeom>
-            <a:solidFill>
-              <a:srgbClr val="6E1840"/>
-            </a:solidFill>
-            <a:ln>
-              <a:noFill/>
-            </a:ln>
-          </p:spPr>
-          <p:style>
-            <a:lnRef idx="2">
-              <a:schemeClr val="accent1">
-                <a:shade val="50000"/>
-              </a:schemeClr>
-            </a:lnRef>
-            <a:fillRef idx="1">
-              <a:schemeClr val="accent1"/>
-            </a:fillRef>
-            <a:effectRef idx="0">
-              <a:schemeClr val="accent1"/>
-            </a:effectRef>
-            <a:fontRef idx="minor">
-              <a:schemeClr val="lt1"/>
-            </a:fontRef>
-          </p:style>
-          <p:txBody>
-            <a:bodyPr rtlCol="0" anchor="ctr"/>
-            <a:lstStyle/>
-            <a:p>
-              <a:pPr algn="ctr"/>
-              <a:endParaRPr lang="fr-FR"/>
-            </a:p>
-          </p:txBody>
-        </p:sp>
+          </p:grpSpPr>
+          <p:sp>
+            <p:nvSpPr>
+              <p:cNvPr id="100" name="Rectangle 99">
+                <a:extLst>
+                  <a:ext uri="{FF2B5EF4-FFF2-40B4-BE49-F238E27FC236}">
+                    <a16:creationId xmlns:a16="http://schemas.microsoft.com/office/drawing/2014/main" id="{4295D5D3-CFF9-46B4-9313-50AC0A8821CA}"/>
+                  </a:ext>
+                </a:extLst>
+              </p:cNvPr>
+              <p:cNvSpPr/>
+              <p:nvPr/>
+            </p:nvSpPr>
+            <p:spPr>
+              <a:xfrm>
+                <a:off x="2944102" y="1406768"/>
+                <a:ext cx="1416008" cy="51233"/>
+              </a:xfrm>
+              <a:prstGeom prst="rect">
+                <a:avLst/>
+              </a:prstGeom>
+              <a:solidFill>
+                <a:srgbClr val="10716F"/>
+              </a:solidFill>
+              <a:ln>
+                <a:noFill/>
+              </a:ln>
+            </p:spPr>
+            <p:style>
+              <a:lnRef idx="2">
+                <a:schemeClr val="accent1">
+                  <a:shade val="50000"/>
+                </a:schemeClr>
+              </a:lnRef>
+              <a:fillRef idx="1">
+                <a:schemeClr val="accent1"/>
+              </a:fillRef>
+              <a:effectRef idx="0">
+                <a:schemeClr val="accent1"/>
+              </a:effectRef>
+              <a:fontRef idx="minor">
+                <a:schemeClr val="lt1"/>
+              </a:fontRef>
+            </p:style>
+            <p:txBody>
+              <a:bodyPr rtlCol="0" anchor="ctr"/>
+              <a:lstStyle/>
+              <a:p>
+                <a:pPr algn="ctr"/>
+                <a:endParaRPr lang="fr-FR"/>
+              </a:p>
+            </p:txBody>
+          </p:sp>
+          <p:sp>
+            <p:nvSpPr>
+              <p:cNvPr id="101" name="Rectangle 100">
+                <a:extLst>
+                  <a:ext uri="{FF2B5EF4-FFF2-40B4-BE49-F238E27FC236}">
+                    <a16:creationId xmlns:a16="http://schemas.microsoft.com/office/drawing/2014/main" id="{FF0D0927-4E59-43CD-8FF5-127296118716}"/>
+                  </a:ext>
+                </a:extLst>
+              </p:cNvPr>
+              <p:cNvSpPr/>
+              <p:nvPr/>
+            </p:nvSpPr>
+            <p:spPr>
+              <a:xfrm>
+                <a:off x="4432534" y="1406767"/>
+                <a:ext cx="1416008" cy="51233"/>
+              </a:xfrm>
+              <a:prstGeom prst="rect">
+                <a:avLst/>
+              </a:prstGeom>
+              <a:solidFill>
+                <a:srgbClr val="4472C4"/>
+              </a:solidFill>
+              <a:ln>
+                <a:noFill/>
+              </a:ln>
+            </p:spPr>
+            <p:style>
+              <a:lnRef idx="2">
+                <a:schemeClr val="accent1">
+                  <a:shade val="50000"/>
+                </a:schemeClr>
+              </a:lnRef>
+              <a:fillRef idx="1">
+                <a:schemeClr val="accent1"/>
+              </a:fillRef>
+              <a:effectRef idx="0">
+                <a:schemeClr val="accent1"/>
+              </a:effectRef>
+              <a:fontRef idx="minor">
+                <a:schemeClr val="lt1"/>
+              </a:fontRef>
+            </p:style>
+            <p:txBody>
+              <a:bodyPr rtlCol="0" anchor="ctr"/>
+              <a:lstStyle/>
+              <a:p>
+                <a:pPr algn="ctr"/>
+                <a:endParaRPr lang="fr-FR"/>
+              </a:p>
+            </p:txBody>
+          </p:sp>
+          <p:sp>
+            <p:nvSpPr>
+              <p:cNvPr id="102" name="Rectangle 101">
+                <a:extLst>
+                  <a:ext uri="{FF2B5EF4-FFF2-40B4-BE49-F238E27FC236}">
+                    <a16:creationId xmlns:a16="http://schemas.microsoft.com/office/drawing/2014/main" id="{4692601D-19A6-48C0-997C-2399FD8A870D}"/>
+                  </a:ext>
+                </a:extLst>
+              </p:cNvPr>
+              <p:cNvSpPr/>
+              <p:nvPr/>
+            </p:nvSpPr>
+            <p:spPr>
+              <a:xfrm>
+                <a:off x="5925291" y="1404012"/>
+                <a:ext cx="1416008" cy="51233"/>
+              </a:xfrm>
+              <a:prstGeom prst="rect">
+                <a:avLst/>
+              </a:prstGeom>
+              <a:solidFill>
+                <a:srgbClr val="C55A11"/>
+              </a:solidFill>
+              <a:ln>
+                <a:noFill/>
+              </a:ln>
+            </p:spPr>
+            <p:style>
+              <a:lnRef idx="2">
+                <a:schemeClr val="accent1">
+                  <a:shade val="50000"/>
+                </a:schemeClr>
+              </a:lnRef>
+              <a:fillRef idx="1">
+                <a:schemeClr val="accent1"/>
+              </a:fillRef>
+              <a:effectRef idx="0">
+                <a:schemeClr val="accent1"/>
+              </a:effectRef>
+              <a:fontRef idx="minor">
+                <a:schemeClr val="lt1"/>
+              </a:fontRef>
+            </p:style>
+            <p:txBody>
+              <a:bodyPr rtlCol="0" anchor="ctr"/>
+              <a:lstStyle/>
+              <a:p>
+                <a:pPr algn="ctr"/>
+                <a:endParaRPr lang="fr-FR"/>
+              </a:p>
+            </p:txBody>
+          </p:sp>
+          <p:sp>
+            <p:nvSpPr>
+              <p:cNvPr id="103" name="Rectangle 102">
+                <a:extLst>
+                  <a:ext uri="{FF2B5EF4-FFF2-40B4-BE49-F238E27FC236}">
+                    <a16:creationId xmlns:a16="http://schemas.microsoft.com/office/drawing/2014/main" id="{8A27B4DF-97A1-4B3B-AC87-60785691BF5E}"/>
+                  </a:ext>
+                </a:extLst>
+              </p:cNvPr>
+              <p:cNvSpPr/>
+              <p:nvPr/>
+            </p:nvSpPr>
+            <p:spPr>
+              <a:xfrm>
+                <a:off x="7413723" y="1404011"/>
+                <a:ext cx="1416008" cy="51233"/>
+              </a:xfrm>
+              <a:prstGeom prst="rect">
+                <a:avLst/>
+              </a:prstGeom>
+              <a:solidFill>
+                <a:srgbClr val="6E1840"/>
+              </a:solidFill>
+              <a:ln>
+                <a:noFill/>
+              </a:ln>
+            </p:spPr>
+            <p:style>
+              <a:lnRef idx="2">
+                <a:schemeClr val="accent1">
+                  <a:shade val="50000"/>
+                </a:schemeClr>
+              </a:lnRef>
+              <a:fillRef idx="1">
+                <a:schemeClr val="accent1"/>
+              </a:fillRef>
+              <a:effectRef idx="0">
+                <a:schemeClr val="accent1"/>
+              </a:effectRef>
+              <a:fontRef idx="minor">
+                <a:schemeClr val="lt1"/>
+              </a:fontRef>
+            </p:style>
+            <p:txBody>
+              <a:bodyPr rtlCol="0" anchor="ctr"/>
+              <a:lstStyle/>
+              <a:p>
+                <a:pPr algn="ctr"/>
+                <a:endParaRPr lang="fr-FR"/>
+              </a:p>
+            </p:txBody>
+          </p:sp>
+        </p:grpSp>
       </p:grpSp>
     </p:spTree>
     <p:extLst>

</xml_diff>

<commit_message>
add the progress presentation v2 : [Progress Level : Current Step2 - Done]
</commit_message>
<xml_diff>
--- a/Progress' Presentations/Etat d'avancement - S1.pptx
+++ b/Progress' Presentations/Etat d'avancement - S1.pptx
@@ -4242,7 +4242,7 @@
         <p:spPr>
           <a:xfrm>
             <a:off x="7559739" y="4305093"/>
-            <a:ext cx="4385518" cy="1275311"/>
+            <a:ext cx="4385518" cy="1327081"/>
           </a:xfrm>
           <a:prstGeom prst="roundRect">
             <a:avLst>
@@ -7315,7 +7315,7 @@
           <p:spPr>
             <a:xfrm>
               <a:off x="1988998" y="2239573"/>
-              <a:ext cx="1786066" cy="738664"/>
+              <a:ext cx="1117614" cy="738664"/>
             </a:xfrm>
             <a:prstGeom prst="rect">
               <a:avLst/>
@@ -7338,7 +7338,7 @@
                   </a:solidFill>
                   <a:latin typeface="Bahnschrift" panose="020B0502040204020203" pitchFamily="34" charset="0"/>
                 </a:rPr>
-                <a:t>Software Developer</a:t>
+                <a:t>BI Engineer</a:t>
               </a:r>
             </a:p>
             <a:p>
@@ -7519,13 +7519,11 @@
                 <a:avLst/>
               </a:prstGeom>
               <a:solidFill>
-                <a:schemeClr val="accent2">
-                  <a:lumMod val="75000"/>
-                </a:schemeClr>
+                <a:srgbClr val="CA646A"/>
               </a:solidFill>
               <a:ln>
                 <a:solidFill>
-                  <a:srgbClr val="C55A11"/>
+                  <a:srgbClr val="CA646A"/>
                 </a:solidFill>
               </a:ln>
             </p:spPr>
@@ -7906,7 +7904,7 @@
         </p:blipFill>
         <p:spPr>
           <a:xfrm>
-            <a:off x="8163096" y="2413560"/>
+            <a:off x="8163096" y="2405876"/>
             <a:ext cx="1645920" cy="1645920"/>
           </a:xfrm>
           <a:prstGeom prst="ellipse">
@@ -7989,7 +7987,7 @@
         </p:blipFill>
         <p:spPr>
           <a:xfrm>
-            <a:off x="8163096" y="4900800"/>
+            <a:off x="8163096" y="4910739"/>
             <a:ext cx="1645920" cy="1645126"/>
           </a:xfrm>
           <a:prstGeom prst="ellipse">
@@ -8002,60 +8000,6 @@
           </a:ln>
         </p:spPr>
       </p:pic>
-      <p:sp>
-        <p:nvSpPr>
-          <p:cNvPr id="11" name="Ellipse 10">
-            <a:extLst>
-              <a:ext uri="{FF2B5EF4-FFF2-40B4-BE49-F238E27FC236}">
-                <a16:creationId xmlns:a16="http://schemas.microsoft.com/office/drawing/2014/main" id="{774A023E-AE22-4597-9DA7-22FC54ED3CF3}"/>
-              </a:ext>
-            </a:extLst>
-          </p:cNvPr>
-          <p:cNvSpPr/>
-          <p:nvPr/>
-        </p:nvSpPr>
-        <p:spPr>
-          <a:xfrm>
-            <a:off x="4216168" y="4863134"/>
-            <a:ext cx="1645920" cy="1645920"/>
-          </a:xfrm>
-          <a:prstGeom prst="ellipse">
-            <a:avLst/>
-          </a:prstGeom>
-          <a:solidFill>
-            <a:schemeClr val="bg1"/>
-          </a:solidFill>
-          <a:ln w="28575">
-            <a:solidFill>
-              <a:srgbClr val="C55A11"/>
-            </a:solidFill>
-          </a:ln>
-        </p:spPr>
-        <p:style>
-          <a:lnRef idx="2">
-            <a:schemeClr val="accent1">
-              <a:shade val="50000"/>
-            </a:schemeClr>
-          </a:lnRef>
-          <a:fillRef idx="1">
-            <a:schemeClr val="accent1"/>
-          </a:fillRef>
-          <a:effectRef idx="0">
-            <a:schemeClr val="accent1"/>
-          </a:effectRef>
-          <a:fontRef idx="minor">
-            <a:schemeClr val="lt1"/>
-          </a:fontRef>
-        </p:style>
-        <p:txBody>
-          <a:bodyPr rtlCol="0" anchor="ctr"/>
-          <a:lstStyle/>
-          <a:p>
-            <a:pPr algn="ctr"/>
-            <a:endParaRPr lang="fr-FR"/>
-          </a:p>
-        </p:txBody>
-      </p:sp>
       <p:grpSp>
         <p:nvGrpSpPr>
           <p:cNvPr id="105" name="Groupe 104">
@@ -8353,10 +8297,10 @@
       </p:grpSp>
       <p:pic>
         <p:nvPicPr>
-          <p:cNvPr id="53" name="Graphique 52" descr="Écolière">
-            <a:extLst>
-              <a:ext uri="{FF2B5EF4-FFF2-40B4-BE49-F238E27FC236}">
-                <a16:creationId xmlns:a16="http://schemas.microsoft.com/office/drawing/2014/main" id="{DEAA0F8E-1AA9-4038-98C6-66E93AF40E00}"/>
+          <p:cNvPr id="9" name="Image 8">
+            <a:extLst>
+              <a:ext uri="{FF2B5EF4-FFF2-40B4-BE49-F238E27FC236}">
+                <a16:creationId xmlns:a16="http://schemas.microsoft.com/office/drawing/2014/main" id="{156FA382-A81F-4784-AD15-77FB7AEA3F58}"/>
               </a:ext>
             </a:extLst>
           </p:cNvPr>
@@ -8365,29 +8309,30 @@
           </p:cNvPicPr>
           <p:nvPr/>
         </p:nvPicPr>
-        <p:blipFill>
+        <p:blipFill rotWithShape="1">
           <a:blip r:embed="rId9">
             <a:extLst>
               <a:ext uri="{28A0092B-C50C-407E-A947-70E740481C1C}">
                 <a14:useLocalDpi xmlns:a14="http://schemas.microsoft.com/office/drawing/2010/main" val="0"/>
               </a:ext>
-              <a:ext uri="{96DAC541-7B7A-43D3-8B79-37D633B846F1}">
-                <asvg:svgBlip xmlns:asvg="http://schemas.microsoft.com/office/drawing/2016/SVG/main" r:embed="rId10"/>
-              </a:ext>
             </a:extLst>
           </a:blip>
-          <a:stretch>
-            <a:fillRect/>
-          </a:stretch>
+          <a:srcRect t="2375" r="945" b="23340"/>
+          <a:stretch/>
         </p:blipFill>
         <p:spPr>
           <a:xfrm>
-            <a:off x="4202622" y="4813495"/>
-            <a:ext cx="1645920" cy="1645920"/>
-          </a:xfrm>
-          <a:prstGeom prst="rect">
+            <a:off x="4247770" y="4869073"/>
+            <a:ext cx="1645920" cy="1645742"/>
+          </a:xfrm>
+          <a:prstGeom prst="ellipse">
             <a:avLst/>
           </a:prstGeom>
+          <a:ln w="28575">
+            <a:solidFill>
+              <a:srgbClr val="CA646A"/>
+            </a:solidFill>
+          </a:ln>
         </p:spPr>
       </p:pic>
     </p:spTree>
@@ -10010,7 +9955,7 @@
                 <a:latin typeface="Times New Roman" panose="02020603050405020304" pitchFamily="18" charset="0"/>
                 <a:cs typeface="Times New Roman" panose="02020603050405020304" pitchFamily="18" charset="0"/>
               </a:rPr>
-              <a:t>The Tracking can be done using  TRACCAR client application </a:t>
+              <a:t>The Tracking will be done using  TRACCAR client application </a:t>
             </a:r>
             <a:endParaRPr lang="fr-FR" sz="1500" b="1" dirty="0">
               <a:solidFill>
@@ -13690,6 +13635,58 @@
           </a:p>
         </p:txBody>
       </p:sp>
+      <p:sp>
+        <p:nvSpPr>
+          <p:cNvPr id="68" name="Rectangle 67">
+            <a:extLst>
+              <a:ext uri="{FF2B5EF4-FFF2-40B4-BE49-F238E27FC236}">
+                <a16:creationId xmlns:a16="http://schemas.microsoft.com/office/drawing/2014/main" id="{89CCA3FB-BBEE-4566-883B-86427E8085FE}"/>
+              </a:ext>
+            </a:extLst>
+          </p:cNvPr>
+          <p:cNvSpPr/>
+          <p:nvPr/>
+        </p:nvSpPr>
+        <p:spPr>
+          <a:xfrm>
+            <a:off x="0" y="6771394"/>
+            <a:ext cx="12192000" cy="91440"/>
+          </a:xfrm>
+          <a:prstGeom prst="rect">
+            <a:avLst/>
+          </a:prstGeom>
+          <a:solidFill>
+            <a:srgbClr val="4466A0"/>
+          </a:solidFill>
+          <a:ln>
+            <a:noFill/>
+          </a:ln>
+        </p:spPr>
+        <p:style>
+          <a:lnRef idx="2">
+            <a:schemeClr val="accent1">
+              <a:shade val="50000"/>
+            </a:schemeClr>
+          </a:lnRef>
+          <a:fillRef idx="1">
+            <a:schemeClr val="accent1"/>
+          </a:fillRef>
+          <a:effectRef idx="0">
+            <a:schemeClr val="accent1"/>
+          </a:effectRef>
+          <a:fontRef idx="minor">
+            <a:schemeClr val="lt1"/>
+          </a:fontRef>
+        </p:style>
+        <p:txBody>
+          <a:bodyPr rtlCol="0" anchor="ctr"/>
+          <a:lstStyle/>
+          <a:p>
+            <a:pPr algn="ctr"/>
+            <a:endParaRPr lang="fr-FR"/>
+          </a:p>
+        </p:txBody>
+      </p:sp>
     </p:spTree>
     <p:extLst>
       <p:ext uri="{BB962C8B-B14F-4D97-AF65-F5344CB8AC3E}">
@@ -14340,6 +14337,58 @@
           </a:prstGeom>
         </p:spPr>
       </p:pic>
+      <p:sp>
+        <p:nvSpPr>
+          <p:cNvPr id="19" name="Rectangle 18">
+            <a:extLst>
+              <a:ext uri="{FF2B5EF4-FFF2-40B4-BE49-F238E27FC236}">
+                <a16:creationId xmlns:a16="http://schemas.microsoft.com/office/drawing/2014/main" id="{3F0AE283-D957-4A28-8634-CCB047B88246}"/>
+              </a:ext>
+            </a:extLst>
+          </p:cNvPr>
+          <p:cNvSpPr/>
+          <p:nvPr/>
+        </p:nvSpPr>
+        <p:spPr>
+          <a:xfrm>
+            <a:off x="0" y="6771394"/>
+            <a:ext cx="12192000" cy="91440"/>
+          </a:xfrm>
+          <a:prstGeom prst="rect">
+            <a:avLst/>
+          </a:prstGeom>
+          <a:solidFill>
+            <a:srgbClr val="4466A0"/>
+          </a:solidFill>
+          <a:ln>
+            <a:noFill/>
+          </a:ln>
+        </p:spPr>
+        <p:style>
+          <a:lnRef idx="2">
+            <a:schemeClr val="accent1">
+              <a:shade val="50000"/>
+            </a:schemeClr>
+          </a:lnRef>
+          <a:fillRef idx="1">
+            <a:schemeClr val="accent1"/>
+          </a:fillRef>
+          <a:effectRef idx="0">
+            <a:schemeClr val="accent1"/>
+          </a:effectRef>
+          <a:fontRef idx="minor">
+            <a:schemeClr val="lt1"/>
+          </a:fontRef>
+        </p:style>
+        <p:txBody>
+          <a:bodyPr rtlCol="0" anchor="ctr"/>
+          <a:lstStyle/>
+          <a:p>
+            <a:pPr algn="ctr"/>
+            <a:endParaRPr lang="fr-FR"/>
+          </a:p>
+        </p:txBody>
+      </p:sp>
     </p:spTree>
     <p:extLst>
       <p:ext uri="{BB962C8B-B14F-4D97-AF65-F5344CB8AC3E}">

</xml_diff>

<commit_message>
add the progress presentation v2 : [Progress Level : Current Step - Done]
</commit_message>
<xml_diff>
--- a/Progress' Presentations/Etat d'avancement - S1.pptx
+++ b/Progress' Presentations/Etat d'avancement - S1.pptx
@@ -10,7 +10,7 @@
   <p:sldIdLst>
     <p:sldId id="267" r:id="rId2"/>
     <p:sldId id="258" r:id="rId3"/>
-    <p:sldId id="273" r:id="rId4"/>
+    <p:sldId id="276" r:id="rId4"/>
     <p:sldId id="275" r:id="rId5"/>
     <p:sldId id="274" r:id="rId6"/>
     <p:sldId id="263" r:id="rId7"/>
@@ -3714,7 +3714,7 @@
         <p:spPr>
           <a:xfrm>
             <a:off x="281906" y="1293274"/>
-            <a:ext cx="5814094" cy="2739211"/>
+            <a:ext cx="5814094" cy="2123658"/>
           </a:xfrm>
           <a:prstGeom prst="rect">
             <a:avLst/>
@@ -3768,20 +3768,6 @@
           </a:p>
           <a:p>
             <a:r>
-              <a:rPr lang="en-US" sz="4000" dirty="0">
-                <a:solidFill>
-                  <a:schemeClr val="tx1">
-                    <a:lumMod val="75000"/>
-                    <a:lumOff val="25000"/>
-                  </a:schemeClr>
-                </a:solidFill>
-                <a:latin typeface="Aharoni" panose="02010803020104030203" pitchFamily="2" charset="-79"/>
-                <a:ea typeface="Tahoma" panose="020B0604030504040204" pitchFamily="34" charset="0"/>
-                <a:cs typeface="Aharoni" panose="02010803020104030203" pitchFamily="2" charset="-79"/>
-              </a:rPr>
-              <a:t>B</a:t>
-            </a:r>
-            <a:r>
               <a:rPr lang="fr-FR" sz="4000" dirty="0" err="1">
                 <a:solidFill>
                   <a:schemeClr val="tx1">
@@ -3793,7 +3779,7 @@
                 <a:ea typeface="Tahoma" panose="020B0604030504040204" pitchFamily="34" charset="0"/>
                 <a:cs typeface="Aharoni" panose="02010803020104030203" pitchFamily="2" charset="-79"/>
               </a:rPr>
-              <a:t>ecause</a:t>
+              <a:t>We</a:t>
             </a:r>
             <a:r>
               <a:rPr lang="fr-FR" sz="4000" dirty="0">
@@ -3807,63 +3793,7 @@
                 <a:ea typeface="Tahoma" panose="020B0604030504040204" pitchFamily="34" charset="0"/>
                 <a:cs typeface="Aharoni" panose="02010803020104030203" pitchFamily="2" charset="-79"/>
               </a:rPr>
-              <a:t> </a:t>
-            </a:r>
-            <a:r>
-              <a:rPr lang="fr-FR" sz="4000" dirty="0" err="1">
-                <a:solidFill>
-                  <a:schemeClr val="tx1">
-                    <a:lumMod val="75000"/>
-                    <a:lumOff val="25000"/>
-                  </a:schemeClr>
-                </a:solidFill>
-                <a:latin typeface="Aharoni" panose="02010803020104030203" pitchFamily="2" charset="-79"/>
-                <a:ea typeface="Tahoma" panose="020B0604030504040204" pitchFamily="34" charset="0"/>
-                <a:cs typeface="Aharoni" panose="02010803020104030203" pitchFamily="2" charset="-79"/>
-              </a:rPr>
-              <a:t>we</a:t>
-            </a:r>
-            <a:r>
-              <a:rPr lang="fr-FR" sz="4000" dirty="0">
-                <a:solidFill>
-                  <a:schemeClr val="tx1">
-                    <a:lumMod val="75000"/>
-                    <a:lumOff val="25000"/>
-                  </a:schemeClr>
-                </a:solidFill>
-                <a:latin typeface="Aharoni" panose="02010803020104030203" pitchFamily="2" charset="-79"/>
-                <a:ea typeface="Tahoma" panose="020B0604030504040204" pitchFamily="34" charset="0"/>
-                <a:cs typeface="Aharoni" panose="02010803020104030203" pitchFamily="2" charset="-79"/>
-              </a:rPr>
-              <a:t> </a:t>
-            </a:r>
-            <a:r>
-              <a:rPr lang="fr-FR" sz="4000" dirty="0" err="1">
-                <a:solidFill>
-                  <a:schemeClr val="tx1">
-                    <a:lumMod val="75000"/>
-                    <a:lumOff val="25000"/>
-                  </a:schemeClr>
-                </a:solidFill>
-                <a:latin typeface="Aharoni" panose="02010803020104030203" pitchFamily="2" charset="-79"/>
-                <a:ea typeface="Tahoma" panose="020B0604030504040204" pitchFamily="34" charset="0"/>
-                <a:cs typeface="Aharoni" panose="02010803020104030203" pitchFamily="2" charset="-79"/>
-              </a:rPr>
-              <a:t>track</a:t>
-            </a:r>
-            <a:r>
-              <a:rPr lang="fr-FR" sz="4000" dirty="0">
-                <a:solidFill>
-                  <a:schemeClr val="tx1">
-                    <a:lumMod val="75000"/>
-                    <a:lumOff val="25000"/>
-                  </a:schemeClr>
-                </a:solidFill>
-                <a:latin typeface="Aharoni" panose="02010803020104030203" pitchFamily="2" charset="-79"/>
-                <a:ea typeface="Tahoma" panose="020B0604030504040204" pitchFamily="34" charset="0"/>
-                <a:cs typeface="Aharoni" panose="02010803020104030203" pitchFamily="2" charset="-79"/>
-              </a:rPr>
-              <a:t> </a:t>
+              <a:t> Track </a:t>
             </a:r>
             <a:r>
               <a:rPr lang="fr-FR" sz="4000" dirty="0" err="1">
@@ -3891,23 +3821,7 @@
                 <a:ea typeface="Tahoma" panose="020B0604030504040204" pitchFamily="34" charset="0"/>
                 <a:cs typeface="Aharoni" panose="02010803020104030203" pitchFamily="2" charset="-79"/>
               </a:rPr>
-              <a:t> </a:t>
-            </a:r>
-          </a:p>
-          <a:p>
-            <a:r>
-              <a:rPr lang="fr-FR" sz="4000" dirty="0">
-                <a:solidFill>
-                  <a:schemeClr val="tx1">
-                    <a:lumMod val="75000"/>
-                    <a:lumOff val="25000"/>
-                  </a:schemeClr>
-                </a:solidFill>
-                <a:latin typeface="Aharoni" panose="02010803020104030203" pitchFamily="2" charset="-79"/>
-                <a:ea typeface="Tahoma" panose="020B0604030504040204" pitchFamily="34" charset="0"/>
-                <a:cs typeface="Aharoni" panose="02010803020104030203" pitchFamily="2" charset="-79"/>
-              </a:rPr>
-              <a:t>for You</a:t>
+              <a:t> for You</a:t>
             </a:r>
             <a:endParaRPr lang="en-US" sz="4000" dirty="0">
               <a:solidFill>
@@ -6387,7 +6301,7 @@
         </p:nvGrpSpPr>
         <p:grpSpPr>
           <a:xfrm>
-            <a:off x="191794" y="2375964"/>
+            <a:off x="4220007" y="2358135"/>
             <a:ext cx="3758205" cy="1668020"/>
             <a:chOff x="316236" y="1656125"/>
             <a:chExt cx="3758205" cy="1668020"/>
@@ -6641,243 +6555,6 @@
       </p:grpSp>
       <p:grpSp>
         <p:nvGrpSpPr>
-          <p:cNvPr id="50" name="Groupe 49">
-            <a:extLst>
-              <a:ext uri="{FF2B5EF4-FFF2-40B4-BE49-F238E27FC236}">
-                <a16:creationId xmlns:a16="http://schemas.microsoft.com/office/drawing/2014/main" id="{2BC777A5-0140-4C0D-AA11-36CCE18FF438}"/>
-              </a:ext>
-            </a:extLst>
-          </p:cNvPr>
-          <p:cNvGrpSpPr/>
-          <p:nvPr/>
-        </p:nvGrpSpPr>
-        <p:grpSpPr>
-          <a:xfrm>
-            <a:off x="5039700" y="2375964"/>
-            <a:ext cx="2975190" cy="891225"/>
-            <a:chOff x="1103407" y="1656125"/>
-            <a:chExt cx="2975190" cy="891225"/>
-          </a:xfrm>
-        </p:grpSpPr>
-        <p:grpSp>
-          <p:nvGrpSpPr>
-            <p:cNvPr id="51" name="Groupe 50">
-              <a:extLst>
-                <a:ext uri="{FF2B5EF4-FFF2-40B4-BE49-F238E27FC236}">
-                  <a16:creationId xmlns:a16="http://schemas.microsoft.com/office/drawing/2014/main" id="{A15D9173-9275-4D2C-8A4B-8BB6FCC9D3E2}"/>
-                </a:ext>
-              </a:extLst>
-            </p:cNvPr>
-            <p:cNvGrpSpPr/>
-            <p:nvPr/>
-          </p:nvGrpSpPr>
-          <p:grpSpPr>
-            <a:xfrm>
-              <a:off x="1103407" y="1656125"/>
-              <a:ext cx="2975190" cy="482600"/>
-              <a:chOff x="1103407" y="1656125"/>
-              <a:chExt cx="2975190" cy="482600"/>
-            </a:xfrm>
-          </p:grpSpPr>
-          <p:sp>
-            <p:nvSpPr>
-              <p:cNvPr id="54" name="Rectangle 53">
-                <a:extLst>
-                  <a:ext uri="{FF2B5EF4-FFF2-40B4-BE49-F238E27FC236}">
-                    <a16:creationId xmlns:a16="http://schemas.microsoft.com/office/drawing/2014/main" id="{4EFD1304-15EB-42E0-82F6-5B0FEF077F52}"/>
-                  </a:ext>
-                </a:extLst>
-              </p:cNvPr>
-              <p:cNvSpPr/>
-              <p:nvPr/>
-            </p:nvSpPr>
-            <p:spPr>
-              <a:xfrm>
-                <a:off x="1103407" y="1656125"/>
-                <a:ext cx="2970576" cy="482600"/>
-              </a:xfrm>
-              <a:prstGeom prst="rect">
-                <a:avLst/>
-              </a:prstGeom>
-              <a:solidFill>
-                <a:srgbClr val="E4E8EC"/>
-              </a:solidFill>
-              <a:ln>
-                <a:solidFill>
-                  <a:schemeClr val="bg1">
-                    <a:lumMod val="75000"/>
-                  </a:schemeClr>
-                </a:solidFill>
-              </a:ln>
-            </p:spPr>
-            <p:style>
-              <a:lnRef idx="2">
-                <a:schemeClr val="accent1">
-                  <a:shade val="50000"/>
-                </a:schemeClr>
-              </a:lnRef>
-              <a:fillRef idx="1">
-                <a:schemeClr val="accent1"/>
-              </a:fillRef>
-              <a:effectRef idx="0">
-                <a:schemeClr val="accent1"/>
-              </a:effectRef>
-              <a:fontRef idx="minor">
-                <a:schemeClr val="lt1"/>
-              </a:fontRef>
-            </p:style>
-            <p:txBody>
-              <a:bodyPr rtlCol="0" anchor="ctr"/>
-              <a:lstStyle/>
-              <a:p>
-                <a:pPr algn="ctr"/>
-                <a:r>
-                  <a:rPr lang="en-US" dirty="0"/>
-                  <a:t>          </a:t>
-                </a:r>
-                <a:r>
-                  <a:rPr lang="en-US" sz="1400" dirty="0" err="1">
-                    <a:solidFill>
-                      <a:schemeClr val="tx1"/>
-                    </a:solidFill>
-                    <a:latin typeface="Bahnschrift" panose="020B0502040204020203" pitchFamily="34" charset="0"/>
-                    <a:ea typeface="Tahoma" panose="020B0604030504040204" pitchFamily="34" charset="0"/>
-                    <a:cs typeface="Tahoma" panose="020B0604030504040204" pitchFamily="34" charset="0"/>
-                  </a:rPr>
-                  <a:t>Abdelhadi</a:t>
-                </a:r>
-                <a:r>
-                  <a:rPr lang="en-US" sz="1400" dirty="0">
-                    <a:solidFill>
-                      <a:schemeClr val="tx1"/>
-                    </a:solidFill>
-                    <a:latin typeface="Bahnschrift" panose="020B0502040204020203" pitchFamily="34" charset="0"/>
-                    <a:ea typeface="Tahoma" panose="020B0604030504040204" pitchFamily="34" charset="0"/>
-                    <a:cs typeface="Tahoma" panose="020B0604030504040204" pitchFamily="34" charset="0"/>
-                  </a:rPr>
-                  <a:t> ESSABRI</a:t>
-                </a:r>
-                <a:endParaRPr lang="fr-FR" sz="1300" dirty="0">
-                  <a:solidFill>
-                    <a:schemeClr val="tx1"/>
-                  </a:solidFill>
-                  <a:latin typeface="Bahnschrift" panose="020B0502040204020203" pitchFamily="34" charset="0"/>
-                  <a:ea typeface="Tahoma" panose="020B0604030504040204" pitchFamily="34" charset="0"/>
-                  <a:cs typeface="Tahoma" panose="020B0604030504040204" pitchFamily="34" charset="0"/>
-                </a:endParaRPr>
-              </a:p>
-            </p:txBody>
-          </p:sp>
-          <p:sp>
-            <p:nvSpPr>
-              <p:cNvPr id="55" name="Rectangle 54">
-                <a:extLst>
-                  <a:ext uri="{FF2B5EF4-FFF2-40B4-BE49-F238E27FC236}">
-                    <a16:creationId xmlns:a16="http://schemas.microsoft.com/office/drawing/2014/main" id="{EDD8F097-6AA6-4830-9ECA-2462CEE98A36}"/>
-                  </a:ext>
-                </a:extLst>
-              </p:cNvPr>
-              <p:cNvSpPr/>
-              <p:nvPr/>
-            </p:nvSpPr>
-            <p:spPr>
-              <a:xfrm>
-                <a:off x="4034137" y="1656125"/>
-                <a:ext cx="44460" cy="482600"/>
-              </a:xfrm>
-              <a:prstGeom prst="rect">
-                <a:avLst/>
-              </a:prstGeom>
-              <a:solidFill>
-                <a:srgbClr val="10716F"/>
-              </a:solidFill>
-              <a:ln>
-                <a:solidFill>
-                  <a:srgbClr val="10716F"/>
-                </a:solidFill>
-              </a:ln>
-            </p:spPr>
-            <p:style>
-              <a:lnRef idx="2">
-                <a:schemeClr val="accent1">
-                  <a:shade val="50000"/>
-                </a:schemeClr>
-              </a:lnRef>
-              <a:fillRef idx="1">
-                <a:schemeClr val="accent1"/>
-              </a:fillRef>
-              <a:effectRef idx="0">
-                <a:schemeClr val="accent1"/>
-              </a:effectRef>
-              <a:fontRef idx="minor">
-                <a:schemeClr val="lt1"/>
-              </a:fontRef>
-            </p:style>
-            <p:txBody>
-              <a:bodyPr rtlCol="0" anchor="ctr"/>
-              <a:lstStyle/>
-              <a:p>
-                <a:pPr algn="ctr"/>
-                <a:endParaRPr lang="fr-FR"/>
-              </a:p>
-            </p:txBody>
-          </p:sp>
-        </p:grpSp>
-        <p:sp>
-          <p:nvSpPr>
-            <p:cNvPr id="52" name="ZoneTexte 51">
-              <a:extLst>
-                <a:ext uri="{FF2B5EF4-FFF2-40B4-BE49-F238E27FC236}">
-                  <a16:creationId xmlns:a16="http://schemas.microsoft.com/office/drawing/2014/main" id="{DD15CC4D-0B7B-47E8-9672-6541110C5958}"/>
-                </a:ext>
-              </a:extLst>
-            </p:cNvPr>
-            <p:cNvSpPr txBox="1"/>
-            <p:nvPr/>
-          </p:nvSpPr>
-          <p:spPr>
-            <a:xfrm>
-              <a:off x="1988998" y="2239573"/>
-              <a:ext cx="1301959" cy="307777"/>
-            </a:xfrm>
-            <a:prstGeom prst="rect">
-              <a:avLst/>
-            </a:prstGeom>
-            <a:noFill/>
-          </p:spPr>
-          <p:txBody>
-            <a:bodyPr wrap="none" rtlCol="0">
-              <a:spAutoFit/>
-            </a:bodyPr>
-            <a:lstStyle/>
-            <a:p>
-              <a:r>
-                <a:rPr lang="en-US" sz="1400" dirty="0">
-                  <a:solidFill>
-                    <a:schemeClr val="tx1">
-                      <a:lumMod val="85000"/>
-                      <a:lumOff val="15000"/>
-                    </a:schemeClr>
-                  </a:solidFill>
-                  <a:latin typeface="Bahnschrift" panose="020B0502040204020203" pitchFamily="34" charset="0"/>
-                </a:rPr>
-                <a:t>Data Scientist</a:t>
-              </a:r>
-              <a:endParaRPr lang="fr-FR" sz="1400" dirty="0">
-                <a:solidFill>
-                  <a:schemeClr val="tx1">
-                    <a:lumMod val="85000"/>
-                    <a:lumOff val="15000"/>
-                  </a:schemeClr>
-                </a:solidFill>
-                <a:latin typeface="Bahnschrift" panose="020B0502040204020203" pitchFamily="34" charset="0"/>
-              </a:endParaRPr>
-            </a:p>
-          </p:txBody>
-        </p:sp>
-      </p:grpSp>
-      <p:grpSp>
-        <p:nvGrpSpPr>
           <p:cNvPr id="56" name="Groupe 55">
             <a:extLst>
               <a:ext uri="{FF2B5EF4-FFF2-40B4-BE49-F238E27FC236}">
@@ -7922,10 +7599,10 @@
       </p:pic>
       <p:pic>
         <p:nvPicPr>
-          <p:cNvPr id="89" name="Image 88">
-            <a:extLst>
-              <a:ext uri="{FF2B5EF4-FFF2-40B4-BE49-F238E27FC236}">
-                <a16:creationId xmlns:a16="http://schemas.microsoft.com/office/drawing/2014/main" id="{2D59D6A3-8784-40BD-878E-566F25ED8740}"/>
+          <p:cNvPr id="91" name="Image 90">
+            <a:extLst>
+              <a:ext uri="{FF2B5EF4-FFF2-40B4-BE49-F238E27FC236}">
+                <a16:creationId xmlns:a16="http://schemas.microsoft.com/office/drawing/2014/main" id="{672742DA-476D-42E3-8E94-B5DFEA55B6D0}"/>
               </a:ext>
             </a:extLst>
           </p:cNvPr>
@@ -7936,46 +7613,6 @@
         </p:nvPicPr>
         <p:blipFill rotWithShape="1">
           <a:blip r:embed="rId7">
-            <a:extLst>
-              <a:ext uri="{28A0092B-C50C-407E-A947-70E740481C1C}">
-                <a14:useLocalDpi xmlns:a14="http://schemas.microsoft.com/office/drawing/2010/main" val="0"/>
-              </a:ext>
-            </a:extLst>
-          </a:blip>
-          <a:srcRect t="17634" b="26144"/>
-          <a:stretch/>
-        </p:blipFill>
-        <p:spPr>
-          <a:xfrm>
-            <a:off x="4247770" y="2391462"/>
-            <a:ext cx="1645920" cy="1645911"/>
-          </a:xfrm>
-          <a:prstGeom prst="ellipse">
-            <a:avLst/>
-          </a:prstGeom>
-          <a:ln w="28575">
-            <a:solidFill>
-              <a:srgbClr val="10716F"/>
-            </a:solidFill>
-          </a:ln>
-        </p:spPr>
-      </p:pic>
-      <p:pic>
-        <p:nvPicPr>
-          <p:cNvPr id="91" name="Image 90">
-            <a:extLst>
-              <a:ext uri="{FF2B5EF4-FFF2-40B4-BE49-F238E27FC236}">
-                <a16:creationId xmlns:a16="http://schemas.microsoft.com/office/drawing/2014/main" id="{672742DA-476D-42E3-8E94-B5DFEA55B6D0}"/>
-              </a:ext>
-            </a:extLst>
-          </p:cNvPr>
-          <p:cNvPicPr>
-            <a:picLocks noChangeAspect="1"/>
-          </p:cNvPicPr>
-          <p:nvPr/>
-        </p:nvPicPr>
-        <p:blipFill rotWithShape="1">
-          <a:blip r:embed="rId8">
             <a:extLst>
               <a:ext uri="{28A0092B-C50C-407E-A947-70E740481C1C}">
                 <a14:useLocalDpi xmlns:a14="http://schemas.microsoft.com/office/drawing/2010/main" val="0"/>
@@ -8310,7 +7947,7 @@
           <p:nvPr/>
         </p:nvPicPr>
         <p:blipFill rotWithShape="1">
-          <a:blip r:embed="rId9">
+          <a:blip r:embed="rId8">
             <a:extLst>
               <a:ext uri="{28A0092B-C50C-407E-A947-70E740481C1C}">
                 <a14:useLocalDpi xmlns:a14="http://schemas.microsoft.com/office/drawing/2010/main" val="0"/>
@@ -8335,10 +7972,308 @@
           </a:ln>
         </p:spPr>
       </p:pic>
+      <p:grpSp>
+        <p:nvGrpSpPr>
+          <p:cNvPr id="3" name="Groupe 2">
+            <a:extLst>
+              <a:ext uri="{FF2B5EF4-FFF2-40B4-BE49-F238E27FC236}">
+                <a16:creationId xmlns:a16="http://schemas.microsoft.com/office/drawing/2014/main" id="{3AE20504-19F2-423E-9034-A6BB9B25EA5D}"/>
+              </a:ext>
+            </a:extLst>
+          </p:cNvPr>
+          <p:cNvGrpSpPr/>
+          <p:nvPr/>
+        </p:nvGrpSpPr>
+        <p:grpSpPr>
+          <a:xfrm>
+            <a:off x="161649" y="2390701"/>
+            <a:ext cx="3802764" cy="1667445"/>
+            <a:chOff x="4212126" y="2375964"/>
+            <a:chExt cx="3802764" cy="1667445"/>
+          </a:xfrm>
+        </p:grpSpPr>
+        <p:grpSp>
+          <p:nvGrpSpPr>
+            <p:cNvPr id="50" name="Groupe 49">
+              <a:extLst>
+                <a:ext uri="{FF2B5EF4-FFF2-40B4-BE49-F238E27FC236}">
+                  <a16:creationId xmlns:a16="http://schemas.microsoft.com/office/drawing/2014/main" id="{2BC777A5-0140-4C0D-AA11-36CCE18FF438}"/>
+                </a:ext>
+              </a:extLst>
+            </p:cNvPr>
+            <p:cNvGrpSpPr/>
+            <p:nvPr/>
+          </p:nvGrpSpPr>
+          <p:grpSpPr>
+            <a:xfrm>
+              <a:off x="5039700" y="2375964"/>
+              <a:ext cx="2975190" cy="891225"/>
+              <a:chOff x="1103407" y="1656125"/>
+              <a:chExt cx="2975190" cy="891225"/>
+            </a:xfrm>
+          </p:grpSpPr>
+          <p:grpSp>
+            <p:nvGrpSpPr>
+              <p:cNvPr id="51" name="Groupe 50">
+                <a:extLst>
+                  <a:ext uri="{FF2B5EF4-FFF2-40B4-BE49-F238E27FC236}">
+                    <a16:creationId xmlns:a16="http://schemas.microsoft.com/office/drawing/2014/main" id="{A15D9173-9275-4D2C-8A4B-8BB6FCC9D3E2}"/>
+                  </a:ext>
+                </a:extLst>
+              </p:cNvPr>
+              <p:cNvGrpSpPr/>
+              <p:nvPr/>
+            </p:nvGrpSpPr>
+            <p:grpSpPr>
+              <a:xfrm>
+                <a:off x="1103407" y="1656125"/>
+                <a:ext cx="2975190" cy="482600"/>
+                <a:chOff x="1103407" y="1656125"/>
+                <a:chExt cx="2975190" cy="482600"/>
+              </a:xfrm>
+            </p:grpSpPr>
+            <p:sp>
+              <p:nvSpPr>
+                <p:cNvPr id="54" name="Rectangle 53">
+                  <a:extLst>
+                    <a:ext uri="{FF2B5EF4-FFF2-40B4-BE49-F238E27FC236}">
+                      <a16:creationId xmlns:a16="http://schemas.microsoft.com/office/drawing/2014/main" id="{4EFD1304-15EB-42E0-82F6-5B0FEF077F52}"/>
+                    </a:ext>
+                  </a:extLst>
+                </p:cNvPr>
+                <p:cNvSpPr/>
+                <p:nvPr/>
+              </p:nvSpPr>
+              <p:spPr>
+                <a:xfrm>
+                  <a:off x="1103407" y="1656125"/>
+                  <a:ext cx="2970576" cy="482600"/>
+                </a:xfrm>
+                <a:prstGeom prst="rect">
+                  <a:avLst/>
+                </a:prstGeom>
+                <a:solidFill>
+                  <a:srgbClr val="E4E8EC"/>
+                </a:solidFill>
+                <a:ln>
+                  <a:solidFill>
+                    <a:schemeClr val="bg1">
+                      <a:lumMod val="75000"/>
+                    </a:schemeClr>
+                  </a:solidFill>
+                </a:ln>
+              </p:spPr>
+              <p:style>
+                <a:lnRef idx="2">
+                  <a:schemeClr val="accent1">
+                    <a:shade val="50000"/>
+                  </a:schemeClr>
+                </a:lnRef>
+                <a:fillRef idx="1">
+                  <a:schemeClr val="accent1"/>
+                </a:fillRef>
+                <a:effectRef idx="0">
+                  <a:schemeClr val="accent1"/>
+                </a:effectRef>
+                <a:fontRef idx="minor">
+                  <a:schemeClr val="lt1"/>
+                </a:fontRef>
+              </p:style>
+              <p:txBody>
+                <a:bodyPr rtlCol="0" anchor="ctr"/>
+                <a:lstStyle/>
+                <a:p>
+                  <a:pPr algn="ctr"/>
+                  <a:r>
+                    <a:rPr lang="en-US" dirty="0"/>
+                    <a:t>          </a:t>
+                  </a:r>
+                  <a:r>
+                    <a:rPr lang="en-US" sz="1400" dirty="0" err="1">
+                      <a:solidFill>
+                        <a:schemeClr val="tx1"/>
+                      </a:solidFill>
+                      <a:latin typeface="Bahnschrift" panose="020B0502040204020203" pitchFamily="34" charset="0"/>
+                      <a:ea typeface="Tahoma" panose="020B0604030504040204" pitchFamily="34" charset="0"/>
+                      <a:cs typeface="Tahoma" panose="020B0604030504040204" pitchFamily="34" charset="0"/>
+                    </a:rPr>
+                    <a:t>Abdelhadi</a:t>
+                  </a:r>
+                  <a:r>
+                    <a:rPr lang="en-US" sz="1400" dirty="0">
+                      <a:solidFill>
+                        <a:schemeClr val="tx1"/>
+                      </a:solidFill>
+                      <a:latin typeface="Bahnschrift" panose="020B0502040204020203" pitchFamily="34" charset="0"/>
+                      <a:ea typeface="Tahoma" panose="020B0604030504040204" pitchFamily="34" charset="0"/>
+                      <a:cs typeface="Tahoma" panose="020B0604030504040204" pitchFamily="34" charset="0"/>
+                    </a:rPr>
+                    <a:t> ESSABRI</a:t>
+                  </a:r>
+                  <a:endParaRPr lang="fr-FR" sz="1300" dirty="0">
+                    <a:solidFill>
+                      <a:schemeClr val="tx1"/>
+                    </a:solidFill>
+                    <a:latin typeface="Bahnschrift" panose="020B0502040204020203" pitchFamily="34" charset="0"/>
+                    <a:ea typeface="Tahoma" panose="020B0604030504040204" pitchFamily="34" charset="0"/>
+                    <a:cs typeface="Tahoma" panose="020B0604030504040204" pitchFamily="34" charset="0"/>
+                  </a:endParaRPr>
+                </a:p>
+              </p:txBody>
+            </p:sp>
+            <p:sp>
+              <p:nvSpPr>
+                <p:cNvPr id="55" name="Rectangle 54">
+                  <a:extLst>
+                    <a:ext uri="{FF2B5EF4-FFF2-40B4-BE49-F238E27FC236}">
+                      <a16:creationId xmlns:a16="http://schemas.microsoft.com/office/drawing/2014/main" id="{EDD8F097-6AA6-4830-9ECA-2462CEE98A36}"/>
+                    </a:ext>
+                  </a:extLst>
+                </p:cNvPr>
+                <p:cNvSpPr/>
+                <p:nvPr/>
+              </p:nvSpPr>
+              <p:spPr>
+                <a:xfrm>
+                  <a:off x="4034137" y="1656125"/>
+                  <a:ext cx="44460" cy="482600"/>
+                </a:xfrm>
+                <a:prstGeom prst="rect">
+                  <a:avLst/>
+                </a:prstGeom>
+                <a:solidFill>
+                  <a:srgbClr val="10716F"/>
+                </a:solidFill>
+                <a:ln>
+                  <a:solidFill>
+                    <a:srgbClr val="10716F"/>
+                  </a:solidFill>
+                </a:ln>
+              </p:spPr>
+              <p:style>
+                <a:lnRef idx="2">
+                  <a:schemeClr val="accent1">
+                    <a:shade val="50000"/>
+                  </a:schemeClr>
+                </a:lnRef>
+                <a:fillRef idx="1">
+                  <a:schemeClr val="accent1"/>
+                </a:fillRef>
+                <a:effectRef idx="0">
+                  <a:schemeClr val="accent1"/>
+                </a:effectRef>
+                <a:fontRef idx="minor">
+                  <a:schemeClr val="lt1"/>
+                </a:fontRef>
+              </p:style>
+              <p:txBody>
+                <a:bodyPr rtlCol="0" anchor="ctr"/>
+                <a:lstStyle/>
+                <a:p>
+                  <a:pPr algn="ctr"/>
+                  <a:endParaRPr lang="fr-FR"/>
+                </a:p>
+              </p:txBody>
+            </p:sp>
+          </p:grpSp>
+          <p:sp>
+            <p:nvSpPr>
+              <p:cNvPr id="52" name="ZoneTexte 51">
+                <a:extLst>
+                  <a:ext uri="{FF2B5EF4-FFF2-40B4-BE49-F238E27FC236}">
+                    <a16:creationId xmlns:a16="http://schemas.microsoft.com/office/drawing/2014/main" id="{DD15CC4D-0B7B-47E8-9672-6541110C5958}"/>
+                  </a:ext>
+                </a:extLst>
+              </p:cNvPr>
+              <p:cNvSpPr txBox="1"/>
+              <p:nvPr/>
+            </p:nvSpPr>
+            <p:spPr>
+              <a:xfrm>
+                <a:off x="1988998" y="2239573"/>
+                <a:ext cx="1301959" cy="307777"/>
+              </a:xfrm>
+              <a:prstGeom prst="rect">
+                <a:avLst/>
+              </a:prstGeom>
+              <a:noFill/>
+            </p:spPr>
+            <p:txBody>
+              <a:bodyPr wrap="none" rtlCol="0">
+                <a:spAutoFit/>
+              </a:bodyPr>
+              <a:lstStyle/>
+              <a:p>
+                <a:r>
+                  <a:rPr lang="en-US" sz="1400" dirty="0">
+                    <a:solidFill>
+                      <a:schemeClr val="tx1">
+                        <a:lumMod val="85000"/>
+                        <a:lumOff val="15000"/>
+                      </a:schemeClr>
+                    </a:solidFill>
+                    <a:latin typeface="Bahnschrift" panose="020B0502040204020203" pitchFamily="34" charset="0"/>
+                  </a:rPr>
+                  <a:t>Data Scientist</a:t>
+                </a:r>
+                <a:endParaRPr lang="fr-FR" sz="1400" dirty="0">
+                  <a:solidFill>
+                    <a:schemeClr val="tx1">
+                      <a:lumMod val="85000"/>
+                      <a:lumOff val="15000"/>
+                    </a:schemeClr>
+                  </a:solidFill>
+                  <a:latin typeface="Bahnschrift" panose="020B0502040204020203" pitchFamily="34" charset="0"/>
+                </a:endParaRPr>
+              </a:p>
+            </p:txBody>
+          </p:sp>
+        </p:grpSp>
+        <p:pic>
+          <p:nvPicPr>
+            <p:cNvPr id="15" name="Image 14">
+              <a:extLst>
+                <a:ext uri="{FF2B5EF4-FFF2-40B4-BE49-F238E27FC236}">
+                  <a16:creationId xmlns:a16="http://schemas.microsoft.com/office/drawing/2014/main" id="{C2FE8FA9-73DD-448B-ABDF-DB7CD2613EB0}"/>
+                </a:ext>
+              </a:extLst>
+            </p:cNvPr>
+            <p:cNvPicPr>
+              <a:picLocks noChangeAspect="1"/>
+            </p:cNvPicPr>
+            <p:nvPr/>
+          </p:nvPicPr>
+          <p:blipFill rotWithShape="1">
+            <a:blip r:embed="rId9">
+              <a:extLst>
+                <a:ext uri="{28A0092B-C50C-407E-A947-70E740481C1C}">
+                  <a14:useLocalDpi xmlns:a14="http://schemas.microsoft.com/office/drawing/2010/main" val="0"/>
+                </a:ext>
+              </a:extLst>
+            </a:blip>
+            <a:srcRect l="22306" t="8185" r="25344" b="52488"/>
+            <a:stretch/>
+          </p:blipFill>
+          <p:spPr>
+            <a:xfrm>
+              <a:off x="4212126" y="2394865"/>
+              <a:ext cx="1645920" cy="1648544"/>
+            </a:xfrm>
+            <a:prstGeom prst="ellipse">
+              <a:avLst/>
+            </a:prstGeom>
+            <a:ln w="28575">
+              <a:solidFill>
+                <a:srgbClr val="10716F"/>
+              </a:solidFill>
+            </a:ln>
+          </p:spPr>
+        </p:pic>
+      </p:grpSp>
     </p:spTree>
     <p:extLst>
       <p:ext uri="{BB962C8B-B14F-4D97-AF65-F5344CB8AC3E}">
-        <p14:creationId xmlns:p14="http://schemas.microsoft.com/office/powerpoint/2010/main" val="2918450855"/>
+        <p14:creationId xmlns:p14="http://schemas.microsoft.com/office/powerpoint/2010/main" val="4284752669"/>
       </p:ext>
     </p:extLst>
   </p:cSld>
@@ -13783,7 +13718,7 @@
         </p:nvSpPr>
         <p:spPr>
           <a:xfrm>
-            <a:off x="338500" y="4861107"/>
+            <a:off x="220559" y="4845718"/>
             <a:ext cx="2668423" cy="369332"/>
           </a:xfrm>
           <a:prstGeom prst="rect">

</xml_diff>

<commit_message>
add the progress presentation v2 : [Progress Level : fix some things]
</commit_message>
<xml_diff>
--- a/Progress' Presentations/Etat d'avancement - S1.pptx
+++ b/Progress' Presentations/Etat d'avancement - S1.pptx
@@ -203,7 +203,7 @@
           <a:p>
             <a:fld id="{23942927-6858-47F6-AE24-764CC11250D6}" type="datetimeFigureOut">
               <a:rPr lang="fr-FR" smtClean="0"/>
-              <a:t>01/12/2021</a:t>
+              <a:t>02/12/2021</a:t>
             </a:fld>
             <a:endParaRPr lang="fr-FR"/>
           </a:p>
@@ -619,7 +619,7 @@
           <a:p>
             <a:fld id="{33C3348E-3C1A-4598-9A7B-0D66E8588920}" type="datetimeFigureOut">
               <a:rPr lang="fr-FR" smtClean="0"/>
-              <a:t>01/12/2021</a:t>
+              <a:t>02/12/2021</a:t>
             </a:fld>
             <a:endParaRPr lang="fr-FR"/>
           </a:p>
@@ -819,7 +819,7 @@
           <a:p>
             <a:fld id="{33C3348E-3C1A-4598-9A7B-0D66E8588920}" type="datetimeFigureOut">
               <a:rPr lang="fr-FR" smtClean="0"/>
-              <a:t>01/12/2021</a:t>
+              <a:t>02/12/2021</a:t>
             </a:fld>
             <a:endParaRPr lang="fr-FR"/>
           </a:p>
@@ -1029,7 +1029,7 @@
           <a:p>
             <a:fld id="{33C3348E-3C1A-4598-9A7B-0D66E8588920}" type="datetimeFigureOut">
               <a:rPr lang="fr-FR" smtClean="0"/>
-              <a:t>01/12/2021</a:t>
+              <a:t>02/12/2021</a:t>
             </a:fld>
             <a:endParaRPr lang="fr-FR"/>
           </a:p>
@@ -1229,7 +1229,7 @@
           <a:p>
             <a:fld id="{33C3348E-3C1A-4598-9A7B-0D66E8588920}" type="datetimeFigureOut">
               <a:rPr lang="fr-FR" smtClean="0"/>
-              <a:t>01/12/2021</a:t>
+              <a:t>02/12/2021</a:t>
             </a:fld>
             <a:endParaRPr lang="fr-FR"/>
           </a:p>
@@ -1505,7 +1505,7 @@
           <a:p>
             <a:fld id="{33C3348E-3C1A-4598-9A7B-0D66E8588920}" type="datetimeFigureOut">
               <a:rPr lang="fr-FR" smtClean="0"/>
-              <a:t>01/12/2021</a:t>
+              <a:t>02/12/2021</a:t>
             </a:fld>
             <a:endParaRPr lang="fr-FR"/>
           </a:p>
@@ -1773,7 +1773,7 @@
           <a:p>
             <a:fld id="{33C3348E-3C1A-4598-9A7B-0D66E8588920}" type="datetimeFigureOut">
               <a:rPr lang="fr-FR" smtClean="0"/>
-              <a:t>01/12/2021</a:t>
+              <a:t>02/12/2021</a:t>
             </a:fld>
             <a:endParaRPr lang="fr-FR"/>
           </a:p>
@@ -2188,7 +2188,7 @@
           <a:p>
             <a:fld id="{33C3348E-3C1A-4598-9A7B-0D66E8588920}" type="datetimeFigureOut">
               <a:rPr lang="fr-FR" smtClean="0"/>
-              <a:t>01/12/2021</a:t>
+              <a:t>02/12/2021</a:t>
             </a:fld>
             <a:endParaRPr lang="fr-FR"/>
           </a:p>
@@ -2330,7 +2330,7 @@
           <a:p>
             <a:fld id="{33C3348E-3C1A-4598-9A7B-0D66E8588920}" type="datetimeFigureOut">
               <a:rPr lang="fr-FR" smtClean="0"/>
-              <a:t>01/12/2021</a:t>
+              <a:t>02/12/2021</a:t>
             </a:fld>
             <a:endParaRPr lang="fr-FR"/>
           </a:p>
@@ -2443,7 +2443,7 @@
           <a:p>
             <a:fld id="{33C3348E-3C1A-4598-9A7B-0D66E8588920}" type="datetimeFigureOut">
               <a:rPr lang="fr-FR" smtClean="0"/>
-              <a:t>01/12/2021</a:t>
+              <a:t>02/12/2021</a:t>
             </a:fld>
             <a:endParaRPr lang="fr-FR"/>
           </a:p>
@@ -2756,7 +2756,7 @@
           <a:p>
             <a:fld id="{33C3348E-3C1A-4598-9A7B-0D66E8588920}" type="datetimeFigureOut">
               <a:rPr lang="fr-FR" smtClean="0"/>
-              <a:t>01/12/2021</a:t>
+              <a:t>02/12/2021</a:t>
             </a:fld>
             <a:endParaRPr lang="fr-FR"/>
           </a:p>
@@ -3045,7 +3045,7 @@
           <a:p>
             <a:fld id="{33C3348E-3C1A-4598-9A7B-0D66E8588920}" type="datetimeFigureOut">
               <a:rPr lang="fr-FR" smtClean="0"/>
-              <a:t>01/12/2021</a:t>
+              <a:t>02/12/2021</a:t>
             </a:fld>
             <a:endParaRPr lang="fr-FR"/>
           </a:p>
@@ -3288,7 +3288,7 @@
           <a:p>
             <a:fld id="{33C3348E-3C1A-4598-9A7B-0D66E8588920}" type="datetimeFigureOut">
               <a:rPr lang="fr-FR" smtClean="0"/>
-              <a:t>01/12/2021</a:t>
+              <a:t>02/12/2021</a:t>
             </a:fld>
             <a:endParaRPr lang="fr-FR"/>
           </a:p>
@@ -4606,6 +4606,83 @@
           </a:prstGeom>
         </p:spPr>
       </p:pic>
+      <p:sp>
+        <p:nvSpPr>
+          <p:cNvPr id="2" name="Rectangle 1">
+            <a:extLst>
+              <a:ext uri="{FF2B5EF4-FFF2-40B4-BE49-F238E27FC236}">
+                <a16:creationId xmlns:a16="http://schemas.microsoft.com/office/drawing/2014/main" id="{61E9EEBB-5D6A-4F13-8EF8-4FC87BC0956B}"/>
+              </a:ext>
+            </a:extLst>
+          </p:cNvPr>
+          <p:cNvSpPr/>
+          <p:nvPr/>
+        </p:nvSpPr>
+        <p:spPr>
+          <a:xfrm>
+            <a:off x="281008" y="4498522"/>
+            <a:ext cx="3270447" cy="866904"/>
+          </a:xfrm>
+          <a:prstGeom prst="rect">
+            <a:avLst/>
+          </a:prstGeom>
+        </p:spPr>
+        <p:txBody>
+          <a:bodyPr wrap="none">
+            <a:spAutoFit/>
+          </a:bodyPr>
+          <a:lstStyle/>
+          <a:p>
+            <a:pPr>
+              <a:lnSpc>
+                <a:spcPct val="150000"/>
+              </a:lnSpc>
+            </a:pPr>
+            <a:r>
+              <a:rPr lang="fr-FR" b="1" dirty="0" err="1">
+                <a:solidFill>
+                  <a:srgbClr val="404040"/>
+                </a:solidFill>
+                <a:latin typeface="Tahoma" panose="020B0604030504040204" pitchFamily="34" charset="0"/>
+                <a:ea typeface="Tahoma" panose="020B0604030504040204" pitchFamily="34" charset="0"/>
+                <a:cs typeface="Tahoma" panose="020B0604030504040204" pitchFamily="34" charset="0"/>
+              </a:rPr>
+              <a:t>Supervised</a:t>
+            </a:r>
+            <a:r>
+              <a:rPr lang="fr-FR" b="1" dirty="0">
+                <a:solidFill>
+                  <a:srgbClr val="404040"/>
+                </a:solidFill>
+                <a:latin typeface="Tahoma" panose="020B0604030504040204" pitchFamily="34" charset="0"/>
+                <a:ea typeface="Tahoma" panose="020B0604030504040204" pitchFamily="34" charset="0"/>
+                <a:cs typeface="Tahoma" panose="020B0604030504040204" pitchFamily="34" charset="0"/>
+              </a:rPr>
+              <a:t> By : </a:t>
+            </a:r>
+          </a:p>
+          <a:p>
+            <a:pPr>
+              <a:lnSpc>
+                <a:spcPct val="150000"/>
+              </a:lnSpc>
+            </a:pPr>
+            <a:r>
+              <a:rPr lang="fr-FR" b="1" dirty="0">
+                <a:solidFill>
+                  <a:schemeClr val="bg2">
+                    <a:lumMod val="50000"/>
+                  </a:schemeClr>
+                </a:solidFill>
+                <a:latin typeface="Tahoma" panose="020B0604030504040204" pitchFamily="34" charset="0"/>
+                <a:ea typeface="Tahoma" panose="020B0604030504040204" pitchFamily="34" charset="0"/>
+                <a:cs typeface="Tahoma" panose="020B0604030504040204" pitchFamily="34" charset="0"/>
+              </a:rPr>
+              <a:t>	Pr. Lamia KARIM   </a:t>
+            </a:r>
+          </a:p>
+        </p:txBody>
+      </p:sp>
     </p:spTree>
     <p:extLst>
       <p:ext uri="{BB962C8B-B14F-4D97-AF65-F5344CB8AC3E}">
@@ -6024,6 +6101,68 @@
           <a:p>
             <a:pPr algn="ctr"/>
             <a:endParaRPr lang="fr-FR"/>
+          </a:p>
+        </p:txBody>
+      </p:sp>
+      <p:sp>
+        <p:nvSpPr>
+          <p:cNvPr id="2" name="Rectangle 1">
+            <a:extLst>
+              <a:ext uri="{FF2B5EF4-FFF2-40B4-BE49-F238E27FC236}">
+                <a16:creationId xmlns:a16="http://schemas.microsoft.com/office/drawing/2014/main" id="{82DE8CD7-46DE-4295-8D94-CC6F7BC2B463}"/>
+              </a:ext>
+            </a:extLst>
+          </p:cNvPr>
+          <p:cNvSpPr/>
+          <p:nvPr/>
+        </p:nvSpPr>
+        <p:spPr>
+          <a:xfrm>
+            <a:off x="11516319" y="6057032"/>
+            <a:ext cx="914400" cy="914400"/>
+          </a:xfrm>
+          <a:prstGeom prst="rect">
+            <a:avLst/>
+          </a:prstGeom>
+          <a:noFill/>
+          <a:ln>
+            <a:noFill/>
+          </a:ln>
+        </p:spPr>
+        <p:style>
+          <a:lnRef idx="2">
+            <a:schemeClr val="accent1">
+              <a:shade val="50000"/>
+            </a:schemeClr>
+          </a:lnRef>
+          <a:fillRef idx="1">
+            <a:schemeClr val="accent1"/>
+          </a:fillRef>
+          <a:effectRef idx="0">
+            <a:schemeClr val="accent1"/>
+          </a:effectRef>
+          <a:fontRef idx="minor">
+            <a:schemeClr val="lt1"/>
+          </a:fontRef>
+        </p:style>
+        <p:txBody>
+          <a:bodyPr rtlCol="0" anchor="ctr"/>
+          <a:lstStyle/>
+          <a:p>
+            <a:pPr algn="ctr"/>
+            <a:r>
+              <a:rPr lang="en-US" dirty="0">
+                <a:solidFill>
+                  <a:schemeClr val="tx1"/>
+                </a:solidFill>
+              </a:rPr>
+              <a:t>2</a:t>
+            </a:r>
+            <a:endParaRPr lang="fr-FR" dirty="0">
+              <a:solidFill>
+                <a:schemeClr val="tx1"/>
+              </a:solidFill>
+            </a:endParaRPr>
           </a:p>
         </p:txBody>
       </p:sp>
@@ -8270,6 +8409,68 @@
           </p:spPr>
         </p:pic>
       </p:grpSp>
+      <p:sp>
+        <p:nvSpPr>
+          <p:cNvPr id="53" name="Rectangle 52">
+            <a:extLst>
+              <a:ext uri="{FF2B5EF4-FFF2-40B4-BE49-F238E27FC236}">
+                <a16:creationId xmlns:a16="http://schemas.microsoft.com/office/drawing/2014/main" id="{66239A83-BA76-42D4-9497-E7D010DFF111}"/>
+              </a:ext>
+            </a:extLst>
+          </p:cNvPr>
+          <p:cNvSpPr/>
+          <p:nvPr/>
+        </p:nvSpPr>
+        <p:spPr>
+          <a:xfrm>
+            <a:off x="11516319" y="6057032"/>
+            <a:ext cx="914400" cy="914400"/>
+          </a:xfrm>
+          <a:prstGeom prst="rect">
+            <a:avLst/>
+          </a:prstGeom>
+          <a:noFill/>
+          <a:ln>
+            <a:noFill/>
+          </a:ln>
+        </p:spPr>
+        <p:style>
+          <a:lnRef idx="2">
+            <a:schemeClr val="accent1">
+              <a:shade val="50000"/>
+            </a:schemeClr>
+          </a:lnRef>
+          <a:fillRef idx="1">
+            <a:schemeClr val="accent1"/>
+          </a:fillRef>
+          <a:effectRef idx="0">
+            <a:schemeClr val="accent1"/>
+          </a:effectRef>
+          <a:fontRef idx="minor">
+            <a:schemeClr val="lt1"/>
+          </a:fontRef>
+        </p:style>
+        <p:txBody>
+          <a:bodyPr rtlCol="0" anchor="ctr"/>
+          <a:lstStyle/>
+          <a:p>
+            <a:pPr algn="ctr"/>
+            <a:r>
+              <a:rPr lang="en-US" dirty="0">
+                <a:solidFill>
+                  <a:schemeClr val="tx1"/>
+                </a:solidFill>
+              </a:rPr>
+              <a:t>3</a:t>
+            </a:r>
+            <a:endParaRPr lang="fr-FR" dirty="0">
+              <a:solidFill>
+                <a:schemeClr val="tx1"/>
+              </a:solidFill>
+            </a:endParaRPr>
+          </a:p>
+        </p:txBody>
+      </p:sp>
     </p:spTree>
     <p:extLst>
       <p:ext uri="{BB962C8B-B14F-4D97-AF65-F5344CB8AC3E}">
@@ -10031,6 +10232,68 @@
           </a:p>
         </p:txBody>
       </p:sp>
+      <p:sp>
+        <p:nvSpPr>
+          <p:cNvPr id="35" name="Rectangle 34">
+            <a:extLst>
+              <a:ext uri="{FF2B5EF4-FFF2-40B4-BE49-F238E27FC236}">
+                <a16:creationId xmlns:a16="http://schemas.microsoft.com/office/drawing/2014/main" id="{583BB170-3E49-41E4-9AC8-6F60FC9E8B2F}"/>
+              </a:ext>
+            </a:extLst>
+          </p:cNvPr>
+          <p:cNvSpPr/>
+          <p:nvPr/>
+        </p:nvSpPr>
+        <p:spPr>
+          <a:xfrm>
+            <a:off x="11516319" y="6057032"/>
+            <a:ext cx="914400" cy="914400"/>
+          </a:xfrm>
+          <a:prstGeom prst="rect">
+            <a:avLst/>
+          </a:prstGeom>
+          <a:noFill/>
+          <a:ln>
+            <a:noFill/>
+          </a:ln>
+        </p:spPr>
+        <p:style>
+          <a:lnRef idx="2">
+            <a:schemeClr val="accent1">
+              <a:shade val="50000"/>
+            </a:schemeClr>
+          </a:lnRef>
+          <a:fillRef idx="1">
+            <a:schemeClr val="accent1"/>
+          </a:fillRef>
+          <a:effectRef idx="0">
+            <a:schemeClr val="accent1"/>
+          </a:effectRef>
+          <a:fontRef idx="minor">
+            <a:schemeClr val="lt1"/>
+          </a:fontRef>
+        </p:style>
+        <p:txBody>
+          <a:bodyPr rtlCol="0" anchor="ctr"/>
+          <a:lstStyle/>
+          <a:p>
+            <a:pPr algn="ctr"/>
+            <a:r>
+              <a:rPr lang="en-US" dirty="0">
+                <a:solidFill>
+                  <a:schemeClr val="tx1"/>
+                </a:solidFill>
+              </a:rPr>
+              <a:t>4</a:t>
+            </a:r>
+            <a:endParaRPr lang="fr-FR" dirty="0">
+              <a:solidFill>
+                <a:schemeClr val="tx1"/>
+              </a:solidFill>
+            </a:endParaRPr>
+          </a:p>
+        </p:txBody>
+      </p:sp>
     </p:spTree>
     <p:extLst>
       <p:ext uri="{BB962C8B-B14F-4D97-AF65-F5344CB8AC3E}">
@@ -10610,6 +10873,68 @@
           </a:p>
         </p:txBody>
       </p:sp>
+      <p:sp>
+        <p:nvSpPr>
+          <p:cNvPr id="11" name="Rectangle 10">
+            <a:extLst>
+              <a:ext uri="{FF2B5EF4-FFF2-40B4-BE49-F238E27FC236}">
+                <a16:creationId xmlns:a16="http://schemas.microsoft.com/office/drawing/2014/main" id="{3FEA8B0F-1EFB-4E0E-BDBE-C6A0A119EEC0}"/>
+              </a:ext>
+            </a:extLst>
+          </p:cNvPr>
+          <p:cNvSpPr/>
+          <p:nvPr/>
+        </p:nvSpPr>
+        <p:spPr>
+          <a:xfrm>
+            <a:off x="11516319" y="6057032"/>
+            <a:ext cx="914400" cy="914400"/>
+          </a:xfrm>
+          <a:prstGeom prst="rect">
+            <a:avLst/>
+          </a:prstGeom>
+          <a:noFill/>
+          <a:ln>
+            <a:noFill/>
+          </a:ln>
+        </p:spPr>
+        <p:style>
+          <a:lnRef idx="2">
+            <a:schemeClr val="accent1">
+              <a:shade val="50000"/>
+            </a:schemeClr>
+          </a:lnRef>
+          <a:fillRef idx="1">
+            <a:schemeClr val="accent1"/>
+          </a:fillRef>
+          <a:effectRef idx="0">
+            <a:schemeClr val="accent1"/>
+          </a:effectRef>
+          <a:fontRef idx="minor">
+            <a:schemeClr val="lt1"/>
+          </a:fontRef>
+        </p:style>
+        <p:txBody>
+          <a:bodyPr rtlCol="0" anchor="ctr"/>
+          <a:lstStyle/>
+          <a:p>
+            <a:pPr algn="ctr"/>
+            <a:r>
+              <a:rPr lang="en-US" dirty="0">
+                <a:solidFill>
+                  <a:schemeClr val="tx1"/>
+                </a:solidFill>
+              </a:rPr>
+              <a:t>5</a:t>
+            </a:r>
+            <a:endParaRPr lang="fr-FR" dirty="0">
+              <a:solidFill>
+                <a:schemeClr val="tx1"/>
+              </a:solidFill>
+            </a:endParaRPr>
+          </a:p>
+        </p:txBody>
+      </p:sp>
     </p:spTree>
     <p:extLst>
       <p:ext uri="{BB962C8B-B14F-4D97-AF65-F5344CB8AC3E}">
@@ -13622,6 +13947,68 @@
           </a:p>
         </p:txBody>
       </p:sp>
+      <p:sp>
+        <p:nvSpPr>
+          <p:cNvPr id="69" name="Rectangle 68">
+            <a:extLst>
+              <a:ext uri="{FF2B5EF4-FFF2-40B4-BE49-F238E27FC236}">
+                <a16:creationId xmlns:a16="http://schemas.microsoft.com/office/drawing/2014/main" id="{C215A046-4C8E-423F-BBAB-0B330C319501}"/>
+              </a:ext>
+            </a:extLst>
+          </p:cNvPr>
+          <p:cNvSpPr/>
+          <p:nvPr/>
+        </p:nvSpPr>
+        <p:spPr>
+          <a:xfrm>
+            <a:off x="11516319" y="6057032"/>
+            <a:ext cx="914400" cy="914400"/>
+          </a:xfrm>
+          <a:prstGeom prst="rect">
+            <a:avLst/>
+          </a:prstGeom>
+          <a:noFill/>
+          <a:ln>
+            <a:noFill/>
+          </a:ln>
+        </p:spPr>
+        <p:style>
+          <a:lnRef idx="2">
+            <a:schemeClr val="accent1">
+              <a:shade val="50000"/>
+            </a:schemeClr>
+          </a:lnRef>
+          <a:fillRef idx="1">
+            <a:schemeClr val="accent1"/>
+          </a:fillRef>
+          <a:effectRef idx="0">
+            <a:schemeClr val="accent1"/>
+          </a:effectRef>
+          <a:fontRef idx="minor">
+            <a:schemeClr val="lt1"/>
+          </a:fontRef>
+        </p:style>
+        <p:txBody>
+          <a:bodyPr rtlCol="0" anchor="ctr"/>
+          <a:lstStyle/>
+          <a:p>
+            <a:pPr algn="ctr"/>
+            <a:r>
+              <a:rPr lang="en-US" dirty="0">
+                <a:solidFill>
+                  <a:schemeClr val="tx1"/>
+                </a:solidFill>
+              </a:rPr>
+              <a:t>6</a:t>
+            </a:r>
+            <a:endParaRPr lang="fr-FR" dirty="0">
+              <a:solidFill>
+                <a:schemeClr val="tx1"/>
+              </a:solidFill>
+            </a:endParaRPr>
+          </a:p>
+        </p:txBody>
+      </p:sp>
     </p:spTree>
     <p:extLst>
       <p:ext uri="{BB962C8B-B14F-4D97-AF65-F5344CB8AC3E}">
@@ -14321,6 +14708,68 @@
           <a:p>
             <a:pPr algn="ctr"/>
             <a:endParaRPr lang="fr-FR"/>
+          </a:p>
+        </p:txBody>
+      </p:sp>
+      <p:sp>
+        <p:nvSpPr>
+          <p:cNvPr id="20" name="Rectangle 19">
+            <a:extLst>
+              <a:ext uri="{FF2B5EF4-FFF2-40B4-BE49-F238E27FC236}">
+                <a16:creationId xmlns:a16="http://schemas.microsoft.com/office/drawing/2014/main" id="{10105DCE-20C2-44BE-8781-150E6D5F1624}"/>
+              </a:ext>
+            </a:extLst>
+          </p:cNvPr>
+          <p:cNvSpPr/>
+          <p:nvPr/>
+        </p:nvSpPr>
+        <p:spPr>
+          <a:xfrm>
+            <a:off x="11516319" y="6057032"/>
+            <a:ext cx="914400" cy="914400"/>
+          </a:xfrm>
+          <a:prstGeom prst="rect">
+            <a:avLst/>
+          </a:prstGeom>
+          <a:noFill/>
+          <a:ln>
+            <a:noFill/>
+          </a:ln>
+        </p:spPr>
+        <p:style>
+          <a:lnRef idx="2">
+            <a:schemeClr val="accent1">
+              <a:shade val="50000"/>
+            </a:schemeClr>
+          </a:lnRef>
+          <a:fillRef idx="1">
+            <a:schemeClr val="accent1"/>
+          </a:fillRef>
+          <a:effectRef idx="0">
+            <a:schemeClr val="accent1"/>
+          </a:effectRef>
+          <a:fontRef idx="minor">
+            <a:schemeClr val="lt1"/>
+          </a:fontRef>
+        </p:style>
+        <p:txBody>
+          <a:bodyPr rtlCol="0" anchor="ctr"/>
+          <a:lstStyle/>
+          <a:p>
+            <a:pPr algn="ctr"/>
+            <a:r>
+              <a:rPr lang="en-US" dirty="0">
+                <a:solidFill>
+                  <a:schemeClr val="tx1"/>
+                </a:solidFill>
+              </a:rPr>
+              <a:t>7</a:t>
+            </a:r>
+            <a:endParaRPr lang="fr-FR" dirty="0">
+              <a:solidFill>
+                <a:schemeClr val="tx1"/>
+              </a:solidFill>
+            </a:endParaRPr>
           </a:p>
         </p:txBody>
       </p:sp>

</xml_diff>

<commit_message>
add the progress presentation v2 : [exclude one member]
</commit_message>
<xml_diff>
--- a/Progress' Presentations/Etat d'avancement - S1.pptx
+++ b/Progress' Presentations/Etat d'avancement - S1.pptx
@@ -203,7 +203,7 @@
           <a:p>
             <a:fld id="{23942927-6858-47F6-AE24-764CC11250D6}" type="datetimeFigureOut">
               <a:rPr lang="fr-FR" smtClean="0"/>
-              <a:t>02/12/2021</a:t>
+              <a:t>04/12/2021</a:t>
             </a:fld>
             <a:endParaRPr lang="fr-FR"/>
           </a:p>
@@ -619,7 +619,7 @@
           <a:p>
             <a:fld id="{33C3348E-3C1A-4598-9A7B-0D66E8588920}" type="datetimeFigureOut">
               <a:rPr lang="fr-FR" smtClean="0"/>
-              <a:t>02/12/2021</a:t>
+              <a:t>04/12/2021</a:t>
             </a:fld>
             <a:endParaRPr lang="fr-FR"/>
           </a:p>
@@ -819,7 +819,7 @@
           <a:p>
             <a:fld id="{33C3348E-3C1A-4598-9A7B-0D66E8588920}" type="datetimeFigureOut">
               <a:rPr lang="fr-FR" smtClean="0"/>
-              <a:t>02/12/2021</a:t>
+              <a:t>04/12/2021</a:t>
             </a:fld>
             <a:endParaRPr lang="fr-FR"/>
           </a:p>
@@ -1029,7 +1029,7 @@
           <a:p>
             <a:fld id="{33C3348E-3C1A-4598-9A7B-0D66E8588920}" type="datetimeFigureOut">
               <a:rPr lang="fr-FR" smtClean="0"/>
-              <a:t>02/12/2021</a:t>
+              <a:t>04/12/2021</a:t>
             </a:fld>
             <a:endParaRPr lang="fr-FR"/>
           </a:p>
@@ -1229,7 +1229,7 @@
           <a:p>
             <a:fld id="{33C3348E-3C1A-4598-9A7B-0D66E8588920}" type="datetimeFigureOut">
               <a:rPr lang="fr-FR" smtClean="0"/>
-              <a:t>02/12/2021</a:t>
+              <a:t>04/12/2021</a:t>
             </a:fld>
             <a:endParaRPr lang="fr-FR"/>
           </a:p>
@@ -1505,7 +1505,7 @@
           <a:p>
             <a:fld id="{33C3348E-3C1A-4598-9A7B-0D66E8588920}" type="datetimeFigureOut">
               <a:rPr lang="fr-FR" smtClean="0"/>
-              <a:t>02/12/2021</a:t>
+              <a:t>04/12/2021</a:t>
             </a:fld>
             <a:endParaRPr lang="fr-FR"/>
           </a:p>
@@ -1773,7 +1773,7 @@
           <a:p>
             <a:fld id="{33C3348E-3C1A-4598-9A7B-0D66E8588920}" type="datetimeFigureOut">
               <a:rPr lang="fr-FR" smtClean="0"/>
-              <a:t>02/12/2021</a:t>
+              <a:t>04/12/2021</a:t>
             </a:fld>
             <a:endParaRPr lang="fr-FR"/>
           </a:p>
@@ -2188,7 +2188,7 @@
           <a:p>
             <a:fld id="{33C3348E-3C1A-4598-9A7B-0D66E8588920}" type="datetimeFigureOut">
               <a:rPr lang="fr-FR" smtClean="0"/>
-              <a:t>02/12/2021</a:t>
+              <a:t>04/12/2021</a:t>
             </a:fld>
             <a:endParaRPr lang="fr-FR"/>
           </a:p>
@@ -2330,7 +2330,7 @@
           <a:p>
             <a:fld id="{33C3348E-3C1A-4598-9A7B-0D66E8588920}" type="datetimeFigureOut">
               <a:rPr lang="fr-FR" smtClean="0"/>
-              <a:t>02/12/2021</a:t>
+              <a:t>04/12/2021</a:t>
             </a:fld>
             <a:endParaRPr lang="fr-FR"/>
           </a:p>
@@ -2443,7 +2443,7 @@
           <a:p>
             <a:fld id="{33C3348E-3C1A-4598-9A7B-0D66E8588920}" type="datetimeFigureOut">
               <a:rPr lang="fr-FR" smtClean="0"/>
-              <a:t>02/12/2021</a:t>
+              <a:t>04/12/2021</a:t>
             </a:fld>
             <a:endParaRPr lang="fr-FR"/>
           </a:p>
@@ -2756,7 +2756,7 @@
           <a:p>
             <a:fld id="{33C3348E-3C1A-4598-9A7B-0D66E8588920}" type="datetimeFigureOut">
               <a:rPr lang="fr-FR" smtClean="0"/>
-              <a:t>02/12/2021</a:t>
+              <a:t>04/12/2021</a:t>
             </a:fld>
             <a:endParaRPr lang="fr-FR"/>
           </a:p>
@@ -3045,7 +3045,7 @@
           <a:p>
             <a:fld id="{33C3348E-3C1A-4598-9A7B-0D66E8588920}" type="datetimeFigureOut">
               <a:rPr lang="fr-FR" smtClean="0"/>
-              <a:t>02/12/2021</a:t>
+              <a:t>04/12/2021</a:t>
             </a:fld>
             <a:endParaRPr lang="fr-FR"/>
           </a:p>
@@ -3288,7 +3288,7 @@
           <a:p>
             <a:fld id="{33C3348E-3C1A-4598-9A7B-0D66E8588920}" type="datetimeFigureOut">
               <a:rPr lang="fr-FR" smtClean="0"/>
-              <a:t>02/12/2021</a:t>
+              <a:t>04/12/2021</a:t>
             </a:fld>
             <a:endParaRPr lang="fr-FR"/>
           </a:p>
@@ -6957,7 +6957,7 @@
         </p:nvGrpSpPr>
         <p:grpSpPr>
           <a:xfrm>
-            <a:off x="979423" y="4863134"/>
+            <a:off x="2413245" y="4841636"/>
             <a:ext cx="2971034" cy="1322112"/>
             <a:chOff x="1103407" y="1656125"/>
             <a:chExt cx="2971034" cy="1322112"/>
@@ -7187,10 +7187,10 @@
       </p:grpSp>
       <p:grpSp>
         <p:nvGrpSpPr>
-          <p:cNvPr id="74" name="Groupe 73">
-            <a:extLst>
-              <a:ext uri="{FF2B5EF4-FFF2-40B4-BE49-F238E27FC236}">
-                <a16:creationId xmlns:a16="http://schemas.microsoft.com/office/drawing/2014/main" id="{C6EAF3E2-0BFD-4B72-B7E5-EA6303B5E7EC}"/>
+          <p:cNvPr id="80" name="Groupe 79">
+            <a:extLst>
+              <a:ext uri="{FF2B5EF4-FFF2-40B4-BE49-F238E27FC236}">
+                <a16:creationId xmlns:a16="http://schemas.microsoft.com/office/drawing/2014/main" id="{C9D7BDFD-CE50-4242-9875-F86A7E035EC1}"/>
               </a:ext>
             </a:extLst>
           </p:cNvPr>
@@ -7199,244 +7199,7 @@
         </p:nvGrpSpPr>
         <p:grpSpPr>
           <a:xfrm>
-            <a:off x="5040158" y="4863134"/>
-            <a:ext cx="2971034" cy="891225"/>
-            <a:chOff x="1103407" y="1656125"/>
-            <a:chExt cx="2971034" cy="891225"/>
-          </a:xfrm>
-        </p:grpSpPr>
-        <p:grpSp>
-          <p:nvGrpSpPr>
-            <p:cNvPr id="75" name="Groupe 74">
-              <a:extLst>
-                <a:ext uri="{FF2B5EF4-FFF2-40B4-BE49-F238E27FC236}">
-                  <a16:creationId xmlns:a16="http://schemas.microsoft.com/office/drawing/2014/main" id="{A397620D-86EA-4334-94A2-85F5C556225D}"/>
-                </a:ext>
-              </a:extLst>
-            </p:cNvPr>
-            <p:cNvGrpSpPr/>
-            <p:nvPr/>
-          </p:nvGrpSpPr>
-          <p:grpSpPr>
-            <a:xfrm>
-              <a:off x="1103407" y="1656125"/>
-              <a:ext cx="2971034" cy="482600"/>
-              <a:chOff x="1103407" y="1656125"/>
-              <a:chExt cx="2971034" cy="482600"/>
-            </a:xfrm>
-          </p:grpSpPr>
-          <p:sp>
-            <p:nvSpPr>
-              <p:cNvPr id="78" name="Rectangle 77">
-                <a:extLst>
-                  <a:ext uri="{FF2B5EF4-FFF2-40B4-BE49-F238E27FC236}">
-                    <a16:creationId xmlns:a16="http://schemas.microsoft.com/office/drawing/2014/main" id="{25FBA2D7-48BB-4607-B8FE-7A5509099430}"/>
-                  </a:ext>
-                </a:extLst>
-              </p:cNvPr>
-              <p:cNvSpPr/>
-              <p:nvPr/>
-            </p:nvSpPr>
-            <p:spPr>
-              <a:xfrm>
-                <a:off x="1103407" y="1656125"/>
-                <a:ext cx="2970576" cy="482600"/>
-              </a:xfrm>
-              <a:prstGeom prst="rect">
-                <a:avLst/>
-              </a:prstGeom>
-              <a:solidFill>
-                <a:srgbClr val="E4E8EC"/>
-              </a:solidFill>
-              <a:ln>
-                <a:solidFill>
-                  <a:schemeClr val="bg1">
-                    <a:lumMod val="75000"/>
-                  </a:schemeClr>
-                </a:solidFill>
-              </a:ln>
-            </p:spPr>
-            <p:style>
-              <a:lnRef idx="2">
-                <a:schemeClr val="accent1">
-                  <a:shade val="50000"/>
-                </a:schemeClr>
-              </a:lnRef>
-              <a:fillRef idx="1">
-                <a:schemeClr val="accent1"/>
-              </a:fillRef>
-              <a:effectRef idx="0">
-                <a:schemeClr val="accent1"/>
-              </a:effectRef>
-              <a:fontRef idx="minor">
-                <a:schemeClr val="lt1"/>
-              </a:fontRef>
-            </p:style>
-            <p:txBody>
-              <a:bodyPr rtlCol="0" anchor="ctr"/>
-              <a:lstStyle/>
-              <a:p>
-                <a:pPr algn="ctr"/>
-                <a:r>
-                  <a:rPr lang="en-US" dirty="0"/>
-                  <a:t>               </a:t>
-                </a:r>
-                <a:r>
-                  <a:rPr lang="en-US" sz="1400" dirty="0" err="1">
-                    <a:solidFill>
-                      <a:schemeClr val="tx1"/>
-                    </a:solidFill>
-                    <a:latin typeface="Bahnschrift" panose="020B0502040204020203" pitchFamily="34" charset="0"/>
-                    <a:ea typeface="Tahoma" panose="020B0604030504040204" pitchFamily="34" charset="0"/>
-                    <a:cs typeface="Tahoma" panose="020B0604030504040204" pitchFamily="34" charset="0"/>
-                  </a:rPr>
-                  <a:t>Chaimaa</a:t>
-                </a:r>
-                <a:r>
-                  <a:rPr lang="en-US" sz="1400" dirty="0">
-                    <a:solidFill>
-                      <a:schemeClr val="tx1"/>
-                    </a:solidFill>
-                    <a:latin typeface="Bahnschrift" panose="020B0502040204020203" pitchFamily="34" charset="0"/>
-                    <a:ea typeface="Tahoma" panose="020B0604030504040204" pitchFamily="34" charset="0"/>
-                    <a:cs typeface="Tahoma" panose="020B0604030504040204" pitchFamily="34" charset="0"/>
-                  </a:rPr>
-                  <a:t> EL KABBACH</a:t>
-                </a:r>
-                <a:endParaRPr lang="fr-FR" sz="1300" dirty="0">
-                  <a:solidFill>
-                    <a:schemeClr val="tx1"/>
-                  </a:solidFill>
-                  <a:latin typeface="Bahnschrift" panose="020B0502040204020203" pitchFamily="34" charset="0"/>
-                  <a:ea typeface="Tahoma" panose="020B0604030504040204" pitchFamily="34" charset="0"/>
-                  <a:cs typeface="Tahoma" panose="020B0604030504040204" pitchFamily="34" charset="0"/>
-                </a:endParaRPr>
-              </a:p>
-            </p:txBody>
-          </p:sp>
-          <p:sp>
-            <p:nvSpPr>
-              <p:cNvPr id="79" name="Rectangle 78">
-                <a:extLst>
-                  <a:ext uri="{FF2B5EF4-FFF2-40B4-BE49-F238E27FC236}">
-                    <a16:creationId xmlns:a16="http://schemas.microsoft.com/office/drawing/2014/main" id="{4EFDD07E-7118-4AD1-B2E1-6F571BAF3383}"/>
-                  </a:ext>
-                </a:extLst>
-              </p:cNvPr>
-              <p:cNvSpPr/>
-              <p:nvPr/>
-            </p:nvSpPr>
-            <p:spPr>
-              <a:xfrm>
-                <a:off x="4029981" y="1656125"/>
-                <a:ext cx="44460" cy="482600"/>
-              </a:xfrm>
-              <a:prstGeom prst="rect">
-                <a:avLst/>
-              </a:prstGeom>
-              <a:solidFill>
-                <a:srgbClr val="CA646A"/>
-              </a:solidFill>
-              <a:ln>
-                <a:solidFill>
-                  <a:srgbClr val="CA646A"/>
-                </a:solidFill>
-              </a:ln>
-            </p:spPr>
-            <p:style>
-              <a:lnRef idx="2">
-                <a:schemeClr val="accent1">
-                  <a:shade val="50000"/>
-                </a:schemeClr>
-              </a:lnRef>
-              <a:fillRef idx="1">
-                <a:schemeClr val="accent1"/>
-              </a:fillRef>
-              <a:effectRef idx="0">
-                <a:schemeClr val="accent1"/>
-              </a:effectRef>
-              <a:fontRef idx="minor">
-                <a:schemeClr val="lt1"/>
-              </a:fontRef>
-            </p:style>
-            <p:txBody>
-              <a:bodyPr rtlCol="0" anchor="ctr"/>
-              <a:lstStyle/>
-              <a:p>
-                <a:pPr algn="ctr"/>
-                <a:endParaRPr lang="fr-FR" dirty="0"/>
-              </a:p>
-            </p:txBody>
-          </p:sp>
-        </p:grpSp>
-        <p:sp>
-          <p:nvSpPr>
-            <p:cNvPr id="76" name="ZoneTexte 75">
-              <a:extLst>
-                <a:ext uri="{FF2B5EF4-FFF2-40B4-BE49-F238E27FC236}">
-                  <a16:creationId xmlns:a16="http://schemas.microsoft.com/office/drawing/2014/main" id="{65035643-831E-475E-97E8-FFA097B355E7}"/>
-                </a:ext>
-              </a:extLst>
-            </p:cNvPr>
-            <p:cNvSpPr txBox="1"/>
-            <p:nvPr/>
-          </p:nvSpPr>
-          <p:spPr>
-            <a:xfrm>
-              <a:off x="1988540" y="2239573"/>
-              <a:ext cx="1207382" cy="307777"/>
-            </a:xfrm>
-            <a:prstGeom prst="rect">
-              <a:avLst/>
-            </a:prstGeom>
-            <a:noFill/>
-          </p:spPr>
-          <p:txBody>
-            <a:bodyPr wrap="none" rtlCol="0">
-              <a:spAutoFit/>
-            </a:bodyPr>
-            <a:lstStyle/>
-            <a:p>
-              <a:r>
-                <a:rPr lang="en-US" sz="1400" dirty="0">
-                  <a:solidFill>
-                    <a:schemeClr val="tx1">
-                      <a:lumMod val="85000"/>
-                      <a:lumOff val="15000"/>
-                    </a:schemeClr>
-                  </a:solidFill>
-                  <a:latin typeface="Bahnschrift" panose="020B0502040204020203" pitchFamily="34" charset="0"/>
-                </a:rPr>
-                <a:t>Data Analyst</a:t>
-              </a:r>
-              <a:endParaRPr lang="fr-FR" sz="1400" dirty="0">
-                <a:solidFill>
-                  <a:schemeClr val="tx1">
-                    <a:lumMod val="85000"/>
-                    <a:lumOff val="15000"/>
-                  </a:schemeClr>
-                </a:solidFill>
-                <a:latin typeface="Bahnschrift" panose="020B0502040204020203" pitchFamily="34" charset="0"/>
-              </a:endParaRPr>
-            </a:p>
-          </p:txBody>
-        </p:sp>
-      </p:grpSp>
-      <p:grpSp>
-        <p:nvGrpSpPr>
-          <p:cNvPr id="80" name="Groupe 79">
-            <a:extLst>
-              <a:ext uri="{FF2B5EF4-FFF2-40B4-BE49-F238E27FC236}">
-                <a16:creationId xmlns:a16="http://schemas.microsoft.com/office/drawing/2014/main" id="{C9D7BDFD-CE50-4242-9875-F86A7E035EC1}"/>
-              </a:ext>
-            </a:extLst>
-          </p:cNvPr>
-          <p:cNvGrpSpPr/>
-          <p:nvPr/>
-        </p:nvGrpSpPr>
-        <p:grpSpPr>
-          <a:xfrm>
-            <a:off x="8987086" y="4885233"/>
+            <a:off x="7631713" y="4835319"/>
             <a:ext cx="2971034" cy="894079"/>
             <a:chOff x="1103407" y="1656125"/>
             <a:chExt cx="2971034" cy="894079"/>
@@ -7676,7 +7439,7 @@
         </p:blipFill>
         <p:spPr>
           <a:xfrm>
-            <a:off x="156005" y="4882323"/>
+            <a:off x="1589827" y="4860825"/>
             <a:ext cx="1645920" cy="1645920"/>
           </a:xfrm>
           <a:prstGeom prst="ellipse">
@@ -7763,7 +7526,7 @@
         </p:blipFill>
         <p:spPr>
           <a:xfrm>
-            <a:off x="8163096" y="4910739"/>
+            <a:off x="6807723" y="4860825"/>
             <a:ext cx="1645920" cy="1645126"/>
           </a:xfrm>
           <a:prstGeom prst="ellipse">
@@ -8071,46 +7834,6 @@
           </p:sp>
         </p:grpSp>
       </p:grpSp>
-      <p:pic>
-        <p:nvPicPr>
-          <p:cNvPr id="9" name="Image 8">
-            <a:extLst>
-              <a:ext uri="{FF2B5EF4-FFF2-40B4-BE49-F238E27FC236}">
-                <a16:creationId xmlns:a16="http://schemas.microsoft.com/office/drawing/2014/main" id="{156FA382-A81F-4784-AD15-77FB7AEA3F58}"/>
-              </a:ext>
-            </a:extLst>
-          </p:cNvPr>
-          <p:cNvPicPr>
-            <a:picLocks noChangeAspect="1"/>
-          </p:cNvPicPr>
-          <p:nvPr/>
-        </p:nvPicPr>
-        <p:blipFill rotWithShape="1">
-          <a:blip r:embed="rId8">
-            <a:extLst>
-              <a:ext uri="{28A0092B-C50C-407E-A947-70E740481C1C}">
-                <a14:useLocalDpi xmlns:a14="http://schemas.microsoft.com/office/drawing/2010/main" val="0"/>
-              </a:ext>
-            </a:extLst>
-          </a:blip>
-          <a:srcRect t="2375" r="945" b="23340"/>
-          <a:stretch/>
-        </p:blipFill>
-        <p:spPr>
-          <a:xfrm>
-            <a:off x="4247770" y="4869073"/>
-            <a:ext cx="1645920" cy="1645742"/>
-          </a:xfrm>
-          <a:prstGeom prst="ellipse">
-            <a:avLst/>
-          </a:prstGeom>
-          <a:ln w="28575">
-            <a:solidFill>
-              <a:srgbClr val="CA646A"/>
-            </a:solidFill>
-          </a:ln>
-        </p:spPr>
-      </p:pic>
       <p:grpSp>
         <p:nvGrpSpPr>
           <p:cNvPr id="3" name="Groupe 2">
@@ -8383,7 +8106,7 @@
             <p:nvPr/>
           </p:nvPicPr>
           <p:blipFill rotWithShape="1">
-            <a:blip r:embed="rId9">
+            <a:blip r:embed="rId8">
               <a:extLst>
                 <a:ext uri="{28A0092B-C50C-407E-A947-70E740481C1C}">
                   <a14:useLocalDpi xmlns:a14="http://schemas.microsoft.com/office/drawing/2010/main" val="0"/>

</xml_diff>